<commit_message>
ADC auto adjust and analog deadzone
</commit_message>
<xml_diff>
--- a/doc/Firmware_manual.pptx
+++ b/doc/Firmware_manual.pptx
@@ -5177,6 +5177,336 @@
           </a:fontRef>
         </p:style>
       </p:cxnSp>
+      <p:sp>
+        <p:nvSpPr>
+          <p:cNvPr id="2" name="左大括号 1">
+            <a:extLst>
+              <a:ext uri="{FF2B5EF4-FFF2-40B4-BE49-F238E27FC236}">
+                <a16:creationId xmlns:a16="http://schemas.microsoft.com/office/drawing/2014/main" id="{07F91A2A-5FC7-6FBE-6B91-3BD12644DABF}"/>
+              </a:ext>
+            </a:extLst>
+          </p:cNvPr>
+          <p:cNvSpPr/>
+          <p:nvPr/>
+        </p:nvSpPr>
+        <p:spPr>
+          <a:xfrm rot="10800000">
+            <a:off x="10118725" y="2066078"/>
+            <a:ext cx="417184" cy="1172940"/>
+          </a:xfrm>
+          <a:prstGeom prst="leftBrace">
+            <a:avLst>
+              <a:gd name="adj1" fmla="val 21655"/>
+              <a:gd name="adj2" fmla="val 50551"/>
+            </a:avLst>
+          </a:prstGeom>
+          <a:ln w="28575">
+            <a:solidFill>
+              <a:schemeClr val="accent4">
+                <a:lumMod val="75000"/>
+                <a:alpha val="69804"/>
+              </a:schemeClr>
+            </a:solidFill>
+          </a:ln>
+        </p:spPr>
+        <p:style>
+          <a:lnRef idx="1">
+            <a:schemeClr val="accent1"/>
+          </a:lnRef>
+          <a:fillRef idx="0">
+            <a:schemeClr val="accent1"/>
+          </a:fillRef>
+          <a:effectRef idx="0">
+            <a:schemeClr val="accent1"/>
+          </a:effectRef>
+          <a:fontRef idx="minor">
+            <a:schemeClr val="tx1"/>
+          </a:fontRef>
+        </p:style>
+        <p:txBody>
+          <a:bodyPr rtlCol="0" anchor="ctr"/>
+          <a:lstStyle/>
+          <a:p>
+            <a:pPr algn="ctr"/>
+            <a:endParaRPr lang="zh-CN" altLang="en-US"/>
+          </a:p>
+        </p:txBody>
+      </p:sp>
+      <p:sp>
+        <p:nvSpPr>
+          <p:cNvPr id="9" name="文本框 8">
+            <a:extLst>
+              <a:ext uri="{FF2B5EF4-FFF2-40B4-BE49-F238E27FC236}">
+                <a16:creationId xmlns:a16="http://schemas.microsoft.com/office/drawing/2014/main" id="{B8471C1D-2200-4F4F-8FED-D15431D6918D}"/>
+              </a:ext>
+            </a:extLst>
+          </p:cNvPr>
+          <p:cNvSpPr txBox="1"/>
+          <p:nvPr/>
+        </p:nvSpPr>
+        <p:spPr>
+          <a:xfrm>
+            <a:off x="10776742" y="2405178"/>
+            <a:ext cx="1121834" cy="565146"/>
+          </a:xfrm>
+          <a:prstGeom prst="rect">
+            <a:avLst/>
+          </a:prstGeom>
+          <a:noFill/>
+        </p:spPr>
+        <p:txBody>
+          <a:bodyPr wrap="square" lIns="36000" tIns="36000" rIns="36000" bIns="36000" rtlCol="0">
+            <a:spAutoFit/>
+          </a:bodyPr>
+          <a:lstStyle/>
+          <a:p>
+            <a:pPr algn="ctr"/>
+            <a:r>
+              <a:rPr lang="en-US" altLang="zh-CN" sz="1600" b="1" dirty="0">
+                <a:solidFill>
+                  <a:schemeClr val="accent4">
+                    <a:lumMod val="75000"/>
+                  </a:schemeClr>
+                </a:solidFill>
+              </a:rPr>
+              <a:t>Analog</a:t>
+            </a:r>
+            <a:br>
+              <a:rPr lang="en-US" altLang="zh-CN" sz="1600" b="1" dirty="0">
+                <a:solidFill>
+                  <a:schemeClr val="accent4">
+                    <a:lumMod val="75000"/>
+                  </a:schemeClr>
+                </a:solidFill>
+              </a:rPr>
+            </a:br>
+            <a:r>
+              <a:rPr lang="en-US" altLang="zh-CN" sz="1600" b="1" dirty="0">
+                <a:solidFill>
+                  <a:schemeClr val="accent4">
+                    <a:lumMod val="75000"/>
+                  </a:schemeClr>
+                </a:solidFill>
+              </a:rPr>
+              <a:t>Deadzone</a:t>
+            </a:r>
+            <a:endParaRPr lang="zh-CN" altLang="en-US" sz="1600" b="1" dirty="0">
+              <a:solidFill>
+                <a:schemeClr val="accent4">
+                  <a:lumMod val="75000"/>
+                </a:schemeClr>
+              </a:solidFill>
+            </a:endParaRPr>
+          </a:p>
+        </p:txBody>
+      </p:sp>
+      <p:sp>
+        <p:nvSpPr>
+          <p:cNvPr id="10" name="矩形: 圆角 9">
+            <a:extLst>
+              <a:ext uri="{FF2B5EF4-FFF2-40B4-BE49-F238E27FC236}">
+                <a16:creationId xmlns:a16="http://schemas.microsoft.com/office/drawing/2014/main" id="{B152DA46-81F0-54FD-59E7-65C6A819093C}"/>
+              </a:ext>
+            </a:extLst>
+          </p:cNvPr>
+          <p:cNvSpPr/>
+          <p:nvPr/>
+        </p:nvSpPr>
+        <p:spPr>
+          <a:xfrm>
+            <a:off x="7210835" y="2090975"/>
+            <a:ext cx="694445" cy="1120685"/>
+          </a:xfrm>
+          <a:prstGeom prst="roundRect">
+            <a:avLst>
+              <a:gd name="adj" fmla="val 9697"/>
+            </a:avLst>
+          </a:prstGeom>
+          <a:solidFill>
+            <a:schemeClr val="accent4">
+              <a:lumMod val="75000"/>
+              <a:alpha val="30196"/>
+            </a:schemeClr>
+          </a:solidFill>
+          <a:ln>
+            <a:noFill/>
+          </a:ln>
+        </p:spPr>
+        <p:style>
+          <a:lnRef idx="2">
+            <a:schemeClr val="accent1">
+              <a:shade val="50000"/>
+            </a:schemeClr>
+          </a:lnRef>
+          <a:fillRef idx="1">
+            <a:schemeClr val="accent1"/>
+          </a:fillRef>
+          <a:effectRef idx="0">
+            <a:schemeClr val="accent1"/>
+          </a:effectRef>
+          <a:fontRef idx="minor">
+            <a:schemeClr val="lt1"/>
+          </a:fontRef>
+        </p:style>
+        <p:txBody>
+          <a:bodyPr rtlCol="0" anchor="b"/>
+          <a:lstStyle/>
+          <a:p>
+            <a:pPr algn="ctr"/>
+            <a:r>
+              <a:rPr lang="en-US" altLang="zh-CN" sz="1300" b="1" dirty="0">
+                <a:solidFill>
+                  <a:schemeClr val="accent4">
+                    <a:lumMod val="75000"/>
+                  </a:schemeClr>
+                </a:solidFill>
+              </a:rPr>
+              <a:t>1.4°</a:t>
+            </a:r>
+            <a:endParaRPr lang="zh-CN" altLang="en-US" sz="1300" b="1" dirty="0">
+              <a:solidFill>
+                <a:schemeClr val="accent4">
+                  <a:lumMod val="75000"/>
+                </a:schemeClr>
+              </a:solidFill>
+            </a:endParaRPr>
+          </a:p>
+        </p:txBody>
+      </p:sp>
+      <p:sp>
+        <p:nvSpPr>
+          <p:cNvPr id="18" name="矩形: 圆角 17">
+            <a:extLst>
+              <a:ext uri="{FF2B5EF4-FFF2-40B4-BE49-F238E27FC236}">
+                <a16:creationId xmlns:a16="http://schemas.microsoft.com/office/drawing/2014/main" id="{9A948D97-BA1A-FC99-ADFD-7A4F98106EF7}"/>
+              </a:ext>
+            </a:extLst>
+          </p:cNvPr>
+          <p:cNvSpPr/>
+          <p:nvPr/>
+        </p:nvSpPr>
+        <p:spPr>
+          <a:xfrm>
+            <a:off x="8222426" y="2090975"/>
+            <a:ext cx="694445" cy="1120685"/>
+          </a:xfrm>
+          <a:prstGeom prst="roundRect">
+            <a:avLst>
+              <a:gd name="adj" fmla="val 9697"/>
+            </a:avLst>
+          </a:prstGeom>
+          <a:solidFill>
+            <a:schemeClr val="accent4">
+              <a:lumMod val="75000"/>
+              <a:alpha val="30196"/>
+            </a:schemeClr>
+          </a:solidFill>
+          <a:ln>
+            <a:noFill/>
+          </a:ln>
+        </p:spPr>
+        <p:style>
+          <a:lnRef idx="2">
+            <a:schemeClr val="accent1">
+              <a:shade val="50000"/>
+            </a:schemeClr>
+          </a:lnRef>
+          <a:fillRef idx="1">
+            <a:schemeClr val="accent1"/>
+          </a:fillRef>
+          <a:effectRef idx="0">
+            <a:schemeClr val="accent1"/>
+          </a:effectRef>
+          <a:fontRef idx="minor">
+            <a:schemeClr val="lt1"/>
+          </a:fontRef>
+        </p:style>
+        <p:txBody>
+          <a:bodyPr rtlCol="0" anchor="b"/>
+          <a:lstStyle/>
+          <a:p>
+            <a:pPr algn="ctr"/>
+            <a:r>
+              <a:rPr lang="en-US" altLang="zh-CN" sz="1300" b="1" dirty="0">
+                <a:solidFill>
+                  <a:schemeClr val="accent4">
+                    <a:lumMod val="75000"/>
+                  </a:schemeClr>
+                </a:solidFill>
+              </a:rPr>
+              <a:t>2.8°</a:t>
+            </a:r>
+            <a:endParaRPr lang="zh-CN" altLang="en-US" sz="1300" b="1" dirty="0"/>
+          </a:p>
+        </p:txBody>
+      </p:sp>
+      <p:sp>
+        <p:nvSpPr>
+          <p:cNvPr id="21" name="矩形: 圆角 20">
+            <a:extLst>
+              <a:ext uri="{FF2B5EF4-FFF2-40B4-BE49-F238E27FC236}">
+                <a16:creationId xmlns:a16="http://schemas.microsoft.com/office/drawing/2014/main" id="{ED6C52A8-4108-1ABD-A6E3-CA9F55351877}"/>
+              </a:ext>
+            </a:extLst>
+          </p:cNvPr>
+          <p:cNvSpPr/>
+          <p:nvPr/>
+        </p:nvSpPr>
+        <p:spPr>
+          <a:xfrm>
+            <a:off x="9233780" y="2090228"/>
+            <a:ext cx="694445" cy="1120685"/>
+          </a:xfrm>
+          <a:prstGeom prst="roundRect">
+            <a:avLst>
+              <a:gd name="adj" fmla="val 9697"/>
+            </a:avLst>
+          </a:prstGeom>
+          <a:solidFill>
+            <a:schemeClr val="accent4">
+              <a:lumMod val="75000"/>
+              <a:alpha val="30196"/>
+            </a:schemeClr>
+          </a:solidFill>
+          <a:ln>
+            <a:noFill/>
+          </a:ln>
+        </p:spPr>
+        <p:style>
+          <a:lnRef idx="2">
+            <a:schemeClr val="accent1">
+              <a:shade val="50000"/>
+            </a:schemeClr>
+          </a:lnRef>
+          <a:fillRef idx="1">
+            <a:schemeClr val="accent1"/>
+          </a:fillRef>
+          <a:effectRef idx="0">
+            <a:schemeClr val="accent1"/>
+          </a:effectRef>
+          <a:fontRef idx="minor">
+            <a:schemeClr val="lt1"/>
+          </a:fontRef>
+        </p:style>
+        <p:txBody>
+          <a:bodyPr rtlCol="0" anchor="b"/>
+          <a:lstStyle/>
+          <a:p>
+            <a:pPr algn="ctr"/>
+            <a:r>
+              <a:rPr lang="en-US" altLang="zh-CN" sz="1300" b="1" dirty="0">
+                <a:solidFill>
+                  <a:schemeClr val="accent4">
+                    <a:lumMod val="75000"/>
+                  </a:schemeClr>
+                </a:solidFill>
+              </a:rPr>
+              <a:t>4.2°</a:t>
+            </a:r>
+            <a:endParaRPr lang="zh-CN" altLang="en-US" sz="1300" b="1" dirty="0"/>
+          </a:p>
+        </p:txBody>
+      </p:sp>
     </p:spTree>
     <p:extLst>
       <p:ext uri="{BB962C8B-B14F-4D97-AF65-F5344CB8AC3E}">

</xml_diff>

<commit_message>
Add LED Off mode
</commit_message>
<xml_diff>
--- a/doc/Firmware_manual.pptx
+++ b/doc/Firmware_manual.pptx
@@ -347,7 +347,7 @@
           <a:p>
             <a:fld id="{3EE251DF-F41D-4D38-AD68-E860CD6864CB}" type="datetimeFigureOut">
               <a:rPr lang="zh-CN" altLang="en-US" smtClean="0"/>
-              <a:t>2023/4/16</a:t>
+              <a:t>2023/4/18</a:t>
             </a:fld>
             <a:endParaRPr lang="zh-CN" altLang="en-US"/>
           </a:p>
@@ -4791,7 +4791,7 @@
                   </a:schemeClr>
                 </a:solidFill>
               </a:rPr>
-              <a:t>Direction</a:t>
+              <a:t>Mode</a:t>
             </a:r>
             <a:endParaRPr lang="zh-CN" altLang="en-US" sz="1600" b="1" dirty="0">
               <a:solidFill>
@@ -5062,7 +5062,7 @@
               </a:lnSpc>
             </a:pPr>
             <a:r>
-              <a:rPr lang="en-US" altLang="zh-CN" sz="1300" b="1" dirty="0">
+              <a:rPr lang="en-US" altLang="zh-CN" sz="1200" b="1" dirty="0">
                 <a:solidFill>
                   <a:srgbClr val="009E47"/>
                 </a:solidFill>
@@ -5077,7 +5077,7 @@
               </a:lnSpc>
             </a:pPr>
             <a:r>
-              <a:rPr lang="en-US" altLang="zh-CN" sz="1300" b="1" dirty="0">
+              <a:rPr lang="en-US" altLang="zh-CN" sz="1200" b="1" dirty="0">
                 <a:solidFill>
                   <a:srgbClr val="FF0000"/>
                 </a:solidFill>
@@ -5092,7 +5092,7 @@
               </a:lnSpc>
             </a:pPr>
             <a:r>
-              <a:rPr lang="en-US" altLang="zh-CN" sz="1300" b="1" dirty="0">
+              <a:rPr lang="en-US" altLang="zh-CN" sz="1200" b="1" dirty="0">
                 <a:solidFill>
                   <a:srgbClr val="00B0F0"/>
                 </a:solidFill>
@@ -5107,7 +5107,7 @@
               </a:lnSpc>
             </a:pPr>
             <a:r>
-              <a:rPr lang="en-US" altLang="zh-CN" sz="1300" b="1" dirty="0">
+              <a:rPr lang="en-US" altLang="zh-CN" sz="1200" b="1" dirty="0">
                 <a:solidFill>
                   <a:schemeClr val="accent4">
                     <a:lumMod val="75000"/>
@@ -5116,7 +5116,7 @@
               </a:rPr>
               <a:t>I2C Reversed</a:t>
             </a:r>
-            <a:endParaRPr lang="zh-CN" altLang="en-US" sz="1300" b="1" dirty="0">
+            <a:endParaRPr lang="zh-CN" altLang="en-US" sz="1200" b="1" dirty="0">
               <a:solidFill>
                 <a:schemeClr val="accent4">
                   <a:lumMod val="75000"/>
@@ -5507,6 +5507,141 @@
           </a:p>
         </p:txBody>
       </p:sp>
+      <p:sp>
+        <p:nvSpPr>
+          <p:cNvPr id="27" name="文本框 26">
+            <a:extLst>
+              <a:ext uri="{FF2B5EF4-FFF2-40B4-BE49-F238E27FC236}">
+                <a16:creationId xmlns:a16="http://schemas.microsoft.com/office/drawing/2014/main" id="{E62C67B6-13DA-53FE-5D48-4091013EAAB7}"/>
+              </a:ext>
+            </a:extLst>
+          </p:cNvPr>
+          <p:cNvSpPr txBox="1"/>
+          <p:nvPr/>
+        </p:nvSpPr>
+        <p:spPr>
+          <a:xfrm>
+            <a:off x="5516198" y="145952"/>
+            <a:ext cx="803713" cy="611312"/>
+          </a:xfrm>
+          <a:prstGeom prst="rect">
+            <a:avLst/>
+          </a:prstGeom>
+          <a:solidFill>
+            <a:schemeClr val="bg1">
+              <a:lumMod val="85000"/>
+            </a:schemeClr>
+          </a:solidFill>
+          <a:ln w="9525">
+            <a:solidFill>
+              <a:srgbClr val="0070C0"/>
+            </a:solidFill>
+            <a:prstDash val="sysDot"/>
+          </a:ln>
+          <a:effectLst/>
+        </p:spPr>
+        <p:txBody>
+          <a:bodyPr wrap="square" lIns="54000" tIns="36000" rIns="36000" bIns="36000" rtlCol="0">
+            <a:spAutoFit/>
+          </a:bodyPr>
+          <a:lstStyle/>
+          <a:p>
+            <a:pPr algn="r">
+              <a:lnSpc>
+                <a:spcPts val="1400"/>
+              </a:lnSpc>
+            </a:pPr>
+            <a:r>
+              <a:rPr lang="en-US" altLang="zh-CN" sz="1200" b="1" dirty="0">
+                <a:solidFill>
+                  <a:srgbClr val="00B0F0"/>
+                </a:solidFill>
+              </a:rPr>
+              <a:t>Normal</a:t>
+            </a:r>
+          </a:p>
+          <a:p>
+            <a:pPr algn="r">
+              <a:lnSpc>
+                <a:spcPts val="1400"/>
+              </a:lnSpc>
+            </a:pPr>
+            <a:r>
+              <a:rPr lang="en-US" altLang="zh-CN" sz="1200" b="1" dirty="0">
+                <a:solidFill>
+                  <a:schemeClr val="accent4">
+                    <a:lumMod val="75000"/>
+                  </a:schemeClr>
+                </a:solidFill>
+              </a:rPr>
+              <a:t>Reversed</a:t>
+            </a:r>
+          </a:p>
+          <a:p>
+            <a:pPr algn="r">
+              <a:lnSpc>
+                <a:spcPts val="1400"/>
+              </a:lnSpc>
+            </a:pPr>
+            <a:r>
+              <a:rPr lang="en-US" altLang="zh-CN" sz="1200" b="1" dirty="0"/>
+              <a:t>Off</a:t>
+            </a:r>
+          </a:p>
+        </p:txBody>
+      </p:sp>
+      <p:cxnSp>
+        <p:nvCxnSpPr>
+          <p:cNvPr id="30" name="连接符: 肘形 29">
+            <a:extLst>
+              <a:ext uri="{FF2B5EF4-FFF2-40B4-BE49-F238E27FC236}">
+                <a16:creationId xmlns:a16="http://schemas.microsoft.com/office/drawing/2014/main" id="{FE5AEEC1-12F6-D1C3-5528-DC952F8E5C09}"/>
+              </a:ext>
+            </a:extLst>
+          </p:cNvPr>
+          <p:cNvCxnSpPr>
+            <a:cxnSpLocks/>
+            <a:stCxn id="27" idx="3"/>
+            <a:endCxn id="28" idx="0"/>
+          </p:cNvCxnSpPr>
+          <p:nvPr/>
+        </p:nvCxnSpPr>
+        <p:spPr>
+          <a:xfrm flipV="1">
+            <a:off x="6319911" y="239027"/>
+            <a:ext cx="2271125" cy="212581"/>
+          </a:xfrm>
+          <a:prstGeom prst="bentConnector4">
+            <a:avLst>
+              <a:gd name="adj1" fmla="val 6819"/>
+              <a:gd name="adj2" fmla="val 143784"/>
+            </a:avLst>
+          </a:prstGeom>
+          <a:ln w="28575">
+            <a:solidFill>
+              <a:schemeClr val="accent5">
+                <a:lumMod val="75000"/>
+                <a:alpha val="69804"/>
+              </a:schemeClr>
+            </a:solidFill>
+            <a:prstDash val="sysDot"/>
+          </a:ln>
+        </p:spPr>
+        <p:style>
+          <a:lnRef idx="1">
+            <a:schemeClr val="accent1"/>
+          </a:lnRef>
+          <a:fillRef idx="0">
+            <a:schemeClr val="accent1"/>
+          </a:fillRef>
+          <a:effectRef idx="0">
+            <a:schemeClr val="accent1"/>
+          </a:effectRef>
+          <a:fontRef idx="minor">
+            <a:schemeClr val="tx1"/>
+          </a:fontRef>
+        </p:style>
+      </p:cxnSp>
     </p:spTree>
     <p:extLst>
       <p:ext uri="{BB962C8B-B14F-4D97-AF65-F5344CB8AC3E}">

</xml_diff>

<commit_message>
Keycap print FDM guide
</commit_message>
<xml_diff>
--- a/doc/Firmware_manual.pptx
+++ b/doc/Firmware_manual.pptx
@@ -774,10 +774,10 @@
       </p:grpSpPr>
       <p:pic>
         <p:nvPicPr>
-          <p:cNvPr id="11" name="图片 10">
-            <a:extLst>
-              <a:ext uri="{FF2B5EF4-FFF2-40B4-BE49-F238E27FC236}">
-                <a16:creationId xmlns:a16="http://schemas.microsoft.com/office/drawing/2014/main" id="{42C84BB9-D9F8-6F69-5A31-11444C98BF7F}"/>
+          <p:cNvPr id="3" name="图片 2">
+            <a:extLst>
+              <a:ext uri="{FF2B5EF4-FFF2-40B4-BE49-F238E27FC236}">
+                <a16:creationId xmlns:a16="http://schemas.microsoft.com/office/drawing/2014/main" id="{DC122279-C0AB-BECD-6DAC-4EFEE92A3F15}"/>
               </a:ext>
             </a:extLst>
           </p:cNvPr>
@@ -1556,9 +1556,9 @@
         <p:grpSpPr>
           <a:xfrm>
             <a:off x="6726964" y="1471273"/>
-            <a:ext cx="3669573" cy="3091260"/>
+            <a:ext cx="3669573" cy="3019191"/>
             <a:chOff x="6726964" y="1153775"/>
-            <a:chExt cx="3669573" cy="3091260"/>
+            <a:chExt cx="3669573" cy="3019191"/>
           </a:xfrm>
         </p:grpSpPr>
         <p:sp>
@@ -1575,7 +1575,7 @@
           </p:nvSpPr>
           <p:spPr>
             <a:xfrm>
-              <a:off x="6758939" y="3844925"/>
+              <a:off x="6758939" y="3772856"/>
               <a:ext cx="586023" cy="400110"/>
             </a:xfrm>
             <a:prstGeom prst="rect">
@@ -1624,7 +1624,7 @@
           </p:nvSpPr>
           <p:spPr>
             <a:xfrm>
-              <a:off x="7772399" y="3844925"/>
+              <a:off x="7772399" y="3772856"/>
               <a:ext cx="586023" cy="400110"/>
             </a:xfrm>
             <a:prstGeom prst="rect">
@@ -1673,7 +1673,7 @@
           </p:nvSpPr>
           <p:spPr>
             <a:xfrm>
-              <a:off x="8785859" y="3844925"/>
+              <a:off x="8785859" y="3772856"/>
               <a:ext cx="586023" cy="400110"/>
             </a:xfrm>
             <a:prstGeom prst="rect">
@@ -1722,7 +1722,7 @@
           </p:nvSpPr>
           <p:spPr>
             <a:xfrm>
-              <a:off x="9799319" y="3844925"/>
+              <a:off x="9799319" y="3772856"/>
               <a:ext cx="586023" cy="400110"/>
             </a:xfrm>
             <a:prstGeom prst="rect">
@@ -1771,7 +1771,7 @@
           </p:nvSpPr>
           <p:spPr>
             <a:xfrm>
-              <a:off x="7265669" y="2450168"/>
+              <a:off x="7265669" y="2378099"/>
               <a:ext cx="586023" cy="400110"/>
             </a:xfrm>
             <a:prstGeom prst="rect">
@@ -1820,7 +1820,7 @@
           </p:nvSpPr>
           <p:spPr>
             <a:xfrm>
-              <a:off x="8290559" y="2450168"/>
+              <a:off x="8290559" y="2378099"/>
               <a:ext cx="586023" cy="400110"/>
             </a:xfrm>
             <a:prstGeom prst="rect">
@@ -1869,7 +1869,7 @@
           </p:nvSpPr>
           <p:spPr>
             <a:xfrm>
-              <a:off x="9289538" y="2450168"/>
+              <a:off x="9289538" y="2378099"/>
               <a:ext cx="586023" cy="400110"/>
             </a:xfrm>
             <a:prstGeom prst="rect">
@@ -2496,17 +2496,21 @@
         </p:nvSpPr>
         <p:spPr>
           <a:xfrm>
-            <a:off x="9852637" y="935063"/>
-            <a:ext cx="603610" cy="230832"/>
-          </a:xfrm>
-          <a:prstGeom prst="rect">
-            <a:avLst/>
+            <a:off x="9852637" y="873104"/>
+            <a:ext cx="603610" cy="287718"/>
+          </a:xfrm>
+          <a:prstGeom prst="roundRect">
+            <a:avLst>
+              <a:gd name="adj" fmla="val 29099"/>
+            </a:avLst>
           </a:prstGeom>
-          <a:noFill/>
+          <a:solidFill>
+            <a:srgbClr val="FF0000"/>
+          </a:solidFill>
         </p:spPr>
         <p:txBody>
           <a:bodyPr wrap="square" lIns="36000" tIns="0" rIns="36000" bIns="0" rtlCol="0">
-            <a:spAutoFit/>
+            <a:noAutofit/>
           </a:bodyPr>
           <a:lstStyle/>
           <a:p>
@@ -2518,14 +2522,14 @@
             <a:r>
               <a:rPr lang="en-US" altLang="zh-CN" sz="1600" b="1" dirty="0">
                 <a:solidFill>
-                  <a:srgbClr val="FF0000"/>
+                  <a:schemeClr val="bg1"/>
                 </a:solidFill>
               </a:rPr>
               <a:t>Hold</a:t>
             </a:r>
             <a:endParaRPr lang="zh-CN" altLang="en-US" sz="1600" b="1" dirty="0">
               <a:solidFill>
-                <a:srgbClr val="FF0000"/>
+                <a:schemeClr val="bg1"/>
               </a:solidFill>
             </a:endParaRPr>
           </a:p>
@@ -2545,7 +2549,7 @@
         </p:nvSpPr>
         <p:spPr>
           <a:xfrm>
-            <a:off x="7508922" y="635498"/>
+            <a:off x="7508922" y="625973"/>
             <a:ext cx="1363358" cy="303536"/>
           </a:xfrm>
           <a:prstGeom prst="rect">
@@ -2828,13 +2832,12 @@
           <p:cNvCxnSpPr>
             <a:cxnSpLocks/>
             <a:stCxn id="21" idx="3"/>
-            <a:endCxn id="20" idx="0"/>
           </p:cNvCxnSpPr>
           <p:nvPr/>
         </p:nvCxnSpPr>
         <p:spPr>
           <a:xfrm>
-            <a:off x="8872280" y="787266"/>
+            <a:off x="8872280" y="777741"/>
             <a:ext cx="1282162" cy="147797"/>
           </a:xfrm>
           <a:prstGeom prst="bentConnector2">
@@ -2880,8 +2883,8 @@
         </p:nvCxnSpPr>
         <p:spPr>
           <a:xfrm>
-            <a:off x="10456247" y="1050479"/>
-            <a:ext cx="1059338" cy="503152"/>
+            <a:off x="10456247" y="1016963"/>
+            <a:ext cx="951242" cy="536668"/>
           </a:xfrm>
           <a:prstGeom prst="bentConnector2">
             <a:avLst/>
@@ -2922,7 +2925,7 @@
         </p:nvSpPr>
         <p:spPr>
           <a:xfrm>
-            <a:off x="11013340" y="1553631"/>
+            <a:off x="10905244" y="1553631"/>
             <a:ext cx="1004489" cy="534368"/>
           </a:xfrm>
           <a:prstGeom prst="rect">
@@ -2975,7 +2978,7 @@
         </p:nvSpPr>
         <p:spPr>
           <a:xfrm>
-            <a:off x="10704185" y="845650"/>
+            <a:off x="10623113" y="828446"/>
             <a:ext cx="950117" cy="184666"/>
           </a:xfrm>
           <a:prstGeom prst="rect">
@@ -3001,6 +3004,671 @@
           </a:p>
         </p:txBody>
       </p:sp>
+      <p:sp>
+        <p:nvSpPr>
+          <p:cNvPr id="6" name="矩形: 圆角 5">
+            <a:extLst>
+              <a:ext uri="{FF2B5EF4-FFF2-40B4-BE49-F238E27FC236}">
+                <a16:creationId xmlns:a16="http://schemas.microsoft.com/office/drawing/2014/main" id="{8759A2FC-4800-5EBA-A90A-D70EA2441814}"/>
+              </a:ext>
+            </a:extLst>
+          </p:cNvPr>
+          <p:cNvSpPr/>
+          <p:nvPr/>
+        </p:nvSpPr>
+        <p:spPr>
+          <a:xfrm>
+            <a:off x="7210835" y="2412706"/>
+            <a:ext cx="694445" cy="1120685"/>
+          </a:xfrm>
+          <a:prstGeom prst="roundRect">
+            <a:avLst>
+              <a:gd name="adj" fmla="val 9697"/>
+            </a:avLst>
+          </a:prstGeom>
+          <a:solidFill>
+            <a:schemeClr val="accent4">
+              <a:lumMod val="75000"/>
+              <a:alpha val="30196"/>
+            </a:schemeClr>
+          </a:solidFill>
+          <a:ln>
+            <a:noFill/>
+          </a:ln>
+        </p:spPr>
+        <p:style>
+          <a:lnRef idx="2">
+            <a:schemeClr val="accent1">
+              <a:shade val="50000"/>
+            </a:schemeClr>
+          </a:lnRef>
+          <a:fillRef idx="1">
+            <a:schemeClr val="accent1"/>
+          </a:fillRef>
+          <a:effectRef idx="0">
+            <a:schemeClr val="accent1"/>
+          </a:effectRef>
+          <a:fontRef idx="minor">
+            <a:schemeClr val="lt1"/>
+          </a:fontRef>
+        </p:style>
+        <p:txBody>
+          <a:bodyPr lIns="36000" tIns="36000" rIns="36000" bIns="36000" rtlCol="0" anchor="b"/>
+          <a:lstStyle/>
+          <a:p>
+            <a:pPr algn="ctr"/>
+            <a:r>
+              <a:rPr lang="en-US" altLang="zh-CN" sz="1300" b="1" dirty="0">
+                <a:solidFill>
+                  <a:schemeClr val="accent4">
+                    <a:lumMod val="75000"/>
+                  </a:schemeClr>
+                </a:solidFill>
+              </a:rPr>
+              <a:t>TT</a:t>
+            </a:r>
+            <a:br>
+              <a:rPr lang="en-US" altLang="zh-CN" sz="1300" b="1" dirty="0">
+                <a:solidFill>
+                  <a:schemeClr val="accent4">
+                    <a:lumMod val="75000"/>
+                  </a:schemeClr>
+                </a:solidFill>
+              </a:rPr>
+            </a:br>
+            <a:r>
+              <a:rPr lang="en-US" altLang="zh-CN" sz="1300" b="1" dirty="0">
+                <a:solidFill>
+                  <a:schemeClr val="accent4">
+                    <a:lumMod val="75000"/>
+                  </a:schemeClr>
+                </a:solidFill>
+              </a:rPr>
+              <a:t>Effect</a:t>
+            </a:r>
+            <a:endParaRPr lang="zh-CN" altLang="en-US" sz="1300" b="1" dirty="0">
+              <a:solidFill>
+                <a:schemeClr val="accent4">
+                  <a:lumMod val="75000"/>
+                </a:schemeClr>
+              </a:solidFill>
+            </a:endParaRPr>
+          </a:p>
+        </p:txBody>
+      </p:sp>
+      <p:sp>
+        <p:nvSpPr>
+          <p:cNvPr id="8" name="矩形: 圆角 7">
+            <a:extLst>
+              <a:ext uri="{FF2B5EF4-FFF2-40B4-BE49-F238E27FC236}">
+                <a16:creationId xmlns:a16="http://schemas.microsoft.com/office/drawing/2014/main" id="{ADBE85F7-0999-F7DC-E1CC-450D9F145D19}"/>
+              </a:ext>
+            </a:extLst>
+          </p:cNvPr>
+          <p:cNvSpPr/>
+          <p:nvPr/>
+        </p:nvSpPr>
+        <p:spPr>
+          <a:xfrm>
+            <a:off x="8222426" y="2412706"/>
+            <a:ext cx="694445" cy="1120685"/>
+          </a:xfrm>
+          <a:prstGeom prst="roundRect">
+            <a:avLst>
+              <a:gd name="adj" fmla="val 9697"/>
+            </a:avLst>
+          </a:prstGeom>
+          <a:solidFill>
+            <a:schemeClr val="accent4">
+              <a:lumMod val="75000"/>
+              <a:alpha val="30196"/>
+            </a:schemeClr>
+          </a:solidFill>
+          <a:ln>
+            <a:noFill/>
+          </a:ln>
+        </p:spPr>
+        <p:style>
+          <a:lnRef idx="2">
+            <a:schemeClr val="accent1">
+              <a:shade val="50000"/>
+            </a:schemeClr>
+          </a:lnRef>
+          <a:fillRef idx="1">
+            <a:schemeClr val="accent1"/>
+          </a:fillRef>
+          <a:effectRef idx="0">
+            <a:schemeClr val="accent1"/>
+          </a:effectRef>
+          <a:fontRef idx="minor">
+            <a:schemeClr val="lt1"/>
+          </a:fontRef>
+        </p:style>
+        <p:txBody>
+          <a:bodyPr lIns="36000" tIns="36000" rIns="36000" bIns="36000" rtlCol="0" anchor="b"/>
+          <a:lstStyle/>
+          <a:p>
+            <a:pPr algn="ctr"/>
+            <a:r>
+              <a:rPr lang="en-US" altLang="zh-CN" sz="1300" b="1" dirty="0">
+                <a:solidFill>
+                  <a:schemeClr val="accent4">
+                    <a:lumMod val="75000"/>
+                  </a:schemeClr>
+                </a:solidFill>
+              </a:rPr>
+              <a:t>Up</a:t>
+            </a:r>
+            <a:br>
+              <a:rPr lang="en-US" altLang="zh-CN" sz="1300" b="1" dirty="0">
+                <a:solidFill>
+                  <a:schemeClr val="accent4">
+                    <a:lumMod val="75000"/>
+                  </a:schemeClr>
+                </a:solidFill>
+              </a:rPr>
+            </a:br>
+            <a:r>
+              <a:rPr lang="en-US" altLang="zh-CN" sz="1300" b="1" dirty="0">
+                <a:solidFill>
+                  <a:schemeClr val="accent4">
+                    <a:lumMod val="75000"/>
+                  </a:schemeClr>
+                </a:solidFill>
+              </a:rPr>
+              <a:t>Color</a:t>
+            </a:r>
+            <a:endParaRPr lang="zh-CN" altLang="en-US" sz="1300" b="1" dirty="0">
+              <a:solidFill>
+                <a:schemeClr val="accent4">
+                  <a:lumMod val="75000"/>
+                </a:schemeClr>
+              </a:solidFill>
+            </a:endParaRPr>
+          </a:p>
+        </p:txBody>
+      </p:sp>
+      <p:sp>
+        <p:nvSpPr>
+          <p:cNvPr id="9" name="矩形: 圆角 8">
+            <a:extLst>
+              <a:ext uri="{FF2B5EF4-FFF2-40B4-BE49-F238E27FC236}">
+                <a16:creationId xmlns:a16="http://schemas.microsoft.com/office/drawing/2014/main" id="{2C66D444-A49A-457F-8041-D6762ACACBD5}"/>
+              </a:ext>
+            </a:extLst>
+          </p:cNvPr>
+          <p:cNvSpPr/>
+          <p:nvPr/>
+        </p:nvSpPr>
+        <p:spPr>
+          <a:xfrm>
+            <a:off x="9233780" y="2411959"/>
+            <a:ext cx="694445" cy="1120685"/>
+          </a:xfrm>
+          <a:prstGeom prst="roundRect">
+            <a:avLst>
+              <a:gd name="adj" fmla="val 9697"/>
+            </a:avLst>
+          </a:prstGeom>
+          <a:solidFill>
+            <a:schemeClr val="accent4">
+              <a:lumMod val="75000"/>
+              <a:alpha val="30196"/>
+            </a:schemeClr>
+          </a:solidFill>
+          <a:ln>
+            <a:noFill/>
+          </a:ln>
+        </p:spPr>
+        <p:style>
+          <a:lnRef idx="2">
+            <a:schemeClr val="accent1">
+              <a:shade val="50000"/>
+            </a:schemeClr>
+          </a:lnRef>
+          <a:fillRef idx="1">
+            <a:schemeClr val="accent1"/>
+          </a:fillRef>
+          <a:effectRef idx="0">
+            <a:schemeClr val="accent1"/>
+          </a:effectRef>
+          <a:fontRef idx="minor">
+            <a:schemeClr val="lt1"/>
+          </a:fontRef>
+        </p:style>
+        <p:txBody>
+          <a:bodyPr lIns="36000" tIns="36000" rIns="36000" bIns="36000" rtlCol="0" anchor="b"/>
+          <a:lstStyle/>
+          <a:p>
+            <a:pPr algn="ctr"/>
+            <a:endParaRPr lang="zh-CN" altLang="en-US" sz="1300" b="1" dirty="0">
+              <a:solidFill>
+                <a:schemeClr val="accent4">
+                  <a:lumMod val="75000"/>
+                </a:schemeClr>
+              </a:solidFill>
+            </a:endParaRPr>
+          </a:p>
+        </p:txBody>
+      </p:sp>
+      <p:sp>
+        <p:nvSpPr>
+          <p:cNvPr id="10" name="矩形: 圆角 9">
+            <a:extLst>
+              <a:ext uri="{FF2B5EF4-FFF2-40B4-BE49-F238E27FC236}">
+                <a16:creationId xmlns:a16="http://schemas.microsoft.com/office/drawing/2014/main" id="{5268326C-5710-A117-D2C7-3F36551D2446}"/>
+              </a:ext>
+            </a:extLst>
+          </p:cNvPr>
+          <p:cNvSpPr/>
+          <p:nvPr/>
+        </p:nvSpPr>
+        <p:spPr>
+          <a:xfrm>
+            <a:off x="6705666" y="3792143"/>
+            <a:ext cx="694445" cy="1120685"/>
+          </a:xfrm>
+          <a:prstGeom prst="roundRect">
+            <a:avLst>
+              <a:gd name="adj" fmla="val 9697"/>
+            </a:avLst>
+          </a:prstGeom>
+          <a:solidFill>
+            <a:schemeClr val="accent4">
+              <a:lumMod val="75000"/>
+              <a:alpha val="30196"/>
+            </a:schemeClr>
+          </a:solidFill>
+          <a:ln>
+            <a:noFill/>
+          </a:ln>
+        </p:spPr>
+        <p:style>
+          <a:lnRef idx="2">
+            <a:schemeClr val="accent1">
+              <a:shade val="50000"/>
+            </a:schemeClr>
+          </a:lnRef>
+          <a:fillRef idx="1">
+            <a:schemeClr val="accent1"/>
+          </a:fillRef>
+          <a:effectRef idx="0">
+            <a:schemeClr val="accent1"/>
+          </a:effectRef>
+          <a:fontRef idx="minor">
+            <a:schemeClr val="lt1"/>
+          </a:fontRef>
+        </p:style>
+        <p:txBody>
+          <a:bodyPr lIns="36000" tIns="36000" rIns="36000" bIns="36000" rtlCol="0" anchor="b"/>
+          <a:lstStyle/>
+          <a:p>
+            <a:pPr algn="ctr"/>
+            <a:r>
+              <a:rPr lang="en-US" altLang="zh-CN" sz="1300" b="1" dirty="0">
+                <a:solidFill>
+                  <a:schemeClr val="accent4">
+                    <a:lumMod val="75000"/>
+                  </a:schemeClr>
+                </a:solidFill>
+              </a:rPr>
+              <a:t>Theme</a:t>
+            </a:r>
+            <a:endParaRPr lang="zh-CN" altLang="en-US" sz="1300" b="1" dirty="0">
+              <a:solidFill>
+                <a:schemeClr val="accent4">
+                  <a:lumMod val="75000"/>
+                </a:schemeClr>
+              </a:solidFill>
+            </a:endParaRPr>
+          </a:p>
+        </p:txBody>
+      </p:sp>
+      <p:sp>
+        <p:nvSpPr>
+          <p:cNvPr id="11" name="矩形: 圆角 10">
+            <a:extLst>
+              <a:ext uri="{FF2B5EF4-FFF2-40B4-BE49-F238E27FC236}">
+                <a16:creationId xmlns:a16="http://schemas.microsoft.com/office/drawing/2014/main" id="{28FF11EF-2D67-8AA1-975B-989DCA894003}"/>
+              </a:ext>
+            </a:extLst>
+          </p:cNvPr>
+          <p:cNvSpPr/>
+          <p:nvPr/>
+        </p:nvSpPr>
+        <p:spPr>
+          <a:xfrm>
+            <a:off x="7712792" y="3795426"/>
+            <a:ext cx="694445" cy="1120685"/>
+          </a:xfrm>
+          <a:prstGeom prst="roundRect">
+            <a:avLst>
+              <a:gd name="adj" fmla="val 9697"/>
+            </a:avLst>
+          </a:prstGeom>
+          <a:solidFill>
+            <a:schemeClr val="accent4">
+              <a:lumMod val="75000"/>
+              <a:alpha val="30196"/>
+            </a:schemeClr>
+          </a:solidFill>
+          <a:ln>
+            <a:noFill/>
+          </a:ln>
+        </p:spPr>
+        <p:style>
+          <a:lnRef idx="2">
+            <a:schemeClr val="accent1">
+              <a:shade val="50000"/>
+            </a:schemeClr>
+          </a:lnRef>
+          <a:fillRef idx="1">
+            <a:schemeClr val="accent1"/>
+          </a:fillRef>
+          <a:effectRef idx="0">
+            <a:schemeClr val="accent1"/>
+          </a:effectRef>
+          <a:fontRef idx="minor">
+            <a:schemeClr val="lt1"/>
+          </a:fontRef>
+        </p:style>
+        <p:txBody>
+          <a:bodyPr lIns="36000" tIns="36000" rIns="36000" bIns="36000" rtlCol="0" anchor="b"/>
+          <a:lstStyle/>
+          <a:p>
+            <a:pPr algn="ctr"/>
+            <a:r>
+              <a:rPr lang="en-US" altLang="zh-CN" sz="1300" b="1" dirty="0">
+                <a:solidFill>
+                  <a:schemeClr val="accent4">
+                    <a:lumMod val="75000"/>
+                  </a:schemeClr>
+                </a:solidFill>
+              </a:rPr>
+              <a:t>Down</a:t>
+            </a:r>
+          </a:p>
+          <a:p>
+            <a:pPr algn="ctr"/>
+            <a:r>
+              <a:rPr lang="en-US" altLang="zh-CN" sz="1300" b="1" dirty="0">
+                <a:solidFill>
+                  <a:schemeClr val="accent4">
+                    <a:lumMod val="75000"/>
+                  </a:schemeClr>
+                </a:solidFill>
+              </a:rPr>
+              <a:t>Color</a:t>
+            </a:r>
+            <a:endParaRPr lang="zh-CN" altLang="en-US" sz="1300" b="1" dirty="0">
+              <a:solidFill>
+                <a:schemeClr val="accent4">
+                  <a:lumMod val="75000"/>
+                </a:schemeClr>
+              </a:solidFill>
+            </a:endParaRPr>
+          </a:p>
+        </p:txBody>
+      </p:sp>
+      <p:sp>
+        <p:nvSpPr>
+          <p:cNvPr id="12" name="矩形: 圆角 11">
+            <a:extLst>
+              <a:ext uri="{FF2B5EF4-FFF2-40B4-BE49-F238E27FC236}">
+                <a16:creationId xmlns:a16="http://schemas.microsoft.com/office/drawing/2014/main" id="{FB39A25D-3FB5-8488-D6AB-4116F870FCA3}"/>
+              </a:ext>
+            </a:extLst>
+          </p:cNvPr>
+          <p:cNvSpPr/>
+          <p:nvPr/>
+        </p:nvSpPr>
+        <p:spPr>
+          <a:xfrm>
+            <a:off x="8727511" y="3792143"/>
+            <a:ext cx="694445" cy="1120685"/>
+          </a:xfrm>
+          <a:prstGeom prst="roundRect">
+            <a:avLst>
+              <a:gd name="adj" fmla="val 9697"/>
+            </a:avLst>
+          </a:prstGeom>
+          <a:solidFill>
+            <a:schemeClr val="accent4">
+              <a:lumMod val="75000"/>
+              <a:alpha val="30196"/>
+            </a:schemeClr>
+          </a:solidFill>
+          <a:ln>
+            <a:noFill/>
+          </a:ln>
+        </p:spPr>
+        <p:style>
+          <a:lnRef idx="2">
+            <a:schemeClr val="accent1">
+              <a:shade val="50000"/>
+            </a:schemeClr>
+          </a:lnRef>
+          <a:fillRef idx="1">
+            <a:schemeClr val="accent1"/>
+          </a:fillRef>
+          <a:effectRef idx="0">
+            <a:schemeClr val="accent1"/>
+          </a:effectRef>
+          <a:fontRef idx="minor">
+            <a:schemeClr val="lt1"/>
+          </a:fontRef>
+        </p:style>
+        <p:txBody>
+          <a:bodyPr lIns="36000" tIns="36000" rIns="36000" bIns="36000" rtlCol="0" anchor="b"/>
+          <a:lstStyle/>
+          <a:p>
+            <a:pPr algn="ctr"/>
+            <a:r>
+              <a:rPr lang="en-US" altLang="zh-CN" sz="1300" b="1" dirty="0">
+                <a:solidFill>
+                  <a:schemeClr val="accent4">
+                    <a:lumMod val="75000"/>
+                  </a:schemeClr>
+                </a:solidFill>
+              </a:rPr>
+              <a:t>E-Row</a:t>
+            </a:r>
+            <a:br>
+              <a:rPr lang="en-US" altLang="zh-CN" sz="1300" b="1" dirty="0">
+                <a:solidFill>
+                  <a:schemeClr val="accent4">
+                    <a:lumMod val="75000"/>
+                  </a:schemeClr>
+                </a:solidFill>
+              </a:rPr>
+            </a:br>
+            <a:r>
+              <a:rPr lang="en-US" altLang="zh-CN" sz="1300" b="1" dirty="0">
+                <a:solidFill>
+                  <a:schemeClr val="accent4">
+                    <a:lumMod val="75000"/>
+                  </a:schemeClr>
+                </a:solidFill>
+              </a:rPr>
+              <a:t>Color</a:t>
+            </a:r>
+            <a:endParaRPr lang="zh-CN" altLang="en-US" sz="1300" b="1" dirty="0">
+              <a:solidFill>
+                <a:schemeClr val="accent4">
+                  <a:lumMod val="75000"/>
+                </a:schemeClr>
+              </a:solidFill>
+            </a:endParaRPr>
+          </a:p>
+        </p:txBody>
+      </p:sp>
+      <p:sp>
+        <p:nvSpPr>
+          <p:cNvPr id="13" name="矩形: 圆角 12">
+            <a:extLst>
+              <a:ext uri="{FF2B5EF4-FFF2-40B4-BE49-F238E27FC236}">
+                <a16:creationId xmlns:a16="http://schemas.microsoft.com/office/drawing/2014/main" id="{1C4D0F25-2AD5-0869-5F7E-34A1A48E15E0}"/>
+              </a:ext>
+            </a:extLst>
+          </p:cNvPr>
+          <p:cNvSpPr/>
+          <p:nvPr/>
+        </p:nvSpPr>
+        <p:spPr>
+          <a:xfrm>
+            <a:off x="9734637" y="3792143"/>
+            <a:ext cx="694445" cy="1120685"/>
+          </a:xfrm>
+          <a:prstGeom prst="roundRect">
+            <a:avLst>
+              <a:gd name="adj" fmla="val 9697"/>
+            </a:avLst>
+          </a:prstGeom>
+          <a:solidFill>
+            <a:schemeClr val="accent4">
+              <a:lumMod val="75000"/>
+              <a:alpha val="30196"/>
+            </a:schemeClr>
+          </a:solidFill>
+          <a:ln>
+            <a:noFill/>
+          </a:ln>
+        </p:spPr>
+        <p:style>
+          <a:lnRef idx="2">
+            <a:schemeClr val="accent1">
+              <a:shade val="50000"/>
+            </a:schemeClr>
+          </a:lnRef>
+          <a:fillRef idx="1">
+            <a:schemeClr val="accent1"/>
+          </a:fillRef>
+          <a:effectRef idx="0">
+            <a:schemeClr val="accent1"/>
+          </a:effectRef>
+          <a:fontRef idx="minor">
+            <a:schemeClr val="lt1"/>
+          </a:fontRef>
+        </p:style>
+        <p:txBody>
+          <a:bodyPr lIns="36000" tIns="36000" rIns="36000" bIns="36000" rtlCol="0" anchor="b"/>
+          <a:lstStyle/>
+          <a:p>
+            <a:pPr algn="ctr"/>
+            <a:endParaRPr lang="zh-CN" altLang="en-US" sz="1300" b="1" dirty="0">
+              <a:solidFill>
+                <a:schemeClr val="accent4">
+                  <a:lumMod val="75000"/>
+                </a:schemeClr>
+              </a:solidFill>
+            </a:endParaRPr>
+          </a:p>
+        </p:txBody>
+      </p:sp>
+      <p:sp>
+        <p:nvSpPr>
+          <p:cNvPr id="14" name="左大括号 13">
+            <a:extLst>
+              <a:ext uri="{FF2B5EF4-FFF2-40B4-BE49-F238E27FC236}">
+                <a16:creationId xmlns:a16="http://schemas.microsoft.com/office/drawing/2014/main" id="{ED754121-08A1-B733-B738-EE93E051FA2E}"/>
+              </a:ext>
+            </a:extLst>
+          </p:cNvPr>
+          <p:cNvSpPr/>
+          <p:nvPr/>
+        </p:nvSpPr>
+        <p:spPr>
+          <a:xfrm rot="10800000" flipH="1">
+            <a:off x="6198236" y="2411960"/>
+            <a:ext cx="417184" cy="2500868"/>
+          </a:xfrm>
+          <a:prstGeom prst="leftBrace">
+            <a:avLst>
+              <a:gd name="adj1" fmla="val 21655"/>
+              <a:gd name="adj2" fmla="val 50551"/>
+            </a:avLst>
+          </a:prstGeom>
+          <a:ln w="28575">
+            <a:solidFill>
+              <a:schemeClr val="accent4">
+                <a:lumMod val="75000"/>
+                <a:alpha val="69804"/>
+              </a:schemeClr>
+            </a:solidFill>
+          </a:ln>
+        </p:spPr>
+        <p:style>
+          <a:lnRef idx="1">
+            <a:schemeClr val="accent1"/>
+          </a:lnRef>
+          <a:fillRef idx="0">
+            <a:schemeClr val="accent1"/>
+          </a:fillRef>
+          <a:effectRef idx="0">
+            <a:schemeClr val="accent1"/>
+          </a:effectRef>
+          <a:fontRef idx="minor">
+            <a:schemeClr val="tx1"/>
+          </a:fontRef>
+        </p:style>
+        <p:txBody>
+          <a:bodyPr rtlCol="0" anchor="ctr"/>
+          <a:lstStyle/>
+          <a:p>
+            <a:pPr algn="ctr"/>
+            <a:endParaRPr lang="zh-CN" altLang="en-US"/>
+          </a:p>
+        </p:txBody>
+      </p:sp>
+      <p:cxnSp>
+        <p:nvCxnSpPr>
+          <p:cNvPr id="16" name="连接符: 肘形 15">
+            <a:extLst>
+              <a:ext uri="{FF2B5EF4-FFF2-40B4-BE49-F238E27FC236}">
+                <a16:creationId xmlns:a16="http://schemas.microsoft.com/office/drawing/2014/main" id="{323D88EB-DF41-3BAC-C388-2117A3977FDE}"/>
+              </a:ext>
+            </a:extLst>
+          </p:cNvPr>
+          <p:cNvCxnSpPr>
+            <a:cxnSpLocks/>
+            <a:stCxn id="20" idx="0"/>
+            <a:endCxn id="14" idx="1"/>
+          </p:cNvCxnSpPr>
+          <p:nvPr/>
+        </p:nvCxnSpPr>
+        <p:spPr>
+          <a:xfrm rot="16200000" flipH="1" flipV="1">
+            <a:off x="6788584" y="282756"/>
+            <a:ext cx="2775510" cy="3956206"/>
+          </a:xfrm>
+          <a:prstGeom prst="bentConnector4">
+            <a:avLst>
+              <a:gd name="adj1" fmla="val -12697"/>
+              <a:gd name="adj2" fmla="val 105778"/>
+            </a:avLst>
+          </a:prstGeom>
+          <a:ln w="28575">
+            <a:solidFill>
+              <a:srgbClr val="FF0000"/>
+            </a:solidFill>
+            <a:prstDash val="sysDot"/>
+          </a:ln>
+        </p:spPr>
+        <p:style>
+          <a:lnRef idx="1">
+            <a:schemeClr val="accent1"/>
+          </a:lnRef>
+          <a:fillRef idx="0">
+            <a:schemeClr val="accent1"/>
+          </a:fillRef>
+          <a:effectRef idx="0">
+            <a:schemeClr val="accent1"/>
+          </a:effectRef>
+          <a:fontRef idx="minor">
+            <a:schemeClr val="tx1"/>
+          </a:fontRef>
+        </p:style>
+      </p:cxnSp>
     </p:spTree>
     <p:extLst>
       <p:ext uri="{BB962C8B-B14F-4D97-AF65-F5344CB8AC3E}">
@@ -3560,7 +4228,7 @@
         </p:nvSpPr>
         <p:spPr>
           <a:xfrm rot="13792854">
-            <a:off x="5105038" y="1540518"/>
+            <a:off x="5113504" y="1532052"/>
             <a:ext cx="437078" cy="304655"/>
           </a:xfrm>
           <a:prstGeom prst="leftArrow">
@@ -5342,7 +6010,7 @@
         </p:nvSpPr>
         <p:spPr>
           <a:xfrm>
-            <a:off x="4449688" y="1073633"/>
+            <a:off x="4453921" y="1077866"/>
             <a:ext cx="1038549" cy="318924"/>
           </a:xfrm>
           <a:prstGeom prst="rect">
@@ -5445,7 +6113,7 @@
         </p:nvSpPr>
         <p:spPr>
           <a:xfrm rot="13792854">
-            <a:off x="5105038" y="1536283"/>
+            <a:off x="5113504" y="1527817"/>
             <a:ext cx="437078" cy="304655"/>
           </a:xfrm>
           <a:prstGeom prst="leftArrow">
@@ -5734,7 +6402,17 @@
           <a:lstStyle/>
           <a:p>
             <a:pPr algn="ctr"/>
-            <a:endParaRPr lang="zh-CN" altLang="en-US" sz="1300" b="1">
+            <a:r>
+              <a:rPr lang="en-US" altLang="zh-CN" sz="1300" b="1" dirty="0">
+                <a:solidFill>
+                  <a:schemeClr val="accent4">
+                    <a:lumMod val="75000"/>
+                  </a:schemeClr>
+                </a:solidFill>
+              </a:rPr>
+              <a:t>17%</a:t>
+            </a:r>
+            <a:endParaRPr lang="zh-CN" altLang="en-US" sz="1300" b="1" dirty="0">
               <a:solidFill>
                 <a:schemeClr val="accent4">
                   <a:lumMod val="75000"/>
@@ -5797,7 +6475,17 @@
           <a:lstStyle/>
           <a:p>
             <a:pPr algn="ctr"/>
-            <a:endParaRPr lang="zh-CN" altLang="en-US" sz="1300" b="1">
+            <a:r>
+              <a:rPr lang="en-US" altLang="zh-CN" sz="1300" b="1" dirty="0">
+                <a:solidFill>
+                  <a:schemeClr val="accent4">
+                    <a:lumMod val="75000"/>
+                  </a:schemeClr>
+                </a:solidFill>
+              </a:rPr>
+              <a:t>50%</a:t>
+            </a:r>
+            <a:endParaRPr lang="zh-CN" altLang="en-US" sz="1300" b="1" dirty="0">
               <a:solidFill>
                 <a:schemeClr val="accent4">
                   <a:lumMod val="75000"/>
@@ -5860,7 +6548,17 @@
           <a:lstStyle/>
           <a:p>
             <a:pPr algn="ctr"/>
-            <a:endParaRPr lang="zh-CN" altLang="en-US" sz="1300" b="1">
+            <a:r>
+              <a:rPr lang="en-US" altLang="zh-CN" sz="1300" b="1" dirty="0">
+                <a:solidFill>
+                  <a:schemeClr val="accent4">
+                    <a:lumMod val="75000"/>
+                  </a:schemeClr>
+                </a:solidFill>
+              </a:rPr>
+              <a:t>83%</a:t>
+            </a:r>
+            <a:endParaRPr lang="zh-CN" altLang="en-US" sz="1300" b="1" dirty="0">
               <a:solidFill>
                 <a:schemeClr val="accent4">
                   <a:lumMod val="75000"/>
@@ -5884,7 +6582,7 @@
         </p:nvSpPr>
         <p:spPr>
           <a:xfrm>
-            <a:off x="6705666" y="3798454"/>
+            <a:off x="6705666" y="3792143"/>
             <a:ext cx="694445" cy="1120685"/>
           </a:xfrm>
           <a:prstGeom prst="roundRect">
@@ -5923,7 +6621,17 @@
           <a:lstStyle/>
           <a:p>
             <a:pPr algn="ctr"/>
-            <a:endParaRPr lang="zh-CN" altLang="en-US" sz="1300" b="1">
+            <a:r>
+              <a:rPr lang="en-US" altLang="zh-CN" sz="1300" b="1" dirty="0">
+                <a:solidFill>
+                  <a:schemeClr val="accent4">
+                    <a:lumMod val="75000"/>
+                  </a:schemeClr>
+                </a:solidFill>
+              </a:rPr>
+              <a:t>0%</a:t>
+            </a:r>
+            <a:endParaRPr lang="zh-CN" altLang="en-US" sz="1300" b="1" dirty="0">
               <a:solidFill>
                 <a:schemeClr val="accent4">
                   <a:lumMod val="75000"/>
@@ -5986,7 +6694,17 @@
           <a:lstStyle/>
           <a:p>
             <a:pPr algn="ctr"/>
-            <a:endParaRPr lang="zh-CN" altLang="en-US" sz="1300" b="1">
+            <a:r>
+              <a:rPr lang="en-US" altLang="zh-CN" sz="1300" b="1" dirty="0">
+                <a:solidFill>
+                  <a:schemeClr val="accent4">
+                    <a:lumMod val="75000"/>
+                  </a:schemeClr>
+                </a:solidFill>
+              </a:rPr>
+              <a:t>33%</a:t>
+            </a:r>
+            <a:endParaRPr lang="zh-CN" altLang="en-US" sz="1300" b="1" dirty="0">
               <a:solidFill>
                 <a:schemeClr val="accent4">
                   <a:lumMod val="75000"/>
@@ -6049,7 +6767,17 @@
           <a:lstStyle/>
           <a:p>
             <a:pPr algn="ctr"/>
-            <a:endParaRPr lang="zh-CN" altLang="en-US" sz="1300" b="1">
+            <a:r>
+              <a:rPr lang="en-US" altLang="zh-CN" sz="1300" b="1" dirty="0">
+                <a:solidFill>
+                  <a:schemeClr val="accent4">
+                    <a:lumMod val="75000"/>
+                  </a:schemeClr>
+                </a:solidFill>
+              </a:rPr>
+              <a:t>67%</a:t>
+            </a:r>
+            <a:endParaRPr lang="zh-CN" altLang="en-US" sz="1300" b="1" dirty="0">
               <a:solidFill>
                 <a:schemeClr val="accent4">
                   <a:lumMod val="75000"/>
@@ -6112,7 +6840,17 @@
           <a:lstStyle/>
           <a:p>
             <a:pPr algn="ctr"/>
-            <a:endParaRPr lang="zh-CN" altLang="en-US" sz="1300" b="1">
+            <a:r>
+              <a:rPr lang="en-US" altLang="zh-CN" sz="1300" b="1" dirty="0">
+                <a:solidFill>
+                  <a:schemeClr val="accent4">
+                    <a:lumMod val="75000"/>
+                  </a:schemeClr>
+                </a:solidFill>
+              </a:rPr>
+              <a:t>100%</a:t>
+            </a:r>
+            <a:endParaRPr lang="zh-CN" altLang="en-US" sz="1300" b="1" dirty="0">
               <a:solidFill>
                 <a:schemeClr val="accent4">
                   <a:lumMod val="75000"/>

</xml_diff>

<commit_message>
Key color setting done
</commit_message>
<xml_diff>
--- a/doc/Firmware_manual.pptx
+++ b/doc/Firmware_manual.pptx
@@ -361,7 +361,7 @@
           <a:p>
             <a:fld id="{5233C8C7-F8F0-45E5-B257-B695ED03E8DF}" type="datetimeFigureOut">
               <a:rPr lang="zh-CN" altLang="en-US" smtClean="0"/>
-              <a:t>2023/4/22</a:t>
+              <a:t>2023/4/29</a:t>
             </a:fld>
             <a:endParaRPr lang="zh-CN" altLang="en-US"/>
           </a:p>
@@ -3157,7 +3157,7 @@
                   </a:schemeClr>
                 </a:solidFill>
               </a:rPr>
-              <a:t>Up</a:t>
+              <a:t>Key Off</a:t>
             </a:r>
             <a:br>
               <a:rPr lang="en-US" altLang="zh-CN" sz="1300" b="1" dirty="0">
@@ -3312,6 +3312,25 @@
                   </a:schemeClr>
                 </a:solidFill>
               </a:rPr>
+              <a:t>Key</a:t>
+            </a:r>
+            <a:br>
+              <a:rPr lang="en-US" altLang="zh-CN" sz="1300" b="1" dirty="0">
+                <a:solidFill>
+                  <a:schemeClr val="accent4">
+                    <a:lumMod val="75000"/>
+                  </a:schemeClr>
+                </a:solidFill>
+              </a:rPr>
+            </a:br>
+            <a:r>
+              <a:rPr lang="en-US" altLang="zh-CN" sz="1300" b="1" dirty="0">
+                <a:solidFill>
+                  <a:schemeClr val="accent4">
+                    <a:lumMod val="75000"/>
+                  </a:schemeClr>
+                </a:solidFill>
+              </a:rPr>
               <a:t>Theme</a:t>
             </a:r>
             <a:endParaRPr lang="zh-CN" altLang="en-US" sz="1300" b="1" dirty="0">
@@ -3385,7 +3404,7 @@
                   </a:schemeClr>
                 </a:solidFill>
               </a:rPr>
-              <a:t>Down</a:t>
+              <a:t>Key On</a:t>
             </a:r>
           </a:p>
           <a:p>
@@ -3463,35 +3482,6 @@
           <a:lstStyle/>
           <a:p>
             <a:pPr algn="ctr"/>
-            <a:r>
-              <a:rPr lang="en-US" altLang="zh-CN" sz="1300" b="1" dirty="0">
-                <a:solidFill>
-                  <a:schemeClr val="accent4">
-                    <a:lumMod val="75000"/>
-                  </a:schemeClr>
-                </a:solidFill>
-              </a:rPr>
-              <a:t>E-Row</a:t>
-            </a:r>
-            <a:br>
-              <a:rPr lang="en-US" altLang="zh-CN" sz="1300" b="1" dirty="0">
-                <a:solidFill>
-                  <a:schemeClr val="accent4">
-                    <a:lumMod val="75000"/>
-                  </a:schemeClr>
-                </a:solidFill>
-              </a:rPr>
-            </a:br>
-            <a:r>
-              <a:rPr lang="en-US" altLang="zh-CN" sz="1300" b="1" dirty="0">
-                <a:solidFill>
-                  <a:schemeClr val="accent4">
-                    <a:lumMod val="75000"/>
-                  </a:schemeClr>
-                </a:solidFill>
-              </a:rPr>
-              <a:t>Color</a:t>
-            </a:r>
             <a:endParaRPr lang="zh-CN" altLang="en-US" sz="1300" b="1" dirty="0">
               <a:solidFill>
                 <a:schemeClr val="accent4">

</xml_diff>

<commit_message>
Konami spoof mode support.
</commit_message>
<xml_diff>
--- a/doc/Firmware_manual.pptx
+++ b/doc/Firmware_manual.pptx
@@ -8,9 +8,10 @@
   <p:sldIdLst>
     <p:sldId id="256" r:id="rId3"/>
     <p:sldId id="258" r:id="rId4"/>
-    <p:sldId id="260" r:id="rId5"/>
-    <p:sldId id="259" r:id="rId6"/>
-    <p:sldId id="261" r:id="rId7"/>
+    <p:sldId id="262" r:id="rId5"/>
+    <p:sldId id="260" r:id="rId6"/>
+    <p:sldId id="259" r:id="rId7"/>
+    <p:sldId id="261" r:id="rId8"/>
   </p:sldIdLst>
   <p:sldSz cx="12192000" cy="6858000"/>
   <p:notesSz cx="6858000" cy="9144000"/>
@@ -361,7 +362,7 @@
           <a:p>
             <a:fld id="{5233C8C7-F8F0-45E5-B257-B695ED03E8DF}" type="datetimeFigureOut">
               <a:rPr lang="zh-CN" altLang="en-US" smtClean="0"/>
-              <a:t>2023/5/3</a:t>
+              <a:t>2023/5/15</a:t>
             </a:fld>
             <a:endParaRPr lang="zh-CN" altLang="en-US"/>
           </a:p>
@@ -2239,6 +2240,624 @@
       </p:grpSpPr>
       <p:sp>
         <p:nvSpPr>
+          <p:cNvPr id="3" name="标题 2">
+            <a:extLst>
+              <a:ext uri="{FF2B5EF4-FFF2-40B4-BE49-F238E27FC236}">
+                <a16:creationId xmlns:a16="http://schemas.microsoft.com/office/drawing/2014/main" id="{88873DDC-2AA2-EE3F-414F-7B75CE3921FD}"/>
+              </a:ext>
+            </a:extLst>
+          </p:cNvPr>
+          <p:cNvSpPr>
+            <a:spLocks noGrp="1"/>
+          </p:cNvSpPr>
+          <p:nvPr>
+            <p:ph type="title"/>
+          </p:nvPr>
+        </p:nvSpPr>
+        <p:spPr/>
+        <p:txBody>
+          <a:bodyPr/>
+          <a:lstStyle/>
+          <a:p>
+            <a:r>
+              <a:rPr lang="en-US" altLang="zh-CN" dirty="0"/>
+              <a:t>POWER-ON</a:t>
+            </a:r>
+            <a:endParaRPr lang="zh-CN" altLang="en-US" dirty="0"/>
+          </a:p>
+        </p:txBody>
+      </p:sp>
+      <p:sp>
+        <p:nvSpPr>
+          <p:cNvPr id="4" name="矩形: 圆角 3">
+            <a:extLst>
+              <a:ext uri="{FF2B5EF4-FFF2-40B4-BE49-F238E27FC236}">
+                <a16:creationId xmlns:a16="http://schemas.microsoft.com/office/drawing/2014/main" id="{0CB77F11-2A4B-483F-D41F-CC84B1F47586}"/>
+              </a:ext>
+            </a:extLst>
+          </p:cNvPr>
+          <p:cNvSpPr/>
+          <p:nvPr/>
+        </p:nvSpPr>
+        <p:spPr>
+          <a:xfrm>
+            <a:off x="9928225" y="1540931"/>
+            <a:ext cx="190500" cy="203200"/>
+          </a:xfrm>
+          <a:prstGeom prst="roundRect">
+            <a:avLst/>
+          </a:prstGeom>
+          <a:solidFill>
+            <a:srgbClr val="FF0000">
+              <a:alpha val="50196"/>
+            </a:srgbClr>
+          </a:solidFill>
+          <a:ln>
+            <a:noFill/>
+          </a:ln>
+        </p:spPr>
+        <p:style>
+          <a:lnRef idx="2">
+            <a:schemeClr val="accent1">
+              <a:shade val="50000"/>
+            </a:schemeClr>
+          </a:lnRef>
+          <a:fillRef idx="1">
+            <a:schemeClr val="accent1"/>
+          </a:fillRef>
+          <a:effectRef idx="0">
+            <a:schemeClr val="accent1"/>
+          </a:effectRef>
+          <a:fontRef idx="minor">
+            <a:schemeClr val="lt1"/>
+          </a:fontRef>
+        </p:style>
+        <p:txBody>
+          <a:bodyPr rtlCol="0" anchor="ctr"/>
+          <a:lstStyle/>
+          <a:p>
+            <a:pPr algn="ctr"/>
+            <a:endParaRPr lang="zh-CN" altLang="en-US"/>
+          </a:p>
+        </p:txBody>
+      </p:sp>
+      <p:sp>
+        <p:nvSpPr>
+          <p:cNvPr id="7" name="矩形: 圆角 6">
+            <a:extLst>
+              <a:ext uri="{FF2B5EF4-FFF2-40B4-BE49-F238E27FC236}">
+                <a16:creationId xmlns:a16="http://schemas.microsoft.com/office/drawing/2014/main" id="{032457AE-E0B6-8C09-5CCA-1E12685611C9}"/>
+              </a:ext>
+            </a:extLst>
+          </p:cNvPr>
+          <p:cNvSpPr/>
+          <p:nvPr/>
+        </p:nvSpPr>
+        <p:spPr>
+          <a:xfrm>
+            <a:off x="10202862" y="1540931"/>
+            <a:ext cx="190500" cy="203200"/>
+          </a:xfrm>
+          <a:prstGeom prst="roundRect">
+            <a:avLst/>
+          </a:prstGeom>
+          <a:solidFill>
+            <a:srgbClr val="FF0000">
+              <a:alpha val="50196"/>
+            </a:srgbClr>
+          </a:solidFill>
+          <a:ln>
+            <a:noFill/>
+          </a:ln>
+        </p:spPr>
+        <p:style>
+          <a:lnRef idx="2">
+            <a:schemeClr val="accent1">
+              <a:shade val="50000"/>
+            </a:schemeClr>
+          </a:lnRef>
+          <a:fillRef idx="1">
+            <a:schemeClr val="accent1"/>
+          </a:fillRef>
+          <a:effectRef idx="0">
+            <a:schemeClr val="accent1"/>
+          </a:effectRef>
+          <a:fontRef idx="minor">
+            <a:schemeClr val="lt1"/>
+          </a:fontRef>
+        </p:style>
+        <p:txBody>
+          <a:bodyPr rtlCol="0" anchor="ctr"/>
+          <a:lstStyle/>
+          <a:p>
+            <a:pPr algn="ctr"/>
+            <a:endParaRPr lang="zh-CN" altLang="en-US"/>
+          </a:p>
+        </p:txBody>
+      </p:sp>
+      <p:sp>
+        <p:nvSpPr>
+          <p:cNvPr id="21" name="文本框 20">
+            <a:extLst>
+              <a:ext uri="{FF2B5EF4-FFF2-40B4-BE49-F238E27FC236}">
+                <a16:creationId xmlns:a16="http://schemas.microsoft.com/office/drawing/2014/main" id="{8E6E2637-9F6C-3912-359C-68A8EA1C1110}"/>
+              </a:ext>
+            </a:extLst>
+          </p:cNvPr>
+          <p:cNvSpPr txBox="1"/>
+          <p:nvPr/>
+        </p:nvSpPr>
+        <p:spPr>
+          <a:xfrm>
+            <a:off x="8623299" y="532507"/>
+            <a:ext cx="1101117" cy="534368"/>
+          </a:xfrm>
+          <a:prstGeom prst="rect">
+            <a:avLst/>
+          </a:prstGeom>
+          <a:noFill/>
+        </p:spPr>
+        <p:txBody>
+          <a:bodyPr wrap="square" lIns="36000" tIns="36000" rIns="36000" bIns="36000" rtlCol="0">
+            <a:spAutoFit/>
+          </a:bodyPr>
+          <a:lstStyle/>
+          <a:p>
+            <a:pPr algn="ctr">
+              <a:lnSpc>
+                <a:spcPts val="1800"/>
+              </a:lnSpc>
+            </a:pPr>
+            <a:r>
+              <a:rPr lang="en-US" altLang="zh-CN" sz="1600" b="1" dirty="0">
+                <a:solidFill>
+                  <a:schemeClr val="accent1">
+                    <a:lumMod val="75000"/>
+                  </a:schemeClr>
+                </a:solidFill>
+              </a:rPr>
+              <a:t>NORMAL Device</a:t>
+            </a:r>
+            <a:endParaRPr lang="zh-CN" altLang="en-US" sz="1600" b="1" dirty="0">
+              <a:solidFill>
+                <a:schemeClr val="accent1">
+                  <a:lumMod val="75000"/>
+                </a:schemeClr>
+              </a:solidFill>
+            </a:endParaRPr>
+          </a:p>
+        </p:txBody>
+      </p:sp>
+      <p:cxnSp>
+        <p:nvCxnSpPr>
+          <p:cNvPr id="28" name="连接符: 肘形 27">
+            <a:extLst>
+              <a:ext uri="{FF2B5EF4-FFF2-40B4-BE49-F238E27FC236}">
+                <a16:creationId xmlns:a16="http://schemas.microsoft.com/office/drawing/2014/main" id="{976E10BB-0DF0-AB0A-FDC6-2EF48D79C205}"/>
+              </a:ext>
+            </a:extLst>
+          </p:cNvPr>
+          <p:cNvCxnSpPr>
+            <a:cxnSpLocks/>
+            <a:stCxn id="21" idx="3"/>
+            <a:endCxn id="4" idx="0"/>
+          </p:cNvCxnSpPr>
+          <p:nvPr/>
+        </p:nvCxnSpPr>
+        <p:spPr>
+          <a:xfrm>
+            <a:off x="9724416" y="799691"/>
+            <a:ext cx="299059" cy="741240"/>
+          </a:xfrm>
+          <a:prstGeom prst="bentConnector2">
+            <a:avLst/>
+          </a:prstGeom>
+          <a:ln w="28575">
+            <a:solidFill>
+              <a:srgbClr val="FF0000"/>
+            </a:solidFill>
+            <a:prstDash val="sysDot"/>
+          </a:ln>
+        </p:spPr>
+        <p:style>
+          <a:lnRef idx="1">
+            <a:schemeClr val="accent1"/>
+          </a:lnRef>
+          <a:fillRef idx="0">
+            <a:schemeClr val="accent1"/>
+          </a:fillRef>
+          <a:effectRef idx="0">
+            <a:schemeClr val="accent1"/>
+          </a:effectRef>
+          <a:fontRef idx="minor">
+            <a:schemeClr val="tx1"/>
+          </a:fontRef>
+        </p:style>
+      </p:cxnSp>
+      <p:cxnSp>
+        <p:nvCxnSpPr>
+          <p:cNvPr id="29" name="连接符: 肘形 28">
+            <a:extLst>
+              <a:ext uri="{FF2B5EF4-FFF2-40B4-BE49-F238E27FC236}">
+                <a16:creationId xmlns:a16="http://schemas.microsoft.com/office/drawing/2014/main" id="{186BC645-EC5A-4155-8E85-265E63787097}"/>
+              </a:ext>
+            </a:extLst>
+          </p:cNvPr>
+          <p:cNvCxnSpPr>
+            <a:cxnSpLocks/>
+            <a:stCxn id="4" idx="2"/>
+            <a:endCxn id="32" idx="1"/>
+          </p:cNvCxnSpPr>
+          <p:nvPr/>
+        </p:nvCxnSpPr>
+        <p:spPr>
+          <a:xfrm rot="16200000" flipH="1">
+            <a:off x="10384587" y="1383018"/>
+            <a:ext cx="161518" cy="883743"/>
+          </a:xfrm>
+          <a:prstGeom prst="bentConnector2">
+            <a:avLst/>
+          </a:prstGeom>
+          <a:ln w="28575">
+            <a:solidFill>
+              <a:srgbClr val="FF0000"/>
+            </a:solidFill>
+            <a:prstDash val="sysDot"/>
+          </a:ln>
+        </p:spPr>
+        <p:style>
+          <a:lnRef idx="1">
+            <a:schemeClr val="accent1"/>
+          </a:lnRef>
+          <a:fillRef idx="0">
+            <a:schemeClr val="accent1"/>
+          </a:fillRef>
+          <a:effectRef idx="0">
+            <a:schemeClr val="accent1"/>
+          </a:effectRef>
+          <a:fontRef idx="minor">
+            <a:schemeClr val="tx1"/>
+          </a:fontRef>
+        </p:style>
+      </p:cxnSp>
+      <p:sp>
+        <p:nvSpPr>
+          <p:cNvPr id="32" name="文本框 31">
+            <a:extLst>
+              <a:ext uri="{FF2B5EF4-FFF2-40B4-BE49-F238E27FC236}">
+                <a16:creationId xmlns:a16="http://schemas.microsoft.com/office/drawing/2014/main" id="{96D11CA9-7DCD-0AFA-7EBD-3232EBB90B6D}"/>
+              </a:ext>
+            </a:extLst>
+          </p:cNvPr>
+          <p:cNvSpPr txBox="1"/>
+          <p:nvPr/>
+        </p:nvSpPr>
+        <p:spPr>
+          <a:xfrm>
+            <a:off x="10907218" y="1638465"/>
+            <a:ext cx="1004489" cy="534368"/>
+          </a:xfrm>
+          <a:prstGeom prst="rect">
+            <a:avLst/>
+          </a:prstGeom>
+          <a:noFill/>
+        </p:spPr>
+        <p:txBody>
+          <a:bodyPr wrap="square" lIns="36000" tIns="36000" rIns="36000" bIns="36000" rtlCol="0">
+            <a:spAutoFit/>
+          </a:bodyPr>
+          <a:lstStyle/>
+          <a:p>
+            <a:pPr algn="ctr">
+              <a:lnSpc>
+                <a:spcPts val="1800"/>
+              </a:lnSpc>
+            </a:pPr>
+            <a:r>
+              <a:rPr lang="en-US" altLang="zh-CN" sz="1600" b="1" dirty="0">
+                <a:solidFill>
+                  <a:schemeClr val="accent1">
+                    <a:lumMod val="75000"/>
+                  </a:schemeClr>
+                </a:solidFill>
+              </a:rPr>
+              <a:t>Firmware</a:t>
+            </a:r>
+            <a:br>
+              <a:rPr lang="en-US" altLang="zh-CN" sz="1600" b="1" dirty="0">
+                <a:solidFill>
+                  <a:schemeClr val="accent1">
+                    <a:lumMod val="75000"/>
+                  </a:schemeClr>
+                </a:solidFill>
+              </a:rPr>
+            </a:br>
+            <a:r>
+              <a:rPr lang="en-US" altLang="zh-CN" sz="1600" b="1" dirty="0">
+                <a:solidFill>
+                  <a:schemeClr val="accent1">
+                    <a:lumMod val="75000"/>
+                  </a:schemeClr>
+                </a:solidFill>
+              </a:rPr>
+              <a:t>Update</a:t>
+            </a:r>
+            <a:endParaRPr lang="zh-CN" altLang="en-US" sz="1600" b="1" dirty="0">
+              <a:solidFill>
+                <a:schemeClr val="accent1">
+                  <a:lumMod val="75000"/>
+                </a:schemeClr>
+              </a:solidFill>
+            </a:endParaRPr>
+          </a:p>
+        </p:txBody>
+      </p:sp>
+      <p:sp>
+        <p:nvSpPr>
+          <p:cNvPr id="43" name="文本框 42">
+            <a:extLst>
+              <a:ext uri="{FF2B5EF4-FFF2-40B4-BE49-F238E27FC236}">
+                <a16:creationId xmlns:a16="http://schemas.microsoft.com/office/drawing/2014/main" id="{0DAB5956-B96D-3BE8-1B50-BDA805009E4B}"/>
+              </a:ext>
+            </a:extLst>
+          </p:cNvPr>
+          <p:cNvSpPr txBox="1"/>
+          <p:nvPr/>
+        </p:nvSpPr>
+        <p:spPr>
+          <a:xfrm>
+            <a:off x="10507110" y="532507"/>
+            <a:ext cx="1026539" cy="534368"/>
+          </a:xfrm>
+          <a:prstGeom prst="rect">
+            <a:avLst/>
+          </a:prstGeom>
+          <a:noFill/>
+        </p:spPr>
+        <p:txBody>
+          <a:bodyPr wrap="square" lIns="36000" tIns="36000" rIns="36000" bIns="36000" rtlCol="0">
+            <a:spAutoFit/>
+          </a:bodyPr>
+          <a:lstStyle/>
+          <a:p>
+            <a:pPr algn="ctr">
+              <a:lnSpc>
+                <a:spcPts val="1800"/>
+              </a:lnSpc>
+            </a:pPr>
+            <a:r>
+              <a:rPr lang="en-US" altLang="zh-CN" sz="1600" b="1" dirty="0">
+                <a:solidFill>
+                  <a:schemeClr val="accent1">
+                    <a:lumMod val="75000"/>
+                  </a:schemeClr>
+                </a:solidFill>
+              </a:rPr>
+              <a:t>KONAMI</a:t>
+            </a:r>
+            <a:br>
+              <a:rPr lang="en-US" altLang="zh-CN" sz="1600" b="1" dirty="0">
+                <a:solidFill>
+                  <a:schemeClr val="accent1">
+                    <a:lumMod val="75000"/>
+                  </a:schemeClr>
+                </a:solidFill>
+              </a:rPr>
+            </a:br>
+            <a:r>
+              <a:rPr lang="en-US" altLang="zh-CN" sz="1600" b="1" dirty="0">
+                <a:solidFill>
+                  <a:schemeClr val="accent1">
+                    <a:lumMod val="75000"/>
+                  </a:schemeClr>
+                </a:solidFill>
+              </a:rPr>
+              <a:t>Device</a:t>
+            </a:r>
+            <a:endParaRPr lang="zh-CN" altLang="en-US" sz="1600" b="1" dirty="0">
+              <a:solidFill>
+                <a:schemeClr val="accent1">
+                  <a:lumMod val="75000"/>
+                </a:schemeClr>
+              </a:solidFill>
+            </a:endParaRPr>
+          </a:p>
+        </p:txBody>
+      </p:sp>
+      <p:cxnSp>
+        <p:nvCxnSpPr>
+          <p:cNvPr id="44" name="连接符: 肘形 43">
+            <a:extLst>
+              <a:ext uri="{FF2B5EF4-FFF2-40B4-BE49-F238E27FC236}">
+                <a16:creationId xmlns:a16="http://schemas.microsoft.com/office/drawing/2014/main" id="{160C77F0-F107-9C31-6478-C9FD2DB5BE94}"/>
+              </a:ext>
+            </a:extLst>
+          </p:cNvPr>
+          <p:cNvCxnSpPr>
+            <a:cxnSpLocks/>
+            <a:stCxn id="43" idx="1"/>
+            <a:endCxn id="7" idx="0"/>
+          </p:cNvCxnSpPr>
+          <p:nvPr/>
+        </p:nvCxnSpPr>
+        <p:spPr>
+          <a:xfrm rot="10800000" flipV="1">
+            <a:off x="10298112" y="799691"/>
+            <a:ext cx="208998" cy="741240"/>
+          </a:xfrm>
+          <a:prstGeom prst="bentConnector2">
+            <a:avLst/>
+          </a:prstGeom>
+          <a:ln w="28575">
+            <a:solidFill>
+              <a:srgbClr val="FF0000"/>
+            </a:solidFill>
+            <a:prstDash val="sysDot"/>
+          </a:ln>
+        </p:spPr>
+        <p:style>
+          <a:lnRef idx="1">
+            <a:schemeClr val="accent1"/>
+          </a:lnRef>
+          <a:fillRef idx="0">
+            <a:schemeClr val="accent1"/>
+          </a:fillRef>
+          <a:effectRef idx="0">
+            <a:schemeClr val="accent1"/>
+          </a:effectRef>
+          <a:fontRef idx="minor">
+            <a:schemeClr val="tx1"/>
+          </a:fontRef>
+        </p:style>
+      </p:cxnSp>
+      <p:cxnSp>
+        <p:nvCxnSpPr>
+          <p:cNvPr id="50" name="连接符: 肘形 49">
+            <a:extLst>
+              <a:ext uri="{FF2B5EF4-FFF2-40B4-BE49-F238E27FC236}">
+                <a16:creationId xmlns:a16="http://schemas.microsoft.com/office/drawing/2014/main" id="{64288B23-6692-0B64-AA76-B9F199FC2D3B}"/>
+              </a:ext>
+            </a:extLst>
+          </p:cNvPr>
+          <p:cNvCxnSpPr>
+            <a:cxnSpLocks/>
+            <a:stCxn id="7" idx="2"/>
+            <a:endCxn id="32" idx="1"/>
+          </p:cNvCxnSpPr>
+          <p:nvPr/>
+        </p:nvCxnSpPr>
+        <p:spPr>
+          <a:xfrm rot="16200000" flipH="1">
+            <a:off x="10521906" y="1520337"/>
+            <a:ext cx="161518" cy="609106"/>
+          </a:xfrm>
+          <a:prstGeom prst="bentConnector2">
+            <a:avLst/>
+          </a:prstGeom>
+          <a:ln w="28575">
+            <a:solidFill>
+              <a:srgbClr val="FF0000"/>
+            </a:solidFill>
+            <a:prstDash val="sysDot"/>
+          </a:ln>
+        </p:spPr>
+        <p:style>
+          <a:lnRef idx="1">
+            <a:schemeClr val="accent1"/>
+          </a:lnRef>
+          <a:fillRef idx="0">
+            <a:schemeClr val="accent1"/>
+          </a:fillRef>
+          <a:effectRef idx="0">
+            <a:schemeClr val="accent1"/>
+          </a:effectRef>
+          <a:fontRef idx="minor">
+            <a:schemeClr val="tx1"/>
+          </a:fontRef>
+        </p:style>
+      </p:cxnSp>
+      <p:sp>
+        <p:nvSpPr>
+          <p:cNvPr id="55" name="文本框 54">
+            <a:extLst>
+              <a:ext uri="{FF2B5EF4-FFF2-40B4-BE49-F238E27FC236}">
+                <a16:creationId xmlns:a16="http://schemas.microsoft.com/office/drawing/2014/main" id="{3C414146-6225-9E49-1D20-945EFA12CA8A}"/>
+              </a:ext>
+            </a:extLst>
+          </p:cNvPr>
+          <p:cNvSpPr txBox="1"/>
+          <p:nvPr/>
+        </p:nvSpPr>
+        <p:spPr>
+          <a:xfrm>
+            <a:off x="8768596" y="244470"/>
+            <a:ext cx="2626526" cy="239415"/>
+          </a:xfrm>
+          <a:prstGeom prst="rect">
+            <a:avLst/>
+          </a:prstGeom>
+          <a:solidFill>
+            <a:schemeClr val="bg1">
+              <a:lumMod val="85000"/>
+            </a:schemeClr>
+          </a:solidFill>
+          <a:ln w="9525">
+            <a:solidFill>
+              <a:srgbClr val="0070C0"/>
+            </a:solidFill>
+            <a:prstDash val="sysDot"/>
+          </a:ln>
+          <a:effectLst/>
+        </p:spPr>
+        <p:txBody>
+          <a:bodyPr wrap="square" lIns="54000" tIns="36000" rIns="36000" bIns="36000" rtlCol="0">
+            <a:spAutoFit/>
+          </a:bodyPr>
+          <a:lstStyle/>
+          <a:p>
+            <a:pPr>
+              <a:lnSpc>
+                <a:spcPts val="1300"/>
+              </a:lnSpc>
+            </a:pPr>
+            <a:r>
+              <a:rPr lang="en-US" altLang="zh-CN" sz="1200" b="1" dirty="0">
+                <a:solidFill>
+                  <a:srgbClr val="009E47"/>
+                </a:solidFill>
+              </a:rPr>
+              <a:t>Device Mode will be saved in flash.</a:t>
+            </a:r>
+            <a:endParaRPr lang="zh-CN" altLang="en-US" sz="1200" b="1" dirty="0">
+              <a:solidFill>
+                <a:schemeClr val="accent4">
+                  <a:lumMod val="75000"/>
+                </a:schemeClr>
+              </a:solidFill>
+            </a:endParaRPr>
+          </a:p>
+        </p:txBody>
+      </p:sp>
+    </p:spTree>
+    <p:extLst>
+      <p:ext uri="{BB962C8B-B14F-4D97-AF65-F5344CB8AC3E}">
+        <p14:creationId xmlns:p14="http://schemas.microsoft.com/office/powerpoint/2010/main" val="3519022973"/>
+      </p:ext>
+    </p:extLst>
+  </p:cSld>
+  <p:clrMapOvr>
+    <a:masterClrMapping/>
+  </p:clrMapOvr>
+</p:sld>
+</file>
+
+<file path=ppt/slides/slide3.xml><?xml version="1.0" encoding="utf-8"?>
+<p:sld xmlns:a="http://schemas.openxmlformats.org/drawingml/2006/main" xmlns:r="http://schemas.openxmlformats.org/officeDocument/2006/relationships" xmlns:p="http://schemas.openxmlformats.org/presentationml/2006/main">
+  <p:cSld>
+    <p:bg>
+      <p:bgPr>
+        <a:solidFill>
+          <a:srgbClr val="FFFFE5"/>
+        </a:solidFill>
+        <a:effectLst/>
+      </p:bgPr>
+    </p:bg>
+    <p:spTree>
+      <p:nvGrpSpPr>
+        <p:cNvPr id="1" name=""/>
+        <p:cNvGrpSpPr/>
+        <p:nvPr/>
+      </p:nvGrpSpPr>
+      <p:grpSpPr>
+        <a:xfrm>
+          <a:off x="0" y="0"/>
+          <a:ext cx="0" cy="0"/>
+          <a:chOff x="0" y="0"/>
+          <a:chExt cx="0" cy="0"/>
+        </a:xfrm>
+      </p:grpSpPr>
+      <p:sp>
+        <p:nvSpPr>
           <p:cNvPr id="2" name="左大括号 1">
             <a:extLst>
               <a:ext uri="{FF2B5EF4-FFF2-40B4-BE49-F238E27FC236}">
@@ -3662,7 +4281,7 @@
     </p:spTree>
     <p:extLst>
       <p:ext uri="{BB962C8B-B14F-4D97-AF65-F5344CB8AC3E}">
-        <p14:creationId xmlns:p14="http://schemas.microsoft.com/office/powerpoint/2010/main" val="3519022973"/>
+        <p14:creationId xmlns:p14="http://schemas.microsoft.com/office/powerpoint/2010/main" val="588425790"/>
       </p:ext>
     </p:extLst>
   </p:cSld>
@@ -3672,7 +4291,7 @@
 </p:sld>
 </file>
 
-<file path=ppt/slides/slide3.xml><?xml version="1.0" encoding="utf-8"?>
+<file path=ppt/slides/slide4.xml><?xml version="1.0" encoding="utf-8"?>
 <p:sld xmlns:a="http://schemas.openxmlformats.org/drawingml/2006/main" xmlns:r="http://schemas.openxmlformats.org/officeDocument/2006/relationships" xmlns:p="http://schemas.openxmlformats.org/presentationml/2006/main">
   <p:cSld>
     <p:spTree>
@@ -5966,7 +6585,7 @@
 </p:sld>
 </file>
 
-<file path=ppt/slides/slide4.xml><?xml version="1.0" encoding="utf-8"?>
+<file path=ppt/slides/slide5.xml><?xml version="1.0" encoding="utf-8"?>
 <p:sld xmlns:a="http://schemas.openxmlformats.org/drawingml/2006/main" xmlns:r="http://schemas.openxmlformats.org/officeDocument/2006/relationships" xmlns:p="http://schemas.openxmlformats.org/presentationml/2006/main">
   <p:cSld>
     <p:spTree>
@@ -7422,7 +8041,7 @@
 </p:sld>
 </file>
 
-<file path=ppt/slides/slide5.xml><?xml version="1.0" encoding="utf-8"?>
+<file path=ppt/slides/slide6.xml><?xml version="1.0" encoding="utf-8"?>
 <p:sld xmlns:a="http://schemas.openxmlformats.org/drawingml/2006/main" xmlns:r="http://schemas.openxmlformats.org/officeDocument/2006/relationships" xmlns:p="http://schemas.openxmlformats.org/presentationml/2006/main">
   <p:cSld>
     <p:spTree>

</xml_diff>

<commit_message>
Brightness level and start work on bluetooth
</commit_message>
<xml_diff>
--- a/doc/Firmware_manual.pptx
+++ b/doc/Firmware_manual.pptx
@@ -9,9 +9,9 @@
     <p:sldId id="256" r:id="rId3"/>
     <p:sldId id="258" r:id="rId4"/>
     <p:sldId id="262" r:id="rId5"/>
-    <p:sldId id="260" r:id="rId6"/>
-    <p:sldId id="259" r:id="rId7"/>
-    <p:sldId id="261" r:id="rId8"/>
+    <p:sldId id="263" r:id="rId6"/>
+    <p:sldId id="260" r:id="rId7"/>
+    <p:sldId id="259" r:id="rId8"/>
   </p:sldIdLst>
   <p:sldSz cx="12192000" cy="6858000"/>
   <p:notesSz cx="6858000" cy="9144000"/>
@@ -362,7 +362,7 @@
           <a:p>
             <a:fld id="{5233C8C7-F8F0-45E5-B257-B695ED03E8DF}" type="datetimeFigureOut">
               <a:rPr lang="zh-CN" altLang="en-US" smtClean="0"/>
-              <a:t>2023/5/15</a:t>
+              <a:t>2023/5/28</a:t>
             </a:fld>
             <a:endParaRPr lang="zh-CN" altLang="en-US"/>
           </a:p>
@@ -2200,6 +2200,60 @@
           </p:txBody>
         </p:sp>
       </p:grpSp>
+      <p:sp>
+        <p:nvSpPr>
+          <p:cNvPr id="2" name="标题 2">
+            <a:extLst>
+              <a:ext uri="{FF2B5EF4-FFF2-40B4-BE49-F238E27FC236}">
+                <a16:creationId xmlns:a16="http://schemas.microsoft.com/office/drawing/2014/main" id="{4E9190ED-7AF4-95CC-A980-5FE199667520}"/>
+              </a:ext>
+            </a:extLst>
+          </p:cNvPr>
+          <p:cNvSpPr txBox="1">
+            <a:spLocks/>
+          </p:cNvSpPr>
+          <p:nvPr/>
+        </p:nvSpPr>
+        <p:spPr>
+          <a:xfrm>
+            <a:off x="0" y="5905500"/>
+            <a:ext cx="12192000" cy="952499"/>
+          </a:xfrm>
+          <a:prstGeom prst="rect">
+            <a:avLst/>
+          </a:prstGeom>
+        </p:spPr>
+        <p:txBody>
+          <a:bodyPr/>
+          <a:lstStyle>
+            <a:lvl1pPr algn="l" defTabSz="914400" rtl="0" eaLnBrk="1" latinLnBrk="0" hangingPunct="1">
+              <a:lnSpc>
+                <a:spcPct val="90000"/>
+              </a:lnSpc>
+              <a:spcBef>
+                <a:spcPct val="0"/>
+              </a:spcBef>
+              <a:buNone/>
+              <a:defRPr sz="4400" kern="1200">
+                <a:solidFill>
+                  <a:schemeClr val="tx1"/>
+                </a:solidFill>
+                <a:latin typeface="+mj-lt"/>
+                <a:ea typeface="+mj-ea"/>
+                <a:cs typeface="+mj-cs"/>
+              </a:defRPr>
+            </a:lvl1pPr>
+          </a:lstStyle>
+          <a:p>
+            <a:pPr algn="ctr"/>
+            <a:r>
+              <a:rPr lang="en-US" altLang="zh-CN" b="1" dirty="0"/>
+              <a:t>Manual</a:t>
+            </a:r>
+            <a:endParaRPr lang="zh-CN" altLang="en-US" b="1" dirty="0"/>
+          </a:p>
+        </p:txBody>
+      </p:sp>
     </p:spTree>
     <p:extLst>
       <p:ext uri="{BB962C8B-B14F-4D97-AF65-F5344CB8AC3E}">
@@ -3503,7 +3557,7 @@
         <p:spPr>
           <a:xfrm>
             <a:off x="10456247" y="1016963"/>
-            <a:ext cx="951242" cy="536668"/>
+            <a:ext cx="790378" cy="536668"/>
           </a:xfrm>
           <a:prstGeom prst="bentConnector2">
             <a:avLst/>
@@ -3544,7 +3598,7 @@
         </p:nvSpPr>
         <p:spPr>
           <a:xfrm>
-            <a:off x="10905244" y="1553631"/>
+            <a:off x="10744380" y="1553631"/>
             <a:ext cx="1004489" cy="534368"/>
           </a:xfrm>
           <a:prstGeom prst="rect">
@@ -3597,7 +3651,7 @@
         </p:nvSpPr>
         <p:spPr>
           <a:xfrm>
-            <a:off x="10623113" y="828446"/>
+            <a:off x="10445314" y="828446"/>
             <a:ext cx="950117" cy="184666"/>
           </a:xfrm>
           <a:prstGeom prst="rect">
@@ -4278,6 +4332,410 @@
           </a:fontRef>
         </p:style>
       </p:cxnSp>
+      <p:sp>
+        <p:nvSpPr>
+          <p:cNvPr id="5" name="文本框 4">
+            <a:extLst>
+              <a:ext uri="{FF2B5EF4-FFF2-40B4-BE49-F238E27FC236}">
+                <a16:creationId xmlns:a16="http://schemas.microsoft.com/office/drawing/2014/main" id="{8B994459-D4F4-C5C6-A9A2-998AB2C47BE5}"/>
+              </a:ext>
+            </a:extLst>
+          </p:cNvPr>
+          <p:cNvSpPr txBox="1"/>
+          <p:nvPr/>
+        </p:nvSpPr>
+        <p:spPr>
+          <a:xfrm>
+            <a:off x="4543474" y="870944"/>
+            <a:ext cx="1038549" cy="565146"/>
+          </a:xfrm>
+          <a:prstGeom prst="rect">
+            <a:avLst/>
+          </a:prstGeom>
+          <a:noFill/>
+        </p:spPr>
+        <p:txBody>
+          <a:bodyPr wrap="square" lIns="36000" tIns="36000" rIns="36000" bIns="36000" rtlCol="0">
+            <a:spAutoFit/>
+          </a:bodyPr>
+          <a:lstStyle/>
+          <a:p>
+            <a:pPr algn="ctr"/>
+            <a:r>
+              <a:rPr lang="en-US" altLang="zh-CN" sz="1600" b="1" dirty="0">
+                <a:solidFill>
+                  <a:schemeClr val="accent1">
+                    <a:lumMod val="75000"/>
+                  </a:schemeClr>
+                </a:solidFill>
+              </a:rPr>
+              <a:t>LEVEL Mode</a:t>
+            </a:r>
+            <a:endParaRPr lang="zh-CN" altLang="en-US" sz="1600" b="1" dirty="0">
+              <a:solidFill>
+                <a:schemeClr val="accent1">
+                  <a:lumMod val="75000"/>
+                </a:schemeClr>
+              </a:solidFill>
+            </a:endParaRPr>
+          </a:p>
+        </p:txBody>
+      </p:sp>
+      <p:sp>
+        <p:nvSpPr>
+          <p:cNvPr id="15" name="箭头: 左 14">
+            <a:extLst>
+              <a:ext uri="{FF2B5EF4-FFF2-40B4-BE49-F238E27FC236}">
+                <a16:creationId xmlns:a16="http://schemas.microsoft.com/office/drawing/2014/main" id="{81F8C91F-0DF9-A78F-9FA4-3627206ECEC6}"/>
+              </a:ext>
+            </a:extLst>
+          </p:cNvPr>
+          <p:cNvSpPr/>
+          <p:nvPr/>
+        </p:nvSpPr>
+        <p:spPr>
+          <a:xfrm rot="2159241">
+            <a:off x="4220521" y="759362"/>
+            <a:ext cx="437078" cy="304655"/>
+          </a:xfrm>
+          <a:prstGeom prst="leftArrow">
+            <a:avLst/>
+          </a:prstGeom>
+          <a:noFill/>
+          <a:ln w="28575">
+            <a:solidFill>
+              <a:srgbClr val="2F528F">
+                <a:alpha val="69804"/>
+              </a:srgbClr>
+            </a:solidFill>
+          </a:ln>
+        </p:spPr>
+        <p:style>
+          <a:lnRef idx="2">
+            <a:schemeClr val="accent1">
+              <a:shade val="50000"/>
+            </a:schemeClr>
+          </a:lnRef>
+          <a:fillRef idx="1">
+            <a:schemeClr val="accent1"/>
+          </a:fillRef>
+          <a:effectRef idx="0">
+            <a:schemeClr val="accent1"/>
+          </a:effectRef>
+          <a:fontRef idx="minor">
+            <a:schemeClr val="lt1"/>
+          </a:fontRef>
+        </p:style>
+        <p:txBody>
+          <a:bodyPr rtlCol="0" anchor="ctr"/>
+          <a:lstStyle/>
+          <a:p>
+            <a:pPr algn="ctr"/>
+            <a:endParaRPr lang="zh-CN" altLang="en-US"/>
+          </a:p>
+        </p:txBody>
+      </p:sp>
+      <p:sp>
+        <p:nvSpPr>
+          <p:cNvPr id="17" name="箭头: 左 16">
+            <a:extLst>
+              <a:ext uri="{FF2B5EF4-FFF2-40B4-BE49-F238E27FC236}">
+                <a16:creationId xmlns:a16="http://schemas.microsoft.com/office/drawing/2014/main" id="{916F607E-44E8-08BA-E148-2E38F1DEA424}"/>
+              </a:ext>
+            </a:extLst>
+          </p:cNvPr>
+          <p:cNvSpPr/>
+          <p:nvPr/>
+        </p:nvSpPr>
+        <p:spPr>
+          <a:xfrm rot="13792854">
+            <a:off x="5143135" y="1561683"/>
+            <a:ext cx="437078" cy="304655"/>
+          </a:xfrm>
+          <a:prstGeom prst="leftArrow">
+            <a:avLst/>
+          </a:prstGeom>
+          <a:noFill/>
+          <a:ln w="28575">
+            <a:solidFill>
+              <a:srgbClr val="2F528F">
+                <a:alpha val="69804"/>
+              </a:srgbClr>
+            </a:solidFill>
+          </a:ln>
+        </p:spPr>
+        <p:style>
+          <a:lnRef idx="2">
+            <a:schemeClr val="accent1">
+              <a:shade val="50000"/>
+            </a:schemeClr>
+          </a:lnRef>
+          <a:fillRef idx="1">
+            <a:schemeClr val="accent1"/>
+          </a:fillRef>
+          <a:effectRef idx="0">
+            <a:schemeClr val="accent1"/>
+          </a:effectRef>
+          <a:fontRef idx="minor">
+            <a:schemeClr val="lt1"/>
+          </a:fontRef>
+        </p:style>
+        <p:txBody>
+          <a:bodyPr rtlCol="0" anchor="ctr"/>
+          <a:lstStyle/>
+          <a:p>
+            <a:pPr algn="ctr"/>
+            <a:endParaRPr lang="zh-CN" altLang="en-US"/>
+          </a:p>
+        </p:txBody>
+      </p:sp>
+      <p:cxnSp>
+        <p:nvCxnSpPr>
+          <p:cNvPr id="19" name="连接符: 肘形 18">
+            <a:extLst>
+              <a:ext uri="{FF2B5EF4-FFF2-40B4-BE49-F238E27FC236}">
+                <a16:creationId xmlns:a16="http://schemas.microsoft.com/office/drawing/2014/main" id="{FA84C167-5D37-C5A6-1A5E-95BF9B52C92A}"/>
+              </a:ext>
+            </a:extLst>
+          </p:cNvPr>
+          <p:cNvCxnSpPr>
+            <a:cxnSpLocks/>
+            <a:stCxn id="20" idx="0"/>
+            <a:endCxn id="5" idx="0"/>
+          </p:cNvCxnSpPr>
+          <p:nvPr/>
+        </p:nvCxnSpPr>
+        <p:spPr>
+          <a:xfrm rot="16200000" flipV="1">
+            <a:off x="7607516" y="-1673823"/>
+            <a:ext cx="2160" cy="5091693"/>
+          </a:xfrm>
+          <a:prstGeom prst="bentConnector3">
+            <a:avLst>
+              <a:gd name="adj1" fmla="val 27538287"/>
+            </a:avLst>
+          </a:prstGeom>
+          <a:ln w="28575">
+            <a:solidFill>
+              <a:srgbClr val="FF0000"/>
+            </a:solidFill>
+            <a:prstDash val="sysDot"/>
+          </a:ln>
+        </p:spPr>
+        <p:style>
+          <a:lnRef idx="1">
+            <a:schemeClr val="accent1"/>
+          </a:lnRef>
+          <a:fillRef idx="0">
+            <a:schemeClr val="accent1"/>
+          </a:fillRef>
+          <a:effectRef idx="0">
+            <a:schemeClr val="accent1"/>
+          </a:effectRef>
+          <a:fontRef idx="minor">
+            <a:schemeClr val="tx1"/>
+          </a:fontRef>
+        </p:style>
+      </p:cxnSp>
+      <p:cxnSp>
+        <p:nvCxnSpPr>
+          <p:cNvPr id="53" name="连接符: 肘形 52">
+            <a:extLst>
+              <a:ext uri="{FF2B5EF4-FFF2-40B4-BE49-F238E27FC236}">
+                <a16:creationId xmlns:a16="http://schemas.microsoft.com/office/drawing/2014/main" id="{11BDCBF5-ADBF-EB71-C72D-BD18EF921866}"/>
+              </a:ext>
+            </a:extLst>
+          </p:cNvPr>
+          <p:cNvCxnSpPr>
+            <a:cxnSpLocks/>
+            <a:stCxn id="20" idx="0"/>
+            <a:endCxn id="54" idx="3"/>
+          </p:cNvCxnSpPr>
+          <p:nvPr/>
+        </p:nvCxnSpPr>
+        <p:spPr>
+          <a:xfrm rot="16200000" flipH="1">
+            <a:off x="9813541" y="1214004"/>
+            <a:ext cx="2099197" cy="1417397"/>
+          </a:xfrm>
+          <a:prstGeom prst="bentConnector4">
+            <a:avLst>
+              <a:gd name="adj1" fmla="val -10890"/>
+              <a:gd name="adj2" fmla="val 116128"/>
+            </a:avLst>
+          </a:prstGeom>
+          <a:ln w="28575">
+            <a:solidFill>
+              <a:srgbClr val="FF0000"/>
+            </a:solidFill>
+            <a:prstDash val="sysDot"/>
+          </a:ln>
+        </p:spPr>
+        <p:style>
+          <a:lnRef idx="1">
+            <a:schemeClr val="accent1"/>
+          </a:lnRef>
+          <a:fillRef idx="0">
+            <a:schemeClr val="accent1"/>
+          </a:fillRef>
+          <a:effectRef idx="0">
+            <a:schemeClr val="accent1"/>
+          </a:effectRef>
+          <a:fontRef idx="minor">
+            <a:schemeClr val="tx1"/>
+          </a:fontRef>
+        </p:style>
+      </p:cxnSp>
+      <p:sp>
+        <p:nvSpPr>
+          <p:cNvPr id="54" name="文本框 53">
+            <a:extLst>
+              <a:ext uri="{FF2B5EF4-FFF2-40B4-BE49-F238E27FC236}">
+                <a16:creationId xmlns:a16="http://schemas.microsoft.com/office/drawing/2014/main" id="{B42071E4-9984-9508-AF43-4CEFB9F2F045}"/>
+              </a:ext>
+            </a:extLst>
+          </p:cNvPr>
+          <p:cNvSpPr txBox="1"/>
+          <p:nvPr/>
+        </p:nvSpPr>
+        <p:spPr>
+          <a:xfrm>
+            <a:off x="10822593" y="2705117"/>
+            <a:ext cx="749246" cy="534368"/>
+          </a:xfrm>
+          <a:prstGeom prst="rect">
+            <a:avLst/>
+          </a:prstGeom>
+          <a:noFill/>
+        </p:spPr>
+        <p:txBody>
+          <a:bodyPr wrap="square" lIns="36000" tIns="36000" rIns="36000" bIns="36000" rtlCol="0">
+            <a:spAutoFit/>
+          </a:bodyPr>
+          <a:lstStyle/>
+          <a:p>
+            <a:pPr algn="ctr">
+              <a:lnSpc>
+                <a:spcPts val="1800"/>
+              </a:lnSpc>
+            </a:pPr>
+            <a:r>
+              <a:rPr lang="en-US" altLang="zh-CN" sz="1600" b="1" dirty="0">
+                <a:solidFill>
+                  <a:schemeClr val="accent1">
+                    <a:lumMod val="75000"/>
+                  </a:schemeClr>
+                </a:solidFill>
+              </a:rPr>
+              <a:t>Factory Default</a:t>
+            </a:r>
+            <a:endParaRPr lang="zh-CN" altLang="en-US" sz="1600" b="1" dirty="0">
+              <a:solidFill>
+                <a:schemeClr val="accent1">
+                  <a:lumMod val="75000"/>
+                </a:schemeClr>
+              </a:solidFill>
+            </a:endParaRPr>
+          </a:p>
+        </p:txBody>
+      </p:sp>
+      <p:sp>
+        <p:nvSpPr>
+          <p:cNvPr id="63" name="左大括号 62">
+            <a:extLst>
+              <a:ext uri="{FF2B5EF4-FFF2-40B4-BE49-F238E27FC236}">
+                <a16:creationId xmlns:a16="http://schemas.microsoft.com/office/drawing/2014/main" id="{E9B54DE5-B3C5-A544-7339-D3EAC43DD1CE}"/>
+              </a:ext>
+            </a:extLst>
+          </p:cNvPr>
+          <p:cNvSpPr/>
+          <p:nvPr/>
+        </p:nvSpPr>
+        <p:spPr>
+          <a:xfrm rot="10800000">
+            <a:off x="10289179" y="2404618"/>
+            <a:ext cx="417184" cy="1144836"/>
+          </a:xfrm>
+          <a:prstGeom prst="leftBrace">
+            <a:avLst>
+              <a:gd name="adj1" fmla="val 21655"/>
+              <a:gd name="adj2" fmla="val 50551"/>
+            </a:avLst>
+          </a:prstGeom>
+          <a:ln w="28575">
+            <a:solidFill>
+              <a:schemeClr val="accent4">
+                <a:lumMod val="75000"/>
+                <a:alpha val="69804"/>
+              </a:schemeClr>
+            </a:solidFill>
+          </a:ln>
+        </p:spPr>
+        <p:style>
+          <a:lnRef idx="1">
+            <a:schemeClr val="accent1"/>
+          </a:lnRef>
+          <a:fillRef idx="0">
+            <a:schemeClr val="accent1"/>
+          </a:fillRef>
+          <a:effectRef idx="0">
+            <a:schemeClr val="accent1"/>
+          </a:effectRef>
+          <a:fontRef idx="minor">
+            <a:schemeClr val="tx1"/>
+          </a:fontRef>
+        </p:style>
+        <p:txBody>
+          <a:bodyPr rtlCol="0" anchor="ctr"/>
+          <a:lstStyle/>
+          <a:p>
+            <a:pPr algn="ctr"/>
+            <a:endParaRPr lang="zh-CN" altLang="en-US"/>
+          </a:p>
+        </p:txBody>
+      </p:sp>
+      <p:sp>
+        <p:nvSpPr>
+          <p:cNvPr id="67" name="文本框 66">
+            <a:extLst>
+              <a:ext uri="{FF2B5EF4-FFF2-40B4-BE49-F238E27FC236}">
+                <a16:creationId xmlns:a16="http://schemas.microsoft.com/office/drawing/2014/main" id="{91EE07D7-A3A3-3254-2F46-06F1576B2EF7}"/>
+              </a:ext>
+            </a:extLst>
+          </p:cNvPr>
+          <p:cNvSpPr txBox="1"/>
+          <p:nvPr/>
+        </p:nvSpPr>
+        <p:spPr>
+          <a:xfrm>
+            <a:off x="10125276" y="2813505"/>
+            <a:ext cx="406791" cy="292388"/>
+          </a:xfrm>
+          <a:prstGeom prst="rect">
+            <a:avLst/>
+          </a:prstGeom>
+          <a:noFill/>
+        </p:spPr>
+        <p:txBody>
+          <a:bodyPr wrap="square">
+            <a:spAutoFit/>
+          </a:bodyPr>
+          <a:lstStyle/>
+          <a:p>
+            <a:r>
+              <a:rPr lang="en-US" altLang="zh-CN" sz="1300" b="1" dirty="0">
+                <a:solidFill>
+                  <a:schemeClr val="accent4">
+                    <a:lumMod val="75000"/>
+                  </a:schemeClr>
+                </a:solidFill>
+              </a:rPr>
+              <a:t>All</a:t>
+            </a:r>
+            <a:endParaRPr lang="zh-CN" altLang="en-US" sz="1300" dirty="0"/>
+          </a:p>
+        </p:txBody>
+      </p:sp>
     </p:spTree>
     <p:extLst>
       <p:ext uri="{BB962C8B-B14F-4D97-AF65-F5344CB8AC3E}">
@@ -4292,6 +4750,1236 @@
 </file>
 
 <file path=ppt/slides/slide4.xml><?xml version="1.0" encoding="utf-8"?>
+<p:sld xmlns:a="http://schemas.openxmlformats.org/drawingml/2006/main" xmlns:r="http://schemas.openxmlformats.org/officeDocument/2006/relationships" xmlns:p="http://schemas.openxmlformats.org/presentationml/2006/main">
+  <p:cSld>
+    <p:spTree>
+      <p:nvGrpSpPr>
+        <p:cNvPr id="1" name=""/>
+        <p:cNvGrpSpPr/>
+        <p:nvPr/>
+      </p:nvGrpSpPr>
+      <p:grpSpPr>
+        <a:xfrm>
+          <a:off x="0" y="0"/>
+          <a:ext cx="0" cy="0"/>
+          <a:chOff x="0" y="0"/>
+          <a:chExt cx="0" cy="0"/>
+        </a:xfrm>
+      </p:grpSpPr>
+      <p:sp>
+        <p:nvSpPr>
+          <p:cNvPr id="3" name="标题 2">
+            <a:extLst>
+              <a:ext uri="{FF2B5EF4-FFF2-40B4-BE49-F238E27FC236}">
+                <a16:creationId xmlns:a16="http://schemas.microsoft.com/office/drawing/2014/main" id="{88873DDC-2AA2-EE3F-414F-7B75CE3921FD}"/>
+              </a:ext>
+            </a:extLst>
+          </p:cNvPr>
+          <p:cNvSpPr>
+            <a:spLocks noGrp="1"/>
+          </p:cNvSpPr>
+          <p:nvPr>
+            <p:ph type="title"/>
+          </p:nvPr>
+        </p:nvSpPr>
+        <p:spPr/>
+        <p:txBody>
+          <a:bodyPr/>
+          <a:lstStyle/>
+          <a:p>
+            <a:r>
+              <a:rPr lang="en-US" altLang="zh-CN" dirty="0"/>
+              <a:t>LEVEL MODE</a:t>
+            </a:r>
+            <a:endParaRPr lang="zh-CN" altLang="en-US" dirty="0"/>
+          </a:p>
+        </p:txBody>
+      </p:sp>
+      <p:sp>
+        <p:nvSpPr>
+          <p:cNvPr id="4" name="矩形: 圆角 3">
+            <a:extLst>
+              <a:ext uri="{FF2B5EF4-FFF2-40B4-BE49-F238E27FC236}">
+                <a16:creationId xmlns:a16="http://schemas.microsoft.com/office/drawing/2014/main" id="{0CB77F11-2A4B-483F-D41F-CC84B1F47586}"/>
+              </a:ext>
+            </a:extLst>
+          </p:cNvPr>
+          <p:cNvSpPr/>
+          <p:nvPr/>
+        </p:nvSpPr>
+        <p:spPr>
+          <a:xfrm>
+            <a:off x="9928225" y="1540930"/>
+            <a:ext cx="190500" cy="203200"/>
+          </a:xfrm>
+          <a:prstGeom prst="roundRect">
+            <a:avLst/>
+          </a:prstGeom>
+          <a:solidFill>
+            <a:srgbClr val="FF0000">
+              <a:alpha val="50196"/>
+            </a:srgbClr>
+          </a:solidFill>
+          <a:ln>
+            <a:noFill/>
+          </a:ln>
+        </p:spPr>
+        <p:style>
+          <a:lnRef idx="2">
+            <a:schemeClr val="accent1">
+              <a:shade val="50000"/>
+            </a:schemeClr>
+          </a:lnRef>
+          <a:fillRef idx="1">
+            <a:schemeClr val="accent1"/>
+          </a:fillRef>
+          <a:effectRef idx="0">
+            <a:schemeClr val="accent1"/>
+          </a:effectRef>
+          <a:fontRef idx="minor">
+            <a:schemeClr val="lt1"/>
+          </a:fontRef>
+        </p:style>
+        <p:txBody>
+          <a:bodyPr rtlCol="0" anchor="ctr"/>
+          <a:lstStyle/>
+          <a:p>
+            <a:pPr algn="ctr"/>
+            <a:endParaRPr lang="zh-CN" altLang="en-US"/>
+          </a:p>
+        </p:txBody>
+      </p:sp>
+      <p:sp>
+        <p:nvSpPr>
+          <p:cNvPr id="7" name="矩形: 圆角 6">
+            <a:extLst>
+              <a:ext uri="{FF2B5EF4-FFF2-40B4-BE49-F238E27FC236}">
+                <a16:creationId xmlns:a16="http://schemas.microsoft.com/office/drawing/2014/main" id="{032457AE-E0B6-8C09-5CCA-1E12685611C9}"/>
+              </a:ext>
+            </a:extLst>
+          </p:cNvPr>
+          <p:cNvSpPr/>
+          <p:nvPr/>
+        </p:nvSpPr>
+        <p:spPr>
+          <a:xfrm>
+            <a:off x="10202862" y="1540930"/>
+            <a:ext cx="190500" cy="203200"/>
+          </a:xfrm>
+          <a:prstGeom prst="roundRect">
+            <a:avLst/>
+          </a:prstGeom>
+          <a:solidFill>
+            <a:srgbClr val="00B050">
+              <a:alpha val="69804"/>
+            </a:srgbClr>
+          </a:solidFill>
+          <a:ln>
+            <a:noFill/>
+          </a:ln>
+        </p:spPr>
+        <p:style>
+          <a:lnRef idx="2">
+            <a:schemeClr val="accent1">
+              <a:shade val="50000"/>
+            </a:schemeClr>
+          </a:lnRef>
+          <a:fillRef idx="1">
+            <a:schemeClr val="accent1"/>
+          </a:fillRef>
+          <a:effectRef idx="0">
+            <a:schemeClr val="accent1"/>
+          </a:effectRef>
+          <a:fontRef idx="minor">
+            <a:schemeClr val="lt1"/>
+          </a:fontRef>
+        </p:style>
+        <p:txBody>
+          <a:bodyPr rtlCol="0" anchor="ctr"/>
+          <a:lstStyle/>
+          <a:p>
+            <a:pPr algn="ctr"/>
+            <a:endParaRPr lang="zh-CN" altLang="en-US"/>
+          </a:p>
+        </p:txBody>
+      </p:sp>
+      <p:sp>
+        <p:nvSpPr>
+          <p:cNvPr id="32" name="文本框 31">
+            <a:extLst>
+              <a:ext uri="{FF2B5EF4-FFF2-40B4-BE49-F238E27FC236}">
+                <a16:creationId xmlns:a16="http://schemas.microsoft.com/office/drawing/2014/main" id="{96D11CA9-7DCD-0AFA-7EBD-3232EBB90B6D}"/>
+              </a:ext>
+            </a:extLst>
+          </p:cNvPr>
+          <p:cNvSpPr txBox="1"/>
+          <p:nvPr/>
+        </p:nvSpPr>
+        <p:spPr>
+          <a:xfrm>
+            <a:off x="10945773" y="1518699"/>
+            <a:ext cx="446991" cy="246221"/>
+          </a:xfrm>
+          <a:prstGeom prst="rect">
+            <a:avLst/>
+          </a:prstGeom>
+          <a:noFill/>
+        </p:spPr>
+        <p:txBody>
+          <a:bodyPr wrap="square" lIns="36000" tIns="0" rIns="36000" bIns="0" rtlCol="0">
+            <a:spAutoFit/>
+          </a:bodyPr>
+          <a:lstStyle/>
+          <a:p>
+            <a:r>
+              <a:rPr lang="en-US" altLang="zh-CN" sz="1600" b="1" dirty="0">
+                <a:solidFill>
+                  <a:srgbClr val="00B050"/>
+                </a:solidFill>
+              </a:rPr>
+              <a:t>OK</a:t>
+            </a:r>
+            <a:endParaRPr lang="zh-CN" altLang="en-US" sz="1600" b="1" dirty="0">
+              <a:solidFill>
+                <a:srgbClr val="00B050"/>
+              </a:solidFill>
+            </a:endParaRPr>
+          </a:p>
+        </p:txBody>
+      </p:sp>
+      <p:sp>
+        <p:nvSpPr>
+          <p:cNvPr id="23" name="文本框 22">
+            <a:extLst>
+              <a:ext uri="{FF2B5EF4-FFF2-40B4-BE49-F238E27FC236}">
+                <a16:creationId xmlns:a16="http://schemas.microsoft.com/office/drawing/2014/main" id="{D10518B1-8FB2-4909-443A-D16845752C94}"/>
+              </a:ext>
+            </a:extLst>
+          </p:cNvPr>
+          <p:cNvSpPr txBox="1"/>
+          <p:nvPr/>
+        </p:nvSpPr>
+        <p:spPr>
+          <a:xfrm>
+            <a:off x="4505376" y="1082604"/>
+            <a:ext cx="1038549" cy="318924"/>
+          </a:xfrm>
+          <a:prstGeom prst="rect">
+            <a:avLst/>
+          </a:prstGeom>
+          <a:noFill/>
+        </p:spPr>
+        <p:txBody>
+          <a:bodyPr wrap="square" lIns="36000" tIns="36000" rIns="36000" bIns="36000" rtlCol="0">
+            <a:spAutoFit/>
+          </a:bodyPr>
+          <a:lstStyle/>
+          <a:p>
+            <a:pPr algn="ctr"/>
+            <a:r>
+              <a:rPr lang="en-US" altLang="zh-CN" sz="1600" b="1" dirty="0">
+                <a:solidFill>
+                  <a:schemeClr val="accent1">
+                    <a:lumMod val="75000"/>
+                  </a:schemeClr>
+                </a:solidFill>
+              </a:rPr>
+              <a:t>Level</a:t>
+            </a:r>
+            <a:endParaRPr lang="zh-CN" altLang="en-US" sz="1600" b="1" dirty="0">
+              <a:solidFill>
+                <a:schemeClr val="accent1">
+                  <a:lumMod val="75000"/>
+                </a:schemeClr>
+              </a:solidFill>
+            </a:endParaRPr>
+          </a:p>
+        </p:txBody>
+      </p:sp>
+      <p:sp>
+        <p:nvSpPr>
+          <p:cNvPr id="33" name="箭头: 左 32">
+            <a:extLst>
+              <a:ext uri="{FF2B5EF4-FFF2-40B4-BE49-F238E27FC236}">
+                <a16:creationId xmlns:a16="http://schemas.microsoft.com/office/drawing/2014/main" id="{14B2FFD5-F8BF-CBAD-9ADE-4EDFF88CC7E8}"/>
+              </a:ext>
+            </a:extLst>
+          </p:cNvPr>
+          <p:cNvSpPr/>
+          <p:nvPr/>
+        </p:nvSpPr>
+        <p:spPr>
+          <a:xfrm rot="2159241">
+            <a:off x="4250152" y="788993"/>
+            <a:ext cx="437078" cy="304655"/>
+          </a:xfrm>
+          <a:prstGeom prst="leftArrow">
+            <a:avLst/>
+          </a:prstGeom>
+          <a:noFill/>
+          <a:ln w="28575">
+            <a:solidFill>
+              <a:srgbClr val="2F528F">
+                <a:alpha val="69804"/>
+              </a:srgbClr>
+            </a:solidFill>
+          </a:ln>
+        </p:spPr>
+        <p:style>
+          <a:lnRef idx="2">
+            <a:schemeClr val="accent1">
+              <a:shade val="50000"/>
+            </a:schemeClr>
+          </a:lnRef>
+          <a:fillRef idx="1">
+            <a:schemeClr val="accent1"/>
+          </a:fillRef>
+          <a:effectRef idx="0">
+            <a:schemeClr val="accent1"/>
+          </a:effectRef>
+          <a:fontRef idx="minor">
+            <a:schemeClr val="lt1"/>
+          </a:fontRef>
+        </p:style>
+        <p:txBody>
+          <a:bodyPr rtlCol="0" anchor="ctr"/>
+          <a:lstStyle/>
+          <a:p>
+            <a:pPr algn="ctr"/>
+            <a:endParaRPr lang="zh-CN" altLang="en-US"/>
+          </a:p>
+        </p:txBody>
+      </p:sp>
+      <p:sp>
+        <p:nvSpPr>
+          <p:cNvPr id="34" name="箭头: 左 33">
+            <a:extLst>
+              <a:ext uri="{FF2B5EF4-FFF2-40B4-BE49-F238E27FC236}">
+                <a16:creationId xmlns:a16="http://schemas.microsoft.com/office/drawing/2014/main" id="{EC28EFDC-B25E-4586-C6D9-15C2737210FB}"/>
+              </a:ext>
+            </a:extLst>
+          </p:cNvPr>
+          <p:cNvSpPr/>
+          <p:nvPr/>
+        </p:nvSpPr>
+        <p:spPr>
+          <a:xfrm rot="13792854">
+            <a:off x="5113504" y="1532052"/>
+            <a:ext cx="437078" cy="304655"/>
+          </a:xfrm>
+          <a:prstGeom prst="leftArrow">
+            <a:avLst/>
+          </a:prstGeom>
+          <a:noFill/>
+          <a:ln w="28575">
+            <a:solidFill>
+              <a:srgbClr val="2F528F">
+                <a:alpha val="69804"/>
+              </a:srgbClr>
+            </a:solidFill>
+          </a:ln>
+        </p:spPr>
+        <p:style>
+          <a:lnRef idx="2">
+            <a:schemeClr val="accent1">
+              <a:shade val="50000"/>
+            </a:schemeClr>
+          </a:lnRef>
+          <a:fillRef idx="1">
+            <a:schemeClr val="accent1"/>
+          </a:fillRef>
+          <a:effectRef idx="0">
+            <a:schemeClr val="accent1"/>
+          </a:effectRef>
+          <a:fontRef idx="minor">
+            <a:schemeClr val="lt1"/>
+          </a:fontRef>
+        </p:style>
+        <p:txBody>
+          <a:bodyPr rtlCol="0" anchor="ctr"/>
+          <a:lstStyle/>
+          <a:p>
+            <a:pPr algn="ctr"/>
+            <a:endParaRPr lang="zh-CN" altLang="en-US"/>
+          </a:p>
+        </p:txBody>
+      </p:sp>
+      <p:cxnSp>
+        <p:nvCxnSpPr>
+          <p:cNvPr id="36" name="直接连接符 35">
+            <a:extLst>
+              <a:ext uri="{FF2B5EF4-FFF2-40B4-BE49-F238E27FC236}">
+                <a16:creationId xmlns:a16="http://schemas.microsoft.com/office/drawing/2014/main" id="{1DE5AA49-B042-F55F-7363-348CE1C56DFE}"/>
+              </a:ext>
+            </a:extLst>
+          </p:cNvPr>
+          <p:cNvCxnSpPr>
+            <a:cxnSpLocks/>
+            <a:stCxn id="7" idx="3"/>
+            <a:endCxn id="32" idx="1"/>
+          </p:cNvCxnSpPr>
+          <p:nvPr/>
+        </p:nvCxnSpPr>
+        <p:spPr>
+          <a:xfrm flipV="1">
+            <a:off x="10393362" y="1641810"/>
+            <a:ext cx="552411" cy="720"/>
+          </a:xfrm>
+          <a:prstGeom prst="line">
+            <a:avLst/>
+          </a:prstGeom>
+          <a:ln w="28575">
+            <a:solidFill>
+              <a:srgbClr val="00B050">
+                <a:alpha val="69804"/>
+              </a:srgbClr>
+            </a:solidFill>
+            <a:prstDash val="sysDot"/>
+          </a:ln>
+        </p:spPr>
+        <p:style>
+          <a:lnRef idx="1">
+            <a:schemeClr val="accent1"/>
+          </a:lnRef>
+          <a:fillRef idx="0">
+            <a:schemeClr val="accent1"/>
+          </a:fillRef>
+          <a:effectRef idx="0">
+            <a:schemeClr val="accent1"/>
+          </a:effectRef>
+          <a:fontRef idx="minor">
+            <a:schemeClr val="tx1"/>
+          </a:fontRef>
+        </p:style>
+      </p:cxnSp>
+      <p:sp>
+        <p:nvSpPr>
+          <p:cNvPr id="41" name="文本框 40">
+            <a:extLst>
+              <a:ext uri="{FF2B5EF4-FFF2-40B4-BE49-F238E27FC236}">
+                <a16:creationId xmlns:a16="http://schemas.microsoft.com/office/drawing/2014/main" id="{C8E21311-7827-10B3-F5A7-4AFEABD8E6FA}"/>
+              </a:ext>
+            </a:extLst>
+          </p:cNvPr>
+          <p:cNvSpPr txBox="1"/>
+          <p:nvPr/>
+        </p:nvSpPr>
+        <p:spPr>
+          <a:xfrm>
+            <a:off x="10945773" y="1762247"/>
+            <a:ext cx="783772" cy="246221"/>
+          </a:xfrm>
+          <a:prstGeom prst="rect">
+            <a:avLst/>
+          </a:prstGeom>
+          <a:noFill/>
+        </p:spPr>
+        <p:txBody>
+          <a:bodyPr wrap="square" lIns="36000" tIns="0" rIns="36000" bIns="0" rtlCol="0">
+            <a:spAutoFit/>
+          </a:bodyPr>
+          <a:lstStyle/>
+          <a:p>
+            <a:r>
+              <a:rPr lang="en-US" altLang="zh-CN" sz="1600" b="1" dirty="0">
+                <a:solidFill>
+                  <a:srgbClr val="FF0000"/>
+                </a:solidFill>
+              </a:rPr>
+              <a:t>Cancel</a:t>
+            </a:r>
+            <a:endParaRPr lang="zh-CN" altLang="en-US" sz="1600" b="1" dirty="0">
+              <a:solidFill>
+                <a:srgbClr val="FF0000"/>
+              </a:solidFill>
+            </a:endParaRPr>
+          </a:p>
+        </p:txBody>
+      </p:sp>
+      <p:cxnSp>
+        <p:nvCxnSpPr>
+          <p:cNvPr id="48" name="连接符: 肘形 47">
+            <a:extLst>
+              <a:ext uri="{FF2B5EF4-FFF2-40B4-BE49-F238E27FC236}">
+                <a16:creationId xmlns:a16="http://schemas.microsoft.com/office/drawing/2014/main" id="{40C54F7A-C92D-EE17-7E7F-B749AF19359A}"/>
+              </a:ext>
+            </a:extLst>
+          </p:cNvPr>
+          <p:cNvCxnSpPr>
+            <a:cxnSpLocks/>
+            <a:stCxn id="4" idx="2"/>
+            <a:endCxn id="41" idx="1"/>
+          </p:cNvCxnSpPr>
+          <p:nvPr/>
+        </p:nvCxnSpPr>
+        <p:spPr>
+          <a:xfrm rot="16200000" flipH="1">
+            <a:off x="10414010" y="1353595"/>
+            <a:ext cx="141228" cy="922298"/>
+          </a:xfrm>
+          <a:prstGeom prst="bentConnector2">
+            <a:avLst/>
+          </a:prstGeom>
+          <a:ln w="28575">
+            <a:solidFill>
+              <a:srgbClr val="FF0000"/>
+            </a:solidFill>
+            <a:prstDash val="sysDot"/>
+          </a:ln>
+        </p:spPr>
+        <p:style>
+          <a:lnRef idx="1">
+            <a:schemeClr val="accent1"/>
+          </a:lnRef>
+          <a:fillRef idx="0">
+            <a:schemeClr val="accent1"/>
+          </a:fillRef>
+          <a:effectRef idx="0">
+            <a:schemeClr val="accent1"/>
+          </a:effectRef>
+          <a:fontRef idx="minor">
+            <a:schemeClr val="tx1"/>
+          </a:fontRef>
+        </p:style>
+      </p:cxnSp>
+      <p:sp>
+        <p:nvSpPr>
+          <p:cNvPr id="6" name="左大括号 5">
+            <a:extLst>
+              <a:ext uri="{FF2B5EF4-FFF2-40B4-BE49-F238E27FC236}">
+                <a16:creationId xmlns:a16="http://schemas.microsoft.com/office/drawing/2014/main" id="{485A5E57-A203-7FC8-F4B2-26DCB1B32A71}"/>
+              </a:ext>
+            </a:extLst>
+          </p:cNvPr>
+          <p:cNvSpPr/>
+          <p:nvPr/>
+        </p:nvSpPr>
+        <p:spPr>
+          <a:xfrm rot="16200000">
+            <a:off x="8380727" y="3301847"/>
+            <a:ext cx="389999" cy="3776150"/>
+          </a:xfrm>
+          <a:prstGeom prst="leftBrace">
+            <a:avLst>
+              <a:gd name="adj1" fmla="val 21655"/>
+              <a:gd name="adj2" fmla="val 49829"/>
+            </a:avLst>
+          </a:prstGeom>
+          <a:ln w="28575">
+            <a:solidFill>
+              <a:schemeClr val="accent4">
+                <a:lumMod val="75000"/>
+                <a:alpha val="69804"/>
+              </a:schemeClr>
+            </a:solidFill>
+          </a:ln>
+        </p:spPr>
+        <p:style>
+          <a:lnRef idx="1">
+            <a:schemeClr val="accent1"/>
+          </a:lnRef>
+          <a:fillRef idx="0">
+            <a:schemeClr val="accent1"/>
+          </a:fillRef>
+          <a:effectRef idx="0">
+            <a:schemeClr val="accent1"/>
+          </a:effectRef>
+          <a:fontRef idx="minor">
+            <a:schemeClr val="tx1"/>
+          </a:fontRef>
+        </p:style>
+        <p:txBody>
+          <a:bodyPr rtlCol="0" anchor="ctr"/>
+          <a:lstStyle/>
+          <a:p>
+            <a:pPr algn="ctr"/>
+            <a:endParaRPr lang="zh-CN" altLang="en-US"/>
+          </a:p>
+        </p:txBody>
+      </p:sp>
+      <p:sp>
+        <p:nvSpPr>
+          <p:cNvPr id="8" name="文本框 7">
+            <a:extLst>
+              <a:ext uri="{FF2B5EF4-FFF2-40B4-BE49-F238E27FC236}">
+                <a16:creationId xmlns:a16="http://schemas.microsoft.com/office/drawing/2014/main" id="{AE3C47F2-E0ED-9CC7-32DB-823BE8A51BAE}"/>
+              </a:ext>
+            </a:extLst>
+          </p:cNvPr>
+          <p:cNvSpPr txBox="1"/>
+          <p:nvPr/>
+        </p:nvSpPr>
+        <p:spPr>
+          <a:xfrm>
+            <a:off x="7526908" y="5393376"/>
+            <a:ext cx="2085483" cy="349702"/>
+          </a:xfrm>
+          <a:prstGeom prst="rect">
+            <a:avLst/>
+          </a:prstGeom>
+          <a:noFill/>
+        </p:spPr>
+        <p:txBody>
+          <a:bodyPr wrap="square" lIns="36000" tIns="36000" rIns="36000" bIns="36000" rtlCol="0">
+            <a:spAutoFit/>
+          </a:bodyPr>
+          <a:lstStyle>
+            <a:defPPr>
+              <a:defRPr lang="zh-CN"/>
+            </a:defPPr>
+            <a:lvl1pPr algn="ctr">
+              <a:defRPr sz="1600" b="1">
+                <a:solidFill>
+                  <a:schemeClr val="accent4">
+                    <a:lumMod val="75000"/>
+                  </a:schemeClr>
+                </a:solidFill>
+              </a:defRPr>
+            </a:lvl1pPr>
+          </a:lstStyle>
+          <a:p>
+            <a:r>
+              <a:rPr lang="en-US" altLang="zh-CN" dirty="0"/>
+              <a:t>1-7 Quick Set</a:t>
+            </a:r>
+            <a:endParaRPr lang="zh-CN" altLang="en-US" dirty="0"/>
+          </a:p>
+        </p:txBody>
+      </p:sp>
+      <p:sp>
+        <p:nvSpPr>
+          <p:cNvPr id="31" name="矩形: 圆角 30">
+            <a:extLst>
+              <a:ext uri="{FF2B5EF4-FFF2-40B4-BE49-F238E27FC236}">
+                <a16:creationId xmlns:a16="http://schemas.microsoft.com/office/drawing/2014/main" id="{86AD6E91-1A22-BB9B-7D95-55D299AC2D56}"/>
+              </a:ext>
+            </a:extLst>
+          </p:cNvPr>
+          <p:cNvSpPr/>
+          <p:nvPr/>
+        </p:nvSpPr>
+        <p:spPr>
+          <a:xfrm>
+            <a:off x="7210835" y="2412706"/>
+            <a:ext cx="694445" cy="1120685"/>
+          </a:xfrm>
+          <a:prstGeom prst="roundRect">
+            <a:avLst>
+              <a:gd name="adj" fmla="val 9697"/>
+            </a:avLst>
+          </a:prstGeom>
+          <a:solidFill>
+            <a:schemeClr val="accent4">
+              <a:lumMod val="75000"/>
+              <a:alpha val="30196"/>
+            </a:schemeClr>
+          </a:solidFill>
+          <a:ln>
+            <a:noFill/>
+          </a:ln>
+        </p:spPr>
+        <p:style>
+          <a:lnRef idx="2">
+            <a:schemeClr val="accent1">
+              <a:shade val="50000"/>
+            </a:schemeClr>
+          </a:lnRef>
+          <a:fillRef idx="1">
+            <a:schemeClr val="accent1"/>
+          </a:fillRef>
+          <a:effectRef idx="0">
+            <a:schemeClr val="accent1"/>
+          </a:effectRef>
+          <a:fontRef idx="minor">
+            <a:schemeClr val="lt1"/>
+          </a:fontRef>
+        </p:style>
+        <p:txBody>
+          <a:bodyPr rtlCol="0" anchor="b"/>
+          <a:lstStyle/>
+          <a:p>
+            <a:pPr algn="ctr"/>
+            <a:r>
+              <a:rPr lang="en-US" altLang="zh-CN" sz="1300" b="1" dirty="0">
+                <a:solidFill>
+                  <a:schemeClr val="accent4">
+                    <a:lumMod val="75000"/>
+                  </a:schemeClr>
+                </a:solidFill>
+              </a:rPr>
+              <a:t>17%</a:t>
+            </a:r>
+            <a:endParaRPr lang="zh-CN" altLang="en-US" sz="1300" b="1" dirty="0">
+              <a:solidFill>
+                <a:schemeClr val="accent4">
+                  <a:lumMod val="75000"/>
+                </a:schemeClr>
+              </a:solidFill>
+            </a:endParaRPr>
+          </a:p>
+        </p:txBody>
+      </p:sp>
+      <p:sp>
+        <p:nvSpPr>
+          <p:cNvPr id="35" name="矩形: 圆角 34">
+            <a:extLst>
+              <a:ext uri="{FF2B5EF4-FFF2-40B4-BE49-F238E27FC236}">
+                <a16:creationId xmlns:a16="http://schemas.microsoft.com/office/drawing/2014/main" id="{094EF032-1E3C-EF73-592C-F884F8DFFA77}"/>
+              </a:ext>
+            </a:extLst>
+          </p:cNvPr>
+          <p:cNvSpPr/>
+          <p:nvPr/>
+        </p:nvSpPr>
+        <p:spPr>
+          <a:xfrm>
+            <a:off x="8222426" y="2412706"/>
+            <a:ext cx="694445" cy="1120685"/>
+          </a:xfrm>
+          <a:prstGeom prst="roundRect">
+            <a:avLst>
+              <a:gd name="adj" fmla="val 9697"/>
+            </a:avLst>
+          </a:prstGeom>
+          <a:solidFill>
+            <a:schemeClr val="accent4">
+              <a:lumMod val="75000"/>
+              <a:alpha val="30196"/>
+            </a:schemeClr>
+          </a:solidFill>
+          <a:ln>
+            <a:noFill/>
+          </a:ln>
+        </p:spPr>
+        <p:style>
+          <a:lnRef idx="2">
+            <a:schemeClr val="accent1">
+              <a:shade val="50000"/>
+            </a:schemeClr>
+          </a:lnRef>
+          <a:fillRef idx="1">
+            <a:schemeClr val="accent1"/>
+          </a:fillRef>
+          <a:effectRef idx="0">
+            <a:schemeClr val="accent1"/>
+          </a:effectRef>
+          <a:fontRef idx="minor">
+            <a:schemeClr val="lt1"/>
+          </a:fontRef>
+        </p:style>
+        <p:txBody>
+          <a:bodyPr rtlCol="0" anchor="b"/>
+          <a:lstStyle/>
+          <a:p>
+            <a:pPr algn="ctr"/>
+            <a:r>
+              <a:rPr lang="en-US" altLang="zh-CN" sz="1300" b="1" dirty="0">
+                <a:solidFill>
+                  <a:schemeClr val="accent4">
+                    <a:lumMod val="75000"/>
+                  </a:schemeClr>
+                </a:solidFill>
+              </a:rPr>
+              <a:t>50%</a:t>
+            </a:r>
+            <a:endParaRPr lang="zh-CN" altLang="en-US" sz="1300" b="1" dirty="0">
+              <a:solidFill>
+                <a:schemeClr val="accent4">
+                  <a:lumMod val="75000"/>
+                </a:schemeClr>
+              </a:solidFill>
+            </a:endParaRPr>
+          </a:p>
+        </p:txBody>
+      </p:sp>
+      <p:sp>
+        <p:nvSpPr>
+          <p:cNvPr id="37" name="矩形: 圆角 36">
+            <a:extLst>
+              <a:ext uri="{FF2B5EF4-FFF2-40B4-BE49-F238E27FC236}">
+                <a16:creationId xmlns:a16="http://schemas.microsoft.com/office/drawing/2014/main" id="{00E0C1A2-AAE2-C2D9-11EF-F88EFE34EF59}"/>
+              </a:ext>
+            </a:extLst>
+          </p:cNvPr>
+          <p:cNvSpPr/>
+          <p:nvPr/>
+        </p:nvSpPr>
+        <p:spPr>
+          <a:xfrm>
+            <a:off x="9233780" y="2412706"/>
+            <a:ext cx="694445" cy="1120685"/>
+          </a:xfrm>
+          <a:prstGeom prst="roundRect">
+            <a:avLst>
+              <a:gd name="adj" fmla="val 9697"/>
+            </a:avLst>
+          </a:prstGeom>
+          <a:solidFill>
+            <a:schemeClr val="accent4">
+              <a:lumMod val="75000"/>
+              <a:alpha val="30196"/>
+            </a:schemeClr>
+          </a:solidFill>
+          <a:ln>
+            <a:noFill/>
+          </a:ln>
+        </p:spPr>
+        <p:style>
+          <a:lnRef idx="2">
+            <a:schemeClr val="accent1">
+              <a:shade val="50000"/>
+            </a:schemeClr>
+          </a:lnRef>
+          <a:fillRef idx="1">
+            <a:schemeClr val="accent1"/>
+          </a:fillRef>
+          <a:effectRef idx="0">
+            <a:schemeClr val="accent1"/>
+          </a:effectRef>
+          <a:fontRef idx="minor">
+            <a:schemeClr val="lt1"/>
+          </a:fontRef>
+        </p:style>
+        <p:txBody>
+          <a:bodyPr rtlCol="0" anchor="b"/>
+          <a:lstStyle/>
+          <a:p>
+            <a:pPr algn="ctr"/>
+            <a:r>
+              <a:rPr lang="en-US" altLang="zh-CN" sz="1300" b="1" dirty="0">
+                <a:solidFill>
+                  <a:schemeClr val="accent4">
+                    <a:lumMod val="75000"/>
+                  </a:schemeClr>
+                </a:solidFill>
+              </a:rPr>
+              <a:t>83%</a:t>
+            </a:r>
+            <a:endParaRPr lang="zh-CN" altLang="en-US" sz="1300" b="1" dirty="0">
+              <a:solidFill>
+                <a:schemeClr val="accent4">
+                  <a:lumMod val="75000"/>
+                </a:schemeClr>
+              </a:solidFill>
+            </a:endParaRPr>
+          </a:p>
+        </p:txBody>
+      </p:sp>
+      <p:sp>
+        <p:nvSpPr>
+          <p:cNvPr id="38" name="矩形: 圆角 37">
+            <a:extLst>
+              <a:ext uri="{FF2B5EF4-FFF2-40B4-BE49-F238E27FC236}">
+                <a16:creationId xmlns:a16="http://schemas.microsoft.com/office/drawing/2014/main" id="{ACFD66D6-C677-7C3E-25BF-D5E878680322}"/>
+              </a:ext>
+            </a:extLst>
+          </p:cNvPr>
+          <p:cNvSpPr/>
+          <p:nvPr/>
+        </p:nvSpPr>
+        <p:spPr>
+          <a:xfrm>
+            <a:off x="6705666" y="3792890"/>
+            <a:ext cx="694445" cy="1120685"/>
+          </a:xfrm>
+          <a:prstGeom prst="roundRect">
+            <a:avLst>
+              <a:gd name="adj" fmla="val 9697"/>
+            </a:avLst>
+          </a:prstGeom>
+          <a:solidFill>
+            <a:schemeClr val="accent4">
+              <a:lumMod val="75000"/>
+              <a:alpha val="30196"/>
+            </a:schemeClr>
+          </a:solidFill>
+          <a:ln>
+            <a:noFill/>
+          </a:ln>
+        </p:spPr>
+        <p:style>
+          <a:lnRef idx="2">
+            <a:schemeClr val="accent1">
+              <a:shade val="50000"/>
+            </a:schemeClr>
+          </a:lnRef>
+          <a:fillRef idx="1">
+            <a:schemeClr val="accent1"/>
+          </a:fillRef>
+          <a:effectRef idx="0">
+            <a:schemeClr val="accent1"/>
+          </a:effectRef>
+          <a:fontRef idx="minor">
+            <a:schemeClr val="lt1"/>
+          </a:fontRef>
+        </p:style>
+        <p:txBody>
+          <a:bodyPr rtlCol="0" anchor="b"/>
+          <a:lstStyle/>
+          <a:p>
+            <a:pPr algn="ctr"/>
+            <a:r>
+              <a:rPr lang="en-US" altLang="zh-CN" sz="1300" b="1" dirty="0">
+                <a:solidFill>
+                  <a:schemeClr val="accent4">
+                    <a:lumMod val="75000"/>
+                  </a:schemeClr>
+                </a:solidFill>
+              </a:rPr>
+              <a:t>0%</a:t>
+            </a:r>
+            <a:endParaRPr lang="zh-CN" altLang="en-US" sz="1300" b="1" dirty="0">
+              <a:solidFill>
+                <a:schemeClr val="accent4">
+                  <a:lumMod val="75000"/>
+                </a:schemeClr>
+              </a:solidFill>
+            </a:endParaRPr>
+          </a:p>
+        </p:txBody>
+      </p:sp>
+      <p:sp>
+        <p:nvSpPr>
+          <p:cNvPr id="42" name="矩形: 圆角 41">
+            <a:extLst>
+              <a:ext uri="{FF2B5EF4-FFF2-40B4-BE49-F238E27FC236}">
+                <a16:creationId xmlns:a16="http://schemas.microsoft.com/office/drawing/2014/main" id="{AF3CB319-D5C7-CAE0-B67A-A2B662D654B1}"/>
+              </a:ext>
+            </a:extLst>
+          </p:cNvPr>
+          <p:cNvSpPr/>
+          <p:nvPr/>
+        </p:nvSpPr>
+        <p:spPr>
+          <a:xfrm>
+            <a:off x="7712792" y="3796173"/>
+            <a:ext cx="694445" cy="1120685"/>
+          </a:xfrm>
+          <a:prstGeom prst="roundRect">
+            <a:avLst>
+              <a:gd name="adj" fmla="val 9697"/>
+            </a:avLst>
+          </a:prstGeom>
+          <a:solidFill>
+            <a:schemeClr val="accent4">
+              <a:lumMod val="75000"/>
+              <a:alpha val="30196"/>
+            </a:schemeClr>
+          </a:solidFill>
+          <a:ln>
+            <a:noFill/>
+          </a:ln>
+        </p:spPr>
+        <p:style>
+          <a:lnRef idx="2">
+            <a:schemeClr val="accent1">
+              <a:shade val="50000"/>
+            </a:schemeClr>
+          </a:lnRef>
+          <a:fillRef idx="1">
+            <a:schemeClr val="accent1"/>
+          </a:fillRef>
+          <a:effectRef idx="0">
+            <a:schemeClr val="accent1"/>
+          </a:effectRef>
+          <a:fontRef idx="minor">
+            <a:schemeClr val="lt1"/>
+          </a:fontRef>
+        </p:style>
+        <p:txBody>
+          <a:bodyPr rtlCol="0" anchor="b"/>
+          <a:lstStyle/>
+          <a:p>
+            <a:pPr algn="ctr"/>
+            <a:r>
+              <a:rPr lang="en-US" altLang="zh-CN" sz="1300" b="1" dirty="0">
+                <a:solidFill>
+                  <a:schemeClr val="accent4">
+                    <a:lumMod val="75000"/>
+                  </a:schemeClr>
+                </a:solidFill>
+              </a:rPr>
+              <a:t>33%</a:t>
+            </a:r>
+            <a:endParaRPr lang="zh-CN" altLang="en-US" sz="1300" b="1" dirty="0">
+              <a:solidFill>
+                <a:schemeClr val="accent4">
+                  <a:lumMod val="75000"/>
+                </a:schemeClr>
+              </a:solidFill>
+            </a:endParaRPr>
+          </a:p>
+        </p:txBody>
+      </p:sp>
+      <p:sp>
+        <p:nvSpPr>
+          <p:cNvPr id="43" name="矩形: 圆角 42">
+            <a:extLst>
+              <a:ext uri="{FF2B5EF4-FFF2-40B4-BE49-F238E27FC236}">
+                <a16:creationId xmlns:a16="http://schemas.microsoft.com/office/drawing/2014/main" id="{88043554-1B21-38C2-4DA9-8332BA1CFD4E}"/>
+              </a:ext>
+            </a:extLst>
+          </p:cNvPr>
+          <p:cNvSpPr/>
+          <p:nvPr/>
+        </p:nvSpPr>
+        <p:spPr>
+          <a:xfrm>
+            <a:off x="8727511" y="3792890"/>
+            <a:ext cx="694445" cy="1120685"/>
+          </a:xfrm>
+          <a:prstGeom prst="roundRect">
+            <a:avLst>
+              <a:gd name="adj" fmla="val 9697"/>
+            </a:avLst>
+          </a:prstGeom>
+          <a:solidFill>
+            <a:schemeClr val="accent4">
+              <a:lumMod val="75000"/>
+              <a:alpha val="30196"/>
+            </a:schemeClr>
+          </a:solidFill>
+          <a:ln>
+            <a:noFill/>
+          </a:ln>
+        </p:spPr>
+        <p:style>
+          <a:lnRef idx="2">
+            <a:schemeClr val="accent1">
+              <a:shade val="50000"/>
+            </a:schemeClr>
+          </a:lnRef>
+          <a:fillRef idx="1">
+            <a:schemeClr val="accent1"/>
+          </a:fillRef>
+          <a:effectRef idx="0">
+            <a:schemeClr val="accent1"/>
+          </a:effectRef>
+          <a:fontRef idx="minor">
+            <a:schemeClr val="lt1"/>
+          </a:fontRef>
+        </p:style>
+        <p:txBody>
+          <a:bodyPr rtlCol="0" anchor="b"/>
+          <a:lstStyle/>
+          <a:p>
+            <a:pPr algn="ctr"/>
+            <a:r>
+              <a:rPr lang="en-US" altLang="zh-CN" sz="1300" b="1" dirty="0">
+                <a:solidFill>
+                  <a:schemeClr val="accent4">
+                    <a:lumMod val="75000"/>
+                  </a:schemeClr>
+                </a:solidFill>
+              </a:rPr>
+              <a:t>67%</a:t>
+            </a:r>
+            <a:endParaRPr lang="zh-CN" altLang="en-US" sz="1300" b="1" dirty="0">
+              <a:solidFill>
+                <a:schemeClr val="accent4">
+                  <a:lumMod val="75000"/>
+                </a:schemeClr>
+              </a:solidFill>
+            </a:endParaRPr>
+          </a:p>
+        </p:txBody>
+      </p:sp>
+      <p:sp>
+        <p:nvSpPr>
+          <p:cNvPr id="44" name="矩形: 圆角 43">
+            <a:extLst>
+              <a:ext uri="{FF2B5EF4-FFF2-40B4-BE49-F238E27FC236}">
+                <a16:creationId xmlns:a16="http://schemas.microsoft.com/office/drawing/2014/main" id="{4A3994B3-B51A-1A88-E0F2-88217F19C0B3}"/>
+              </a:ext>
+            </a:extLst>
+          </p:cNvPr>
+          <p:cNvSpPr/>
+          <p:nvPr/>
+        </p:nvSpPr>
+        <p:spPr>
+          <a:xfrm>
+            <a:off x="9734637" y="3792890"/>
+            <a:ext cx="694445" cy="1120685"/>
+          </a:xfrm>
+          <a:prstGeom prst="roundRect">
+            <a:avLst>
+              <a:gd name="adj" fmla="val 9697"/>
+            </a:avLst>
+          </a:prstGeom>
+          <a:solidFill>
+            <a:schemeClr val="accent4">
+              <a:lumMod val="75000"/>
+              <a:alpha val="30196"/>
+            </a:schemeClr>
+          </a:solidFill>
+          <a:ln>
+            <a:noFill/>
+          </a:ln>
+        </p:spPr>
+        <p:style>
+          <a:lnRef idx="2">
+            <a:schemeClr val="accent1">
+              <a:shade val="50000"/>
+            </a:schemeClr>
+          </a:lnRef>
+          <a:fillRef idx="1">
+            <a:schemeClr val="accent1"/>
+          </a:fillRef>
+          <a:effectRef idx="0">
+            <a:schemeClr val="accent1"/>
+          </a:effectRef>
+          <a:fontRef idx="minor">
+            <a:schemeClr val="lt1"/>
+          </a:fontRef>
+        </p:style>
+        <p:txBody>
+          <a:bodyPr rtlCol="0" anchor="b"/>
+          <a:lstStyle/>
+          <a:p>
+            <a:pPr algn="ctr"/>
+            <a:r>
+              <a:rPr lang="en-US" altLang="zh-CN" sz="1300" b="1" dirty="0">
+                <a:solidFill>
+                  <a:schemeClr val="accent4">
+                    <a:lumMod val="75000"/>
+                  </a:schemeClr>
+                </a:solidFill>
+              </a:rPr>
+              <a:t>100%</a:t>
+            </a:r>
+            <a:endParaRPr lang="zh-CN" altLang="en-US" sz="1300" b="1" dirty="0">
+              <a:solidFill>
+                <a:schemeClr val="accent4">
+                  <a:lumMod val="75000"/>
+                </a:schemeClr>
+              </a:solidFill>
+            </a:endParaRPr>
+          </a:p>
+        </p:txBody>
+      </p:sp>
+      <p:sp>
+        <p:nvSpPr>
+          <p:cNvPr id="45" name="文本框 44">
+            <a:extLst>
+              <a:ext uri="{FF2B5EF4-FFF2-40B4-BE49-F238E27FC236}">
+                <a16:creationId xmlns:a16="http://schemas.microsoft.com/office/drawing/2014/main" id="{2CF41008-FC14-D3F0-1044-1ECE2FA8B4F0}"/>
+              </a:ext>
+            </a:extLst>
+          </p:cNvPr>
+          <p:cNvSpPr txBox="1"/>
+          <p:nvPr/>
+        </p:nvSpPr>
+        <p:spPr>
+          <a:xfrm>
+            <a:off x="5783201" y="531843"/>
+            <a:ext cx="2175466" cy="239415"/>
+          </a:xfrm>
+          <a:prstGeom prst="rect">
+            <a:avLst/>
+          </a:prstGeom>
+          <a:solidFill>
+            <a:schemeClr val="bg1">
+              <a:lumMod val="85000"/>
+            </a:schemeClr>
+          </a:solidFill>
+          <a:ln w="9525">
+            <a:solidFill>
+              <a:srgbClr val="0070C0"/>
+            </a:solidFill>
+            <a:prstDash val="sysDot"/>
+          </a:ln>
+          <a:effectLst/>
+        </p:spPr>
+        <p:txBody>
+          <a:bodyPr wrap="square" lIns="54000" tIns="36000" rIns="36000" bIns="36000" rtlCol="0">
+            <a:spAutoFit/>
+          </a:bodyPr>
+          <a:lstStyle/>
+          <a:p>
+            <a:pPr>
+              <a:lnSpc>
+                <a:spcPts val="1300"/>
+              </a:lnSpc>
+            </a:pPr>
+            <a:r>
+              <a:rPr lang="en-US" altLang="zh-CN" sz="1200" b="1" dirty="0">
+                <a:solidFill>
+                  <a:srgbClr val="009E47"/>
+                </a:solidFill>
+              </a:rPr>
+              <a:t>Overall LED Brightness Level</a:t>
+            </a:r>
+            <a:endParaRPr lang="zh-CN" altLang="en-US" sz="1200" b="1" dirty="0">
+              <a:solidFill>
+                <a:srgbClr val="009E47"/>
+              </a:solidFill>
+            </a:endParaRPr>
+          </a:p>
+        </p:txBody>
+      </p:sp>
+      <p:cxnSp>
+        <p:nvCxnSpPr>
+          <p:cNvPr id="46" name="连接符: 肘形 45">
+            <a:extLst>
+              <a:ext uri="{FF2B5EF4-FFF2-40B4-BE49-F238E27FC236}">
+                <a16:creationId xmlns:a16="http://schemas.microsoft.com/office/drawing/2014/main" id="{0AAD8FAD-7CF7-4F29-0769-830EF005877F}"/>
+              </a:ext>
+            </a:extLst>
+          </p:cNvPr>
+          <p:cNvCxnSpPr>
+            <a:cxnSpLocks/>
+            <a:stCxn id="23" idx="0"/>
+            <a:endCxn id="45" idx="1"/>
+          </p:cNvCxnSpPr>
+          <p:nvPr/>
+        </p:nvCxnSpPr>
+        <p:spPr>
+          <a:xfrm rot="5400000" flipH="1" flipV="1">
+            <a:off x="5188400" y="487803"/>
+            <a:ext cx="431053" cy="758550"/>
+          </a:xfrm>
+          <a:prstGeom prst="bentConnector2">
+            <a:avLst/>
+          </a:prstGeom>
+          <a:ln w="28575">
+            <a:solidFill>
+              <a:schemeClr val="accent5">
+                <a:lumMod val="75000"/>
+                <a:alpha val="69804"/>
+              </a:schemeClr>
+            </a:solidFill>
+            <a:prstDash val="sysDot"/>
+          </a:ln>
+        </p:spPr>
+        <p:style>
+          <a:lnRef idx="1">
+            <a:schemeClr val="accent1"/>
+          </a:lnRef>
+          <a:fillRef idx="0">
+            <a:schemeClr val="accent1"/>
+          </a:fillRef>
+          <a:effectRef idx="0">
+            <a:schemeClr val="accent1"/>
+          </a:effectRef>
+          <a:fontRef idx="minor">
+            <a:schemeClr val="tx1"/>
+          </a:fontRef>
+        </p:style>
+      </p:cxnSp>
+    </p:spTree>
+    <p:extLst>
+      <p:ext uri="{BB962C8B-B14F-4D97-AF65-F5344CB8AC3E}">
+        <p14:creationId xmlns:p14="http://schemas.microsoft.com/office/powerpoint/2010/main" val="4046009604"/>
+      </p:ext>
+    </p:extLst>
+  </p:cSld>
+  <p:clrMapOvr>
+    <a:masterClrMapping/>
+  </p:clrMapOvr>
+</p:sld>
+</file>
+
+<file path=ppt/slides/slide5.xml><?xml version="1.0" encoding="utf-8"?>
 <p:sld xmlns:a="http://schemas.openxmlformats.org/drawingml/2006/main" xmlns:r="http://schemas.openxmlformats.org/officeDocument/2006/relationships" xmlns:p="http://schemas.openxmlformats.org/presentationml/2006/main">
   <p:cSld>
     <p:spTree>
@@ -6585,7 +8273,7 @@
 </p:sld>
 </file>
 
-<file path=ppt/slides/slide5.xml><?xml version="1.0" encoding="utf-8"?>
+<file path=ppt/slides/slide6.xml><?xml version="1.0" encoding="utf-8"?>
 <p:sld xmlns:a="http://schemas.openxmlformats.org/drawingml/2006/main" xmlns:r="http://schemas.openxmlformats.org/officeDocument/2006/relationships" xmlns:p="http://schemas.openxmlformats.org/presentationml/2006/main">
   <p:cSld>
     <p:spTree>
@@ -7587,7 +9275,7 @@
         </p:nvSpPr>
         <p:spPr>
           <a:xfrm>
-            <a:off x="9233780" y="2411959"/>
+            <a:off x="9233780" y="2412706"/>
             <a:ext cx="694445" cy="1120685"/>
           </a:xfrm>
           <a:prstGeom prst="roundRect">
@@ -7660,7 +9348,7 @@
         </p:nvSpPr>
         <p:spPr>
           <a:xfrm>
-            <a:off x="6705666" y="3792143"/>
+            <a:off x="6705666" y="3792890"/>
             <a:ext cx="694445" cy="1120685"/>
           </a:xfrm>
           <a:prstGeom prst="roundRect">
@@ -7733,7 +9421,7 @@
         </p:nvSpPr>
         <p:spPr>
           <a:xfrm>
-            <a:off x="7712792" y="3795426"/>
+            <a:off x="7712792" y="3796173"/>
             <a:ext cx="694445" cy="1120685"/>
           </a:xfrm>
           <a:prstGeom prst="roundRect">
@@ -7806,7 +9494,7 @@
         </p:nvSpPr>
         <p:spPr>
           <a:xfrm>
-            <a:off x="8727511" y="3792143"/>
+            <a:off x="8727511" y="3792890"/>
             <a:ext cx="694445" cy="1120685"/>
           </a:xfrm>
           <a:prstGeom prst="roundRect">
@@ -7879,7 +9567,7 @@
         </p:nvSpPr>
         <p:spPr>
           <a:xfrm>
-            <a:off x="9734637" y="3792143"/>
+            <a:off x="9734637" y="3792890"/>
             <a:ext cx="694445" cy="1120685"/>
           </a:xfrm>
           <a:prstGeom prst="roundRect">
@@ -8032,1898 +9720,6 @@
     <p:extLst>
       <p:ext uri="{BB962C8B-B14F-4D97-AF65-F5344CB8AC3E}">
         <p14:creationId xmlns:p14="http://schemas.microsoft.com/office/powerpoint/2010/main" val="3103237577"/>
-      </p:ext>
-    </p:extLst>
-  </p:cSld>
-  <p:clrMapOvr>
-    <a:masterClrMapping/>
-  </p:clrMapOvr>
-</p:sld>
-</file>
-
-<file path=ppt/slides/slide6.xml><?xml version="1.0" encoding="utf-8"?>
-<p:sld xmlns:a="http://schemas.openxmlformats.org/drawingml/2006/main" xmlns:r="http://schemas.openxmlformats.org/officeDocument/2006/relationships" xmlns:p="http://schemas.openxmlformats.org/presentationml/2006/main">
-  <p:cSld>
-    <p:spTree>
-      <p:nvGrpSpPr>
-        <p:cNvPr id="1" name=""/>
-        <p:cNvGrpSpPr/>
-        <p:nvPr/>
-      </p:nvGrpSpPr>
-      <p:grpSpPr>
-        <a:xfrm>
-          <a:off x="0" y="0"/>
-          <a:ext cx="0" cy="0"/>
-          <a:chOff x="0" y="0"/>
-          <a:chExt cx="0" cy="0"/>
-        </a:xfrm>
-      </p:grpSpPr>
-      <p:pic>
-        <p:nvPicPr>
-          <p:cNvPr id="15" name="图片 14">
-            <a:extLst>
-              <a:ext uri="{FF2B5EF4-FFF2-40B4-BE49-F238E27FC236}">
-                <a16:creationId xmlns:a16="http://schemas.microsoft.com/office/drawing/2014/main" id="{359C8C55-CA60-4B63-0491-18FECC192D9C}"/>
-              </a:ext>
-            </a:extLst>
-          </p:cNvPr>
-          <p:cNvPicPr>
-            <a:picLocks noChangeAspect="1"/>
-          </p:cNvPicPr>
-          <p:nvPr/>
-        </p:nvPicPr>
-        <p:blipFill>
-          <a:blip r:embed="rId2">
-            <a:extLst>
-              <a:ext uri="{28A0092B-C50C-407E-A947-70E740481C1C}">
-                <a14:useLocalDpi xmlns:a14="http://schemas.microsoft.com/office/drawing/2010/main" val="0"/>
-              </a:ext>
-            </a:extLst>
-          </a:blip>
-          <a:stretch>
-            <a:fillRect/>
-          </a:stretch>
-        </p:blipFill>
-        <p:spPr>
-          <a:xfrm>
-            <a:off x="7527642" y="2168324"/>
-            <a:ext cx="3403491" cy="3403491"/>
-          </a:xfrm>
-          <a:prstGeom prst="rect">
-            <a:avLst/>
-          </a:prstGeom>
-        </p:spPr>
-      </p:pic>
-      <p:pic>
-        <p:nvPicPr>
-          <p:cNvPr id="1038" name="Picture 14" descr="Smd Sot-23 Mos Foot N Tube 50v 0.33a Bss138 - Buy Bss138,50v 0.33a  Bss138,Mosfet Bss138 Product on Alibaba.com">
-            <a:extLst>
-              <a:ext uri="{FF2B5EF4-FFF2-40B4-BE49-F238E27FC236}">
-                <a16:creationId xmlns:a16="http://schemas.microsoft.com/office/drawing/2014/main" id="{F4470569-7C3E-1345-33DA-C16DB52E7B17}"/>
-              </a:ext>
-            </a:extLst>
-          </p:cNvPr>
-          <p:cNvPicPr>
-            <a:picLocks noChangeAspect="1" noChangeArrowheads="1"/>
-          </p:cNvPicPr>
-          <p:nvPr/>
-        </p:nvPicPr>
-        <p:blipFill>
-          <a:blip r:embed="rId3">
-            <a:extLst>
-              <a:ext uri="{28A0092B-C50C-407E-A947-70E740481C1C}">
-                <a14:useLocalDpi xmlns:a14="http://schemas.microsoft.com/office/drawing/2010/main" val="0"/>
-              </a:ext>
-            </a:extLst>
-          </a:blip>
-          <a:srcRect/>
-          <a:stretch>
-            <a:fillRect/>
-          </a:stretch>
-        </p:blipFill>
-        <p:spPr bwMode="auto">
-          <a:xfrm rot="19862277">
-            <a:off x="7505596" y="2836214"/>
-            <a:ext cx="1403195" cy="1403195"/>
-          </a:xfrm>
-          <a:prstGeom prst="rect">
-            <a:avLst/>
-          </a:prstGeom>
-          <a:noFill/>
-          <a:effectLst>
-            <a:outerShdw blurRad="50800" dist="38100" dir="2700000" algn="tl" rotWithShape="0">
-              <a:prstClr val="black">
-                <a:alpha val="40000"/>
-              </a:prstClr>
-            </a:outerShdw>
-          </a:effectLst>
-          <a:extLst>
-            <a:ext uri="{909E8E84-426E-40DD-AFC4-6F175D3DCCD1}">
-              <a14:hiddenFill xmlns:a14="http://schemas.microsoft.com/office/drawing/2010/main">
-                <a:solidFill>
-                  <a:srgbClr val="FFFFFF"/>
-                </a:solidFill>
-              </a14:hiddenFill>
-            </a:ext>
-          </a:extLst>
-        </p:spPr>
-      </p:pic>
-      <p:pic>
-        <p:nvPicPr>
-          <p:cNvPr id="5" name="图片 4">
-            <a:extLst>
-              <a:ext uri="{FF2B5EF4-FFF2-40B4-BE49-F238E27FC236}">
-                <a16:creationId xmlns:a16="http://schemas.microsoft.com/office/drawing/2014/main" id="{9B4A8192-47A9-3BB6-D8A2-E6ABAB7C7AAD}"/>
-              </a:ext>
-            </a:extLst>
-          </p:cNvPr>
-          <p:cNvPicPr>
-            <a:picLocks noChangeAspect="1"/>
-          </p:cNvPicPr>
-          <p:nvPr/>
-        </p:nvPicPr>
-        <p:blipFill>
-          <a:blip r:embed="rId4"/>
-          <a:stretch>
-            <a:fillRect/>
-          </a:stretch>
-        </p:blipFill>
-        <p:spPr>
-          <a:xfrm rot="20985078" flipH="1" flipV="1">
-            <a:off x="398626" y="3439195"/>
-            <a:ext cx="3818843" cy="1959233"/>
-          </a:xfrm>
-          <a:prstGeom prst="rect">
-            <a:avLst/>
-          </a:prstGeom>
-        </p:spPr>
-      </p:pic>
-      <p:pic>
-        <p:nvPicPr>
-          <p:cNvPr id="17" name="图片 16">
-            <a:extLst>
-              <a:ext uri="{FF2B5EF4-FFF2-40B4-BE49-F238E27FC236}">
-                <a16:creationId xmlns:a16="http://schemas.microsoft.com/office/drawing/2014/main" id="{D63C1CC2-BBB8-A4A3-BA19-9730576582D1}"/>
-              </a:ext>
-            </a:extLst>
-          </p:cNvPr>
-          <p:cNvPicPr>
-            <a:picLocks noChangeAspect="1"/>
-          </p:cNvPicPr>
-          <p:nvPr/>
-        </p:nvPicPr>
-        <p:blipFill>
-          <a:blip r:embed="rId5"/>
-          <a:stretch>
-            <a:fillRect/>
-          </a:stretch>
-        </p:blipFill>
-        <p:spPr>
-          <a:xfrm>
-            <a:off x="4871807" y="778609"/>
-            <a:ext cx="1313093" cy="2650391"/>
-          </a:xfrm>
-          <a:prstGeom prst="rect">
-            <a:avLst/>
-          </a:prstGeom>
-        </p:spPr>
-      </p:pic>
-      <p:sp>
-        <p:nvSpPr>
-          <p:cNvPr id="22" name="任意多边形: 形状 21">
-            <a:extLst>
-              <a:ext uri="{FF2B5EF4-FFF2-40B4-BE49-F238E27FC236}">
-                <a16:creationId xmlns:a16="http://schemas.microsoft.com/office/drawing/2014/main" id="{C9B5AA22-1B19-520A-8C08-A7180F08FFD4}"/>
-              </a:ext>
-            </a:extLst>
-          </p:cNvPr>
-          <p:cNvSpPr/>
-          <p:nvPr/>
-        </p:nvSpPr>
-        <p:spPr>
-          <a:xfrm>
-            <a:off x="3035978" y="3947530"/>
-            <a:ext cx="5360988" cy="1264257"/>
-          </a:xfrm>
-          <a:custGeom>
-            <a:avLst/>
-            <a:gdLst>
-              <a:gd name="connsiteX0" fmla="*/ 0 w 5200650"/>
-              <a:gd name="connsiteY0" fmla="*/ 355600 h 959485"/>
-              <a:gd name="connsiteX1" fmla="*/ 2520950 w 5200650"/>
-              <a:gd name="connsiteY1" fmla="*/ 952500 h 959485"/>
-              <a:gd name="connsiteX2" fmla="*/ 5200650 w 5200650"/>
-              <a:gd name="connsiteY2" fmla="*/ 0 h 959485"/>
-              <a:gd name="connsiteX0" fmla="*/ 0 w 5200650"/>
-              <a:gd name="connsiteY0" fmla="*/ 355600 h 1047075"/>
-              <a:gd name="connsiteX1" fmla="*/ 2057198 w 5200650"/>
-              <a:gd name="connsiteY1" fmla="*/ 1041400 h 1047075"/>
-              <a:gd name="connsiteX2" fmla="*/ 5200650 w 5200650"/>
-              <a:gd name="connsiteY2" fmla="*/ 0 h 1047075"/>
-              <a:gd name="connsiteX0" fmla="*/ 0 w 5200650"/>
-              <a:gd name="connsiteY0" fmla="*/ 355600 h 1049940"/>
-              <a:gd name="connsiteX1" fmla="*/ 2057198 w 5200650"/>
-              <a:gd name="connsiteY1" fmla="*/ 1041400 h 1049940"/>
-              <a:gd name="connsiteX2" fmla="*/ 3535547 w 5200650"/>
-              <a:gd name="connsiteY2" fmla="*/ 692034 h 1049940"/>
-              <a:gd name="connsiteX3" fmla="*/ 5200650 w 5200650"/>
-              <a:gd name="connsiteY3" fmla="*/ 0 h 1049940"/>
-              <a:gd name="connsiteX0" fmla="*/ 0 w 5200650"/>
-              <a:gd name="connsiteY0" fmla="*/ 355600 h 947090"/>
-              <a:gd name="connsiteX1" fmla="*/ 1268819 w 5200650"/>
-              <a:gd name="connsiteY1" fmla="*/ 933450 h 947090"/>
-              <a:gd name="connsiteX2" fmla="*/ 3535547 w 5200650"/>
-              <a:gd name="connsiteY2" fmla="*/ 692034 h 947090"/>
-              <a:gd name="connsiteX3" fmla="*/ 5200650 w 5200650"/>
-              <a:gd name="connsiteY3" fmla="*/ 0 h 947090"/>
-              <a:gd name="connsiteX0" fmla="*/ 0 w 5200650"/>
-              <a:gd name="connsiteY0" fmla="*/ 355600 h 947090"/>
-              <a:gd name="connsiteX1" fmla="*/ 1268819 w 5200650"/>
-              <a:gd name="connsiteY1" fmla="*/ 933450 h 947090"/>
-              <a:gd name="connsiteX2" fmla="*/ 3535547 w 5200650"/>
-              <a:gd name="connsiteY2" fmla="*/ 692034 h 947090"/>
-              <a:gd name="connsiteX3" fmla="*/ 5200650 w 5200650"/>
-              <a:gd name="connsiteY3" fmla="*/ 0 h 947090"/>
-              <a:gd name="connsiteX0" fmla="*/ 0 w 5200650"/>
-              <a:gd name="connsiteY0" fmla="*/ 355600 h 1068452"/>
-              <a:gd name="connsiteX1" fmla="*/ 977317 w 5200650"/>
-              <a:gd name="connsiteY1" fmla="*/ 1060450 h 1068452"/>
-              <a:gd name="connsiteX2" fmla="*/ 3535547 w 5200650"/>
-              <a:gd name="connsiteY2" fmla="*/ 692034 h 1068452"/>
-              <a:gd name="connsiteX3" fmla="*/ 5200650 w 5200650"/>
-              <a:gd name="connsiteY3" fmla="*/ 0 h 1068452"/>
-              <a:gd name="connsiteX0" fmla="*/ 0 w 5200650"/>
-              <a:gd name="connsiteY0" fmla="*/ 355600 h 1068452"/>
-              <a:gd name="connsiteX1" fmla="*/ 977317 w 5200650"/>
-              <a:gd name="connsiteY1" fmla="*/ 1060450 h 1068452"/>
-              <a:gd name="connsiteX2" fmla="*/ 3535547 w 5200650"/>
-              <a:gd name="connsiteY2" fmla="*/ 692034 h 1068452"/>
-              <a:gd name="connsiteX3" fmla="*/ 5200650 w 5200650"/>
-              <a:gd name="connsiteY3" fmla="*/ 0 h 1068452"/>
-              <a:gd name="connsiteX0" fmla="*/ 0 w 5200650"/>
-              <a:gd name="connsiteY0" fmla="*/ 355600 h 1068452"/>
-              <a:gd name="connsiteX1" fmla="*/ 977317 w 5200650"/>
-              <a:gd name="connsiteY1" fmla="*/ 1060450 h 1068452"/>
-              <a:gd name="connsiteX2" fmla="*/ 3535547 w 5200650"/>
-              <a:gd name="connsiteY2" fmla="*/ 692034 h 1068452"/>
-              <a:gd name="connsiteX3" fmla="*/ 5200650 w 5200650"/>
-              <a:gd name="connsiteY3" fmla="*/ 0 h 1068452"/>
-              <a:gd name="connsiteX0" fmla="*/ 0 w 5200650"/>
-              <a:gd name="connsiteY0" fmla="*/ 355600 h 1074637"/>
-              <a:gd name="connsiteX1" fmla="*/ 1454320 w 5200650"/>
-              <a:gd name="connsiteY1" fmla="*/ 1066800 h 1074637"/>
-              <a:gd name="connsiteX2" fmla="*/ 3535547 w 5200650"/>
-              <a:gd name="connsiteY2" fmla="*/ 692034 h 1074637"/>
-              <a:gd name="connsiteX3" fmla="*/ 5200650 w 5200650"/>
-              <a:gd name="connsiteY3" fmla="*/ 0 h 1074637"/>
-              <a:gd name="connsiteX0" fmla="*/ 0 w 5200650"/>
-              <a:gd name="connsiteY0" fmla="*/ 355600 h 1074637"/>
-              <a:gd name="connsiteX1" fmla="*/ 1454320 w 5200650"/>
-              <a:gd name="connsiteY1" fmla="*/ 1066800 h 1074637"/>
-              <a:gd name="connsiteX2" fmla="*/ 3535547 w 5200650"/>
-              <a:gd name="connsiteY2" fmla="*/ 692034 h 1074637"/>
-              <a:gd name="connsiteX3" fmla="*/ 5200650 w 5200650"/>
-              <a:gd name="connsiteY3" fmla="*/ 0 h 1074637"/>
-              <a:gd name="connsiteX0" fmla="*/ 0 w 5200650"/>
-              <a:gd name="connsiteY0" fmla="*/ 355600 h 1074637"/>
-              <a:gd name="connsiteX1" fmla="*/ 1454320 w 5200650"/>
-              <a:gd name="connsiteY1" fmla="*/ 1066800 h 1074637"/>
-              <a:gd name="connsiteX2" fmla="*/ 3535547 w 5200650"/>
-              <a:gd name="connsiteY2" fmla="*/ 692034 h 1074637"/>
-              <a:gd name="connsiteX3" fmla="*/ 5200650 w 5200650"/>
-              <a:gd name="connsiteY3" fmla="*/ 0 h 1074637"/>
-              <a:gd name="connsiteX0" fmla="*/ 0 w 5200650"/>
-              <a:gd name="connsiteY0" fmla="*/ 355600 h 1086829"/>
-              <a:gd name="connsiteX1" fmla="*/ 1454320 w 5200650"/>
-              <a:gd name="connsiteY1" fmla="*/ 1066800 h 1086829"/>
-              <a:gd name="connsiteX2" fmla="*/ 3535547 w 5200650"/>
-              <a:gd name="connsiteY2" fmla="*/ 692034 h 1086829"/>
-              <a:gd name="connsiteX3" fmla="*/ 5200650 w 5200650"/>
-              <a:gd name="connsiteY3" fmla="*/ 0 h 1086829"/>
-              <a:gd name="connsiteX0" fmla="*/ 0 w 5200650"/>
-              <a:gd name="connsiteY0" fmla="*/ 355600 h 1086829"/>
-              <a:gd name="connsiteX1" fmla="*/ 1454320 w 5200650"/>
-              <a:gd name="connsiteY1" fmla="*/ 1066800 h 1086829"/>
-              <a:gd name="connsiteX2" fmla="*/ 3535547 w 5200650"/>
-              <a:gd name="connsiteY2" fmla="*/ 692034 h 1086829"/>
-              <a:gd name="connsiteX3" fmla="*/ 5200650 w 5200650"/>
-              <a:gd name="connsiteY3" fmla="*/ 0 h 1086829"/>
-              <a:gd name="connsiteX0" fmla="*/ 0 w 5593184"/>
-              <a:gd name="connsiteY0" fmla="*/ 674687 h 1405916"/>
-              <a:gd name="connsiteX1" fmla="*/ 1454320 w 5593184"/>
-              <a:gd name="connsiteY1" fmla="*/ 1385887 h 1405916"/>
-              <a:gd name="connsiteX2" fmla="*/ 3535547 w 5593184"/>
-              <a:gd name="connsiteY2" fmla="*/ 1011121 h 1405916"/>
-              <a:gd name="connsiteX3" fmla="*/ 5593184 w 5593184"/>
-              <a:gd name="connsiteY3" fmla="*/ 0 h 1405916"/>
-              <a:gd name="connsiteX0" fmla="*/ 0 w 5593184"/>
-              <a:gd name="connsiteY0" fmla="*/ 675330 h 1406559"/>
-              <a:gd name="connsiteX1" fmla="*/ 1454320 w 5593184"/>
-              <a:gd name="connsiteY1" fmla="*/ 1386530 h 1406559"/>
-              <a:gd name="connsiteX2" fmla="*/ 3535547 w 5593184"/>
-              <a:gd name="connsiteY2" fmla="*/ 1011764 h 1406559"/>
-              <a:gd name="connsiteX3" fmla="*/ 5593184 w 5593184"/>
-              <a:gd name="connsiteY3" fmla="*/ 643 h 1406559"/>
-              <a:gd name="connsiteX0" fmla="*/ 0 w 5593184"/>
-              <a:gd name="connsiteY0" fmla="*/ 675212 h 1426178"/>
-              <a:gd name="connsiteX1" fmla="*/ 1454320 w 5593184"/>
-              <a:gd name="connsiteY1" fmla="*/ 1386412 h 1426178"/>
-              <a:gd name="connsiteX2" fmla="*/ 3038670 w 5593184"/>
-              <a:gd name="connsiteY2" fmla="*/ 1211671 h 1426178"/>
-              <a:gd name="connsiteX3" fmla="*/ 5593184 w 5593184"/>
-              <a:gd name="connsiteY3" fmla="*/ 525 h 1426178"/>
-              <a:gd name="connsiteX0" fmla="*/ 0 w 5593184"/>
-              <a:gd name="connsiteY0" fmla="*/ 674687 h 1385887"/>
-              <a:gd name="connsiteX1" fmla="*/ 1454320 w 5593184"/>
-              <a:gd name="connsiteY1" fmla="*/ 1385887 h 1385887"/>
-              <a:gd name="connsiteX2" fmla="*/ 5593184 w 5593184"/>
-              <a:gd name="connsiteY2" fmla="*/ 0 h 1385887"/>
-              <a:gd name="connsiteX0" fmla="*/ 0 w 5593184"/>
-              <a:gd name="connsiteY0" fmla="*/ 674687 h 1385887"/>
-              <a:gd name="connsiteX1" fmla="*/ 1454320 w 5593184"/>
-              <a:gd name="connsiteY1" fmla="*/ 1385887 h 1385887"/>
-              <a:gd name="connsiteX2" fmla="*/ 5593184 w 5593184"/>
-              <a:gd name="connsiteY2" fmla="*/ 0 h 1385887"/>
-              <a:gd name="connsiteX0" fmla="*/ 0 w 5593184"/>
-              <a:gd name="connsiteY0" fmla="*/ 674687 h 1543049"/>
-              <a:gd name="connsiteX1" fmla="*/ 2060510 w 5593184"/>
-              <a:gd name="connsiteY1" fmla="*/ 1543049 h 1543049"/>
-              <a:gd name="connsiteX2" fmla="*/ 5593184 w 5593184"/>
-              <a:gd name="connsiteY2" fmla="*/ 0 h 1543049"/>
-              <a:gd name="connsiteX0" fmla="*/ 0 w 5593184"/>
-              <a:gd name="connsiteY0" fmla="*/ 674687 h 1543049"/>
-              <a:gd name="connsiteX1" fmla="*/ 2060510 w 5593184"/>
-              <a:gd name="connsiteY1" fmla="*/ 1543049 h 1543049"/>
-              <a:gd name="connsiteX2" fmla="*/ 5593184 w 5593184"/>
-              <a:gd name="connsiteY2" fmla="*/ 0 h 1543049"/>
-              <a:gd name="connsiteX0" fmla="*/ 0 w 5593184"/>
-              <a:gd name="connsiteY0" fmla="*/ 674687 h 1485899"/>
-              <a:gd name="connsiteX1" fmla="*/ 2239386 w 5593184"/>
-              <a:gd name="connsiteY1" fmla="*/ 1485899 h 1485899"/>
-              <a:gd name="connsiteX2" fmla="*/ 5593184 w 5593184"/>
-              <a:gd name="connsiteY2" fmla="*/ 0 h 1485899"/>
-              <a:gd name="connsiteX0" fmla="*/ 0 w 5593184"/>
-              <a:gd name="connsiteY0" fmla="*/ 674687 h 1485899"/>
-              <a:gd name="connsiteX1" fmla="*/ 2239386 w 5593184"/>
-              <a:gd name="connsiteY1" fmla="*/ 1485899 h 1485899"/>
-              <a:gd name="connsiteX2" fmla="*/ 5593184 w 5593184"/>
-              <a:gd name="connsiteY2" fmla="*/ 0 h 1485899"/>
-              <a:gd name="connsiteX0" fmla="*/ 0 w 5593184"/>
-              <a:gd name="connsiteY0" fmla="*/ 674687 h 1523333"/>
-              <a:gd name="connsiteX1" fmla="*/ 2239386 w 5593184"/>
-              <a:gd name="connsiteY1" fmla="*/ 1485899 h 1523333"/>
-              <a:gd name="connsiteX2" fmla="*/ 5593184 w 5593184"/>
-              <a:gd name="connsiteY2" fmla="*/ 0 h 1523333"/>
-              <a:gd name="connsiteX0" fmla="*/ 0 w 5593184"/>
-              <a:gd name="connsiteY0" fmla="*/ 674687 h 1523333"/>
-              <a:gd name="connsiteX1" fmla="*/ 2239386 w 5593184"/>
-              <a:gd name="connsiteY1" fmla="*/ 1485899 h 1523333"/>
-              <a:gd name="connsiteX2" fmla="*/ 5593184 w 5593184"/>
-              <a:gd name="connsiteY2" fmla="*/ 0 h 1523333"/>
-              <a:gd name="connsiteX0" fmla="*/ 0 w 5593184"/>
-              <a:gd name="connsiteY0" fmla="*/ 674687 h 1436608"/>
-              <a:gd name="connsiteX1" fmla="*/ 2244085 w 5593184"/>
-              <a:gd name="connsiteY1" fmla="*/ 1391306 h 1436608"/>
-              <a:gd name="connsiteX2" fmla="*/ 5593184 w 5593184"/>
-              <a:gd name="connsiteY2" fmla="*/ 0 h 1436608"/>
-              <a:gd name="connsiteX0" fmla="*/ 0 w 5593184"/>
-              <a:gd name="connsiteY0" fmla="*/ 674687 h 1326449"/>
-              <a:gd name="connsiteX1" fmla="*/ 2182992 w 5593184"/>
-              <a:gd name="connsiteY1" fmla="*/ 1265182 h 1326449"/>
-              <a:gd name="connsiteX2" fmla="*/ 5593184 w 5593184"/>
-              <a:gd name="connsiteY2" fmla="*/ 0 h 1326449"/>
-              <a:gd name="connsiteX0" fmla="*/ 0 w 5593184"/>
-              <a:gd name="connsiteY0" fmla="*/ 674687 h 1264257"/>
-              <a:gd name="connsiteX1" fmla="*/ 2173593 w 5593184"/>
-              <a:gd name="connsiteY1" fmla="*/ 1188606 h 1264257"/>
-              <a:gd name="connsiteX2" fmla="*/ 5593184 w 5593184"/>
-              <a:gd name="connsiteY2" fmla="*/ 0 h 1264257"/>
-            </a:gdLst>
-            <a:ahLst/>
-            <a:cxnLst>
-              <a:cxn ang="0">
-                <a:pos x="connsiteX0" y="connsiteY0"/>
-              </a:cxn>
-              <a:cxn ang="0">
-                <a:pos x="connsiteX1" y="connsiteY1"/>
-              </a:cxn>
-              <a:cxn ang="0">
-                <a:pos x="connsiteX2" y="connsiteY2"/>
-              </a:cxn>
-            </a:cxnLst>
-            <a:rect l="l" t="t" r="r" b="b"/>
-            <a:pathLst>
-              <a:path w="5593184" h="1264257">
-                <a:moveTo>
-                  <a:pt x="0" y="674687"/>
-                </a:moveTo>
-                <a:cubicBezTo>
-                  <a:pt x="7240" y="1298045"/>
-                  <a:pt x="813253" y="1344711"/>
-                  <a:pt x="2173593" y="1188606"/>
-                </a:cubicBezTo>
-                <a:cubicBezTo>
-                  <a:pt x="3458573" y="1076158"/>
-                  <a:pt x="3528478" y="164902"/>
-                  <a:pt x="5593184" y="0"/>
-                </a:cubicBezTo>
-              </a:path>
-            </a:pathLst>
-          </a:custGeom>
-          <a:noFill/>
-          <a:ln w="38100">
-            <a:solidFill>
-              <a:srgbClr val="FFC000"/>
-            </a:solidFill>
-            <a:headEnd type="oval" w="med" len="med"/>
-            <a:tailEnd type="oval" w="med" len="med"/>
-          </a:ln>
-          <a:effectLst>
-            <a:outerShdw blurRad="50800" dist="38100" dir="2700000" algn="tl" rotWithShape="0">
-              <a:prstClr val="black">
-                <a:alpha val="40000"/>
-              </a:prstClr>
-            </a:outerShdw>
-          </a:effectLst>
-        </p:spPr>
-        <p:style>
-          <a:lnRef idx="2">
-            <a:schemeClr val="accent1">
-              <a:shade val="50000"/>
-            </a:schemeClr>
-          </a:lnRef>
-          <a:fillRef idx="1">
-            <a:schemeClr val="accent1"/>
-          </a:fillRef>
-          <a:effectRef idx="0">
-            <a:schemeClr val="accent1"/>
-          </a:effectRef>
-          <a:fontRef idx="minor">
-            <a:schemeClr val="lt1"/>
-          </a:fontRef>
-        </p:style>
-        <p:txBody>
-          <a:bodyPr rtlCol="0" anchor="ctr"/>
-          <a:lstStyle/>
-          <a:p>
-            <a:pPr algn="ctr"/>
-            <a:endParaRPr lang="zh-CN" altLang="en-US"/>
-          </a:p>
-        </p:txBody>
-      </p:sp>
-      <p:sp>
-        <p:nvSpPr>
-          <p:cNvPr id="23" name="任意多边形: 形状 22">
-            <a:extLst>
-              <a:ext uri="{FF2B5EF4-FFF2-40B4-BE49-F238E27FC236}">
-                <a16:creationId xmlns:a16="http://schemas.microsoft.com/office/drawing/2014/main" id="{277C0D9B-678A-4EE7-99F2-F9F64756A3B5}"/>
-              </a:ext>
-            </a:extLst>
-          </p:cNvPr>
-          <p:cNvSpPr/>
-          <p:nvPr/>
-        </p:nvSpPr>
-        <p:spPr>
-          <a:xfrm>
-            <a:off x="3500438" y="4186721"/>
-            <a:ext cx="4899023" cy="181404"/>
-          </a:xfrm>
-          <a:custGeom>
-            <a:avLst/>
-            <a:gdLst>
-              <a:gd name="connsiteX0" fmla="*/ 0 w 5200650"/>
-              <a:gd name="connsiteY0" fmla="*/ 355600 h 959485"/>
-              <a:gd name="connsiteX1" fmla="*/ 2520950 w 5200650"/>
-              <a:gd name="connsiteY1" fmla="*/ 952500 h 959485"/>
-              <a:gd name="connsiteX2" fmla="*/ 5200650 w 5200650"/>
-              <a:gd name="connsiteY2" fmla="*/ 0 h 959485"/>
-              <a:gd name="connsiteX0" fmla="*/ 0 w 5214937"/>
-              <a:gd name="connsiteY0" fmla="*/ 393700 h 960244"/>
-              <a:gd name="connsiteX1" fmla="*/ 2535237 w 5214937"/>
-              <a:gd name="connsiteY1" fmla="*/ 952500 h 960244"/>
-              <a:gd name="connsiteX2" fmla="*/ 5214937 w 5214937"/>
-              <a:gd name="connsiteY2" fmla="*/ 0 h 960244"/>
-              <a:gd name="connsiteX0" fmla="*/ 0 w 5214937"/>
-              <a:gd name="connsiteY0" fmla="*/ 393700 h 955417"/>
-              <a:gd name="connsiteX1" fmla="*/ 2535237 w 5214937"/>
-              <a:gd name="connsiteY1" fmla="*/ 952500 h 955417"/>
-              <a:gd name="connsiteX2" fmla="*/ 5214937 w 5214937"/>
-              <a:gd name="connsiteY2" fmla="*/ 0 h 955417"/>
-              <a:gd name="connsiteX0" fmla="*/ 0 w 5214937"/>
-              <a:gd name="connsiteY0" fmla="*/ 393700 h 426311"/>
-              <a:gd name="connsiteX1" fmla="*/ 2797175 w 5214937"/>
-              <a:gd name="connsiteY1" fmla="*/ 419100 h 426311"/>
-              <a:gd name="connsiteX2" fmla="*/ 5214937 w 5214937"/>
-              <a:gd name="connsiteY2" fmla="*/ 0 h 426311"/>
-              <a:gd name="connsiteX0" fmla="*/ 0 w 4829174"/>
-              <a:gd name="connsiteY0" fmla="*/ 146050 h 236452"/>
-              <a:gd name="connsiteX1" fmla="*/ 2797175 w 4829174"/>
-              <a:gd name="connsiteY1" fmla="*/ 171450 h 236452"/>
-              <a:gd name="connsiteX2" fmla="*/ 4829174 w 4829174"/>
-              <a:gd name="connsiteY2" fmla="*/ 0 h 236452"/>
-              <a:gd name="connsiteX0" fmla="*/ 0 w 4829174"/>
-              <a:gd name="connsiteY0" fmla="*/ 146050 h 178661"/>
-              <a:gd name="connsiteX1" fmla="*/ 2797175 w 4829174"/>
-              <a:gd name="connsiteY1" fmla="*/ 171450 h 178661"/>
-              <a:gd name="connsiteX2" fmla="*/ 4829174 w 4829174"/>
-              <a:gd name="connsiteY2" fmla="*/ 0 h 178661"/>
-              <a:gd name="connsiteX0" fmla="*/ 0 w 4829174"/>
-              <a:gd name="connsiteY0" fmla="*/ 146050 h 185546"/>
-              <a:gd name="connsiteX1" fmla="*/ 2797175 w 4829174"/>
-              <a:gd name="connsiteY1" fmla="*/ 171450 h 185546"/>
-              <a:gd name="connsiteX2" fmla="*/ 4829174 w 4829174"/>
-              <a:gd name="connsiteY2" fmla="*/ 0 h 185546"/>
-              <a:gd name="connsiteX0" fmla="*/ 0 w 4829174"/>
-              <a:gd name="connsiteY0" fmla="*/ 146050 h 185546"/>
-              <a:gd name="connsiteX1" fmla="*/ 2797175 w 4829174"/>
-              <a:gd name="connsiteY1" fmla="*/ 171450 h 185546"/>
-              <a:gd name="connsiteX2" fmla="*/ 4829174 w 4829174"/>
-              <a:gd name="connsiteY2" fmla="*/ 0 h 185546"/>
-            </a:gdLst>
-            <a:ahLst/>
-            <a:cxnLst>
-              <a:cxn ang="0">
-                <a:pos x="connsiteX0" y="connsiteY0"/>
-              </a:cxn>
-              <a:cxn ang="0">
-                <a:pos x="connsiteX1" y="connsiteY1"/>
-              </a:cxn>
-              <a:cxn ang="0">
-                <a:pos x="connsiteX2" y="connsiteY2"/>
-              </a:cxn>
-            </a:cxnLst>
-            <a:rect l="l" t="t" r="r" b="b"/>
-            <a:pathLst>
-              <a:path w="4829174" h="185546">
-                <a:moveTo>
-                  <a:pt x="0" y="146050"/>
-                </a:moveTo>
-                <a:cubicBezTo>
-                  <a:pt x="822325" y="-102129"/>
-                  <a:pt x="1620837" y="259292"/>
-                  <a:pt x="2797175" y="171450"/>
-                </a:cubicBezTo>
-                <a:cubicBezTo>
-                  <a:pt x="3573463" y="126470"/>
-                  <a:pt x="3708398" y="132291"/>
-                  <a:pt x="4829174" y="0"/>
-                </a:cubicBezTo>
-              </a:path>
-            </a:pathLst>
-          </a:custGeom>
-          <a:noFill/>
-          <a:ln w="38100">
-            <a:headEnd type="oval" w="med" len="med"/>
-            <a:tailEnd type="oval" w="med" len="med"/>
-          </a:ln>
-          <a:effectLst>
-            <a:outerShdw blurRad="50800" dist="38100" dir="2700000" algn="tl" rotWithShape="0">
-              <a:prstClr val="black">
-                <a:alpha val="40000"/>
-              </a:prstClr>
-            </a:outerShdw>
-          </a:effectLst>
-        </p:spPr>
-        <p:style>
-          <a:lnRef idx="2">
-            <a:schemeClr val="accent1">
-              <a:shade val="50000"/>
-            </a:schemeClr>
-          </a:lnRef>
-          <a:fillRef idx="1">
-            <a:schemeClr val="accent1"/>
-          </a:fillRef>
-          <a:effectRef idx="0">
-            <a:schemeClr val="accent1"/>
-          </a:effectRef>
-          <a:fontRef idx="minor">
-            <a:schemeClr val="lt1"/>
-          </a:fontRef>
-        </p:style>
-        <p:txBody>
-          <a:bodyPr rtlCol="0" anchor="ctr"/>
-          <a:lstStyle/>
-          <a:p>
-            <a:pPr algn="ctr"/>
-            <a:endParaRPr lang="zh-CN" altLang="en-US"/>
-          </a:p>
-        </p:txBody>
-      </p:sp>
-      <p:sp>
-        <p:nvSpPr>
-          <p:cNvPr id="25" name="任意多边形: 形状 24">
-            <a:extLst>
-              <a:ext uri="{FF2B5EF4-FFF2-40B4-BE49-F238E27FC236}">
-                <a16:creationId xmlns:a16="http://schemas.microsoft.com/office/drawing/2014/main" id="{B53B51AE-12C9-545D-A49F-F357A25F42DE}"/>
-              </a:ext>
-            </a:extLst>
-          </p:cNvPr>
-          <p:cNvSpPr/>
-          <p:nvPr/>
-        </p:nvSpPr>
-        <p:spPr>
-          <a:xfrm>
-            <a:off x="3500438" y="3168651"/>
-            <a:ext cx="1839920" cy="1150937"/>
-          </a:xfrm>
-          <a:custGeom>
-            <a:avLst/>
-            <a:gdLst>
-              <a:gd name="connsiteX0" fmla="*/ 0 w 1873711"/>
-              <a:gd name="connsiteY0" fmla="*/ 1346200 h 1632298"/>
-              <a:gd name="connsiteX1" fmla="*/ 819150 w 1873711"/>
-              <a:gd name="connsiteY1" fmla="*/ 1631950 h 1632298"/>
-              <a:gd name="connsiteX2" fmla="*/ 1701800 w 1873711"/>
-              <a:gd name="connsiteY2" fmla="*/ 1295400 h 1632298"/>
-              <a:gd name="connsiteX3" fmla="*/ 1873250 w 1873711"/>
-              <a:gd name="connsiteY3" fmla="*/ 0 h 1632298"/>
-              <a:gd name="connsiteX0" fmla="*/ 0 w 1876034"/>
-              <a:gd name="connsiteY0" fmla="*/ 1346200 h 1648169"/>
-              <a:gd name="connsiteX1" fmla="*/ 819150 w 1876034"/>
-              <a:gd name="connsiteY1" fmla="*/ 1631950 h 1648169"/>
-              <a:gd name="connsiteX2" fmla="*/ 1727200 w 1876034"/>
-              <a:gd name="connsiteY2" fmla="*/ 882650 h 1648169"/>
-              <a:gd name="connsiteX3" fmla="*/ 1873250 w 1876034"/>
-              <a:gd name="connsiteY3" fmla="*/ 0 h 1648169"/>
-              <a:gd name="connsiteX0" fmla="*/ 0 w 1876034"/>
-              <a:gd name="connsiteY0" fmla="*/ 1346200 h 1459749"/>
-              <a:gd name="connsiteX1" fmla="*/ 996950 w 1876034"/>
-              <a:gd name="connsiteY1" fmla="*/ 1403350 h 1459749"/>
-              <a:gd name="connsiteX2" fmla="*/ 1727200 w 1876034"/>
-              <a:gd name="connsiteY2" fmla="*/ 882650 h 1459749"/>
-              <a:gd name="connsiteX3" fmla="*/ 1873250 w 1876034"/>
-              <a:gd name="connsiteY3" fmla="*/ 0 h 1459749"/>
-              <a:gd name="connsiteX0" fmla="*/ 0 w 1876034"/>
-              <a:gd name="connsiteY0" fmla="*/ 1346200 h 1412313"/>
-              <a:gd name="connsiteX1" fmla="*/ 762000 w 1876034"/>
-              <a:gd name="connsiteY1" fmla="*/ 1282700 h 1412313"/>
-              <a:gd name="connsiteX2" fmla="*/ 1727200 w 1876034"/>
-              <a:gd name="connsiteY2" fmla="*/ 882650 h 1412313"/>
-              <a:gd name="connsiteX3" fmla="*/ 1873250 w 1876034"/>
-              <a:gd name="connsiteY3" fmla="*/ 0 h 1412313"/>
-              <a:gd name="connsiteX0" fmla="*/ 0 w 1873269"/>
-              <a:gd name="connsiteY0" fmla="*/ 1346200 h 1417839"/>
-              <a:gd name="connsiteX1" fmla="*/ 762000 w 1873269"/>
-              <a:gd name="connsiteY1" fmla="*/ 1282700 h 1417839"/>
-              <a:gd name="connsiteX2" fmla="*/ 1530350 w 1873269"/>
-              <a:gd name="connsiteY2" fmla="*/ 736600 h 1417839"/>
-              <a:gd name="connsiteX3" fmla="*/ 1873250 w 1873269"/>
-              <a:gd name="connsiteY3" fmla="*/ 0 h 1417839"/>
-              <a:gd name="connsiteX0" fmla="*/ 0 w 1873269"/>
-              <a:gd name="connsiteY0" fmla="*/ 1346200 h 1411244"/>
-              <a:gd name="connsiteX1" fmla="*/ 1155700 w 1873269"/>
-              <a:gd name="connsiteY1" fmla="*/ 1257300 h 1411244"/>
-              <a:gd name="connsiteX2" fmla="*/ 1530350 w 1873269"/>
-              <a:gd name="connsiteY2" fmla="*/ 736600 h 1411244"/>
-              <a:gd name="connsiteX3" fmla="*/ 1873250 w 1873269"/>
-              <a:gd name="connsiteY3" fmla="*/ 0 h 1411244"/>
-              <a:gd name="connsiteX0" fmla="*/ 0 w 1880377"/>
-              <a:gd name="connsiteY0" fmla="*/ 1346200 h 1408695"/>
-              <a:gd name="connsiteX1" fmla="*/ 1155700 w 1880377"/>
-              <a:gd name="connsiteY1" fmla="*/ 1257300 h 1408695"/>
-              <a:gd name="connsiteX2" fmla="*/ 1746250 w 1880377"/>
-              <a:gd name="connsiteY2" fmla="*/ 812800 h 1408695"/>
-              <a:gd name="connsiteX3" fmla="*/ 1873250 w 1880377"/>
-              <a:gd name="connsiteY3" fmla="*/ 0 h 1408695"/>
-              <a:gd name="connsiteX0" fmla="*/ 0 w 1873316"/>
-              <a:gd name="connsiteY0" fmla="*/ 1346200 h 1408695"/>
-              <a:gd name="connsiteX1" fmla="*/ 1155700 w 1873316"/>
-              <a:gd name="connsiteY1" fmla="*/ 1257300 h 1408695"/>
-              <a:gd name="connsiteX2" fmla="*/ 1746250 w 1873316"/>
-              <a:gd name="connsiteY2" fmla="*/ 812800 h 1408695"/>
-              <a:gd name="connsiteX3" fmla="*/ 1873250 w 1873316"/>
-              <a:gd name="connsiteY3" fmla="*/ 0 h 1408695"/>
-              <a:gd name="connsiteX0" fmla="*/ 0 w 1873316"/>
-              <a:gd name="connsiteY0" fmla="*/ 1346200 h 1413236"/>
-              <a:gd name="connsiteX1" fmla="*/ 1085850 w 1873316"/>
-              <a:gd name="connsiteY1" fmla="*/ 1276350 h 1413236"/>
-              <a:gd name="connsiteX2" fmla="*/ 1746250 w 1873316"/>
-              <a:gd name="connsiteY2" fmla="*/ 812800 h 1413236"/>
-              <a:gd name="connsiteX3" fmla="*/ 1873250 w 1873316"/>
-              <a:gd name="connsiteY3" fmla="*/ 0 h 1413236"/>
-              <a:gd name="connsiteX0" fmla="*/ 0 w 1873316"/>
-              <a:gd name="connsiteY0" fmla="*/ 1346200 h 1402276"/>
-              <a:gd name="connsiteX1" fmla="*/ 1085850 w 1873316"/>
-              <a:gd name="connsiteY1" fmla="*/ 1276350 h 1402276"/>
-              <a:gd name="connsiteX2" fmla="*/ 1746250 w 1873316"/>
-              <a:gd name="connsiteY2" fmla="*/ 812800 h 1402276"/>
-              <a:gd name="connsiteX3" fmla="*/ 1873250 w 1873316"/>
-              <a:gd name="connsiteY3" fmla="*/ 0 h 1402276"/>
-              <a:gd name="connsiteX0" fmla="*/ 0 w 1873316"/>
-              <a:gd name="connsiteY0" fmla="*/ 1346200 h 1417569"/>
-              <a:gd name="connsiteX1" fmla="*/ 1085850 w 1873316"/>
-              <a:gd name="connsiteY1" fmla="*/ 1276350 h 1417569"/>
-              <a:gd name="connsiteX2" fmla="*/ 1746250 w 1873316"/>
-              <a:gd name="connsiteY2" fmla="*/ 812800 h 1417569"/>
-              <a:gd name="connsiteX3" fmla="*/ 1873250 w 1873316"/>
-              <a:gd name="connsiteY3" fmla="*/ 0 h 1417569"/>
-              <a:gd name="connsiteX0" fmla="*/ 0 w 1873316"/>
-              <a:gd name="connsiteY0" fmla="*/ 1346200 h 1454222"/>
-              <a:gd name="connsiteX1" fmla="*/ 1085850 w 1873316"/>
-              <a:gd name="connsiteY1" fmla="*/ 1276350 h 1454222"/>
-              <a:gd name="connsiteX2" fmla="*/ 1746250 w 1873316"/>
-              <a:gd name="connsiteY2" fmla="*/ 812800 h 1454222"/>
-              <a:gd name="connsiteX3" fmla="*/ 1873250 w 1873316"/>
-              <a:gd name="connsiteY3" fmla="*/ 0 h 1454222"/>
-              <a:gd name="connsiteX0" fmla="*/ 0 w 1873316"/>
-              <a:gd name="connsiteY0" fmla="*/ 1346200 h 1474323"/>
-              <a:gd name="connsiteX1" fmla="*/ 1149350 w 1873316"/>
-              <a:gd name="connsiteY1" fmla="*/ 1339850 h 1474323"/>
-              <a:gd name="connsiteX2" fmla="*/ 1746250 w 1873316"/>
-              <a:gd name="connsiteY2" fmla="*/ 812800 h 1474323"/>
-              <a:gd name="connsiteX3" fmla="*/ 1873250 w 1873316"/>
-              <a:gd name="connsiteY3" fmla="*/ 0 h 1474323"/>
-              <a:gd name="connsiteX0" fmla="*/ 0 w 1873316"/>
-              <a:gd name="connsiteY0" fmla="*/ 1346200 h 1498964"/>
-              <a:gd name="connsiteX1" fmla="*/ 1149350 w 1873316"/>
-              <a:gd name="connsiteY1" fmla="*/ 1339850 h 1498964"/>
-              <a:gd name="connsiteX2" fmla="*/ 1746250 w 1873316"/>
-              <a:gd name="connsiteY2" fmla="*/ 812800 h 1498964"/>
-              <a:gd name="connsiteX3" fmla="*/ 1873250 w 1873316"/>
-              <a:gd name="connsiteY3" fmla="*/ 0 h 1498964"/>
-              <a:gd name="connsiteX0" fmla="*/ 0 w 1873316"/>
-              <a:gd name="connsiteY0" fmla="*/ 1346200 h 1463546"/>
-              <a:gd name="connsiteX1" fmla="*/ 1149350 w 1873316"/>
-              <a:gd name="connsiteY1" fmla="*/ 1339850 h 1463546"/>
-              <a:gd name="connsiteX2" fmla="*/ 1746250 w 1873316"/>
-              <a:gd name="connsiteY2" fmla="*/ 812800 h 1463546"/>
-              <a:gd name="connsiteX3" fmla="*/ 1873250 w 1873316"/>
-              <a:gd name="connsiteY3" fmla="*/ 0 h 1463546"/>
-              <a:gd name="connsiteX0" fmla="*/ 0 w 1873316"/>
-              <a:gd name="connsiteY0" fmla="*/ 1346200 h 1472451"/>
-              <a:gd name="connsiteX1" fmla="*/ 1149350 w 1873316"/>
-              <a:gd name="connsiteY1" fmla="*/ 1339850 h 1472451"/>
-              <a:gd name="connsiteX2" fmla="*/ 1746250 w 1873316"/>
-              <a:gd name="connsiteY2" fmla="*/ 812800 h 1472451"/>
-              <a:gd name="connsiteX3" fmla="*/ 1873250 w 1873316"/>
-              <a:gd name="connsiteY3" fmla="*/ 0 h 1472451"/>
-              <a:gd name="connsiteX0" fmla="*/ 0 w 1873316"/>
-              <a:gd name="connsiteY0" fmla="*/ 1346200 h 1346200"/>
-              <a:gd name="connsiteX1" fmla="*/ 1746250 w 1873316"/>
-              <a:gd name="connsiteY1" fmla="*/ 812800 h 1346200"/>
-              <a:gd name="connsiteX2" fmla="*/ 1873250 w 1873316"/>
-              <a:gd name="connsiteY2" fmla="*/ 0 h 1346200"/>
-              <a:gd name="connsiteX0" fmla="*/ 0 w 1873316"/>
-              <a:gd name="connsiteY0" fmla="*/ 1346200 h 1480184"/>
-              <a:gd name="connsiteX1" fmla="*/ 1746250 w 1873316"/>
-              <a:gd name="connsiteY1" fmla="*/ 812800 h 1480184"/>
-              <a:gd name="connsiteX2" fmla="*/ 1873250 w 1873316"/>
-              <a:gd name="connsiteY2" fmla="*/ 0 h 1480184"/>
-              <a:gd name="connsiteX0" fmla="*/ 0 w 1873250"/>
-              <a:gd name="connsiteY0" fmla="*/ 1346200 h 1346200"/>
-              <a:gd name="connsiteX1" fmla="*/ 1873250 w 1873250"/>
-              <a:gd name="connsiteY1" fmla="*/ 0 h 1346200"/>
-              <a:gd name="connsiteX0" fmla="*/ 0 w 1873250"/>
-              <a:gd name="connsiteY0" fmla="*/ 1346200 h 1346200"/>
-              <a:gd name="connsiteX1" fmla="*/ 1873250 w 1873250"/>
-              <a:gd name="connsiteY1" fmla="*/ 0 h 1346200"/>
-              <a:gd name="connsiteX0" fmla="*/ 0 w 1873250"/>
-              <a:gd name="connsiteY0" fmla="*/ 1346200 h 1410752"/>
-              <a:gd name="connsiteX1" fmla="*/ 1873250 w 1873250"/>
-              <a:gd name="connsiteY1" fmla="*/ 0 h 1410752"/>
-              <a:gd name="connsiteX0" fmla="*/ 0 w 1873267"/>
-              <a:gd name="connsiteY0" fmla="*/ 1346200 h 1373128"/>
-              <a:gd name="connsiteX1" fmla="*/ 1873250 w 1873267"/>
-              <a:gd name="connsiteY1" fmla="*/ 0 h 1373128"/>
-              <a:gd name="connsiteX0" fmla="*/ 0 w 1839931"/>
-              <a:gd name="connsiteY0" fmla="*/ 1150937 h 1187679"/>
-              <a:gd name="connsiteX1" fmla="*/ 1839913 w 1839931"/>
-              <a:gd name="connsiteY1" fmla="*/ 0 h 1187679"/>
-              <a:gd name="connsiteX0" fmla="*/ 0 w 1839926"/>
-              <a:gd name="connsiteY0" fmla="*/ 1150937 h 1150937"/>
-              <a:gd name="connsiteX1" fmla="*/ 1839913 w 1839926"/>
-              <a:gd name="connsiteY1" fmla="*/ 0 h 1150937"/>
-              <a:gd name="connsiteX0" fmla="*/ 0 w 1839920"/>
-              <a:gd name="connsiteY0" fmla="*/ 1150937 h 1150937"/>
-              <a:gd name="connsiteX1" fmla="*/ 1839913 w 1839920"/>
-              <a:gd name="connsiteY1" fmla="*/ 0 h 1150937"/>
-            </a:gdLst>
-            <a:ahLst/>
-            <a:cxnLst>
-              <a:cxn ang="0">
-                <a:pos x="connsiteX0" y="connsiteY0"/>
-              </a:cxn>
-              <a:cxn ang="0">
-                <a:pos x="connsiteX1" y="connsiteY1"/>
-              </a:cxn>
-            </a:cxnLst>
-            <a:rect l="l" t="t" r="r" b="b"/>
-            <a:pathLst>
-              <a:path w="1839920" h="1150937">
-                <a:moveTo>
-                  <a:pt x="0" y="1150937"/>
-                </a:moveTo>
-                <a:cubicBezTo>
-                  <a:pt x="157692" y="652991"/>
-                  <a:pt x="1844146" y="982133"/>
-                  <a:pt x="1839913" y="0"/>
-                </a:cubicBezTo>
-              </a:path>
-            </a:pathLst>
-          </a:custGeom>
-          <a:noFill/>
-          <a:ln w="57150">
-            <a:headEnd type="oval" w="sm" len="sm"/>
-            <a:tailEnd type="oval" w="sm" len="sm"/>
-          </a:ln>
-          <a:effectLst>
-            <a:outerShdw blurRad="50800" dist="38100" dir="2700000" algn="tl" rotWithShape="0">
-              <a:prstClr val="black">
-                <a:alpha val="40000"/>
-              </a:prstClr>
-            </a:outerShdw>
-          </a:effectLst>
-        </p:spPr>
-        <p:style>
-          <a:lnRef idx="2">
-            <a:schemeClr val="accent1">
-              <a:shade val="50000"/>
-            </a:schemeClr>
-          </a:lnRef>
-          <a:fillRef idx="1">
-            <a:schemeClr val="accent1"/>
-          </a:fillRef>
-          <a:effectRef idx="0">
-            <a:schemeClr val="accent1"/>
-          </a:effectRef>
-          <a:fontRef idx="minor">
-            <a:schemeClr val="lt1"/>
-          </a:fontRef>
-        </p:style>
-        <p:txBody>
-          <a:bodyPr rtlCol="0" anchor="ctr"/>
-          <a:lstStyle/>
-          <a:p>
-            <a:pPr algn="ctr"/>
-            <a:endParaRPr lang="zh-CN" altLang="en-US"/>
-          </a:p>
-        </p:txBody>
-      </p:sp>
-      <p:sp>
-        <p:nvSpPr>
-          <p:cNvPr id="26" name="任意多边形: 形状 25">
-            <a:extLst>
-              <a:ext uri="{FF2B5EF4-FFF2-40B4-BE49-F238E27FC236}">
-                <a16:creationId xmlns:a16="http://schemas.microsoft.com/office/drawing/2014/main" id="{95AE4EC9-8603-FF65-86A4-41DC32D7DE0B}"/>
-              </a:ext>
-            </a:extLst>
-          </p:cNvPr>
-          <p:cNvSpPr/>
-          <p:nvPr/>
-        </p:nvSpPr>
-        <p:spPr>
-          <a:xfrm>
-            <a:off x="3633787" y="3150934"/>
-            <a:ext cx="2176954" cy="1640052"/>
-          </a:xfrm>
-          <a:custGeom>
-            <a:avLst/>
-            <a:gdLst>
-              <a:gd name="connsiteX0" fmla="*/ 0 w 1873711"/>
-              <a:gd name="connsiteY0" fmla="*/ 1346200 h 1632298"/>
-              <a:gd name="connsiteX1" fmla="*/ 819150 w 1873711"/>
-              <a:gd name="connsiteY1" fmla="*/ 1631950 h 1632298"/>
-              <a:gd name="connsiteX2" fmla="*/ 1701800 w 1873711"/>
-              <a:gd name="connsiteY2" fmla="*/ 1295400 h 1632298"/>
-              <a:gd name="connsiteX3" fmla="*/ 1873250 w 1873711"/>
-              <a:gd name="connsiteY3" fmla="*/ 0 h 1632298"/>
-              <a:gd name="connsiteX0" fmla="*/ 0 w 1876034"/>
-              <a:gd name="connsiteY0" fmla="*/ 1346200 h 1648169"/>
-              <a:gd name="connsiteX1" fmla="*/ 819150 w 1876034"/>
-              <a:gd name="connsiteY1" fmla="*/ 1631950 h 1648169"/>
-              <a:gd name="connsiteX2" fmla="*/ 1727200 w 1876034"/>
-              <a:gd name="connsiteY2" fmla="*/ 882650 h 1648169"/>
-              <a:gd name="connsiteX3" fmla="*/ 1873250 w 1876034"/>
-              <a:gd name="connsiteY3" fmla="*/ 0 h 1648169"/>
-              <a:gd name="connsiteX0" fmla="*/ 0 w 1876034"/>
-              <a:gd name="connsiteY0" fmla="*/ 1346200 h 1459749"/>
-              <a:gd name="connsiteX1" fmla="*/ 996950 w 1876034"/>
-              <a:gd name="connsiteY1" fmla="*/ 1403350 h 1459749"/>
-              <a:gd name="connsiteX2" fmla="*/ 1727200 w 1876034"/>
-              <a:gd name="connsiteY2" fmla="*/ 882650 h 1459749"/>
-              <a:gd name="connsiteX3" fmla="*/ 1873250 w 1876034"/>
-              <a:gd name="connsiteY3" fmla="*/ 0 h 1459749"/>
-              <a:gd name="connsiteX0" fmla="*/ 0 w 1876034"/>
-              <a:gd name="connsiteY0" fmla="*/ 1346200 h 1412313"/>
-              <a:gd name="connsiteX1" fmla="*/ 762000 w 1876034"/>
-              <a:gd name="connsiteY1" fmla="*/ 1282700 h 1412313"/>
-              <a:gd name="connsiteX2" fmla="*/ 1727200 w 1876034"/>
-              <a:gd name="connsiteY2" fmla="*/ 882650 h 1412313"/>
-              <a:gd name="connsiteX3" fmla="*/ 1873250 w 1876034"/>
-              <a:gd name="connsiteY3" fmla="*/ 0 h 1412313"/>
-              <a:gd name="connsiteX0" fmla="*/ 0 w 1873269"/>
-              <a:gd name="connsiteY0" fmla="*/ 1346200 h 1417839"/>
-              <a:gd name="connsiteX1" fmla="*/ 762000 w 1873269"/>
-              <a:gd name="connsiteY1" fmla="*/ 1282700 h 1417839"/>
-              <a:gd name="connsiteX2" fmla="*/ 1530350 w 1873269"/>
-              <a:gd name="connsiteY2" fmla="*/ 736600 h 1417839"/>
-              <a:gd name="connsiteX3" fmla="*/ 1873250 w 1873269"/>
-              <a:gd name="connsiteY3" fmla="*/ 0 h 1417839"/>
-              <a:gd name="connsiteX0" fmla="*/ 0 w 1873269"/>
-              <a:gd name="connsiteY0" fmla="*/ 1346200 h 1411244"/>
-              <a:gd name="connsiteX1" fmla="*/ 1155700 w 1873269"/>
-              <a:gd name="connsiteY1" fmla="*/ 1257300 h 1411244"/>
-              <a:gd name="connsiteX2" fmla="*/ 1530350 w 1873269"/>
-              <a:gd name="connsiteY2" fmla="*/ 736600 h 1411244"/>
-              <a:gd name="connsiteX3" fmla="*/ 1873250 w 1873269"/>
-              <a:gd name="connsiteY3" fmla="*/ 0 h 1411244"/>
-              <a:gd name="connsiteX0" fmla="*/ 0 w 1880377"/>
-              <a:gd name="connsiteY0" fmla="*/ 1346200 h 1408695"/>
-              <a:gd name="connsiteX1" fmla="*/ 1155700 w 1880377"/>
-              <a:gd name="connsiteY1" fmla="*/ 1257300 h 1408695"/>
-              <a:gd name="connsiteX2" fmla="*/ 1746250 w 1880377"/>
-              <a:gd name="connsiteY2" fmla="*/ 812800 h 1408695"/>
-              <a:gd name="connsiteX3" fmla="*/ 1873250 w 1880377"/>
-              <a:gd name="connsiteY3" fmla="*/ 0 h 1408695"/>
-              <a:gd name="connsiteX0" fmla="*/ 0 w 1873316"/>
-              <a:gd name="connsiteY0" fmla="*/ 1346200 h 1408695"/>
-              <a:gd name="connsiteX1" fmla="*/ 1155700 w 1873316"/>
-              <a:gd name="connsiteY1" fmla="*/ 1257300 h 1408695"/>
-              <a:gd name="connsiteX2" fmla="*/ 1746250 w 1873316"/>
-              <a:gd name="connsiteY2" fmla="*/ 812800 h 1408695"/>
-              <a:gd name="connsiteX3" fmla="*/ 1873250 w 1873316"/>
-              <a:gd name="connsiteY3" fmla="*/ 0 h 1408695"/>
-              <a:gd name="connsiteX0" fmla="*/ 0 w 1873316"/>
-              <a:gd name="connsiteY0" fmla="*/ 1346200 h 1413236"/>
-              <a:gd name="connsiteX1" fmla="*/ 1085850 w 1873316"/>
-              <a:gd name="connsiteY1" fmla="*/ 1276350 h 1413236"/>
-              <a:gd name="connsiteX2" fmla="*/ 1746250 w 1873316"/>
-              <a:gd name="connsiteY2" fmla="*/ 812800 h 1413236"/>
-              <a:gd name="connsiteX3" fmla="*/ 1873250 w 1873316"/>
-              <a:gd name="connsiteY3" fmla="*/ 0 h 1413236"/>
-              <a:gd name="connsiteX0" fmla="*/ 0 w 1873316"/>
-              <a:gd name="connsiteY0" fmla="*/ 1346200 h 1402276"/>
-              <a:gd name="connsiteX1" fmla="*/ 1085850 w 1873316"/>
-              <a:gd name="connsiteY1" fmla="*/ 1276350 h 1402276"/>
-              <a:gd name="connsiteX2" fmla="*/ 1746250 w 1873316"/>
-              <a:gd name="connsiteY2" fmla="*/ 812800 h 1402276"/>
-              <a:gd name="connsiteX3" fmla="*/ 1873250 w 1873316"/>
-              <a:gd name="connsiteY3" fmla="*/ 0 h 1402276"/>
-              <a:gd name="connsiteX0" fmla="*/ 0 w 1873316"/>
-              <a:gd name="connsiteY0" fmla="*/ 1346200 h 1417569"/>
-              <a:gd name="connsiteX1" fmla="*/ 1085850 w 1873316"/>
-              <a:gd name="connsiteY1" fmla="*/ 1276350 h 1417569"/>
-              <a:gd name="connsiteX2" fmla="*/ 1746250 w 1873316"/>
-              <a:gd name="connsiteY2" fmla="*/ 812800 h 1417569"/>
-              <a:gd name="connsiteX3" fmla="*/ 1873250 w 1873316"/>
-              <a:gd name="connsiteY3" fmla="*/ 0 h 1417569"/>
-              <a:gd name="connsiteX0" fmla="*/ 0 w 1873316"/>
-              <a:gd name="connsiteY0" fmla="*/ 1346200 h 1454222"/>
-              <a:gd name="connsiteX1" fmla="*/ 1085850 w 1873316"/>
-              <a:gd name="connsiteY1" fmla="*/ 1276350 h 1454222"/>
-              <a:gd name="connsiteX2" fmla="*/ 1746250 w 1873316"/>
-              <a:gd name="connsiteY2" fmla="*/ 812800 h 1454222"/>
-              <a:gd name="connsiteX3" fmla="*/ 1873250 w 1873316"/>
-              <a:gd name="connsiteY3" fmla="*/ 0 h 1454222"/>
-              <a:gd name="connsiteX0" fmla="*/ 0 w 1873316"/>
-              <a:gd name="connsiteY0" fmla="*/ 1346200 h 1474323"/>
-              <a:gd name="connsiteX1" fmla="*/ 1149350 w 1873316"/>
-              <a:gd name="connsiteY1" fmla="*/ 1339850 h 1474323"/>
-              <a:gd name="connsiteX2" fmla="*/ 1746250 w 1873316"/>
-              <a:gd name="connsiteY2" fmla="*/ 812800 h 1474323"/>
-              <a:gd name="connsiteX3" fmla="*/ 1873250 w 1873316"/>
-              <a:gd name="connsiteY3" fmla="*/ 0 h 1474323"/>
-              <a:gd name="connsiteX0" fmla="*/ 0 w 1873316"/>
-              <a:gd name="connsiteY0" fmla="*/ 1346200 h 1498964"/>
-              <a:gd name="connsiteX1" fmla="*/ 1149350 w 1873316"/>
-              <a:gd name="connsiteY1" fmla="*/ 1339850 h 1498964"/>
-              <a:gd name="connsiteX2" fmla="*/ 1746250 w 1873316"/>
-              <a:gd name="connsiteY2" fmla="*/ 812800 h 1498964"/>
-              <a:gd name="connsiteX3" fmla="*/ 1873250 w 1873316"/>
-              <a:gd name="connsiteY3" fmla="*/ 0 h 1498964"/>
-              <a:gd name="connsiteX0" fmla="*/ 0 w 1873316"/>
-              <a:gd name="connsiteY0" fmla="*/ 1346200 h 1463546"/>
-              <a:gd name="connsiteX1" fmla="*/ 1149350 w 1873316"/>
-              <a:gd name="connsiteY1" fmla="*/ 1339850 h 1463546"/>
-              <a:gd name="connsiteX2" fmla="*/ 1746250 w 1873316"/>
-              <a:gd name="connsiteY2" fmla="*/ 812800 h 1463546"/>
-              <a:gd name="connsiteX3" fmla="*/ 1873250 w 1873316"/>
-              <a:gd name="connsiteY3" fmla="*/ 0 h 1463546"/>
-              <a:gd name="connsiteX0" fmla="*/ 0 w 1873316"/>
-              <a:gd name="connsiteY0" fmla="*/ 1346200 h 1472451"/>
-              <a:gd name="connsiteX1" fmla="*/ 1149350 w 1873316"/>
-              <a:gd name="connsiteY1" fmla="*/ 1339850 h 1472451"/>
-              <a:gd name="connsiteX2" fmla="*/ 1746250 w 1873316"/>
-              <a:gd name="connsiteY2" fmla="*/ 812800 h 1472451"/>
-              <a:gd name="connsiteX3" fmla="*/ 1873250 w 1873316"/>
-              <a:gd name="connsiteY3" fmla="*/ 0 h 1472451"/>
-              <a:gd name="connsiteX0" fmla="*/ 0 w 1873316"/>
-              <a:gd name="connsiteY0" fmla="*/ 1346200 h 1346200"/>
-              <a:gd name="connsiteX1" fmla="*/ 1746250 w 1873316"/>
-              <a:gd name="connsiteY1" fmla="*/ 812800 h 1346200"/>
-              <a:gd name="connsiteX2" fmla="*/ 1873250 w 1873316"/>
-              <a:gd name="connsiteY2" fmla="*/ 0 h 1346200"/>
-              <a:gd name="connsiteX0" fmla="*/ 0 w 1873316"/>
-              <a:gd name="connsiteY0" fmla="*/ 1346200 h 1480184"/>
-              <a:gd name="connsiteX1" fmla="*/ 1746250 w 1873316"/>
-              <a:gd name="connsiteY1" fmla="*/ 812800 h 1480184"/>
-              <a:gd name="connsiteX2" fmla="*/ 1873250 w 1873316"/>
-              <a:gd name="connsiteY2" fmla="*/ 0 h 1480184"/>
-              <a:gd name="connsiteX0" fmla="*/ 0 w 1873250"/>
-              <a:gd name="connsiteY0" fmla="*/ 1346200 h 1346200"/>
-              <a:gd name="connsiteX1" fmla="*/ 1873250 w 1873250"/>
-              <a:gd name="connsiteY1" fmla="*/ 0 h 1346200"/>
-              <a:gd name="connsiteX0" fmla="*/ 0 w 1873250"/>
-              <a:gd name="connsiteY0" fmla="*/ 1346200 h 1346200"/>
-              <a:gd name="connsiteX1" fmla="*/ 1873250 w 1873250"/>
-              <a:gd name="connsiteY1" fmla="*/ 0 h 1346200"/>
-              <a:gd name="connsiteX0" fmla="*/ 0 w 1873250"/>
-              <a:gd name="connsiteY0" fmla="*/ 1346200 h 1410752"/>
-              <a:gd name="connsiteX1" fmla="*/ 1873250 w 1873250"/>
-              <a:gd name="connsiteY1" fmla="*/ 0 h 1410752"/>
-              <a:gd name="connsiteX0" fmla="*/ 0 w 2133600"/>
-              <a:gd name="connsiteY0" fmla="*/ 1123950 h 1232381"/>
-              <a:gd name="connsiteX1" fmla="*/ 2133600 w 2133600"/>
-              <a:gd name="connsiteY1" fmla="*/ 0 h 1232381"/>
-              <a:gd name="connsiteX0" fmla="*/ 0 w 2134216"/>
-              <a:gd name="connsiteY0" fmla="*/ 1123950 h 1154117"/>
-              <a:gd name="connsiteX1" fmla="*/ 2133600 w 2134216"/>
-              <a:gd name="connsiteY1" fmla="*/ 0 h 1154117"/>
-              <a:gd name="connsiteX0" fmla="*/ 0 w 2134405"/>
-              <a:gd name="connsiteY0" fmla="*/ 1123950 h 1123950"/>
-              <a:gd name="connsiteX1" fmla="*/ 2133600 w 2134405"/>
-              <a:gd name="connsiteY1" fmla="*/ 0 h 1123950"/>
-              <a:gd name="connsiteX0" fmla="*/ 0 w 2101102"/>
-              <a:gd name="connsiteY0" fmla="*/ 1438275 h 1438275"/>
-              <a:gd name="connsiteX1" fmla="*/ 2100263 w 2101102"/>
-              <a:gd name="connsiteY1" fmla="*/ 0 h 1438275"/>
-              <a:gd name="connsiteX0" fmla="*/ 0 w 2100590"/>
-              <a:gd name="connsiteY0" fmla="*/ 1438275 h 1579893"/>
-              <a:gd name="connsiteX1" fmla="*/ 2100263 w 2100590"/>
-              <a:gd name="connsiteY1" fmla="*/ 0 h 1579893"/>
-              <a:gd name="connsiteX0" fmla="*/ 0 w 2100267"/>
-              <a:gd name="connsiteY0" fmla="*/ 1438275 h 1640052"/>
-              <a:gd name="connsiteX1" fmla="*/ 2100263 w 2100267"/>
-              <a:gd name="connsiteY1" fmla="*/ 0 h 1640052"/>
-            </a:gdLst>
-            <a:ahLst/>
-            <a:cxnLst>
-              <a:cxn ang="0">
-                <a:pos x="connsiteX0" y="connsiteY0"/>
-              </a:cxn>
-              <a:cxn ang="0">
-                <a:pos x="connsiteX1" y="connsiteY1"/>
-              </a:cxn>
-            </a:cxnLst>
-            <a:rect l="l" t="t" r="r" b="b"/>
-            <a:pathLst>
-              <a:path w="2100267" h="1640052">
-                <a:moveTo>
-                  <a:pt x="0" y="1438275"/>
-                </a:moveTo>
-                <a:cubicBezTo>
-                  <a:pt x="139523" y="1984990"/>
-                  <a:pt x="2103821" y="1392787"/>
-                  <a:pt x="2100263" y="0"/>
-                </a:cubicBezTo>
-              </a:path>
-            </a:pathLst>
-          </a:custGeom>
-          <a:noFill/>
-          <a:ln w="57150">
-            <a:solidFill>
-              <a:srgbClr val="FF0000"/>
-            </a:solidFill>
-            <a:headEnd type="oval" w="sm" len="sm"/>
-            <a:tailEnd type="oval" w="sm" len="sm"/>
-          </a:ln>
-          <a:effectLst>
-            <a:outerShdw blurRad="50800" dist="38100" dir="2700000" algn="tl" rotWithShape="0">
-              <a:prstClr val="black">
-                <a:alpha val="40000"/>
-              </a:prstClr>
-            </a:outerShdw>
-          </a:effectLst>
-        </p:spPr>
-        <p:style>
-          <a:lnRef idx="2">
-            <a:schemeClr val="accent1">
-              <a:shade val="50000"/>
-            </a:schemeClr>
-          </a:lnRef>
-          <a:fillRef idx="1">
-            <a:schemeClr val="accent1"/>
-          </a:fillRef>
-          <a:effectRef idx="0">
-            <a:schemeClr val="accent1"/>
-          </a:effectRef>
-          <a:fontRef idx="minor">
-            <a:schemeClr val="lt1"/>
-          </a:fontRef>
-        </p:style>
-        <p:txBody>
-          <a:bodyPr rtlCol="0" anchor="ctr"/>
-          <a:lstStyle/>
-          <a:p>
-            <a:pPr algn="ctr"/>
-            <a:endParaRPr lang="zh-CN" altLang="en-US"/>
-          </a:p>
-        </p:txBody>
-      </p:sp>
-      <p:sp>
-        <p:nvSpPr>
-          <p:cNvPr id="27" name="任意多边形: 形状 26">
-            <a:extLst>
-              <a:ext uri="{FF2B5EF4-FFF2-40B4-BE49-F238E27FC236}">
-                <a16:creationId xmlns:a16="http://schemas.microsoft.com/office/drawing/2014/main" id="{F79531DD-49E1-7506-06EA-F14CA5D9D680}"/>
-              </a:ext>
-            </a:extLst>
-          </p:cNvPr>
-          <p:cNvSpPr/>
-          <p:nvPr/>
-        </p:nvSpPr>
-        <p:spPr>
-          <a:xfrm>
-            <a:off x="3366747" y="3163635"/>
-            <a:ext cx="2210692" cy="1811677"/>
-          </a:xfrm>
-          <a:custGeom>
-            <a:avLst/>
-            <a:gdLst>
-              <a:gd name="connsiteX0" fmla="*/ 0 w 1873711"/>
-              <a:gd name="connsiteY0" fmla="*/ 1346200 h 1632298"/>
-              <a:gd name="connsiteX1" fmla="*/ 819150 w 1873711"/>
-              <a:gd name="connsiteY1" fmla="*/ 1631950 h 1632298"/>
-              <a:gd name="connsiteX2" fmla="*/ 1701800 w 1873711"/>
-              <a:gd name="connsiteY2" fmla="*/ 1295400 h 1632298"/>
-              <a:gd name="connsiteX3" fmla="*/ 1873250 w 1873711"/>
-              <a:gd name="connsiteY3" fmla="*/ 0 h 1632298"/>
-              <a:gd name="connsiteX0" fmla="*/ 0 w 1876034"/>
-              <a:gd name="connsiteY0" fmla="*/ 1346200 h 1648169"/>
-              <a:gd name="connsiteX1" fmla="*/ 819150 w 1876034"/>
-              <a:gd name="connsiteY1" fmla="*/ 1631950 h 1648169"/>
-              <a:gd name="connsiteX2" fmla="*/ 1727200 w 1876034"/>
-              <a:gd name="connsiteY2" fmla="*/ 882650 h 1648169"/>
-              <a:gd name="connsiteX3" fmla="*/ 1873250 w 1876034"/>
-              <a:gd name="connsiteY3" fmla="*/ 0 h 1648169"/>
-              <a:gd name="connsiteX0" fmla="*/ 0 w 1876034"/>
-              <a:gd name="connsiteY0" fmla="*/ 1346200 h 1459749"/>
-              <a:gd name="connsiteX1" fmla="*/ 996950 w 1876034"/>
-              <a:gd name="connsiteY1" fmla="*/ 1403350 h 1459749"/>
-              <a:gd name="connsiteX2" fmla="*/ 1727200 w 1876034"/>
-              <a:gd name="connsiteY2" fmla="*/ 882650 h 1459749"/>
-              <a:gd name="connsiteX3" fmla="*/ 1873250 w 1876034"/>
-              <a:gd name="connsiteY3" fmla="*/ 0 h 1459749"/>
-              <a:gd name="connsiteX0" fmla="*/ 0 w 1876034"/>
-              <a:gd name="connsiteY0" fmla="*/ 1346200 h 1412313"/>
-              <a:gd name="connsiteX1" fmla="*/ 762000 w 1876034"/>
-              <a:gd name="connsiteY1" fmla="*/ 1282700 h 1412313"/>
-              <a:gd name="connsiteX2" fmla="*/ 1727200 w 1876034"/>
-              <a:gd name="connsiteY2" fmla="*/ 882650 h 1412313"/>
-              <a:gd name="connsiteX3" fmla="*/ 1873250 w 1876034"/>
-              <a:gd name="connsiteY3" fmla="*/ 0 h 1412313"/>
-              <a:gd name="connsiteX0" fmla="*/ 0 w 1873269"/>
-              <a:gd name="connsiteY0" fmla="*/ 1346200 h 1417839"/>
-              <a:gd name="connsiteX1" fmla="*/ 762000 w 1873269"/>
-              <a:gd name="connsiteY1" fmla="*/ 1282700 h 1417839"/>
-              <a:gd name="connsiteX2" fmla="*/ 1530350 w 1873269"/>
-              <a:gd name="connsiteY2" fmla="*/ 736600 h 1417839"/>
-              <a:gd name="connsiteX3" fmla="*/ 1873250 w 1873269"/>
-              <a:gd name="connsiteY3" fmla="*/ 0 h 1417839"/>
-              <a:gd name="connsiteX0" fmla="*/ 0 w 1873269"/>
-              <a:gd name="connsiteY0" fmla="*/ 1346200 h 1411244"/>
-              <a:gd name="connsiteX1" fmla="*/ 1155700 w 1873269"/>
-              <a:gd name="connsiteY1" fmla="*/ 1257300 h 1411244"/>
-              <a:gd name="connsiteX2" fmla="*/ 1530350 w 1873269"/>
-              <a:gd name="connsiteY2" fmla="*/ 736600 h 1411244"/>
-              <a:gd name="connsiteX3" fmla="*/ 1873250 w 1873269"/>
-              <a:gd name="connsiteY3" fmla="*/ 0 h 1411244"/>
-              <a:gd name="connsiteX0" fmla="*/ 0 w 1880377"/>
-              <a:gd name="connsiteY0" fmla="*/ 1346200 h 1408695"/>
-              <a:gd name="connsiteX1" fmla="*/ 1155700 w 1880377"/>
-              <a:gd name="connsiteY1" fmla="*/ 1257300 h 1408695"/>
-              <a:gd name="connsiteX2" fmla="*/ 1746250 w 1880377"/>
-              <a:gd name="connsiteY2" fmla="*/ 812800 h 1408695"/>
-              <a:gd name="connsiteX3" fmla="*/ 1873250 w 1880377"/>
-              <a:gd name="connsiteY3" fmla="*/ 0 h 1408695"/>
-              <a:gd name="connsiteX0" fmla="*/ 0 w 1873316"/>
-              <a:gd name="connsiteY0" fmla="*/ 1346200 h 1408695"/>
-              <a:gd name="connsiteX1" fmla="*/ 1155700 w 1873316"/>
-              <a:gd name="connsiteY1" fmla="*/ 1257300 h 1408695"/>
-              <a:gd name="connsiteX2" fmla="*/ 1746250 w 1873316"/>
-              <a:gd name="connsiteY2" fmla="*/ 812800 h 1408695"/>
-              <a:gd name="connsiteX3" fmla="*/ 1873250 w 1873316"/>
-              <a:gd name="connsiteY3" fmla="*/ 0 h 1408695"/>
-              <a:gd name="connsiteX0" fmla="*/ 0 w 1873316"/>
-              <a:gd name="connsiteY0" fmla="*/ 1346200 h 1413236"/>
-              <a:gd name="connsiteX1" fmla="*/ 1085850 w 1873316"/>
-              <a:gd name="connsiteY1" fmla="*/ 1276350 h 1413236"/>
-              <a:gd name="connsiteX2" fmla="*/ 1746250 w 1873316"/>
-              <a:gd name="connsiteY2" fmla="*/ 812800 h 1413236"/>
-              <a:gd name="connsiteX3" fmla="*/ 1873250 w 1873316"/>
-              <a:gd name="connsiteY3" fmla="*/ 0 h 1413236"/>
-              <a:gd name="connsiteX0" fmla="*/ 0 w 1873316"/>
-              <a:gd name="connsiteY0" fmla="*/ 1346200 h 1402276"/>
-              <a:gd name="connsiteX1" fmla="*/ 1085850 w 1873316"/>
-              <a:gd name="connsiteY1" fmla="*/ 1276350 h 1402276"/>
-              <a:gd name="connsiteX2" fmla="*/ 1746250 w 1873316"/>
-              <a:gd name="connsiteY2" fmla="*/ 812800 h 1402276"/>
-              <a:gd name="connsiteX3" fmla="*/ 1873250 w 1873316"/>
-              <a:gd name="connsiteY3" fmla="*/ 0 h 1402276"/>
-              <a:gd name="connsiteX0" fmla="*/ 0 w 1873316"/>
-              <a:gd name="connsiteY0" fmla="*/ 1346200 h 1417569"/>
-              <a:gd name="connsiteX1" fmla="*/ 1085850 w 1873316"/>
-              <a:gd name="connsiteY1" fmla="*/ 1276350 h 1417569"/>
-              <a:gd name="connsiteX2" fmla="*/ 1746250 w 1873316"/>
-              <a:gd name="connsiteY2" fmla="*/ 812800 h 1417569"/>
-              <a:gd name="connsiteX3" fmla="*/ 1873250 w 1873316"/>
-              <a:gd name="connsiteY3" fmla="*/ 0 h 1417569"/>
-              <a:gd name="connsiteX0" fmla="*/ 0 w 1873316"/>
-              <a:gd name="connsiteY0" fmla="*/ 1346200 h 1454222"/>
-              <a:gd name="connsiteX1" fmla="*/ 1085850 w 1873316"/>
-              <a:gd name="connsiteY1" fmla="*/ 1276350 h 1454222"/>
-              <a:gd name="connsiteX2" fmla="*/ 1746250 w 1873316"/>
-              <a:gd name="connsiteY2" fmla="*/ 812800 h 1454222"/>
-              <a:gd name="connsiteX3" fmla="*/ 1873250 w 1873316"/>
-              <a:gd name="connsiteY3" fmla="*/ 0 h 1454222"/>
-              <a:gd name="connsiteX0" fmla="*/ 0 w 1873316"/>
-              <a:gd name="connsiteY0" fmla="*/ 1346200 h 1474323"/>
-              <a:gd name="connsiteX1" fmla="*/ 1149350 w 1873316"/>
-              <a:gd name="connsiteY1" fmla="*/ 1339850 h 1474323"/>
-              <a:gd name="connsiteX2" fmla="*/ 1746250 w 1873316"/>
-              <a:gd name="connsiteY2" fmla="*/ 812800 h 1474323"/>
-              <a:gd name="connsiteX3" fmla="*/ 1873250 w 1873316"/>
-              <a:gd name="connsiteY3" fmla="*/ 0 h 1474323"/>
-              <a:gd name="connsiteX0" fmla="*/ 0 w 1873316"/>
-              <a:gd name="connsiteY0" fmla="*/ 1346200 h 1498964"/>
-              <a:gd name="connsiteX1" fmla="*/ 1149350 w 1873316"/>
-              <a:gd name="connsiteY1" fmla="*/ 1339850 h 1498964"/>
-              <a:gd name="connsiteX2" fmla="*/ 1746250 w 1873316"/>
-              <a:gd name="connsiteY2" fmla="*/ 812800 h 1498964"/>
-              <a:gd name="connsiteX3" fmla="*/ 1873250 w 1873316"/>
-              <a:gd name="connsiteY3" fmla="*/ 0 h 1498964"/>
-              <a:gd name="connsiteX0" fmla="*/ 0 w 1873316"/>
-              <a:gd name="connsiteY0" fmla="*/ 1346200 h 1463546"/>
-              <a:gd name="connsiteX1" fmla="*/ 1149350 w 1873316"/>
-              <a:gd name="connsiteY1" fmla="*/ 1339850 h 1463546"/>
-              <a:gd name="connsiteX2" fmla="*/ 1746250 w 1873316"/>
-              <a:gd name="connsiteY2" fmla="*/ 812800 h 1463546"/>
-              <a:gd name="connsiteX3" fmla="*/ 1873250 w 1873316"/>
-              <a:gd name="connsiteY3" fmla="*/ 0 h 1463546"/>
-              <a:gd name="connsiteX0" fmla="*/ 0 w 1873316"/>
-              <a:gd name="connsiteY0" fmla="*/ 1346200 h 1472451"/>
-              <a:gd name="connsiteX1" fmla="*/ 1149350 w 1873316"/>
-              <a:gd name="connsiteY1" fmla="*/ 1339850 h 1472451"/>
-              <a:gd name="connsiteX2" fmla="*/ 1746250 w 1873316"/>
-              <a:gd name="connsiteY2" fmla="*/ 812800 h 1472451"/>
-              <a:gd name="connsiteX3" fmla="*/ 1873250 w 1873316"/>
-              <a:gd name="connsiteY3" fmla="*/ 0 h 1472451"/>
-              <a:gd name="connsiteX0" fmla="*/ 0 w 1873316"/>
-              <a:gd name="connsiteY0" fmla="*/ 1346200 h 1346200"/>
-              <a:gd name="connsiteX1" fmla="*/ 1746250 w 1873316"/>
-              <a:gd name="connsiteY1" fmla="*/ 812800 h 1346200"/>
-              <a:gd name="connsiteX2" fmla="*/ 1873250 w 1873316"/>
-              <a:gd name="connsiteY2" fmla="*/ 0 h 1346200"/>
-              <a:gd name="connsiteX0" fmla="*/ 0 w 1873316"/>
-              <a:gd name="connsiteY0" fmla="*/ 1346200 h 1480184"/>
-              <a:gd name="connsiteX1" fmla="*/ 1746250 w 1873316"/>
-              <a:gd name="connsiteY1" fmla="*/ 812800 h 1480184"/>
-              <a:gd name="connsiteX2" fmla="*/ 1873250 w 1873316"/>
-              <a:gd name="connsiteY2" fmla="*/ 0 h 1480184"/>
-              <a:gd name="connsiteX0" fmla="*/ 0 w 1873250"/>
-              <a:gd name="connsiteY0" fmla="*/ 1346200 h 1346200"/>
-              <a:gd name="connsiteX1" fmla="*/ 1873250 w 1873250"/>
-              <a:gd name="connsiteY1" fmla="*/ 0 h 1346200"/>
-              <a:gd name="connsiteX0" fmla="*/ 0 w 1873250"/>
-              <a:gd name="connsiteY0" fmla="*/ 1346200 h 1346200"/>
-              <a:gd name="connsiteX1" fmla="*/ 1873250 w 1873250"/>
-              <a:gd name="connsiteY1" fmla="*/ 0 h 1346200"/>
-              <a:gd name="connsiteX0" fmla="*/ 0 w 1873250"/>
-              <a:gd name="connsiteY0" fmla="*/ 1346200 h 1410752"/>
-              <a:gd name="connsiteX1" fmla="*/ 1873250 w 1873250"/>
-              <a:gd name="connsiteY1" fmla="*/ 0 h 1410752"/>
-              <a:gd name="connsiteX0" fmla="*/ 0 w 2133600"/>
-              <a:gd name="connsiteY0" fmla="*/ 1123950 h 1232381"/>
-              <a:gd name="connsiteX1" fmla="*/ 2133600 w 2133600"/>
-              <a:gd name="connsiteY1" fmla="*/ 0 h 1232381"/>
-              <a:gd name="connsiteX0" fmla="*/ 0 w 2134216"/>
-              <a:gd name="connsiteY0" fmla="*/ 1123950 h 1154117"/>
-              <a:gd name="connsiteX1" fmla="*/ 2133600 w 2134216"/>
-              <a:gd name="connsiteY1" fmla="*/ 0 h 1154117"/>
-              <a:gd name="connsiteX0" fmla="*/ 0 w 2134405"/>
-              <a:gd name="connsiteY0" fmla="*/ 1123950 h 1123950"/>
-              <a:gd name="connsiteX1" fmla="*/ 2133600 w 2134405"/>
-              <a:gd name="connsiteY1" fmla="*/ 0 h 1123950"/>
-              <a:gd name="connsiteX0" fmla="*/ 0 w 2235917"/>
-              <a:gd name="connsiteY0" fmla="*/ 990600 h 990600"/>
-              <a:gd name="connsiteX1" fmla="*/ 2235200 w 2235917"/>
-              <a:gd name="connsiteY1" fmla="*/ 0 h 990600"/>
-              <a:gd name="connsiteX0" fmla="*/ 3053 w 2238529"/>
-              <a:gd name="connsiteY0" fmla="*/ 990600 h 990600"/>
-              <a:gd name="connsiteX1" fmla="*/ 2238253 w 2238529"/>
-              <a:gd name="connsiteY1" fmla="*/ 0 h 990600"/>
-              <a:gd name="connsiteX0" fmla="*/ 3000 w 2239874"/>
-              <a:gd name="connsiteY0" fmla="*/ 990600 h 990600"/>
-              <a:gd name="connsiteX1" fmla="*/ 2238200 w 2239874"/>
-              <a:gd name="connsiteY1" fmla="*/ 0 h 990600"/>
-              <a:gd name="connsiteX0" fmla="*/ 0 w 2237133"/>
-              <a:gd name="connsiteY0" fmla="*/ 990600 h 990600"/>
-              <a:gd name="connsiteX1" fmla="*/ 2235200 w 2237133"/>
-              <a:gd name="connsiteY1" fmla="*/ 0 h 990600"/>
-              <a:gd name="connsiteX0" fmla="*/ 0 w 2256165"/>
-              <a:gd name="connsiteY0" fmla="*/ 1471612 h 1471612"/>
-              <a:gd name="connsiteX1" fmla="*/ 2254250 w 2256165"/>
-              <a:gd name="connsiteY1" fmla="*/ 0 h 1471612"/>
-              <a:gd name="connsiteX0" fmla="*/ 0 w 2256231"/>
-              <a:gd name="connsiteY0" fmla="*/ 1471612 h 1776515"/>
-              <a:gd name="connsiteX1" fmla="*/ 2254250 w 2256231"/>
-              <a:gd name="connsiteY1" fmla="*/ 0 h 1776515"/>
-              <a:gd name="connsiteX0" fmla="*/ 0 w 2208652"/>
-              <a:gd name="connsiteY0" fmla="*/ 1457325 h 1764518"/>
-              <a:gd name="connsiteX1" fmla="*/ 2206625 w 2208652"/>
-              <a:gd name="connsiteY1" fmla="*/ 0 h 1764518"/>
-              <a:gd name="connsiteX0" fmla="*/ 6693 w 2214977"/>
-              <a:gd name="connsiteY0" fmla="*/ 1457325 h 1860175"/>
-              <a:gd name="connsiteX1" fmla="*/ 2213318 w 2214977"/>
-              <a:gd name="connsiteY1" fmla="*/ 0 h 1860175"/>
-              <a:gd name="connsiteX0" fmla="*/ 6885 w 2213512"/>
-              <a:gd name="connsiteY0" fmla="*/ 1457325 h 1887429"/>
-              <a:gd name="connsiteX1" fmla="*/ 2213510 w 2213512"/>
-              <a:gd name="connsiteY1" fmla="*/ 0 h 1887429"/>
-              <a:gd name="connsiteX0" fmla="*/ 0 w 2206627"/>
-              <a:gd name="connsiteY0" fmla="*/ 1457325 h 1834871"/>
-              <a:gd name="connsiteX1" fmla="*/ 1548860 w 2206627"/>
-              <a:gd name="connsiteY1" fmla="*/ 1308355 h 1834871"/>
-              <a:gd name="connsiteX2" fmla="*/ 2206625 w 2206627"/>
-              <a:gd name="connsiteY2" fmla="*/ 0 h 1834871"/>
-              <a:gd name="connsiteX0" fmla="*/ 5994 w 2212621"/>
-              <a:gd name="connsiteY0" fmla="*/ 1457325 h 1834871"/>
-              <a:gd name="connsiteX1" fmla="*/ 1554854 w 2212621"/>
-              <a:gd name="connsiteY1" fmla="*/ 1308355 h 1834871"/>
-              <a:gd name="connsiteX2" fmla="*/ 2212619 w 2212621"/>
-              <a:gd name="connsiteY2" fmla="*/ 0 h 1834871"/>
-              <a:gd name="connsiteX0" fmla="*/ 11124 w 2217750"/>
-              <a:gd name="connsiteY0" fmla="*/ 1457325 h 2063276"/>
-              <a:gd name="connsiteX1" fmla="*/ 998009 w 2217750"/>
-              <a:gd name="connsiteY1" fmla="*/ 1594105 h 2063276"/>
-              <a:gd name="connsiteX2" fmla="*/ 2217749 w 2217750"/>
-              <a:gd name="connsiteY2" fmla="*/ 0 h 2063276"/>
-              <a:gd name="connsiteX0" fmla="*/ 11124 w 2217780"/>
-              <a:gd name="connsiteY0" fmla="*/ 1457325 h 1875162"/>
-              <a:gd name="connsiteX1" fmla="*/ 998009 w 2217780"/>
-              <a:gd name="connsiteY1" fmla="*/ 1594105 h 1875162"/>
-              <a:gd name="connsiteX2" fmla="*/ 2217749 w 2217780"/>
-              <a:gd name="connsiteY2" fmla="*/ 0 h 1875162"/>
-              <a:gd name="connsiteX0" fmla="*/ 11124 w 2217755"/>
-              <a:gd name="connsiteY0" fmla="*/ 1457325 h 1875162"/>
-              <a:gd name="connsiteX1" fmla="*/ 998009 w 2217755"/>
-              <a:gd name="connsiteY1" fmla="*/ 1594105 h 1875162"/>
-              <a:gd name="connsiteX2" fmla="*/ 2217749 w 2217755"/>
-              <a:gd name="connsiteY2" fmla="*/ 0 h 1875162"/>
-              <a:gd name="connsiteX0" fmla="*/ 9877 w 2216508"/>
-              <a:gd name="connsiteY0" fmla="*/ 1457325 h 1901047"/>
-              <a:gd name="connsiteX1" fmla="*/ 996762 w 2216508"/>
-              <a:gd name="connsiteY1" fmla="*/ 1594105 h 1901047"/>
-              <a:gd name="connsiteX2" fmla="*/ 2216502 w 2216508"/>
-              <a:gd name="connsiteY2" fmla="*/ 0 h 1901047"/>
-              <a:gd name="connsiteX0" fmla="*/ 6097 w 2212737"/>
-              <a:gd name="connsiteY0" fmla="*/ 1457325 h 1928594"/>
-              <a:gd name="connsiteX1" fmla="*/ 1450182 w 2212737"/>
-              <a:gd name="connsiteY1" fmla="*/ 1665542 h 1928594"/>
-              <a:gd name="connsiteX2" fmla="*/ 2212722 w 2212737"/>
-              <a:gd name="connsiteY2" fmla="*/ 0 h 1928594"/>
-              <a:gd name="connsiteX0" fmla="*/ 6097 w 2212758"/>
-              <a:gd name="connsiteY0" fmla="*/ 1457325 h 1928594"/>
-              <a:gd name="connsiteX1" fmla="*/ 1450182 w 2212758"/>
-              <a:gd name="connsiteY1" fmla="*/ 1665542 h 1928594"/>
-              <a:gd name="connsiteX2" fmla="*/ 2212722 w 2212758"/>
-              <a:gd name="connsiteY2" fmla="*/ 0 h 1928594"/>
-              <a:gd name="connsiteX0" fmla="*/ 6097 w 2212758"/>
-              <a:gd name="connsiteY0" fmla="*/ 1457325 h 1958757"/>
-              <a:gd name="connsiteX1" fmla="*/ 1450182 w 2212758"/>
-              <a:gd name="connsiteY1" fmla="*/ 1665542 h 1958757"/>
-              <a:gd name="connsiteX2" fmla="*/ 2212722 w 2212758"/>
-              <a:gd name="connsiteY2" fmla="*/ 0 h 1958757"/>
-              <a:gd name="connsiteX0" fmla="*/ 6097 w 2212740"/>
-              <a:gd name="connsiteY0" fmla="*/ 1457325 h 1958757"/>
-              <a:gd name="connsiteX1" fmla="*/ 1450182 w 2212740"/>
-              <a:gd name="connsiteY1" fmla="*/ 1665542 h 1958757"/>
-              <a:gd name="connsiteX2" fmla="*/ 2212722 w 2212740"/>
-              <a:gd name="connsiteY2" fmla="*/ 0 h 1958757"/>
-              <a:gd name="connsiteX0" fmla="*/ 4072 w 2210715"/>
-              <a:gd name="connsiteY0" fmla="*/ 1457325 h 1819285"/>
-              <a:gd name="connsiteX1" fmla="*/ 1448157 w 2210715"/>
-              <a:gd name="connsiteY1" fmla="*/ 1665542 h 1819285"/>
-              <a:gd name="connsiteX2" fmla="*/ 2210697 w 2210715"/>
-              <a:gd name="connsiteY2" fmla="*/ 0 h 1819285"/>
-              <a:gd name="connsiteX0" fmla="*/ 4072 w 2210713"/>
-              <a:gd name="connsiteY0" fmla="*/ 1457325 h 1819285"/>
-              <a:gd name="connsiteX1" fmla="*/ 1448157 w 2210713"/>
-              <a:gd name="connsiteY1" fmla="*/ 1665542 h 1819285"/>
-              <a:gd name="connsiteX2" fmla="*/ 2210697 w 2210713"/>
-              <a:gd name="connsiteY2" fmla="*/ 0 h 1819285"/>
-              <a:gd name="connsiteX0" fmla="*/ 4072 w 2210763"/>
-              <a:gd name="connsiteY0" fmla="*/ 1457325 h 1819285"/>
-              <a:gd name="connsiteX1" fmla="*/ 1448157 w 2210763"/>
-              <a:gd name="connsiteY1" fmla="*/ 1665542 h 1819285"/>
-              <a:gd name="connsiteX2" fmla="*/ 2210697 w 2210763"/>
-              <a:gd name="connsiteY2" fmla="*/ 0 h 1819285"/>
-              <a:gd name="connsiteX0" fmla="*/ 4745 w 2211436"/>
-              <a:gd name="connsiteY0" fmla="*/ 1457325 h 1857787"/>
-              <a:gd name="connsiteX1" fmla="*/ 1448830 w 2211436"/>
-              <a:gd name="connsiteY1" fmla="*/ 1665542 h 1857787"/>
-              <a:gd name="connsiteX2" fmla="*/ 2211370 w 2211436"/>
-              <a:gd name="connsiteY2" fmla="*/ 0 h 1857787"/>
-              <a:gd name="connsiteX0" fmla="*/ 4745 w 2211383"/>
-              <a:gd name="connsiteY0" fmla="*/ 1457325 h 1857787"/>
-              <a:gd name="connsiteX1" fmla="*/ 1448830 w 2211383"/>
-              <a:gd name="connsiteY1" fmla="*/ 1665542 h 1857787"/>
-              <a:gd name="connsiteX2" fmla="*/ 2211370 w 2211383"/>
-              <a:gd name="connsiteY2" fmla="*/ 0 h 1857787"/>
-              <a:gd name="connsiteX0" fmla="*/ 4745 w 2211382"/>
-              <a:gd name="connsiteY0" fmla="*/ 1457325 h 1857787"/>
-              <a:gd name="connsiteX1" fmla="*/ 1448830 w 2211382"/>
-              <a:gd name="connsiteY1" fmla="*/ 1665542 h 1857787"/>
-              <a:gd name="connsiteX2" fmla="*/ 2211370 w 2211382"/>
-              <a:gd name="connsiteY2" fmla="*/ 0 h 1857787"/>
-              <a:gd name="connsiteX0" fmla="*/ 4056 w 2210693"/>
-              <a:gd name="connsiteY0" fmla="*/ 1457325 h 1811677"/>
-              <a:gd name="connsiteX1" fmla="*/ 1448141 w 2210693"/>
-              <a:gd name="connsiteY1" fmla="*/ 1665542 h 1811677"/>
-              <a:gd name="connsiteX2" fmla="*/ 2210681 w 2210693"/>
-              <a:gd name="connsiteY2" fmla="*/ 0 h 1811677"/>
-              <a:gd name="connsiteX0" fmla="*/ 4056 w 2210692"/>
-              <a:gd name="connsiteY0" fmla="*/ 1457325 h 1811677"/>
-              <a:gd name="connsiteX1" fmla="*/ 1448141 w 2210692"/>
-              <a:gd name="connsiteY1" fmla="*/ 1665542 h 1811677"/>
-              <a:gd name="connsiteX2" fmla="*/ 2210681 w 2210692"/>
-              <a:gd name="connsiteY2" fmla="*/ 0 h 1811677"/>
-            </a:gdLst>
-            <a:ahLst/>
-            <a:cxnLst>
-              <a:cxn ang="0">
-                <a:pos x="connsiteX0" y="connsiteY0"/>
-              </a:cxn>
-              <a:cxn ang="0">
-                <a:pos x="connsiteX1" y="connsiteY1"/>
-              </a:cxn>
-              <a:cxn ang="0">
-                <a:pos x="connsiteX2" y="connsiteY2"/>
-              </a:cxn>
-            </a:cxnLst>
-            <a:rect l="l" t="t" r="r" b="b"/>
-            <a:pathLst>
-              <a:path w="2210692" h="1811677">
-                <a:moveTo>
-                  <a:pt x="4056" y="1457325"/>
-                </a:moveTo>
-                <a:cubicBezTo>
-                  <a:pt x="-74970" y="1898205"/>
-                  <a:pt x="1022083" y="1878155"/>
-                  <a:pt x="1448141" y="1665542"/>
-                </a:cubicBezTo>
-                <a:cubicBezTo>
-                  <a:pt x="1743734" y="1509586"/>
-                  <a:pt x="2213326" y="1453620"/>
-                  <a:pt x="2210681" y="0"/>
-                </a:cubicBezTo>
-              </a:path>
-            </a:pathLst>
-          </a:custGeom>
-          <a:noFill/>
-          <a:ln w="38100">
-            <a:solidFill>
-              <a:schemeClr val="accent6">
-                <a:lumMod val="75000"/>
-              </a:schemeClr>
-            </a:solidFill>
-            <a:headEnd type="oval" w="med" len="lg"/>
-            <a:tailEnd type="oval" w="med" len="lg"/>
-          </a:ln>
-          <a:effectLst>
-            <a:outerShdw blurRad="50800" dist="38100" dir="2700000" algn="tl" rotWithShape="0">
-              <a:prstClr val="black">
-                <a:alpha val="40000"/>
-              </a:prstClr>
-            </a:outerShdw>
-          </a:effectLst>
-        </p:spPr>
-        <p:style>
-          <a:lnRef idx="2">
-            <a:schemeClr val="accent1">
-              <a:shade val="50000"/>
-            </a:schemeClr>
-          </a:lnRef>
-          <a:fillRef idx="1">
-            <a:schemeClr val="accent1"/>
-          </a:fillRef>
-          <a:effectRef idx="0">
-            <a:schemeClr val="accent1"/>
-          </a:effectRef>
-          <a:fontRef idx="minor">
-            <a:schemeClr val="lt1"/>
-          </a:fontRef>
-        </p:style>
-        <p:txBody>
-          <a:bodyPr rtlCol="0" anchor="ctr"/>
-          <a:lstStyle/>
-          <a:p>
-            <a:pPr algn="ctr"/>
-            <a:endParaRPr lang="zh-CN" altLang="en-US"/>
-          </a:p>
-        </p:txBody>
-      </p:sp>
-      <p:sp>
-        <p:nvSpPr>
-          <p:cNvPr id="29" name="任意多边形: 形状 28">
-            <a:extLst>
-              <a:ext uri="{FF2B5EF4-FFF2-40B4-BE49-F238E27FC236}">
-                <a16:creationId xmlns:a16="http://schemas.microsoft.com/office/drawing/2014/main" id="{E442963C-5407-5C8E-1595-ADE2849C7DE1}"/>
-              </a:ext>
-            </a:extLst>
-          </p:cNvPr>
-          <p:cNvSpPr/>
-          <p:nvPr/>
-        </p:nvSpPr>
-        <p:spPr>
-          <a:xfrm>
-            <a:off x="5824537" y="3138362"/>
-            <a:ext cx="2241548" cy="534126"/>
-          </a:xfrm>
-          <a:custGeom>
-            <a:avLst/>
-            <a:gdLst>
-              <a:gd name="connsiteX0" fmla="*/ 0 w 5200650"/>
-              <a:gd name="connsiteY0" fmla="*/ 355600 h 959485"/>
-              <a:gd name="connsiteX1" fmla="*/ 2520950 w 5200650"/>
-              <a:gd name="connsiteY1" fmla="*/ 952500 h 959485"/>
-              <a:gd name="connsiteX2" fmla="*/ 5200650 w 5200650"/>
-              <a:gd name="connsiteY2" fmla="*/ 0 h 959485"/>
-              <a:gd name="connsiteX0" fmla="*/ 0 w 5214937"/>
-              <a:gd name="connsiteY0" fmla="*/ 393700 h 960244"/>
-              <a:gd name="connsiteX1" fmla="*/ 2535237 w 5214937"/>
-              <a:gd name="connsiteY1" fmla="*/ 952500 h 960244"/>
-              <a:gd name="connsiteX2" fmla="*/ 5214937 w 5214937"/>
-              <a:gd name="connsiteY2" fmla="*/ 0 h 960244"/>
-              <a:gd name="connsiteX0" fmla="*/ 0 w 5214937"/>
-              <a:gd name="connsiteY0" fmla="*/ 393700 h 955417"/>
-              <a:gd name="connsiteX1" fmla="*/ 2535237 w 5214937"/>
-              <a:gd name="connsiteY1" fmla="*/ 952500 h 955417"/>
-              <a:gd name="connsiteX2" fmla="*/ 5214937 w 5214937"/>
-              <a:gd name="connsiteY2" fmla="*/ 0 h 955417"/>
-              <a:gd name="connsiteX0" fmla="*/ 0 w 5214937"/>
-              <a:gd name="connsiteY0" fmla="*/ 393700 h 426311"/>
-              <a:gd name="connsiteX1" fmla="*/ 2797175 w 5214937"/>
-              <a:gd name="connsiteY1" fmla="*/ 419100 h 426311"/>
-              <a:gd name="connsiteX2" fmla="*/ 5214937 w 5214937"/>
-              <a:gd name="connsiteY2" fmla="*/ 0 h 426311"/>
-              <a:gd name="connsiteX0" fmla="*/ 0 w 4829174"/>
-              <a:gd name="connsiteY0" fmla="*/ 146050 h 236452"/>
-              <a:gd name="connsiteX1" fmla="*/ 2797175 w 4829174"/>
-              <a:gd name="connsiteY1" fmla="*/ 171450 h 236452"/>
-              <a:gd name="connsiteX2" fmla="*/ 4829174 w 4829174"/>
-              <a:gd name="connsiteY2" fmla="*/ 0 h 236452"/>
-              <a:gd name="connsiteX0" fmla="*/ 0 w 4829174"/>
-              <a:gd name="connsiteY0" fmla="*/ 146050 h 178661"/>
-              <a:gd name="connsiteX1" fmla="*/ 2797175 w 4829174"/>
-              <a:gd name="connsiteY1" fmla="*/ 171450 h 178661"/>
-              <a:gd name="connsiteX2" fmla="*/ 4829174 w 4829174"/>
-              <a:gd name="connsiteY2" fmla="*/ 0 h 178661"/>
-              <a:gd name="connsiteX0" fmla="*/ 0 w 4829174"/>
-              <a:gd name="connsiteY0" fmla="*/ 146050 h 185546"/>
-              <a:gd name="connsiteX1" fmla="*/ 2797175 w 4829174"/>
-              <a:gd name="connsiteY1" fmla="*/ 171450 h 185546"/>
-              <a:gd name="connsiteX2" fmla="*/ 4829174 w 4829174"/>
-              <a:gd name="connsiteY2" fmla="*/ 0 h 185546"/>
-              <a:gd name="connsiteX0" fmla="*/ 0 w 4829174"/>
-              <a:gd name="connsiteY0" fmla="*/ 146050 h 185546"/>
-              <a:gd name="connsiteX1" fmla="*/ 2797175 w 4829174"/>
-              <a:gd name="connsiteY1" fmla="*/ 171450 h 185546"/>
-              <a:gd name="connsiteX2" fmla="*/ 4829174 w 4829174"/>
-              <a:gd name="connsiteY2" fmla="*/ 0 h 185546"/>
-              <a:gd name="connsiteX0" fmla="*/ 0 w 5415998"/>
-              <a:gd name="connsiteY0" fmla="*/ 774440 h 774440"/>
-              <a:gd name="connsiteX1" fmla="*/ 3383999 w 5415998"/>
-              <a:gd name="connsiteY1" fmla="*/ 171450 h 774440"/>
-              <a:gd name="connsiteX2" fmla="*/ 5415998 w 5415998"/>
-              <a:gd name="connsiteY2" fmla="*/ 0 h 774440"/>
-              <a:gd name="connsiteX0" fmla="*/ 0 w 5415998"/>
-              <a:gd name="connsiteY0" fmla="*/ 774440 h 1089564"/>
-              <a:gd name="connsiteX1" fmla="*/ 3383999 w 5415998"/>
-              <a:gd name="connsiteY1" fmla="*/ 171450 h 1089564"/>
-              <a:gd name="connsiteX2" fmla="*/ 5415998 w 5415998"/>
-              <a:gd name="connsiteY2" fmla="*/ 0 h 1089564"/>
-              <a:gd name="connsiteX0" fmla="*/ 0 w 5415998"/>
-              <a:gd name="connsiteY0" fmla="*/ 774440 h 1444812"/>
-              <a:gd name="connsiteX1" fmla="*/ 1323070 w 5415998"/>
-              <a:gd name="connsiteY1" fmla="*/ 1330806 h 1444812"/>
-              <a:gd name="connsiteX2" fmla="*/ 5415998 w 5415998"/>
-              <a:gd name="connsiteY2" fmla="*/ 0 h 1444812"/>
-              <a:gd name="connsiteX0" fmla="*/ 0 w 5415998"/>
-              <a:gd name="connsiteY0" fmla="*/ 774440 h 774440"/>
-              <a:gd name="connsiteX1" fmla="*/ 5415998 w 5415998"/>
-              <a:gd name="connsiteY1" fmla="*/ 0 h 774440"/>
-              <a:gd name="connsiteX0" fmla="*/ 0 w 2542904"/>
-              <a:gd name="connsiteY0" fmla="*/ 0 h 633348"/>
-              <a:gd name="connsiteX1" fmla="*/ 2542904 w 2542904"/>
-              <a:gd name="connsiteY1" fmla="*/ 633348 h 633348"/>
-              <a:gd name="connsiteX0" fmla="*/ 0 w 2542904"/>
-              <a:gd name="connsiteY0" fmla="*/ 0 h 633348"/>
-              <a:gd name="connsiteX1" fmla="*/ 2542904 w 2542904"/>
-              <a:gd name="connsiteY1" fmla="*/ 633348 h 633348"/>
-              <a:gd name="connsiteX0" fmla="*/ 0 w 2026498"/>
-              <a:gd name="connsiteY0" fmla="*/ 0 h 506696"/>
-              <a:gd name="connsiteX1" fmla="*/ 2026498 w 2026498"/>
-              <a:gd name="connsiteY1" fmla="*/ 506696 h 506696"/>
-              <a:gd name="connsiteX0" fmla="*/ 0 w 1923217"/>
-              <a:gd name="connsiteY0" fmla="*/ 0 h 511567"/>
-              <a:gd name="connsiteX1" fmla="*/ 1923217 w 1923217"/>
-              <a:gd name="connsiteY1" fmla="*/ 511567 h 511567"/>
-              <a:gd name="connsiteX0" fmla="*/ 0 w 1871577"/>
-              <a:gd name="connsiteY0" fmla="*/ 0 h 521309"/>
-              <a:gd name="connsiteX1" fmla="*/ 1871577 w 1871577"/>
-              <a:gd name="connsiteY1" fmla="*/ 521309 h 521309"/>
-              <a:gd name="connsiteX0" fmla="*/ 0 w 1871577"/>
-              <a:gd name="connsiteY0" fmla="*/ 0 h 554305"/>
-              <a:gd name="connsiteX1" fmla="*/ 1871577 w 1871577"/>
-              <a:gd name="connsiteY1" fmla="*/ 521309 h 554305"/>
-              <a:gd name="connsiteX0" fmla="*/ 0 w 2247145"/>
-              <a:gd name="connsiteY0" fmla="*/ 0 h 546322"/>
-              <a:gd name="connsiteX1" fmla="*/ 2247145 w 2247145"/>
-              <a:gd name="connsiteY1" fmla="*/ 506696 h 546322"/>
-              <a:gd name="connsiteX0" fmla="*/ 0 w 2209588"/>
-              <a:gd name="connsiteY0" fmla="*/ 0 h 546322"/>
-              <a:gd name="connsiteX1" fmla="*/ 2209588 w 2209588"/>
-              <a:gd name="connsiteY1" fmla="*/ 506696 h 546322"/>
-            </a:gdLst>
-            <a:ahLst/>
-            <a:cxnLst>
-              <a:cxn ang="0">
-                <a:pos x="connsiteX0" y="connsiteY0"/>
-              </a:cxn>
-              <a:cxn ang="0">
-                <a:pos x="connsiteX1" y="connsiteY1"/>
-              </a:cxn>
-            </a:cxnLst>
-            <a:rect l="l" t="t" r="r" b="b"/>
-            <a:pathLst>
-              <a:path w="2209588" h="546322">
-                <a:moveTo>
-                  <a:pt x="0" y="0"/>
-                </a:moveTo>
-                <a:cubicBezTo>
-                  <a:pt x="279588" y="858991"/>
-                  <a:pt x="939440" y="427103"/>
-                  <a:pt x="2209588" y="506696"/>
-                </a:cubicBezTo>
-              </a:path>
-            </a:pathLst>
-          </a:custGeom>
-          <a:noFill/>
-          <a:ln w="38100">
-            <a:solidFill>
-              <a:srgbClr val="FF0000"/>
-            </a:solidFill>
-            <a:headEnd type="oval" w="med" len="med"/>
-            <a:tailEnd type="oval" w="med" len="med"/>
-          </a:ln>
-          <a:effectLst>
-            <a:outerShdw blurRad="50800" dist="38100" dir="2700000" algn="tl" rotWithShape="0">
-              <a:prstClr val="black">
-                <a:alpha val="40000"/>
-              </a:prstClr>
-            </a:outerShdw>
-          </a:effectLst>
-        </p:spPr>
-        <p:style>
-          <a:lnRef idx="2">
-            <a:schemeClr val="accent1">
-              <a:shade val="50000"/>
-            </a:schemeClr>
-          </a:lnRef>
-          <a:fillRef idx="1">
-            <a:schemeClr val="accent1"/>
-          </a:fillRef>
-          <a:effectRef idx="0">
-            <a:schemeClr val="accent1"/>
-          </a:effectRef>
-          <a:fontRef idx="minor">
-            <a:schemeClr val="lt1"/>
-          </a:fontRef>
-        </p:style>
-        <p:txBody>
-          <a:bodyPr rtlCol="0" anchor="ctr"/>
-          <a:lstStyle/>
-          <a:p>
-            <a:pPr algn="ctr"/>
-            <a:endParaRPr lang="zh-CN" altLang="en-US"/>
-          </a:p>
-        </p:txBody>
-      </p:sp>
-      <p:sp>
-        <p:nvSpPr>
-          <p:cNvPr id="32" name="对话气泡: 圆角矩形 31">
-            <a:extLst>
-              <a:ext uri="{FF2B5EF4-FFF2-40B4-BE49-F238E27FC236}">
-                <a16:creationId xmlns:a16="http://schemas.microsoft.com/office/drawing/2014/main" id="{364A104A-07F7-A71E-C2BF-B8CB2D3F31AB}"/>
-              </a:ext>
-            </a:extLst>
-          </p:cNvPr>
-          <p:cNvSpPr/>
-          <p:nvPr/>
-        </p:nvSpPr>
-        <p:spPr>
-          <a:xfrm>
-            <a:off x="6597055" y="2243459"/>
-            <a:ext cx="1313093" cy="472042"/>
-          </a:xfrm>
-          <a:prstGeom prst="wedgeRoundRectCallout">
-            <a:avLst>
-              <a:gd name="adj1" fmla="val 60151"/>
-              <a:gd name="adj2" fmla="val 183939"/>
-              <a:gd name="adj3" fmla="val 16667"/>
-            </a:avLst>
-          </a:prstGeom>
-          <a:solidFill>
-            <a:schemeClr val="accent4">
-              <a:lumMod val="20000"/>
-              <a:lumOff val="80000"/>
-            </a:schemeClr>
-          </a:solidFill>
-          <a:ln>
-            <a:solidFill>
-              <a:srgbClr val="0070C0"/>
-            </a:solidFill>
-          </a:ln>
-          <a:effectLst>
-            <a:outerShdw blurRad="63500" sx="102000" sy="102000" algn="ctr" rotWithShape="0">
-              <a:prstClr val="black">
-                <a:alpha val="40000"/>
-              </a:prstClr>
-            </a:outerShdw>
-          </a:effectLst>
-        </p:spPr>
-        <p:style>
-          <a:lnRef idx="2">
-            <a:schemeClr val="accent1">
-              <a:shade val="50000"/>
-            </a:schemeClr>
-          </a:lnRef>
-          <a:fillRef idx="1">
-            <a:schemeClr val="accent1"/>
-          </a:fillRef>
-          <a:effectRef idx="0">
-            <a:schemeClr val="accent1"/>
-          </a:effectRef>
-          <a:fontRef idx="minor">
-            <a:schemeClr val="lt1"/>
-          </a:fontRef>
-        </p:style>
-        <p:txBody>
-          <a:bodyPr rtlCol="0" anchor="ctr"/>
-          <a:lstStyle/>
-          <a:p>
-            <a:pPr algn="ctr"/>
-            <a:r>
-              <a:rPr lang="en-US" altLang="zh-CN" sz="2000" b="1" dirty="0">
-                <a:solidFill>
-                  <a:schemeClr val="tx1"/>
-                </a:solidFill>
-              </a:rPr>
-              <a:t>REF3030</a:t>
-            </a:r>
-            <a:endParaRPr lang="zh-CN" altLang="en-US" sz="2000" b="1" dirty="0">
-              <a:solidFill>
-                <a:schemeClr val="tx1"/>
-              </a:solidFill>
-            </a:endParaRPr>
-          </a:p>
-        </p:txBody>
-      </p:sp>
-      <p:sp>
-        <p:nvSpPr>
-          <p:cNvPr id="33" name="对话气泡: 圆角矩形 32">
-            <a:extLst>
-              <a:ext uri="{FF2B5EF4-FFF2-40B4-BE49-F238E27FC236}">
-                <a16:creationId xmlns:a16="http://schemas.microsoft.com/office/drawing/2014/main" id="{E69F2418-0CA5-EB2B-4B4C-16CCC6B3ADFD}"/>
-              </a:ext>
-            </a:extLst>
-          </p:cNvPr>
-          <p:cNvSpPr/>
-          <p:nvPr/>
-        </p:nvSpPr>
-        <p:spPr>
-          <a:xfrm>
-            <a:off x="2308047" y="848813"/>
-            <a:ext cx="2630148" cy="472042"/>
-          </a:xfrm>
-          <a:prstGeom prst="wedgeRoundRectCallout">
-            <a:avLst>
-              <a:gd name="adj1" fmla="val 52288"/>
-              <a:gd name="adj2" fmla="val 155311"/>
-              <a:gd name="adj3" fmla="val 16667"/>
-            </a:avLst>
-          </a:prstGeom>
-          <a:solidFill>
-            <a:schemeClr val="accent4">
-              <a:lumMod val="20000"/>
-              <a:lumOff val="80000"/>
-            </a:schemeClr>
-          </a:solidFill>
-          <a:ln>
-            <a:solidFill>
-              <a:srgbClr val="0070C0"/>
-            </a:solidFill>
-          </a:ln>
-          <a:effectLst>
-            <a:outerShdw blurRad="63500" sx="102000" sy="102000" algn="ctr" rotWithShape="0">
-              <a:prstClr val="black">
-                <a:alpha val="40000"/>
-              </a:prstClr>
-            </a:outerShdw>
-          </a:effectLst>
-        </p:spPr>
-        <p:style>
-          <a:lnRef idx="2">
-            <a:schemeClr val="accent1">
-              <a:shade val="50000"/>
-            </a:schemeClr>
-          </a:lnRef>
-          <a:fillRef idx="1">
-            <a:schemeClr val="accent1"/>
-          </a:fillRef>
-          <a:effectRef idx="0">
-            <a:schemeClr val="accent1"/>
-          </a:effectRef>
-          <a:fontRef idx="minor">
-            <a:schemeClr val="lt1"/>
-          </a:fontRef>
-        </p:style>
-        <p:txBody>
-          <a:bodyPr rtlCol="0" anchor="ctr"/>
-          <a:lstStyle/>
-          <a:p>
-            <a:pPr algn="ctr"/>
-            <a:r>
-              <a:rPr lang="en-US" altLang="zh-CN" sz="2000" b="1" dirty="0">
-                <a:solidFill>
-                  <a:schemeClr val="tx1"/>
-                </a:solidFill>
-              </a:rPr>
-              <a:t>WS2812B LED Strip</a:t>
-            </a:r>
-            <a:endParaRPr lang="zh-CN" altLang="en-US" sz="2000" b="1" dirty="0">
-              <a:solidFill>
-                <a:schemeClr val="tx1"/>
-              </a:solidFill>
-            </a:endParaRPr>
-          </a:p>
-        </p:txBody>
-      </p:sp>
-      <p:pic>
-        <p:nvPicPr>
-          <p:cNvPr id="37" name="图片 36">
-            <a:extLst>
-              <a:ext uri="{FF2B5EF4-FFF2-40B4-BE49-F238E27FC236}">
-                <a16:creationId xmlns:a16="http://schemas.microsoft.com/office/drawing/2014/main" id="{1136BDBB-88A5-F248-6B03-3C69A518CE75}"/>
-              </a:ext>
-            </a:extLst>
-          </p:cNvPr>
-          <p:cNvPicPr>
-            <a:picLocks noChangeAspect="1"/>
-          </p:cNvPicPr>
-          <p:nvPr/>
-        </p:nvPicPr>
-        <p:blipFill>
-          <a:blip r:embed="rId6"/>
-          <a:stretch>
-            <a:fillRect/>
-          </a:stretch>
-        </p:blipFill>
-        <p:spPr>
-          <a:xfrm>
-            <a:off x="9511903" y="4681538"/>
-            <a:ext cx="184548" cy="171450"/>
-          </a:xfrm>
-          <a:prstGeom prst="rect">
-            <a:avLst/>
-          </a:prstGeom>
-        </p:spPr>
-      </p:pic>
-    </p:spTree>
-    <p:extLst>
-      <p:ext uri="{BB962C8B-B14F-4D97-AF65-F5344CB8AC3E}">
-        <p14:creationId xmlns:p14="http://schemas.microsoft.com/office/powerpoint/2010/main" val="3303521322"/>
       </p:ext>
     </p:extLst>
   </p:cSld>

</xml_diff>

<commit_message>
Big update (analog and effect mode removed)
</commit_message>
<xml_diff>
--- a/doc/Firmware_manual.pptx
+++ b/doc/Firmware_manual.pptx
@@ -11,7 +11,6 @@
     <p:sldId id="262" r:id="rId5"/>
     <p:sldId id="263" r:id="rId6"/>
     <p:sldId id="260" r:id="rId7"/>
-    <p:sldId id="259" r:id="rId8"/>
   </p:sldIdLst>
   <p:sldSz cx="12192000" cy="6858000"/>
   <p:notesSz cx="6858000" cy="9144000"/>
@@ -362,7 +361,7 @@
           <a:p>
             <a:fld id="{5233C8C7-F8F0-45E5-B257-B695ED03E8DF}" type="datetimeFigureOut">
               <a:rPr lang="zh-CN" altLang="en-US" smtClean="0"/>
-              <a:t>2023/5/28</a:t>
+              <a:t>2023/12/10</a:t>
             </a:fld>
             <a:endParaRPr lang="zh-CN" altLang="en-US"/>
           </a:p>
@@ -2912,60 +2911,6 @@
       </p:grpSpPr>
       <p:sp>
         <p:nvSpPr>
-          <p:cNvPr id="2" name="左大括号 1">
-            <a:extLst>
-              <a:ext uri="{FF2B5EF4-FFF2-40B4-BE49-F238E27FC236}">
-                <a16:creationId xmlns:a16="http://schemas.microsoft.com/office/drawing/2014/main" id="{6908500C-1B25-A058-D061-01A508D62675}"/>
-              </a:ext>
-            </a:extLst>
-          </p:cNvPr>
-          <p:cNvSpPr/>
-          <p:nvPr/>
-        </p:nvSpPr>
-        <p:spPr>
-          <a:xfrm rot="5400000">
-            <a:off x="7988718" y="-399922"/>
-            <a:ext cx="389999" cy="2992134"/>
-          </a:xfrm>
-          <a:prstGeom prst="leftBrace">
-            <a:avLst>
-              <a:gd name="adj1" fmla="val 21655"/>
-              <a:gd name="adj2" fmla="val 49829"/>
-            </a:avLst>
-          </a:prstGeom>
-          <a:ln w="28575">
-            <a:solidFill>
-              <a:srgbClr val="2F5597">
-                <a:alpha val="69804"/>
-              </a:srgbClr>
-            </a:solidFill>
-          </a:ln>
-        </p:spPr>
-        <p:style>
-          <a:lnRef idx="1">
-            <a:schemeClr val="accent1"/>
-          </a:lnRef>
-          <a:fillRef idx="0">
-            <a:schemeClr val="accent1"/>
-          </a:fillRef>
-          <a:effectRef idx="0">
-            <a:schemeClr val="accent1"/>
-          </a:effectRef>
-          <a:fontRef idx="minor">
-            <a:schemeClr val="tx1"/>
-          </a:fontRef>
-        </p:style>
-        <p:txBody>
-          <a:bodyPr rtlCol="0" anchor="ctr"/>
-          <a:lstStyle/>
-          <a:p>
-            <a:pPr algn="ctr"/>
-            <a:endParaRPr lang="zh-CN" altLang="en-US"/>
-          </a:p>
-        </p:txBody>
-      </p:sp>
-      <p:sp>
-        <p:nvSpPr>
           <p:cNvPr id="3" name="标题 2">
             <a:extLst>
               <a:ext uri="{FF2B5EF4-FFF2-40B4-BE49-F238E27FC236}">
@@ -3208,336 +3153,6 @@
           </a:p>
         </p:txBody>
       </p:sp>
-      <p:sp>
-        <p:nvSpPr>
-          <p:cNvPr id="21" name="文本框 20">
-            <a:extLst>
-              <a:ext uri="{FF2B5EF4-FFF2-40B4-BE49-F238E27FC236}">
-                <a16:creationId xmlns:a16="http://schemas.microsoft.com/office/drawing/2014/main" id="{8E6E2637-9F6C-3912-359C-68A8EA1C1110}"/>
-              </a:ext>
-            </a:extLst>
-          </p:cNvPr>
-          <p:cNvSpPr txBox="1"/>
-          <p:nvPr/>
-        </p:nvSpPr>
-        <p:spPr>
-          <a:xfrm>
-            <a:off x="7508922" y="625973"/>
-            <a:ext cx="1363358" cy="303536"/>
-          </a:xfrm>
-          <a:prstGeom prst="rect">
-            <a:avLst/>
-          </a:prstGeom>
-          <a:noFill/>
-        </p:spPr>
-        <p:txBody>
-          <a:bodyPr wrap="square" lIns="36000" tIns="36000" rIns="36000" bIns="36000" rtlCol="0">
-            <a:spAutoFit/>
-          </a:bodyPr>
-          <a:lstStyle/>
-          <a:p>
-            <a:pPr algn="ctr">
-              <a:lnSpc>
-                <a:spcPts val="1800"/>
-              </a:lnSpc>
-            </a:pPr>
-            <a:r>
-              <a:rPr lang="en-US" altLang="zh-CN" sz="1600" b="1" dirty="0">
-                <a:solidFill>
-                  <a:schemeClr val="accent1">
-                    <a:lumMod val="75000"/>
-                  </a:schemeClr>
-                </a:solidFill>
-              </a:rPr>
-              <a:t>EFFECT Mode</a:t>
-            </a:r>
-            <a:endParaRPr lang="zh-CN" altLang="en-US" sz="1600" b="1" dirty="0">
-              <a:solidFill>
-                <a:schemeClr val="accent1">
-                  <a:lumMod val="75000"/>
-                </a:schemeClr>
-              </a:solidFill>
-            </a:endParaRPr>
-          </a:p>
-        </p:txBody>
-      </p:sp>
-      <p:sp>
-        <p:nvSpPr>
-          <p:cNvPr id="22" name="矩形: 圆角 21">
-            <a:extLst>
-              <a:ext uri="{FF2B5EF4-FFF2-40B4-BE49-F238E27FC236}">
-                <a16:creationId xmlns:a16="http://schemas.microsoft.com/office/drawing/2014/main" id="{8F7F3EF8-8465-2BA2-34EA-E2E92219F49D}"/>
-              </a:ext>
-            </a:extLst>
-          </p:cNvPr>
-          <p:cNvSpPr/>
-          <p:nvPr/>
-        </p:nvSpPr>
-        <p:spPr>
-          <a:xfrm>
-            <a:off x="6687650" y="1358668"/>
-            <a:ext cx="546588" cy="559594"/>
-          </a:xfrm>
-          <a:prstGeom prst="roundRect">
-            <a:avLst>
-              <a:gd name="adj" fmla="val 9697"/>
-            </a:avLst>
-          </a:prstGeom>
-          <a:solidFill>
-            <a:schemeClr val="accent1">
-              <a:lumMod val="60000"/>
-              <a:lumOff val="40000"/>
-              <a:alpha val="50196"/>
-            </a:schemeClr>
-          </a:solidFill>
-          <a:ln>
-            <a:noFill/>
-          </a:ln>
-        </p:spPr>
-        <p:style>
-          <a:lnRef idx="2">
-            <a:schemeClr val="accent1">
-              <a:shade val="50000"/>
-            </a:schemeClr>
-          </a:lnRef>
-          <a:fillRef idx="1">
-            <a:schemeClr val="accent1"/>
-          </a:fillRef>
-          <a:effectRef idx="0">
-            <a:schemeClr val="accent1"/>
-          </a:effectRef>
-          <a:fontRef idx="minor">
-            <a:schemeClr val="lt1"/>
-          </a:fontRef>
-        </p:style>
-        <p:txBody>
-          <a:bodyPr rtlCol="0" anchor="ctr"/>
-          <a:lstStyle/>
-          <a:p>
-            <a:pPr algn="ctr"/>
-            <a:endParaRPr lang="zh-CN" altLang="en-US"/>
-          </a:p>
-        </p:txBody>
-      </p:sp>
-      <p:sp>
-        <p:nvSpPr>
-          <p:cNvPr id="24" name="矩形: 圆角 23">
-            <a:extLst>
-              <a:ext uri="{FF2B5EF4-FFF2-40B4-BE49-F238E27FC236}">
-                <a16:creationId xmlns:a16="http://schemas.microsoft.com/office/drawing/2014/main" id="{29AB74B2-5405-393B-F951-26391C546C7C}"/>
-              </a:ext>
-            </a:extLst>
-          </p:cNvPr>
-          <p:cNvSpPr/>
-          <p:nvPr/>
-        </p:nvSpPr>
-        <p:spPr>
-          <a:xfrm>
-            <a:off x="7504419" y="1358668"/>
-            <a:ext cx="546588" cy="559594"/>
-          </a:xfrm>
-          <a:prstGeom prst="roundRect">
-            <a:avLst>
-              <a:gd name="adj" fmla="val 9697"/>
-            </a:avLst>
-          </a:prstGeom>
-          <a:solidFill>
-            <a:schemeClr val="accent1">
-              <a:lumMod val="60000"/>
-              <a:lumOff val="40000"/>
-              <a:alpha val="50196"/>
-            </a:schemeClr>
-          </a:solidFill>
-          <a:ln>
-            <a:noFill/>
-          </a:ln>
-        </p:spPr>
-        <p:style>
-          <a:lnRef idx="2">
-            <a:schemeClr val="accent1">
-              <a:shade val="50000"/>
-            </a:schemeClr>
-          </a:lnRef>
-          <a:fillRef idx="1">
-            <a:schemeClr val="accent1"/>
-          </a:fillRef>
-          <a:effectRef idx="0">
-            <a:schemeClr val="accent1"/>
-          </a:effectRef>
-          <a:fontRef idx="minor">
-            <a:schemeClr val="lt1"/>
-          </a:fontRef>
-        </p:style>
-        <p:txBody>
-          <a:bodyPr rtlCol="0" anchor="ctr"/>
-          <a:lstStyle/>
-          <a:p>
-            <a:pPr algn="ctr"/>
-            <a:endParaRPr lang="zh-CN" altLang="en-US"/>
-          </a:p>
-        </p:txBody>
-      </p:sp>
-      <p:sp>
-        <p:nvSpPr>
-          <p:cNvPr id="25" name="矩形: 圆角 24">
-            <a:extLst>
-              <a:ext uri="{FF2B5EF4-FFF2-40B4-BE49-F238E27FC236}">
-                <a16:creationId xmlns:a16="http://schemas.microsoft.com/office/drawing/2014/main" id="{46AB61B0-A47A-5483-B1E8-851C74F8C2D8}"/>
-              </a:ext>
-            </a:extLst>
-          </p:cNvPr>
-          <p:cNvSpPr/>
-          <p:nvPr/>
-        </p:nvSpPr>
-        <p:spPr>
-          <a:xfrm>
-            <a:off x="8321188" y="1358668"/>
-            <a:ext cx="546588" cy="559594"/>
-          </a:xfrm>
-          <a:prstGeom prst="roundRect">
-            <a:avLst>
-              <a:gd name="adj" fmla="val 9697"/>
-            </a:avLst>
-          </a:prstGeom>
-          <a:solidFill>
-            <a:schemeClr val="accent1">
-              <a:lumMod val="60000"/>
-              <a:lumOff val="40000"/>
-              <a:alpha val="50196"/>
-            </a:schemeClr>
-          </a:solidFill>
-          <a:ln>
-            <a:noFill/>
-          </a:ln>
-        </p:spPr>
-        <p:style>
-          <a:lnRef idx="2">
-            <a:schemeClr val="accent1">
-              <a:shade val="50000"/>
-            </a:schemeClr>
-          </a:lnRef>
-          <a:fillRef idx="1">
-            <a:schemeClr val="accent1"/>
-          </a:fillRef>
-          <a:effectRef idx="0">
-            <a:schemeClr val="accent1"/>
-          </a:effectRef>
-          <a:fontRef idx="minor">
-            <a:schemeClr val="lt1"/>
-          </a:fontRef>
-        </p:style>
-        <p:txBody>
-          <a:bodyPr rtlCol="0" anchor="ctr"/>
-          <a:lstStyle/>
-          <a:p>
-            <a:pPr algn="ctr"/>
-            <a:endParaRPr lang="zh-CN" altLang="en-US"/>
-          </a:p>
-        </p:txBody>
-      </p:sp>
-      <p:sp>
-        <p:nvSpPr>
-          <p:cNvPr id="26" name="矩形: 圆角 25">
-            <a:extLst>
-              <a:ext uri="{FF2B5EF4-FFF2-40B4-BE49-F238E27FC236}">
-                <a16:creationId xmlns:a16="http://schemas.microsoft.com/office/drawing/2014/main" id="{907594F9-BBE9-7DB8-DD22-C72E7397185E}"/>
-              </a:ext>
-            </a:extLst>
-          </p:cNvPr>
-          <p:cNvSpPr/>
-          <p:nvPr/>
-        </p:nvSpPr>
-        <p:spPr>
-          <a:xfrm>
-            <a:off x="9133195" y="1358668"/>
-            <a:ext cx="546588" cy="559594"/>
-          </a:xfrm>
-          <a:prstGeom prst="roundRect">
-            <a:avLst>
-              <a:gd name="adj" fmla="val 9697"/>
-            </a:avLst>
-          </a:prstGeom>
-          <a:solidFill>
-            <a:schemeClr val="accent1">
-              <a:lumMod val="60000"/>
-              <a:lumOff val="40000"/>
-              <a:alpha val="50196"/>
-            </a:schemeClr>
-          </a:solidFill>
-          <a:ln>
-            <a:noFill/>
-          </a:ln>
-        </p:spPr>
-        <p:style>
-          <a:lnRef idx="2">
-            <a:schemeClr val="accent1">
-              <a:shade val="50000"/>
-            </a:schemeClr>
-          </a:lnRef>
-          <a:fillRef idx="1">
-            <a:schemeClr val="accent1"/>
-          </a:fillRef>
-          <a:effectRef idx="0">
-            <a:schemeClr val="accent1"/>
-          </a:effectRef>
-          <a:fontRef idx="minor">
-            <a:schemeClr val="lt1"/>
-          </a:fontRef>
-        </p:style>
-        <p:txBody>
-          <a:bodyPr rtlCol="0" anchor="ctr"/>
-          <a:lstStyle/>
-          <a:p>
-            <a:pPr algn="ctr"/>
-            <a:endParaRPr lang="zh-CN" altLang="en-US"/>
-          </a:p>
-        </p:txBody>
-      </p:sp>
-      <p:cxnSp>
-        <p:nvCxnSpPr>
-          <p:cNvPr id="28" name="连接符: 肘形 27">
-            <a:extLst>
-              <a:ext uri="{FF2B5EF4-FFF2-40B4-BE49-F238E27FC236}">
-                <a16:creationId xmlns:a16="http://schemas.microsoft.com/office/drawing/2014/main" id="{976E10BB-0DF0-AB0A-FDC6-2EF48D79C205}"/>
-              </a:ext>
-            </a:extLst>
-          </p:cNvPr>
-          <p:cNvCxnSpPr>
-            <a:cxnSpLocks/>
-            <a:stCxn id="21" idx="3"/>
-          </p:cNvCxnSpPr>
-          <p:nvPr/>
-        </p:nvCxnSpPr>
-        <p:spPr>
-          <a:xfrm>
-            <a:off x="8872280" y="777741"/>
-            <a:ext cx="1282162" cy="147797"/>
-          </a:xfrm>
-          <a:prstGeom prst="bentConnector2">
-            <a:avLst/>
-          </a:prstGeom>
-          <a:ln w="28575">
-            <a:solidFill>
-              <a:srgbClr val="FF0000"/>
-            </a:solidFill>
-            <a:prstDash val="sysDot"/>
-          </a:ln>
-        </p:spPr>
-        <p:style>
-          <a:lnRef idx="1">
-            <a:schemeClr val="accent1"/>
-          </a:lnRef>
-          <a:fillRef idx="0">
-            <a:schemeClr val="accent1"/>
-          </a:fillRef>
-          <a:effectRef idx="0">
-            <a:schemeClr val="accent1"/>
-          </a:effectRef>
-          <a:fontRef idx="minor">
-            <a:schemeClr val="tx1"/>
-          </a:fontRef>
-        </p:style>
-      </p:cxnSp>
       <p:cxnSp>
         <p:nvCxnSpPr>
           <p:cNvPr id="29" name="连接符: 肘形 28">
@@ -4346,7 +3961,7 @@
         </p:nvSpPr>
         <p:spPr>
           <a:xfrm>
-            <a:off x="4543474" y="870944"/>
+            <a:off x="4709632" y="892185"/>
             <a:ext cx="1038549" cy="565146"/>
           </a:xfrm>
           <a:prstGeom prst="rect">
@@ -4369,7 +3984,7 @@
                   </a:schemeClr>
                 </a:solidFill>
               </a:rPr>
-              <a:t>LEVEL Mode</a:t>
+              <a:t>LED LEVEL Mode</a:t>
             </a:r>
             <a:endParaRPr lang="zh-CN" altLang="en-US" sz="1600" b="1" dirty="0">
               <a:solidFill>
@@ -4506,13 +4121,13 @@
           <p:nvPr/>
         </p:nvCxnSpPr>
         <p:spPr>
-          <a:xfrm rot="16200000" flipV="1">
-            <a:off x="7607516" y="-1673823"/>
-            <a:ext cx="2160" cy="5091693"/>
+          <a:xfrm rot="16200000" flipH="1" flipV="1">
+            <a:off x="7682134" y="-1580124"/>
+            <a:ext cx="19081" cy="4925535"/>
           </a:xfrm>
           <a:prstGeom prst="bentConnector3">
             <a:avLst>
-              <a:gd name="adj1" fmla="val 27538287"/>
+              <a:gd name="adj1" fmla="val -2972936"/>
             </a:avLst>
           </a:prstGeom>
           <a:ln w="28575">
@@ -4537,205 +4152,6 @@
           </a:fontRef>
         </p:style>
       </p:cxnSp>
-      <p:cxnSp>
-        <p:nvCxnSpPr>
-          <p:cNvPr id="53" name="连接符: 肘形 52">
-            <a:extLst>
-              <a:ext uri="{FF2B5EF4-FFF2-40B4-BE49-F238E27FC236}">
-                <a16:creationId xmlns:a16="http://schemas.microsoft.com/office/drawing/2014/main" id="{11BDCBF5-ADBF-EB71-C72D-BD18EF921866}"/>
-              </a:ext>
-            </a:extLst>
-          </p:cNvPr>
-          <p:cNvCxnSpPr>
-            <a:cxnSpLocks/>
-            <a:stCxn id="20" idx="0"/>
-            <a:endCxn id="54" idx="3"/>
-          </p:cNvCxnSpPr>
-          <p:nvPr/>
-        </p:nvCxnSpPr>
-        <p:spPr>
-          <a:xfrm rot="16200000" flipH="1">
-            <a:off x="9813541" y="1214004"/>
-            <a:ext cx="2099197" cy="1417397"/>
-          </a:xfrm>
-          <a:prstGeom prst="bentConnector4">
-            <a:avLst>
-              <a:gd name="adj1" fmla="val -10890"/>
-              <a:gd name="adj2" fmla="val 116128"/>
-            </a:avLst>
-          </a:prstGeom>
-          <a:ln w="28575">
-            <a:solidFill>
-              <a:srgbClr val="FF0000"/>
-            </a:solidFill>
-            <a:prstDash val="sysDot"/>
-          </a:ln>
-        </p:spPr>
-        <p:style>
-          <a:lnRef idx="1">
-            <a:schemeClr val="accent1"/>
-          </a:lnRef>
-          <a:fillRef idx="0">
-            <a:schemeClr val="accent1"/>
-          </a:fillRef>
-          <a:effectRef idx="0">
-            <a:schemeClr val="accent1"/>
-          </a:effectRef>
-          <a:fontRef idx="minor">
-            <a:schemeClr val="tx1"/>
-          </a:fontRef>
-        </p:style>
-      </p:cxnSp>
-      <p:sp>
-        <p:nvSpPr>
-          <p:cNvPr id="54" name="文本框 53">
-            <a:extLst>
-              <a:ext uri="{FF2B5EF4-FFF2-40B4-BE49-F238E27FC236}">
-                <a16:creationId xmlns:a16="http://schemas.microsoft.com/office/drawing/2014/main" id="{B42071E4-9984-9508-AF43-4CEFB9F2F045}"/>
-              </a:ext>
-            </a:extLst>
-          </p:cNvPr>
-          <p:cNvSpPr txBox="1"/>
-          <p:nvPr/>
-        </p:nvSpPr>
-        <p:spPr>
-          <a:xfrm>
-            <a:off x="10822593" y="2705117"/>
-            <a:ext cx="749246" cy="534368"/>
-          </a:xfrm>
-          <a:prstGeom prst="rect">
-            <a:avLst/>
-          </a:prstGeom>
-          <a:noFill/>
-        </p:spPr>
-        <p:txBody>
-          <a:bodyPr wrap="square" lIns="36000" tIns="36000" rIns="36000" bIns="36000" rtlCol="0">
-            <a:spAutoFit/>
-          </a:bodyPr>
-          <a:lstStyle/>
-          <a:p>
-            <a:pPr algn="ctr">
-              <a:lnSpc>
-                <a:spcPts val="1800"/>
-              </a:lnSpc>
-            </a:pPr>
-            <a:r>
-              <a:rPr lang="en-US" altLang="zh-CN" sz="1600" b="1" dirty="0">
-                <a:solidFill>
-                  <a:schemeClr val="accent1">
-                    <a:lumMod val="75000"/>
-                  </a:schemeClr>
-                </a:solidFill>
-              </a:rPr>
-              <a:t>Factory Default</a:t>
-            </a:r>
-            <a:endParaRPr lang="zh-CN" altLang="en-US" sz="1600" b="1" dirty="0">
-              <a:solidFill>
-                <a:schemeClr val="accent1">
-                  <a:lumMod val="75000"/>
-                </a:schemeClr>
-              </a:solidFill>
-            </a:endParaRPr>
-          </a:p>
-        </p:txBody>
-      </p:sp>
-      <p:sp>
-        <p:nvSpPr>
-          <p:cNvPr id="63" name="左大括号 62">
-            <a:extLst>
-              <a:ext uri="{FF2B5EF4-FFF2-40B4-BE49-F238E27FC236}">
-                <a16:creationId xmlns:a16="http://schemas.microsoft.com/office/drawing/2014/main" id="{E9B54DE5-B3C5-A544-7339-D3EAC43DD1CE}"/>
-              </a:ext>
-            </a:extLst>
-          </p:cNvPr>
-          <p:cNvSpPr/>
-          <p:nvPr/>
-        </p:nvSpPr>
-        <p:spPr>
-          <a:xfrm rot="10800000">
-            <a:off x="10289179" y="2404618"/>
-            <a:ext cx="417184" cy="1144836"/>
-          </a:xfrm>
-          <a:prstGeom prst="leftBrace">
-            <a:avLst>
-              <a:gd name="adj1" fmla="val 21655"/>
-              <a:gd name="adj2" fmla="val 50551"/>
-            </a:avLst>
-          </a:prstGeom>
-          <a:ln w="28575">
-            <a:solidFill>
-              <a:schemeClr val="accent4">
-                <a:lumMod val="75000"/>
-                <a:alpha val="69804"/>
-              </a:schemeClr>
-            </a:solidFill>
-          </a:ln>
-        </p:spPr>
-        <p:style>
-          <a:lnRef idx="1">
-            <a:schemeClr val="accent1"/>
-          </a:lnRef>
-          <a:fillRef idx="0">
-            <a:schemeClr val="accent1"/>
-          </a:fillRef>
-          <a:effectRef idx="0">
-            <a:schemeClr val="accent1"/>
-          </a:effectRef>
-          <a:fontRef idx="minor">
-            <a:schemeClr val="tx1"/>
-          </a:fontRef>
-        </p:style>
-        <p:txBody>
-          <a:bodyPr rtlCol="0" anchor="ctr"/>
-          <a:lstStyle/>
-          <a:p>
-            <a:pPr algn="ctr"/>
-            <a:endParaRPr lang="zh-CN" altLang="en-US"/>
-          </a:p>
-        </p:txBody>
-      </p:sp>
-      <p:sp>
-        <p:nvSpPr>
-          <p:cNvPr id="67" name="文本框 66">
-            <a:extLst>
-              <a:ext uri="{FF2B5EF4-FFF2-40B4-BE49-F238E27FC236}">
-                <a16:creationId xmlns:a16="http://schemas.microsoft.com/office/drawing/2014/main" id="{91EE07D7-A3A3-3254-2F46-06F1576B2EF7}"/>
-              </a:ext>
-            </a:extLst>
-          </p:cNvPr>
-          <p:cNvSpPr txBox="1"/>
-          <p:nvPr/>
-        </p:nvSpPr>
-        <p:spPr>
-          <a:xfrm>
-            <a:off x="10125276" y="2813505"/>
-            <a:ext cx="406791" cy="292388"/>
-          </a:xfrm>
-          <a:prstGeom prst="rect">
-            <a:avLst/>
-          </a:prstGeom>
-          <a:noFill/>
-        </p:spPr>
-        <p:txBody>
-          <a:bodyPr wrap="square">
-            <a:spAutoFit/>
-          </a:bodyPr>
-          <a:lstStyle/>
-          <a:p>
-            <a:r>
-              <a:rPr lang="en-US" altLang="zh-CN" sz="1300" b="1" dirty="0">
-                <a:solidFill>
-                  <a:schemeClr val="accent4">
-                    <a:lumMod val="75000"/>
-                  </a:schemeClr>
-                </a:solidFill>
-              </a:rPr>
-              <a:t>All</a:t>
-            </a:r>
-            <a:endParaRPr lang="zh-CN" altLang="en-US" sz="1300" dirty="0"/>
-          </a:p>
-        </p:txBody>
-      </p:sp>
     </p:spTree>
     <p:extLst>
       <p:ext uri="{BB962C8B-B14F-4D97-AF65-F5344CB8AC3E}">
@@ -4961,7 +4377,7 @@
         </p:nvSpPr>
         <p:spPr>
           <a:xfrm>
-            <a:off x="4505376" y="1082604"/>
+            <a:off x="4615441" y="1082604"/>
             <a:ext cx="1038549" cy="318924"/>
           </a:xfrm>
           <a:prstGeom prst="rect">
@@ -4984,7 +4400,7 @@
                   </a:schemeClr>
                 </a:solidFill>
               </a:rPr>
-              <a:t>Level</a:t>
+              <a:t>LED Level</a:t>
             </a:r>
             <a:endParaRPr lang="zh-CN" altLang="en-US" sz="1600" b="1" dirty="0">
               <a:solidFill>
@@ -5935,8 +5351,8 @@
         </p:nvCxnSpPr>
         <p:spPr>
           <a:xfrm rot="5400000" flipH="1" flipV="1">
-            <a:off x="5188400" y="487803"/>
-            <a:ext cx="431053" cy="758550"/>
+            <a:off x="5243432" y="542836"/>
+            <a:ext cx="431053" cy="648485"/>
           </a:xfrm>
           <a:prstGeom prst="bentConnector2">
             <a:avLst/>
@@ -6675,8 +6091,8 @@
         </p:nvCxnSpPr>
         <p:spPr>
           <a:xfrm>
-            <a:off x="6960944" y="1099100"/>
-            <a:ext cx="0" cy="259567"/>
+            <a:off x="6960944" y="1095125"/>
+            <a:ext cx="0" cy="263542"/>
           </a:xfrm>
           <a:prstGeom prst="line">
             <a:avLst/>
@@ -6720,7 +6136,7 @@
         <p:spPr>
           <a:xfrm>
             <a:off x="6516575" y="560757"/>
-            <a:ext cx="888737" cy="538343"/>
+            <a:ext cx="888737" cy="534368"/>
           </a:xfrm>
           <a:prstGeom prst="rect">
             <a:avLst/>
@@ -6744,22 +6160,7 @@
                   <a:srgbClr val="FF0000"/>
                 </a:solidFill>
               </a:rPr>
-              <a:t>First</a:t>
-            </a:r>
-            <a:br>
-              <a:rPr lang="en-US" altLang="zh-CN" sz="1600" b="1" dirty="0">
-                <a:solidFill>
-                  <a:srgbClr val="FF0000"/>
-                </a:solidFill>
-              </a:rPr>
-            </a:br>
-            <a:r>
-              <a:rPr lang="en-US" altLang="zh-CN" sz="1600" b="1" dirty="0">
-                <a:solidFill>
-                  <a:srgbClr val="FF0000"/>
-                </a:solidFill>
-              </a:rPr>
-              <a:t>LED</a:t>
+              <a:t>Set First LED</a:t>
             </a:r>
             <a:endParaRPr lang="zh-CN" altLang="en-US" sz="1600" b="1" dirty="0">
               <a:solidFill>
@@ -6856,7 +6257,7 @@
                   <a:srgbClr val="00B050"/>
                 </a:solidFill>
               </a:rPr>
-              <a:t>Last</a:t>
+              <a:t>Set Last</a:t>
             </a:r>
             <a:br>
               <a:rPr lang="en-US" altLang="zh-CN" sz="1600" b="1" dirty="0">
@@ -7179,8 +6580,8 @@
         </p:nvSpPr>
         <p:spPr>
           <a:xfrm>
-            <a:off x="10242550" y="254029"/>
-            <a:ext cx="1397059" cy="742374"/>
+            <a:off x="10222847" y="626864"/>
+            <a:ext cx="1397059" cy="406128"/>
           </a:xfrm>
           <a:prstGeom prst="rect">
             <a:avLst/>
@@ -7212,10 +6613,10 @@
             <a:r>
               <a:rPr lang="en-US" altLang="zh-CN" sz="1200" b="1" dirty="0">
                 <a:solidFill>
-                  <a:srgbClr val="009E47"/>
+                  <a:srgbClr val="00B0F0"/>
                 </a:solidFill>
               </a:rPr>
-              <a:t>Analog</a:t>
+              <a:t>Normal</a:t>
             </a:r>
           </a:p>
           <a:p>
@@ -7227,42 +6628,12 @@
             <a:r>
               <a:rPr lang="en-US" altLang="zh-CN" sz="1200" b="1" dirty="0">
                 <a:solidFill>
-                  <a:srgbClr val="FF0000"/>
-                </a:solidFill>
-              </a:rPr>
-              <a:t>Analog Reversed</a:t>
-            </a:r>
-          </a:p>
-          <a:p>
-            <a:pPr>
-              <a:lnSpc>
-                <a:spcPts val="1300"/>
-              </a:lnSpc>
-            </a:pPr>
-            <a:r>
-              <a:rPr lang="en-US" altLang="zh-CN" sz="1200" b="1" dirty="0">
-                <a:solidFill>
-                  <a:srgbClr val="00B0F0"/>
-                </a:solidFill>
-              </a:rPr>
-              <a:t>I2C</a:t>
-            </a:r>
-          </a:p>
-          <a:p>
-            <a:pPr>
-              <a:lnSpc>
-                <a:spcPts val="1300"/>
-              </a:lnSpc>
-            </a:pPr>
-            <a:r>
-              <a:rPr lang="en-US" altLang="zh-CN" sz="1200" b="1" dirty="0">
-                <a:solidFill>
                   <a:schemeClr val="accent4">
                     <a:lumMod val="75000"/>
                   </a:schemeClr>
                 </a:solidFill>
               </a:rPr>
-              <a:t>I2C Reversed</a:t>
+              <a:t>Reversed</a:t>
             </a:r>
             <a:endParaRPr lang="zh-CN" altLang="en-US" sz="1200" b="1" dirty="0">
               <a:solidFill>
@@ -7292,8 +6663,8 @@
         </p:nvCxnSpPr>
         <p:spPr>
           <a:xfrm flipV="1">
-            <a:off x="9810521" y="625216"/>
-            <a:ext cx="432029" cy="204713"/>
+            <a:off x="9810521" y="829928"/>
+            <a:ext cx="412326" cy="1"/>
           </a:xfrm>
           <a:prstGeom prst="bentConnector3">
             <a:avLst>
@@ -8264,1462 +7635,6 @@
     <p:extLst>
       <p:ext uri="{BB962C8B-B14F-4D97-AF65-F5344CB8AC3E}">
         <p14:creationId xmlns:p14="http://schemas.microsoft.com/office/powerpoint/2010/main" val="2700147817"/>
-      </p:ext>
-    </p:extLst>
-  </p:cSld>
-  <p:clrMapOvr>
-    <a:masterClrMapping/>
-  </p:clrMapOvr>
-</p:sld>
-</file>
-
-<file path=ppt/slides/slide6.xml><?xml version="1.0" encoding="utf-8"?>
-<p:sld xmlns:a="http://schemas.openxmlformats.org/drawingml/2006/main" xmlns:r="http://schemas.openxmlformats.org/officeDocument/2006/relationships" xmlns:p="http://schemas.openxmlformats.org/presentationml/2006/main">
-  <p:cSld>
-    <p:spTree>
-      <p:nvGrpSpPr>
-        <p:cNvPr id="1" name=""/>
-        <p:cNvGrpSpPr/>
-        <p:nvPr/>
-      </p:nvGrpSpPr>
-      <p:grpSpPr>
-        <a:xfrm>
-          <a:off x="0" y="0"/>
-          <a:ext cx="0" cy="0"/>
-          <a:chOff x="0" y="0"/>
-          <a:chExt cx="0" cy="0"/>
-        </a:xfrm>
-      </p:grpSpPr>
-      <p:sp>
-        <p:nvSpPr>
-          <p:cNvPr id="2" name="左大括号 1">
-            <a:extLst>
-              <a:ext uri="{FF2B5EF4-FFF2-40B4-BE49-F238E27FC236}">
-                <a16:creationId xmlns:a16="http://schemas.microsoft.com/office/drawing/2014/main" id="{6908500C-1B25-A058-D061-01A508D62675}"/>
-              </a:ext>
-            </a:extLst>
-          </p:cNvPr>
-          <p:cNvSpPr/>
-          <p:nvPr/>
-        </p:nvSpPr>
-        <p:spPr>
-          <a:xfrm rot="5400000">
-            <a:off x="7988718" y="-404158"/>
-            <a:ext cx="389999" cy="2992134"/>
-          </a:xfrm>
-          <a:prstGeom prst="leftBrace">
-            <a:avLst>
-              <a:gd name="adj1" fmla="val 21655"/>
-              <a:gd name="adj2" fmla="val 49829"/>
-            </a:avLst>
-          </a:prstGeom>
-          <a:ln w="28575">
-            <a:solidFill>
-              <a:srgbClr val="2F5597">
-                <a:alpha val="69804"/>
-              </a:srgbClr>
-            </a:solidFill>
-          </a:ln>
-        </p:spPr>
-        <p:style>
-          <a:lnRef idx="1">
-            <a:schemeClr val="accent1"/>
-          </a:lnRef>
-          <a:fillRef idx="0">
-            <a:schemeClr val="accent1"/>
-          </a:fillRef>
-          <a:effectRef idx="0">
-            <a:schemeClr val="accent1"/>
-          </a:effectRef>
-          <a:fontRef idx="minor">
-            <a:schemeClr val="tx1"/>
-          </a:fontRef>
-        </p:style>
-        <p:txBody>
-          <a:bodyPr rtlCol="0" anchor="ctr"/>
-          <a:lstStyle/>
-          <a:p>
-            <a:pPr algn="ctr"/>
-            <a:endParaRPr lang="zh-CN" altLang="en-US"/>
-          </a:p>
-        </p:txBody>
-      </p:sp>
-      <p:sp>
-        <p:nvSpPr>
-          <p:cNvPr id="3" name="标题 2">
-            <a:extLst>
-              <a:ext uri="{FF2B5EF4-FFF2-40B4-BE49-F238E27FC236}">
-                <a16:creationId xmlns:a16="http://schemas.microsoft.com/office/drawing/2014/main" id="{88873DDC-2AA2-EE3F-414F-7B75CE3921FD}"/>
-              </a:ext>
-            </a:extLst>
-          </p:cNvPr>
-          <p:cNvSpPr>
-            <a:spLocks noGrp="1"/>
-          </p:cNvSpPr>
-          <p:nvPr>
-            <p:ph type="title"/>
-          </p:nvPr>
-        </p:nvSpPr>
-        <p:spPr/>
-        <p:txBody>
-          <a:bodyPr/>
-          <a:lstStyle/>
-          <a:p>
-            <a:r>
-              <a:rPr lang="en-US" altLang="zh-CN" dirty="0"/>
-              <a:t>EFFECT MODE</a:t>
-            </a:r>
-            <a:endParaRPr lang="zh-CN" altLang="en-US" dirty="0"/>
-          </a:p>
-        </p:txBody>
-      </p:sp>
-      <p:sp>
-        <p:nvSpPr>
-          <p:cNvPr id="4" name="矩形: 圆角 3">
-            <a:extLst>
-              <a:ext uri="{FF2B5EF4-FFF2-40B4-BE49-F238E27FC236}">
-                <a16:creationId xmlns:a16="http://schemas.microsoft.com/office/drawing/2014/main" id="{0CB77F11-2A4B-483F-D41F-CC84B1F47586}"/>
-              </a:ext>
-            </a:extLst>
-          </p:cNvPr>
-          <p:cNvSpPr/>
-          <p:nvPr/>
-        </p:nvSpPr>
-        <p:spPr>
-          <a:xfrm>
-            <a:off x="9928225" y="1536695"/>
-            <a:ext cx="190500" cy="203200"/>
-          </a:xfrm>
-          <a:prstGeom prst="roundRect">
-            <a:avLst/>
-          </a:prstGeom>
-          <a:solidFill>
-            <a:srgbClr val="FF0000">
-              <a:alpha val="50196"/>
-            </a:srgbClr>
-          </a:solidFill>
-          <a:ln>
-            <a:noFill/>
-          </a:ln>
-        </p:spPr>
-        <p:style>
-          <a:lnRef idx="2">
-            <a:schemeClr val="accent1">
-              <a:shade val="50000"/>
-            </a:schemeClr>
-          </a:lnRef>
-          <a:fillRef idx="1">
-            <a:schemeClr val="accent1"/>
-          </a:fillRef>
-          <a:effectRef idx="0">
-            <a:schemeClr val="accent1"/>
-          </a:effectRef>
-          <a:fontRef idx="minor">
-            <a:schemeClr val="lt1"/>
-          </a:fontRef>
-        </p:style>
-        <p:txBody>
-          <a:bodyPr rtlCol="0" anchor="ctr"/>
-          <a:lstStyle/>
-          <a:p>
-            <a:pPr algn="ctr"/>
-            <a:endParaRPr lang="zh-CN" altLang="en-US"/>
-          </a:p>
-        </p:txBody>
-      </p:sp>
-      <p:sp>
-        <p:nvSpPr>
-          <p:cNvPr id="7" name="矩形: 圆角 6">
-            <a:extLst>
-              <a:ext uri="{FF2B5EF4-FFF2-40B4-BE49-F238E27FC236}">
-                <a16:creationId xmlns:a16="http://schemas.microsoft.com/office/drawing/2014/main" id="{032457AE-E0B6-8C09-5CCA-1E12685611C9}"/>
-              </a:ext>
-            </a:extLst>
-          </p:cNvPr>
-          <p:cNvSpPr/>
-          <p:nvPr/>
-        </p:nvSpPr>
-        <p:spPr>
-          <a:xfrm>
-            <a:off x="10202862" y="1536695"/>
-            <a:ext cx="190500" cy="203200"/>
-          </a:xfrm>
-          <a:prstGeom prst="roundRect">
-            <a:avLst/>
-          </a:prstGeom>
-          <a:solidFill>
-            <a:srgbClr val="00B050">
-              <a:alpha val="69804"/>
-            </a:srgbClr>
-          </a:solidFill>
-          <a:ln>
-            <a:noFill/>
-          </a:ln>
-        </p:spPr>
-        <p:style>
-          <a:lnRef idx="2">
-            <a:schemeClr val="accent1">
-              <a:shade val="50000"/>
-            </a:schemeClr>
-          </a:lnRef>
-          <a:fillRef idx="1">
-            <a:schemeClr val="accent1"/>
-          </a:fillRef>
-          <a:effectRef idx="0">
-            <a:schemeClr val="accent1"/>
-          </a:effectRef>
-          <a:fontRef idx="minor">
-            <a:schemeClr val="lt1"/>
-          </a:fontRef>
-        </p:style>
-        <p:txBody>
-          <a:bodyPr rtlCol="0" anchor="ctr"/>
-          <a:lstStyle/>
-          <a:p>
-            <a:pPr algn="ctr"/>
-            <a:endParaRPr lang="zh-CN" altLang="en-US"/>
-          </a:p>
-        </p:txBody>
-      </p:sp>
-      <p:sp>
-        <p:nvSpPr>
-          <p:cNvPr id="21" name="文本框 20">
-            <a:extLst>
-              <a:ext uri="{FF2B5EF4-FFF2-40B4-BE49-F238E27FC236}">
-                <a16:creationId xmlns:a16="http://schemas.microsoft.com/office/drawing/2014/main" id="{8E6E2637-9F6C-3912-359C-68A8EA1C1110}"/>
-              </a:ext>
-            </a:extLst>
-          </p:cNvPr>
-          <p:cNvSpPr txBox="1"/>
-          <p:nvPr/>
-        </p:nvSpPr>
-        <p:spPr>
-          <a:xfrm>
-            <a:off x="6958012" y="619596"/>
-            <a:ext cx="2447926" cy="318924"/>
-          </a:xfrm>
-          <a:prstGeom prst="rect">
-            <a:avLst/>
-          </a:prstGeom>
-          <a:noFill/>
-        </p:spPr>
-        <p:txBody>
-          <a:bodyPr wrap="square" lIns="36000" tIns="36000" rIns="36000" bIns="36000" rtlCol="0">
-            <a:spAutoFit/>
-          </a:bodyPr>
-          <a:lstStyle/>
-          <a:p>
-            <a:pPr algn="ctr"/>
-            <a:r>
-              <a:rPr lang="en-US" altLang="zh-CN" sz="1600" b="1" dirty="0">
-                <a:solidFill>
-                  <a:schemeClr val="accent1">
-                    <a:lumMod val="75000"/>
-                  </a:schemeClr>
-                </a:solidFill>
-              </a:rPr>
-              <a:t>Channel Selection</a:t>
-            </a:r>
-            <a:endParaRPr lang="zh-CN" altLang="en-US" sz="1600" b="1" dirty="0">
-              <a:solidFill>
-                <a:schemeClr val="accent1">
-                  <a:lumMod val="75000"/>
-                </a:schemeClr>
-              </a:solidFill>
-            </a:endParaRPr>
-          </a:p>
-        </p:txBody>
-      </p:sp>
-      <p:sp>
-        <p:nvSpPr>
-          <p:cNvPr id="22" name="矩形: 圆角 21">
-            <a:extLst>
-              <a:ext uri="{FF2B5EF4-FFF2-40B4-BE49-F238E27FC236}">
-                <a16:creationId xmlns:a16="http://schemas.microsoft.com/office/drawing/2014/main" id="{8F7F3EF8-8465-2BA2-34EA-E2E92219F49D}"/>
-              </a:ext>
-            </a:extLst>
-          </p:cNvPr>
-          <p:cNvSpPr/>
-          <p:nvPr/>
-        </p:nvSpPr>
-        <p:spPr>
-          <a:xfrm>
-            <a:off x="6687650" y="1354432"/>
-            <a:ext cx="546588" cy="559594"/>
-          </a:xfrm>
-          <a:prstGeom prst="roundRect">
-            <a:avLst>
-              <a:gd name="adj" fmla="val 9697"/>
-            </a:avLst>
-          </a:prstGeom>
-          <a:solidFill>
-            <a:schemeClr val="accent1">
-              <a:lumMod val="60000"/>
-              <a:lumOff val="40000"/>
-              <a:alpha val="50196"/>
-            </a:schemeClr>
-          </a:solidFill>
-          <a:ln>
-            <a:noFill/>
-          </a:ln>
-        </p:spPr>
-        <p:style>
-          <a:lnRef idx="2">
-            <a:schemeClr val="accent1">
-              <a:shade val="50000"/>
-            </a:schemeClr>
-          </a:lnRef>
-          <a:fillRef idx="1">
-            <a:schemeClr val="accent1"/>
-          </a:fillRef>
-          <a:effectRef idx="0">
-            <a:schemeClr val="accent1"/>
-          </a:effectRef>
-          <a:fontRef idx="minor">
-            <a:schemeClr val="lt1"/>
-          </a:fontRef>
-        </p:style>
-        <p:txBody>
-          <a:bodyPr rtlCol="0" anchor="ctr"/>
-          <a:lstStyle/>
-          <a:p>
-            <a:pPr algn="ctr"/>
-            <a:endParaRPr lang="zh-CN" altLang="en-US"/>
-          </a:p>
-        </p:txBody>
-      </p:sp>
-      <p:sp>
-        <p:nvSpPr>
-          <p:cNvPr id="24" name="矩形: 圆角 23">
-            <a:extLst>
-              <a:ext uri="{FF2B5EF4-FFF2-40B4-BE49-F238E27FC236}">
-                <a16:creationId xmlns:a16="http://schemas.microsoft.com/office/drawing/2014/main" id="{29AB74B2-5405-393B-F951-26391C546C7C}"/>
-              </a:ext>
-            </a:extLst>
-          </p:cNvPr>
-          <p:cNvSpPr/>
-          <p:nvPr/>
-        </p:nvSpPr>
-        <p:spPr>
-          <a:xfrm>
-            <a:off x="7504419" y="1354432"/>
-            <a:ext cx="546588" cy="559594"/>
-          </a:xfrm>
-          <a:prstGeom prst="roundRect">
-            <a:avLst>
-              <a:gd name="adj" fmla="val 9697"/>
-            </a:avLst>
-          </a:prstGeom>
-          <a:solidFill>
-            <a:schemeClr val="accent1">
-              <a:lumMod val="60000"/>
-              <a:lumOff val="40000"/>
-              <a:alpha val="50196"/>
-            </a:schemeClr>
-          </a:solidFill>
-          <a:ln>
-            <a:noFill/>
-          </a:ln>
-        </p:spPr>
-        <p:style>
-          <a:lnRef idx="2">
-            <a:schemeClr val="accent1">
-              <a:shade val="50000"/>
-            </a:schemeClr>
-          </a:lnRef>
-          <a:fillRef idx="1">
-            <a:schemeClr val="accent1"/>
-          </a:fillRef>
-          <a:effectRef idx="0">
-            <a:schemeClr val="accent1"/>
-          </a:effectRef>
-          <a:fontRef idx="minor">
-            <a:schemeClr val="lt1"/>
-          </a:fontRef>
-        </p:style>
-        <p:txBody>
-          <a:bodyPr rtlCol="0" anchor="ctr"/>
-          <a:lstStyle/>
-          <a:p>
-            <a:pPr algn="ctr"/>
-            <a:endParaRPr lang="zh-CN" altLang="en-US"/>
-          </a:p>
-        </p:txBody>
-      </p:sp>
-      <p:sp>
-        <p:nvSpPr>
-          <p:cNvPr id="25" name="矩形: 圆角 24">
-            <a:extLst>
-              <a:ext uri="{FF2B5EF4-FFF2-40B4-BE49-F238E27FC236}">
-                <a16:creationId xmlns:a16="http://schemas.microsoft.com/office/drawing/2014/main" id="{46AB61B0-A47A-5483-B1E8-851C74F8C2D8}"/>
-              </a:ext>
-            </a:extLst>
-          </p:cNvPr>
-          <p:cNvSpPr/>
-          <p:nvPr/>
-        </p:nvSpPr>
-        <p:spPr>
-          <a:xfrm>
-            <a:off x="8321188" y="1354432"/>
-            <a:ext cx="546588" cy="559594"/>
-          </a:xfrm>
-          <a:prstGeom prst="roundRect">
-            <a:avLst>
-              <a:gd name="adj" fmla="val 9697"/>
-            </a:avLst>
-          </a:prstGeom>
-          <a:solidFill>
-            <a:schemeClr val="accent1">
-              <a:lumMod val="60000"/>
-              <a:lumOff val="40000"/>
-              <a:alpha val="50196"/>
-            </a:schemeClr>
-          </a:solidFill>
-          <a:ln>
-            <a:noFill/>
-          </a:ln>
-        </p:spPr>
-        <p:style>
-          <a:lnRef idx="2">
-            <a:schemeClr val="accent1">
-              <a:shade val="50000"/>
-            </a:schemeClr>
-          </a:lnRef>
-          <a:fillRef idx="1">
-            <a:schemeClr val="accent1"/>
-          </a:fillRef>
-          <a:effectRef idx="0">
-            <a:schemeClr val="accent1"/>
-          </a:effectRef>
-          <a:fontRef idx="minor">
-            <a:schemeClr val="lt1"/>
-          </a:fontRef>
-        </p:style>
-        <p:txBody>
-          <a:bodyPr rtlCol="0" anchor="ctr"/>
-          <a:lstStyle/>
-          <a:p>
-            <a:pPr algn="ctr"/>
-            <a:endParaRPr lang="zh-CN" altLang="en-US"/>
-          </a:p>
-        </p:txBody>
-      </p:sp>
-      <p:sp>
-        <p:nvSpPr>
-          <p:cNvPr id="26" name="矩形: 圆角 25">
-            <a:extLst>
-              <a:ext uri="{FF2B5EF4-FFF2-40B4-BE49-F238E27FC236}">
-                <a16:creationId xmlns:a16="http://schemas.microsoft.com/office/drawing/2014/main" id="{907594F9-BBE9-7DB8-DD22-C72E7397185E}"/>
-              </a:ext>
-            </a:extLst>
-          </p:cNvPr>
-          <p:cNvSpPr/>
-          <p:nvPr/>
-        </p:nvSpPr>
-        <p:spPr>
-          <a:xfrm>
-            <a:off x="9133195" y="1354432"/>
-            <a:ext cx="546588" cy="559594"/>
-          </a:xfrm>
-          <a:prstGeom prst="roundRect">
-            <a:avLst>
-              <a:gd name="adj" fmla="val 9697"/>
-            </a:avLst>
-          </a:prstGeom>
-          <a:solidFill>
-            <a:schemeClr val="accent1">
-              <a:lumMod val="60000"/>
-              <a:lumOff val="40000"/>
-              <a:alpha val="50196"/>
-            </a:schemeClr>
-          </a:solidFill>
-          <a:ln>
-            <a:noFill/>
-          </a:ln>
-        </p:spPr>
-        <p:style>
-          <a:lnRef idx="2">
-            <a:schemeClr val="accent1">
-              <a:shade val="50000"/>
-            </a:schemeClr>
-          </a:lnRef>
-          <a:fillRef idx="1">
-            <a:schemeClr val="accent1"/>
-          </a:fillRef>
-          <a:effectRef idx="0">
-            <a:schemeClr val="accent1"/>
-          </a:effectRef>
-          <a:fontRef idx="minor">
-            <a:schemeClr val="lt1"/>
-          </a:fontRef>
-        </p:style>
-        <p:txBody>
-          <a:bodyPr rtlCol="0" anchor="ctr"/>
-          <a:lstStyle/>
-          <a:p>
-            <a:pPr algn="ctr"/>
-            <a:endParaRPr lang="zh-CN" altLang="en-US"/>
-          </a:p>
-        </p:txBody>
-      </p:sp>
-      <p:sp>
-        <p:nvSpPr>
-          <p:cNvPr id="23" name="文本框 22">
-            <a:extLst>
-              <a:ext uri="{FF2B5EF4-FFF2-40B4-BE49-F238E27FC236}">
-                <a16:creationId xmlns:a16="http://schemas.microsoft.com/office/drawing/2014/main" id="{D10518B1-8FB2-4909-443A-D16845752C94}"/>
-              </a:ext>
-            </a:extLst>
-          </p:cNvPr>
-          <p:cNvSpPr txBox="1"/>
-          <p:nvPr/>
-        </p:nvSpPr>
-        <p:spPr>
-          <a:xfrm>
-            <a:off x="4453921" y="1077866"/>
-            <a:ext cx="1038549" cy="318924"/>
-          </a:xfrm>
-          <a:prstGeom prst="rect">
-            <a:avLst/>
-          </a:prstGeom>
-          <a:noFill/>
-        </p:spPr>
-        <p:txBody>
-          <a:bodyPr wrap="square" lIns="36000" tIns="36000" rIns="36000" bIns="36000" rtlCol="0">
-            <a:spAutoFit/>
-          </a:bodyPr>
-          <a:lstStyle/>
-          <a:p>
-            <a:pPr algn="ctr"/>
-            <a:r>
-              <a:rPr lang="en-US" altLang="zh-CN" sz="1600" b="1" dirty="0">
-                <a:solidFill>
-                  <a:schemeClr val="accent1">
-                    <a:lumMod val="75000"/>
-                  </a:schemeClr>
-                </a:solidFill>
-              </a:rPr>
-              <a:t>Dial</a:t>
-            </a:r>
-            <a:endParaRPr lang="zh-CN" altLang="en-US" sz="1600" b="1" dirty="0">
-              <a:solidFill>
-                <a:schemeClr val="accent1">
-                  <a:lumMod val="75000"/>
-                </a:schemeClr>
-              </a:solidFill>
-            </a:endParaRPr>
-          </a:p>
-        </p:txBody>
-      </p:sp>
-      <p:sp>
-        <p:nvSpPr>
-          <p:cNvPr id="33" name="箭头: 左 32">
-            <a:extLst>
-              <a:ext uri="{FF2B5EF4-FFF2-40B4-BE49-F238E27FC236}">
-                <a16:creationId xmlns:a16="http://schemas.microsoft.com/office/drawing/2014/main" id="{14B2FFD5-F8BF-CBAD-9ADE-4EDFF88CC7E8}"/>
-              </a:ext>
-            </a:extLst>
-          </p:cNvPr>
-          <p:cNvSpPr/>
-          <p:nvPr/>
-        </p:nvSpPr>
-        <p:spPr>
-          <a:xfrm rot="2159241">
-            <a:off x="4250152" y="784758"/>
-            <a:ext cx="437078" cy="304655"/>
-          </a:xfrm>
-          <a:prstGeom prst="leftArrow">
-            <a:avLst/>
-          </a:prstGeom>
-          <a:noFill/>
-          <a:ln w="28575">
-            <a:solidFill>
-              <a:srgbClr val="2F528F">
-                <a:alpha val="69804"/>
-              </a:srgbClr>
-            </a:solidFill>
-          </a:ln>
-        </p:spPr>
-        <p:style>
-          <a:lnRef idx="2">
-            <a:schemeClr val="accent1">
-              <a:shade val="50000"/>
-            </a:schemeClr>
-          </a:lnRef>
-          <a:fillRef idx="1">
-            <a:schemeClr val="accent1"/>
-          </a:fillRef>
-          <a:effectRef idx="0">
-            <a:schemeClr val="accent1"/>
-          </a:effectRef>
-          <a:fontRef idx="minor">
-            <a:schemeClr val="lt1"/>
-          </a:fontRef>
-        </p:style>
-        <p:txBody>
-          <a:bodyPr rtlCol="0" anchor="ctr"/>
-          <a:lstStyle/>
-          <a:p>
-            <a:pPr algn="ctr"/>
-            <a:endParaRPr lang="zh-CN" altLang="en-US"/>
-          </a:p>
-        </p:txBody>
-      </p:sp>
-      <p:sp>
-        <p:nvSpPr>
-          <p:cNvPr id="34" name="箭头: 左 33">
-            <a:extLst>
-              <a:ext uri="{FF2B5EF4-FFF2-40B4-BE49-F238E27FC236}">
-                <a16:creationId xmlns:a16="http://schemas.microsoft.com/office/drawing/2014/main" id="{EC28EFDC-B25E-4586-C6D9-15C2737210FB}"/>
-              </a:ext>
-            </a:extLst>
-          </p:cNvPr>
-          <p:cNvSpPr/>
-          <p:nvPr/>
-        </p:nvSpPr>
-        <p:spPr>
-          <a:xfrm rot="13792854">
-            <a:off x="5113504" y="1527817"/>
-            <a:ext cx="437078" cy="304655"/>
-          </a:xfrm>
-          <a:prstGeom prst="leftArrow">
-            <a:avLst/>
-          </a:prstGeom>
-          <a:noFill/>
-          <a:ln w="28575">
-            <a:solidFill>
-              <a:srgbClr val="2F528F">
-                <a:alpha val="69804"/>
-              </a:srgbClr>
-            </a:solidFill>
-          </a:ln>
-        </p:spPr>
-        <p:style>
-          <a:lnRef idx="2">
-            <a:schemeClr val="accent1">
-              <a:shade val="50000"/>
-            </a:schemeClr>
-          </a:lnRef>
-          <a:fillRef idx="1">
-            <a:schemeClr val="accent1"/>
-          </a:fillRef>
-          <a:effectRef idx="0">
-            <a:schemeClr val="accent1"/>
-          </a:effectRef>
-          <a:fontRef idx="minor">
-            <a:schemeClr val="lt1"/>
-          </a:fontRef>
-        </p:style>
-        <p:txBody>
-          <a:bodyPr rtlCol="0" anchor="ctr"/>
-          <a:lstStyle/>
-          <a:p>
-            <a:pPr algn="ctr"/>
-            <a:endParaRPr lang="zh-CN" altLang="en-US"/>
-          </a:p>
-        </p:txBody>
-      </p:sp>
-      <p:sp>
-        <p:nvSpPr>
-          <p:cNvPr id="51" name="文本框 50">
-            <a:extLst>
-              <a:ext uri="{FF2B5EF4-FFF2-40B4-BE49-F238E27FC236}">
-                <a16:creationId xmlns:a16="http://schemas.microsoft.com/office/drawing/2014/main" id="{C33F7BC1-118F-FBD3-CAB3-07FA0DDA8442}"/>
-              </a:ext>
-            </a:extLst>
-          </p:cNvPr>
-          <p:cNvSpPr txBox="1"/>
-          <p:nvPr/>
-        </p:nvSpPr>
-        <p:spPr>
-          <a:xfrm>
-            <a:off x="10945773" y="1517379"/>
-            <a:ext cx="446991" cy="246221"/>
-          </a:xfrm>
-          <a:prstGeom prst="rect">
-            <a:avLst/>
-          </a:prstGeom>
-          <a:noFill/>
-        </p:spPr>
-        <p:txBody>
-          <a:bodyPr wrap="square" lIns="36000" tIns="0" rIns="36000" bIns="0" rtlCol="0">
-            <a:spAutoFit/>
-          </a:bodyPr>
-          <a:lstStyle/>
-          <a:p>
-            <a:r>
-              <a:rPr lang="en-US" altLang="zh-CN" sz="1600" b="1" dirty="0">
-                <a:solidFill>
-                  <a:srgbClr val="00B050"/>
-                </a:solidFill>
-              </a:rPr>
-              <a:t>OK</a:t>
-            </a:r>
-            <a:endParaRPr lang="zh-CN" altLang="en-US" sz="1600" b="1" dirty="0">
-              <a:solidFill>
-                <a:srgbClr val="00B050"/>
-              </a:solidFill>
-            </a:endParaRPr>
-          </a:p>
-        </p:txBody>
-      </p:sp>
-      <p:cxnSp>
-        <p:nvCxnSpPr>
-          <p:cNvPr id="52" name="直接连接符 51">
-            <a:extLst>
-              <a:ext uri="{FF2B5EF4-FFF2-40B4-BE49-F238E27FC236}">
-                <a16:creationId xmlns:a16="http://schemas.microsoft.com/office/drawing/2014/main" id="{96870965-64D5-C1FD-AD15-ECF96F002226}"/>
-              </a:ext>
-            </a:extLst>
-          </p:cNvPr>
-          <p:cNvCxnSpPr>
-            <a:cxnSpLocks/>
-            <a:stCxn id="7" idx="3"/>
-            <a:endCxn id="51" idx="1"/>
-          </p:cNvCxnSpPr>
-          <p:nvPr/>
-        </p:nvCxnSpPr>
-        <p:spPr>
-          <a:xfrm>
-            <a:off x="10393362" y="1638295"/>
-            <a:ext cx="552411" cy="2195"/>
-          </a:xfrm>
-          <a:prstGeom prst="line">
-            <a:avLst/>
-          </a:prstGeom>
-          <a:ln w="28575">
-            <a:solidFill>
-              <a:srgbClr val="00B050">
-                <a:alpha val="69804"/>
-              </a:srgbClr>
-            </a:solidFill>
-            <a:prstDash val="sysDot"/>
-          </a:ln>
-        </p:spPr>
-        <p:style>
-          <a:lnRef idx="1">
-            <a:schemeClr val="accent1"/>
-          </a:lnRef>
-          <a:fillRef idx="0">
-            <a:schemeClr val="accent1"/>
-          </a:fillRef>
-          <a:effectRef idx="0">
-            <a:schemeClr val="accent1"/>
-          </a:effectRef>
-          <a:fontRef idx="minor">
-            <a:schemeClr val="tx1"/>
-          </a:fontRef>
-        </p:style>
-      </p:cxnSp>
-      <p:sp>
-        <p:nvSpPr>
-          <p:cNvPr id="59" name="左大括号 58">
-            <a:extLst>
-              <a:ext uri="{FF2B5EF4-FFF2-40B4-BE49-F238E27FC236}">
-                <a16:creationId xmlns:a16="http://schemas.microsoft.com/office/drawing/2014/main" id="{3ECF3BE2-3F69-3DED-23ED-5AC971995BBD}"/>
-              </a:ext>
-            </a:extLst>
-          </p:cNvPr>
-          <p:cNvSpPr/>
-          <p:nvPr/>
-        </p:nvSpPr>
-        <p:spPr>
-          <a:xfrm rot="16200000">
-            <a:off x="8380727" y="3301847"/>
-            <a:ext cx="389999" cy="3776150"/>
-          </a:xfrm>
-          <a:prstGeom prst="leftBrace">
-            <a:avLst>
-              <a:gd name="adj1" fmla="val 21655"/>
-              <a:gd name="adj2" fmla="val 49829"/>
-            </a:avLst>
-          </a:prstGeom>
-          <a:ln w="28575">
-            <a:solidFill>
-              <a:schemeClr val="accent4">
-                <a:lumMod val="75000"/>
-                <a:alpha val="69804"/>
-              </a:schemeClr>
-            </a:solidFill>
-          </a:ln>
-        </p:spPr>
-        <p:style>
-          <a:lnRef idx="1">
-            <a:schemeClr val="accent1"/>
-          </a:lnRef>
-          <a:fillRef idx="0">
-            <a:schemeClr val="accent1"/>
-          </a:fillRef>
-          <a:effectRef idx="0">
-            <a:schemeClr val="accent1"/>
-          </a:effectRef>
-          <a:fontRef idx="minor">
-            <a:schemeClr val="tx1"/>
-          </a:fontRef>
-        </p:style>
-        <p:txBody>
-          <a:bodyPr rtlCol="0" anchor="ctr"/>
-          <a:lstStyle/>
-          <a:p>
-            <a:pPr algn="ctr"/>
-            <a:endParaRPr lang="zh-CN" altLang="en-US"/>
-          </a:p>
-        </p:txBody>
-      </p:sp>
-      <p:sp>
-        <p:nvSpPr>
-          <p:cNvPr id="60" name="文本框 59">
-            <a:extLst>
-              <a:ext uri="{FF2B5EF4-FFF2-40B4-BE49-F238E27FC236}">
-                <a16:creationId xmlns:a16="http://schemas.microsoft.com/office/drawing/2014/main" id="{B7FEA82D-F01C-777F-5444-E01C2DC34F65}"/>
-              </a:ext>
-            </a:extLst>
-          </p:cNvPr>
-          <p:cNvSpPr txBox="1"/>
-          <p:nvPr/>
-        </p:nvSpPr>
-        <p:spPr>
-          <a:xfrm>
-            <a:off x="7526908" y="5393376"/>
-            <a:ext cx="2085483" cy="349702"/>
-          </a:xfrm>
-          <a:prstGeom prst="rect">
-            <a:avLst/>
-          </a:prstGeom>
-          <a:noFill/>
-        </p:spPr>
-        <p:txBody>
-          <a:bodyPr wrap="square" lIns="36000" tIns="36000" rIns="36000" bIns="36000" rtlCol="0">
-            <a:spAutoFit/>
-          </a:bodyPr>
-          <a:lstStyle>
-            <a:defPPr>
-              <a:defRPr lang="zh-CN"/>
-            </a:defPPr>
-            <a:lvl1pPr algn="ctr">
-              <a:defRPr sz="1600" b="1">
-                <a:solidFill>
-                  <a:schemeClr val="accent4">
-                    <a:lumMod val="75000"/>
-                  </a:schemeClr>
-                </a:solidFill>
-              </a:defRPr>
-            </a:lvl1pPr>
-          </a:lstStyle>
-          <a:p>
-            <a:r>
-              <a:rPr lang="en-US" altLang="zh-CN" dirty="0"/>
-              <a:t>1-7 Quick Set</a:t>
-            </a:r>
-            <a:endParaRPr lang="zh-CN" altLang="en-US" dirty="0"/>
-          </a:p>
-        </p:txBody>
-      </p:sp>
-      <p:sp>
-        <p:nvSpPr>
-          <p:cNvPr id="61" name="矩形: 圆角 60">
-            <a:extLst>
-              <a:ext uri="{FF2B5EF4-FFF2-40B4-BE49-F238E27FC236}">
-                <a16:creationId xmlns:a16="http://schemas.microsoft.com/office/drawing/2014/main" id="{EB74DE4F-53BB-10A8-2355-D5EC60EAD3B7}"/>
-              </a:ext>
-            </a:extLst>
-          </p:cNvPr>
-          <p:cNvSpPr/>
-          <p:nvPr/>
-        </p:nvSpPr>
-        <p:spPr>
-          <a:xfrm>
-            <a:off x="7210835" y="2412706"/>
-            <a:ext cx="694445" cy="1120685"/>
-          </a:xfrm>
-          <a:prstGeom prst="roundRect">
-            <a:avLst>
-              <a:gd name="adj" fmla="val 9697"/>
-            </a:avLst>
-          </a:prstGeom>
-          <a:solidFill>
-            <a:schemeClr val="accent4">
-              <a:lumMod val="75000"/>
-              <a:alpha val="30196"/>
-            </a:schemeClr>
-          </a:solidFill>
-          <a:ln>
-            <a:noFill/>
-          </a:ln>
-        </p:spPr>
-        <p:style>
-          <a:lnRef idx="2">
-            <a:schemeClr val="accent1">
-              <a:shade val="50000"/>
-            </a:schemeClr>
-          </a:lnRef>
-          <a:fillRef idx="1">
-            <a:schemeClr val="accent1"/>
-          </a:fillRef>
-          <a:effectRef idx="0">
-            <a:schemeClr val="accent1"/>
-          </a:effectRef>
-          <a:fontRef idx="minor">
-            <a:schemeClr val="lt1"/>
-          </a:fontRef>
-        </p:style>
-        <p:txBody>
-          <a:bodyPr rtlCol="0" anchor="b"/>
-          <a:lstStyle/>
-          <a:p>
-            <a:pPr algn="ctr"/>
-            <a:r>
-              <a:rPr lang="en-US" altLang="zh-CN" sz="1300" b="1" dirty="0">
-                <a:solidFill>
-                  <a:schemeClr val="accent4">
-                    <a:lumMod val="75000"/>
-                  </a:schemeClr>
-                </a:solidFill>
-              </a:rPr>
-              <a:t>17%</a:t>
-            </a:r>
-            <a:endParaRPr lang="zh-CN" altLang="en-US" sz="1300" b="1" dirty="0">
-              <a:solidFill>
-                <a:schemeClr val="accent4">
-                  <a:lumMod val="75000"/>
-                </a:schemeClr>
-              </a:solidFill>
-            </a:endParaRPr>
-          </a:p>
-        </p:txBody>
-      </p:sp>
-      <p:sp>
-        <p:nvSpPr>
-          <p:cNvPr id="62" name="矩形: 圆角 61">
-            <a:extLst>
-              <a:ext uri="{FF2B5EF4-FFF2-40B4-BE49-F238E27FC236}">
-                <a16:creationId xmlns:a16="http://schemas.microsoft.com/office/drawing/2014/main" id="{82E1640C-BE63-4F09-3BEA-6369603F7ED7}"/>
-              </a:ext>
-            </a:extLst>
-          </p:cNvPr>
-          <p:cNvSpPr/>
-          <p:nvPr/>
-        </p:nvSpPr>
-        <p:spPr>
-          <a:xfrm>
-            <a:off x="8222426" y="2412706"/>
-            <a:ext cx="694445" cy="1120685"/>
-          </a:xfrm>
-          <a:prstGeom prst="roundRect">
-            <a:avLst>
-              <a:gd name="adj" fmla="val 9697"/>
-            </a:avLst>
-          </a:prstGeom>
-          <a:solidFill>
-            <a:schemeClr val="accent4">
-              <a:lumMod val="75000"/>
-              <a:alpha val="30196"/>
-            </a:schemeClr>
-          </a:solidFill>
-          <a:ln>
-            <a:noFill/>
-          </a:ln>
-        </p:spPr>
-        <p:style>
-          <a:lnRef idx="2">
-            <a:schemeClr val="accent1">
-              <a:shade val="50000"/>
-            </a:schemeClr>
-          </a:lnRef>
-          <a:fillRef idx="1">
-            <a:schemeClr val="accent1"/>
-          </a:fillRef>
-          <a:effectRef idx="0">
-            <a:schemeClr val="accent1"/>
-          </a:effectRef>
-          <a:fontRef idx="minor">
-            <a:schemeClr val="lt1"/>
-          </a:fontRef>
-        </p:style>
-        <p:txBody>
-          <a:bodyPr rtlCol="0" anchor="b"/>
-          <a:lstStyle/>
-          <a:p>
-            <a:pPr algn="ctr"/>
-            <a:r>
-              <a:rPr lang="en-US" altLang="zh-CN" sz="1300" b="1" dirty="0">
-                <a:solidFill>
-                  <a:schemeClr val="accent4">
-                    <a:lumMod val="75000"/>
-                  </a:schemeClr>
-                </a:solidFill>
-              </a:rPr>
-              <a:t>50%</a:t>
-            </a:r>
-            <a:endParaRPr lang="zh-CN" altLang="en-US" sz="1300" b="1" dirty="0">
-              <a:solidFill>
-                <a:schemeClr val="accent4">
-                  <a:lumMod val="75000"/>
-                </a:schemeClr>
-              </a:solidFill>
-            </a:endParaRPr>
-          </a:p>
-        </p:txBody>
-      </p:sp>
-      <p:sp>
-        <p:nvSpPr>
-          <p:cNvPr id="63" name="矩形: 圆角 62">
-            <a:extLst>
-              <a:ext uri="{FF2B5EF4-FFF2-40B4-BE49-F238E27FC236}">
-                <a16:creationId xmlns:a16="http://schemas.microsoft.com/office/drawing/2014/main" id="{C9C20ECA-008A-1283-AF1F-3920A4F726AD}"/>
-              </a:ext>
-            </a:extLst>
-          </p:cNvPr>
-          <p:cNvSpPr/>
-          <p:nvPr/>
-        </p:nvSpPr>
-        <p:spPr>
-          <a:xfrm>
-            <a:off x="9233780" y="2412706"/>
-            <a:ext cx="694445" cy="1120685"/>
-          </a:xfrm>
-          <a:prstGeom prst="roundRect">
-            <a:avLst>
-              <a:gd name="adj" fmla="val 9697"/>
-            </a:avLst>
-          </a:prstGeom>
-          <a:solidFill>
-            <a:schemeClr val="accent4">
-              <a:lumMod val="75000"/>
-              <a:alpha val="30196"/>
-            </a:schemeClr>
-          </a:solidFill>
-          <a:ln>
-            <a:noFill/>
-          </a:ln>
-        </p:spPr>
-        <p:style>
-          <a:lnRef idx="2">
-            <a:schemeClr val="accent1">
-              <a:shade val="50000"/>
-            </a:schemeClr>
-          </a:lnRef>
-          <a:fillRef idx="1">
-            <a:schemeClr val="accent1"/>
-          </a:fillRef>
-          <a:effectRef idx="0">
-            <a:schemeClr val="accent1"/>
-          </a:effectRef>
-          <a:fontRef idx="minor">
-            <a:schemeClr val="lt1"/>
-          </a:fontRef>
-        </p:style>
-        <p:txBody>
-          <a:bodyPr rtlCol="0" anchor="b"/>
-          <a:lstStyle/>
-          <a:p>
-            <a:pPr algn="ctr"/>
-            <a:r>
-              <a:rPr lang="en-US" altLang="zh-CN" sz="1300" b="1" dirty="0">
-                <a:solidFill>
-                  <a:schemeClr val="accent4">
-                    <a:lumMod val="75000"/>
-                  </a:schemeClr>
-                </a:solidFill>
-              </a:rPr>
-              <a:t>83%</a:t>
-            </a:r>
-            <a:endParaRPr lang="zh-CN" altLang="en-US" sz="1300" b="1" dirty="0">
-              <a:solidFill>
-                <a:schemeClr val="accent4">
-                  <a:lumMod val="75000"/>
-                </a:schemeClr>
-              </a:solidFill>
-            </a:endParaRPr>
-          </a:p>
-        </p:txBody>
-      </p:sp>
-      <p:sp>
-        <p:nvSpPr>
-          <p:cNvPr id="64" name="矩形: 圆角 63">
-            <a:extLst>
-              <a:ext uri="{FF2B5EF4-FFF2-40B4-BE49-F238E27FC236}">
-                <a16:creationId xmlns:a16="http://schemas.microsoft.com/office/drawing/2014/main" id="{850E025B-B8F5-C8D7-749B-01B3F39B1377}"/>
-              </a:ext>
-            </a:extLst>
-          </p:cNvPr>
-          <p:cNvSpPr/>
-          <p:nvPr/>
-        </p:nvSpPr>
-        <p:spPr>
-          <a:xfrm>
-            <a:off x="6705666" y="3792890"/>
-            <a:ext cx="694445" cy="1120685"/>
-          </a:xfrm>
-          <a:prstGeom prst="roundRect">
-            <a:avLst>
-              <a:gd name="adj" fmla="val 9697"/>
-            </a:avLst>
-          </a:prstGeom>
-          <a:solidFill>
-            <a:schemeClr val="accent4">
-              <a:lumMod val="75000"/>
-              <a:alpha val="30196"/>
-            </a:schemeClr>
-          </a:solidFill>
-          <a:ln>
-            <a:noFill/>
-          </a:ln>
-        </p:spPr>
-        <p:style>
-          <a:lnRef idx="2">
-            <a:schemeClr val="accent1">
-              <a:shade val="50000"/>
-            </a:schemeClr>
-          </a:lnRef>
-          <a:fillRef idx="1">
-            <a:schemeClr val="accent1"/>
-          </a:fillRef>
-          <a:effectRef idx="0">
-            <a:schemeClr val="accent1"/>
-          </a:effectRef>
-          <a:fontRef idx="minor">
-            <a:schemeClr val="lt1"/>
-          </a:fontRef>
-        </p:style>
-        <p:txBody>
-          <a:bodyPr rtlCol="0" anchor="b"/>
-          <a:lstStyle/>
-          <a:p>
-            <a:pPr algn="ctr"/>
-            <a:r>
-              <a:rPr lang="en-US" altLang="zh-CN" sz="1300" b="1" dirty="0">
-                <a:solidFill>
-                  <a:schemeClr val="accent4">
-                    <a:lumMod val="75000"/>
-                  </a:schemeClr>
-                </a:solidFill>
-              </a:rPr>
-              <a:t>0%</a:t>
-            </a:r>
-            <a:endParaRPr lang="zh-CN" altLang="en-US" sz="1300" b="1" dirty="0">
-              <a:solidFill>
-                <a:schemeClr val="accent4">
-                  <a:lumMod val="75000"/>
-                </a:schemeClr>
-              </a:solidFill>
-            </a:endParaRPr>
-          </a:p>
-        </p:txBody>
-      </p:sp>
-      <p:sp>
-        <p:nvSpPr>
-          <p:cNvPr id="65" name="矩形: 圆角 64">
-            <a:extLst>
-              <a:ext uri="{FF2B5EF4-FFF2-40B4-BE49-F238E27FC236}">
-                <a16:creationId xmlns:a16="http://schemas.microsoft.com/office/drawing/2014/main" id="{37679911-4110-FC77-A2F0-27017F0921AD}"/>
-              </a:ext>
-            </a:extLst>
-          </p:cNvPr>
-          <p:cNvSpPr/>
-          <p:nvPr/>
-        </p:nvSpPr>
-        <p:spPr>
-          <a:xfrm>
-            <a:off x="7712792" y="3796173"/>
-            <a:ext cx="694445" cy="1120685"/>
-          </a:xfrm>
-          <a:prstGeom prst="roundRect">
-            <a:avLst>
-              <a:gd name="adj" fmla="val 9697"/>
-            </a:avLst>
-          </a:prstGeom>
-          <a:solidFill>
-            <a:schemeClr val="accent4">
-              <a:lumMod val="75000"/>
-              <a:alpha val="30196"/>
-            </a:schemeClr>
-          </a:solidFill>
-          <a:ln>
-            <a:noFill/>
-          </a:ln>
-        </p:spPr>
-        <p:style>
-          <a:lnRef idx="2">
-            <a:schemeClr val="accent1">
-              <a:shade val="50000"/>
-            </a:schemeClr>
-          </a:lnRef>
-          <a:fillRef idx="1">
-            <a:schemeClr val="accent1"/>
-          </a:fillRef>
-          <a:effectRef idx="0">
-            <a:schemeClr val="accent1"/>
-          </a:effectRef>
-          <a:fontRef idx="minor">
-            <a:schemeClr val="lt1"/>
-          </a:fontRef>
-        </p:style>
-        <p:txBody>
-          <a:bodyPr rtlCol="0" anchor="b"/>
-          <a:lstStyle/>
-          <a:p>
-            <a:pPr algn="ctr"/>
-            <a:r>
-              <a:rPr lang="en-US" altLang="zh-CN" sz="1300" b="1" dirty="0">
-                <a:solidFill>
-                  <a:schemeClr val="accent4">
-                    <a:lumMod val="75000"/>
-                  </a:schemeClr>
-                </a:solidFill>
-              </a:rPr>
-              <a:t>33%</a:t>
-            </a:r>
-            <a:endParaRPr lang="zh-CN" altLang="en-US" sz="1300" b="1" dirty="0">
-              <a:solidFill>
-                <a:schemeClr val="accent4">
-                  <a:lumMod val="75000"/>
-                </a:schemeClr>
-              </a:solidFill>
-            </a:endParaRPr>
-          </a:p>
-        </p:txBody>
-      </p:sp>
-      <p:sp>
-        <p:nvSpPr>
-          <p:cNvPr id="66" name="矩形: 圆角 65">
-            <a:extLst>
-              <a:ext uri="{FF2B5EF4-FFF2-40B4-BE49-F238E27FC236}">
-                <a16:creationId xmlns:a16="http://schemas.microsoft.com/office/drawing/2014/main" id="{B0ABECA3-7C5B-AD98-C7AE-BF15697CFAA3}"/>
-              </a:ext>
-            </a:extLst>
-          </p:cNvPr>
-          <p:cNvSpPr/>
-          <p:nvPr/>
-        </p:nvSpPr>
-        <p:spPr>
-          <a:xfrm>
-            <a:off x="8727511" y="3792890"/>
-            <a:ext cx="694445" cy="1120685"/>
-          </a:xfrm>
-          <a:prstGeom prst="roundRect">
-            <a:avLst>
-              <a:gd name="adj" fmla="val 9697"/>
-            </a:avLst>
-          </a:prstGeom>
-          <a:solidFill>
-            <a:schemeClr val="accent4">
-              <a:lumMod val="75000"/>
-              <a:alpha val="30196"/>
-            </a:schemeClr>
-          </a:solidFill>
-          <a:ln>
-            <a:noFill/>
-          </a:ln>
-        </p:spPr>
-        <p:style>
-          <a:lnRef idx="2">
-            <a:schemeClr val="accent1">
-              <a:shade val="50000"/>
-            </a:schemeClr>
-          </a:lnRef>
-          <a:fillRef idx="1">
-            <a:schemeClr val="accent1"/>
-          </a:fillRef>
-          <a:effectRef idx="0">
-            <a:schemeClr val="accent1"/>
-          </a:effectRef>
-          <a:fontRef idx="minor">
-            <a:schemeClr val="lt1"/>
-          </a:fontRef>
-        </p:style>
-        <p:txBody>
-          <a:bodyPr rtlCol="0" anchor="b"/>
-          <a:lstStyle/>
-          <a:p>
-            <a:pPr algn="ctr"/>
-            <a:r>
-              <a:rPr lang="en-US" altLang="zh-CN" sz="1300" b="1" dirty="0">
-                <a:solidFill>
-                  <a:schemeClr val="accent4">
-                    <a:lumMod val="75000"/>
-                  </a:schemeClr>
-                </a:solidFill>
-              </a:rPr>
-              <a:t>67%</a:t>
-            </a:r>
-            <a:endParaRPr lang="zh-CN" altLang="en-US" sz="1300" b="1" dirty="0">
-              <a:solidFill>
-                <a:schemeClr val="accent4">
-                  <a:lumMod val="75000"/>
-                </a:schemeClr>
-              </a:solidFill>
-            </a:endParaRPr>
-          </a:p>
-        </p:txBody>
-      </p:sp>
-      <p:sp>
-        <p:nvSpPr>
-          <p:cNvPr id="67" name="矩形: 圆角 66">
-            <a:extLst>
-              <a:ext uri="{FF2B5EF4-FFF2-40B4-BE49-F238E27FC236}">
-                <a16:creationId xmlns:a16="http://schemas.microsoft.com/office/drawing/2014/main" id="{B69D2A11-92E7-04DC-7532-8E489C34871A}"/>
-              </a:ext>
-            </a:extLst>
-          </p:cNvPr>
-          <p:cNvSpPr/>
-          <p:nvPr/>
-        </p:nvSpPr>
-        <p:spPr>
-          <a:xfrm>
-            <a:off x="9734637" y="3792890"/>
-            <a:ext cx="694445" cy="1120685"/>
-          </a:xfrm>
-          <a:prstGeom prst="roundRect">
-            <a:avLst>
-              <a:gd name="adj" fmla="val 9697"/>
-            </a:avLst>
-          </a:prstGeom>
-          <a:solidFill>
-            <a:schemeClr val="accent4">
-              <a:lumMod val="75000"/>
-              <a:alpha val="30196"/>
-            </a:schemeClr>
-          </a:solidFill>
-          <a:ln>
-            <a:noFill/>
-          </a:ln>
-        </p:spPr>
-        <p:style>
-          <a:lnRef idx="2">
-            <a:schemeClr val="accent1">
-              <a:shade val="50000"/>
-            </a:schemeClr>
-          </a:lnRef>
-          <a:fillRef idx="1">
-            <a:schemeClr val="accent1"/>
-          </a:fillRef>
-          <a:effectRef idx="0">
-            <a:schemeClr val="accent1"/>
-          </a:effectRef>
-          <a:fontRef idx="minor">
-            <a:schemeClr val="lt1"/>
-          </a:fontRef>
-        </p:style>
-        <p:txBody>
-          <a:bodyPr rtlCol="0" anchor="b"/>
-          <a:lstStyle/>
-          <a:p>
-            <a:pPr algn="ctr"/>
-            <a:r>
-              <a:rPr lang="en-US" altLang="zh-CN" sz="1300" b="1" dirty="0">
-                <a:solidFill>
-                  <a:schemeClr val="accent4">
-                    <a:lumMod val="75000"/>
-                  </a:schemeClr>
-                </a:solidFill>
-              </a:rPr>
-              <a:t>100%</a:t>
-            </a:r>
-            <a:endParaRPr lang="zh-CN" altLang="en-US" sz="1300" b="1" dirty="0">
-              <a:solidFill>
-                <a:schemeClr val="accent4">
-                  <a:lumMod val="75000"/>
-                </a:schemeClr>
-              </a:solidFill>
-            </a:endParaRPr>
-          </a:p>
-        </p:txBody>
-      </p:sp>
-      <p:sp>
-        <p:nvSpPr>
-          <p:cNvPr id="68" name="文本框 67">
-            <a:extLst>
-              <a:ext uri="{FF2B5EF4-FFF2-40B4-BE49-F238E27FC236}">
-                <a16:creationId xmlns:a16="http://schemas.microsoft.com/office/drawing/2014/main" id="{88220386-DE64-3DD3-BEEA-F3BAF527BA7D}"/>
-              </a:ext>
-            </a:extLst>
-          </p:cNvPr>
-          <p:cNvSpPr txBox="1"/>
-          <p:nvPr/>
-        </p:nvSpPr>
-        <p:spPr>
-          <a:xfrm>
-            <a:off x="10945773" y="1758012"/>
-            <a:ext cx="783772" cy="246221"/>
-          </a:xfrm>
-          <a:prstGeom prst="rect">
-            <a:avLst/>
-          </a:prstGeom>
-          <a:noFill/>
-        </p:spPr>
-        <p:txBody>
-          <a:bodyPr wrap="square" lIns="36000" tIns="0" rIns="36000" bIns="0" rtlCol="0">
-            <a:spAutoFit/>
-          </a:bodyPr>
-          <a:lstStyle/>
-          <a:p>
-            <a:r>
-              <a:rPr lang="en-US" altLang="zh-CN" sz="1600" b="1" dirty="0">
-                <a:solidFill>
-                  <a:srgbClr val="FF0000"/>
-                </a:solidFill>
-              </a:rPr>
-              <a:t>Cancel</a:t>
-            </a:r>
-            <a:endParaRPr lang="zh-CN" altLang="en-US" sz="1600" b="1" dirty="0">
-              <a:solidFill>
-                <a:srgbClr val="FF0000"/>
-              </a:solidFill>
-            </a:endParaRPr>
-          </a:p>
-        </p:txBody>
-      </p:sp>
-      <p:cxnSp>
-        <p:nvCxnSpPr>
-          <p:cNvPr id="69" name="连接符: 肘形 68">
-            <a:extLst>
-              <a:ext uri="{FF2B5EF4-FFF2-40B4-BE49-F238E27FC236}">
-                <a16:creationId xmlns:a16="http://schemas.microsoft.com/office/drawing/2014/main" id="{EAF02DFE-BD4B-D902-7A6A-EC402795DB4F}"/>
-              </a:ext>
-            </a:extLst>
-          </p:cNvPr>
-          <p:cNvCxnSpPr>
-            <a:cxnSpLocks/>
-            <a:stCxn id="4" idx="2"/>
-            <a:endCxn id="68" idx="1"/>
-          </p:cNvCxnSpPr>
-          <p:nvPr/>
-        </p:nvCxnSpPr>
-        <p:spPr>
-          <a:xfrm rot="16200000" flipH="1">
-            <a:off x="10414010" y="1349360"/>
-            <a:ext cx="141228" cy="922298"/>
-          </a:xfrm>
-          <a:prstGeom prst="bentConnector2">
-            <a:avLst/>
-          </a:prstGeom>
-          <a:ln w="28575">
-            <a:solidFill>
-              <a:srgbClr val="FF0000"/>
-            </a:solidFill>
-            <a:prstDash val="sysDot"/>
-          </a:ln>
-        </p:spPr>
-        <p:style>
-          <a:lnRef idx="1">
-            <a:schemeClr val="accent1"/>
-          </a:lnRef>
-          <a:fillRef idx="0">
-            <a:schemeClr val="accent1"/>
-          </a:fillRef>
-          <a:effectRef idx="0">
-            <a:schemeClr val="accent1"/>
-          </a:effectRef>
-          <a:fontRef idx="minor">
-            <a:schemeClr val="tx1"/>
-          </a:fontRef>
-        </p:style>
-      </p:cxnSp>
-    </p:spTree>
-    <p:extLst>
-      <p:ext uri="{BB962C8B-B14F-4D97-AF65-F5344CB8AC3E}">
-        <p14:creationId xmlns:p14="http://schemas.microsoft.com/office/powerpoint/2010/main" val="3103237577"/>
       </p:ext>
     </p:extLst>
   </p:cSld>

</xml_diff>

<commit_message>
Update and finetune manual
</commit_message>
<xml_diff>
--- a/doc/Firmware_manual.pptx
+++ b/doc/Firmware_manual.pptx
@@ -217,7 +217,7 @@
           <a:p>
             <a:fld id="{99D69C7F-8110-406B-A63E-81EB2EBDFE06}" type="datetimeFigureOut">
               <a:rPr lang="zh-CN" altLang="en-US" smtClean="0"/>
-              <a:t>2025/3/10</a:t>
+              <a:t>2025/3/11</a:t>
             </a:fld>
             <a:endParaRPr lang="zh-CN" altLang="en-US"/>
           </a:p>
@@ -395,7 +395,7 @@
           <a:p>
             <a:fld id="{002F3B7A-C25F-4CE1-8FEE-39C6D6ACD16A}" type="datetimeFigureOut">
               <a:rPr lang="zh-CN" altLang="en-US" smtClean="0"/>
-              <a:t>2025/3/10</a:t>
+              <a:t>2025/3/11</a:t>
             </a:fld>
             <a:endParaRPr lang="zh-CN" altLang="en-US"/>
           </a:p>
@@ -2797,6 +2797,45 @@
           </a:p>
         </p:txBody>
       </p:sp>
+      <p:sp>
+        <p:nvSpPr>
+          <p:cNvPr id="4" name="文本框 3">
+            <a:extLst>
+              <a:ext uri="{FF2B5EF4-FFF2-40B4-BE49-F238E27FC236}">
+                <a16:creationId xmlns:a16="http://schemas.microsoft.com/office/drawing/2014/main" id="{1ECA1310-B9F8-9A4A-4108-7A6BDB321294}"/>
+              </a:ext>
+            </a:extLst>
+          </p:cNvPr>
+          <p:cNvSpPr txBox="1"/>
+          <p:nvPr/>
+        </p:nvSpPr>
+        <p:spPr>
+          <a:xfrm>
+            <a:off x="7510738" y="99038"/>
+            <a:ext cx="4577161" cy="369332"/>
+          </a:xfrm>
+          <a:prstGeom prst="rect">
+            <a:avLst/>
+          </a:prstGeom>
+          <a:noFill/>
+        </p:spPr>
+        <p:txBody>
+          <a:bodyPr wrap="square">
+            <a:spAutoFit/>
+          </a:bodyPr>
+          <a:lstStyle/>
+          <a:p>
+            <a:pPr algn="ctr"/>
+            <a:r>
+              <a:rPr lang="en-US" altLang="zh-CN" b="1" dirty="0">
+                <a:hlinkClick r:id="rId3"/>
+              </a:rPr>
+              <a:t>https://github.com/whowechina/iidx_pico</a:t>
+            </a:r>
+            <a:endParaRPr lang="zh-CN" altLang="en-US" b="1" dirty="0"/>
+          </a:p>
+        </p:txBody>
+      </p:sp>
     </p:spTree>
     <p:extLst>
       <p:ext uri="{BB962C8B-B14F-4D97-AF65-F5344CB8AC3E}">
@@ -3648,59 +3687,6 @@
           </a:p>
         </p:txBody>
       </p:sp>
-      <p:sp>
-        <p:nvSpPr>
-          <p:cNvPr id="20" name="文本框 19">
-            <a:extLst>
-              <a:ext uri="{FF2B5EF4-FFF2-40B4-BE49-F238E27FC236}">
-                <a16:creationId xmlns:a16="http://schemas.microsoft.com/office/drawing/2014/main" id="{64509E83-8020-4340-C62B-3DC5B0A4F453}"/>
-              </a:ext>
-            </a:extLst>
-          </p:cNvPr>
-          <p:cNvSpPr txBox="1"/>
-          <p:nvPr/>
-        </p:nvSpPr>
-        <p:spPr>
-          <a:xfrm>
-            <a:off x="9852637" y="873104"/>
-            <a:ext cx="603610" cy="287718"/>
-          </a:xfrm>
-          <a:prstGeom prst="roundRect">
-            <a:avLst>
-              <a:gd name="adj" fmla="val 29099"/>
-            </a:avLst>
-          </a:prstGeom>
-          <a:solidFill>
-            <a:srgbClr val="FF0000"/>
-          </a:solidFill>
-        </p:spPr>
-        <p:txBody>
-          <a:bodyPr wrap="square" lIns="36000" tIns="0" rIns="36000" bIns="0" rtlCol="0">
-            <a:noAutofit/>
-          </a:bodyPr>
-          <a:lstStyle/>
-          <a:p>
-            <a:pPr algn="ctr">
-              <a:lnSpc>
-                <a:spcPts val="1800"/>
-              </a:lnSpc>
-            </a:pPr>
-            <a:r>
-              <a:rPr lang="en-US" altLang="zh-CN" sz="1600" b="1" dirty="0">
-                <a:solidFill>
-                  <a:schemeClr val="bg1"/>
-                </a:solidFill>
-              </a:rPr>
-              <a:t>Hold</a:t>
-            </a:r>
-            <a:endParaRPr lang="zh-CN" altLang="en-US" sz="1600" b="1" dirty="0">
-              <a:solidFill>
-                <a:schemeClr val="bg1"/>
-              </a:solidFill>
-            </a:endParaRPr>
-          </a:p>
-        </p:txBody>
-      </p:sp>
       <p:cxnSp>
         <p:nvCxnSpPr>
           <p:cNvPr id="29" name="连接符: 肘形 28">
@@ -3712,18 +3698,20 @@
           </p:cNvPr>
           <p:cNvCxnSpPr>
             <a:cxnSpLocks/>
-            <a:stCxn id="20" idx="3"/>
+            <a:stCxn id="27" idx="2"/>
             <a:endCxn id="32" idx="0"/>
           </p:cNvCxnSpPr>
           <p:nvPr/>
         </p:nvCxnSpPr>
         <p:spPr>
-          <a:xfrm>
-            <a:off x="10456247" y="1016963"/>
-            <a:ext cx="790378" cy="536668"/>
-          </a:xfrm>
-          <a:prstGeom prst="bentConnector2">
-            <a:avLst/>
+          <a:xfrm rot="16200000" flipH="1">
+            <a:off x="10977902" y="1284908"/>
+            <a:ext cx="536670" cy="776"/>
+          </a:xfrm>
+          <a:prstGeom prst="bentConnector3">
+            <a:avLst>
+              <a:gd name="adj1" fmla="val 50000"/>
+            </a:avLst>
           </a:prstGeom>
           <a:ln w="28575">
             <a:solidFill>
@@ -3797,46 +3785,6 @@
                 </a:schemeClr>
               </a:solidFill>
             </a:endParaRPr>
-          </a:p>
-        </p:txBody>
-      </p:sp>
-      <p:sp>
-        <p:nvSpPr>
-          <p:cNvPr id="39" name="文本框 38">
-            <a:extLst>
-              <a:ext uri="{FF2B5EF4-FFF2-40B4-BE49-F238E27FC236}">
-                <a16:creationId xmlns:a16="http://schemas.microsoft.com/office/drawing/2014/main" id="{3A8EFEEB-D49A-FD23-F20A-22C9ED03C1E0}"/>
-              </a:ext>
-            </a:extLst>
-          </p:cNvPr>
-          <p:cNvSpPr txBox="1"/>
-          <p:nvPr/>
-        </p:nvSpPr>
-        <p:spPr>
-          <a:xfrm>
-            <a:off x="10445314" y="828446"/>
-            <a:ext cx="950117" cy="184666"/>
-          </a:xfrm>
-          <a:prstGeom prst="rect">
-            <a:avLst/>
-          </a:prstGeom>
-          <a:noFill/>
-        </p:spPr>
-        <p:txBody>
-          <a:bodyPr wrap="square" lIns="0" tIns="0" rIns="0" bIns="0">
-            <a:spAutoFit/>
-          </a:bodyPr>
-          <a:lstStyle/>
-          <a:p>
-            <a:pPr algn="ctr"/>
-            <a:r>
-              <a:rPr lang="en-US" altLang="zh-CN" sz="1200" b="1" dirty="0">
-                <a:solidFill>
-                  <a:srgbClr val="FF0000"/>
-                </a:solidFill>
-              </a:rPr>
-              <a:t>5 seconds</a:t>
-            </a:r>
           </a:p>
         </p:txBody>
       </p:sp>
@@ -4457,20 +4405,20 @@
           </p:cNvPr>
           <p:cNvCxnSpPr>
             <a:cxnSpLocks/>
-            <a:stCxn id="20" idx="0"/>
+            <a:stCxn id="18" idx="1"/>
             <a:endCxn id="14" idx="1"/>
           </p:cNvCxnSpPr>
           <p:nvPr/>
         </p:nvCxnSpPr>
         <p:spPr>
           <a:xfrm rot="16200000" flipH="1" flipV="1">
-            <a:off x="6788584" y="282756"/>
-            <a:ext cx="2775510" cy="3956206"/>
+            <a:off x="6948889" y="432137"/>
+            <a:ext cx="2465823" cy="3967129"/>
           </a:xfrm>
           <a:prstGeom prst="bentConnector4">
             <a:avLst>
-              <a:gd name="adj1" fmla="val -12697"/>
-              <a:gd name="adj2" fmla="val 105778"/>
+              <a:gd name="adj1" fmla="val -28029"/>
+              <a:gd name="adj2" fmla="val 105762"/>
             </a:avLst>
           </a:prstGeom>
           <a:ln w="28575">
@@ -4663,19 +4611,19 @@
           </p:cNvPr>
           <p:cNvCxnSpPr>
             <a:cxnSpLocks/>
-            <a:stCxn id="20" idx="0"/>
+            <a:stCxn id="18" idx="1"/>
             <a:endCxn id="5" idx="0"/>
           </p:cNvCxnSpPr>
           <p:nvPr/>
         </p:nvCxnSpPr>
         <p:spPr>
-          <a:xfrm rot="16200000" flipH="1" flipV="1">
-            <a:off x="7682134" y="-1580124"/>
-            <a:ext cx="19081" cy="4925535"/>
+          <a:xfrm rot="16200000" flipV="1">
+            <a:off x="7551833" y="-1430741"/>
+            <a:ext cx="290606" cy="4936458"/>
           </a:xfrm>
           <a:prstGeom prst="bentConnector3">
             <a:avLst>
-              <a:gd name="adj1" fmla="val -2972936"/>
+              <a:gd name="adj1" fmla="val 319201"/>
             </a:avLst>
           </a:prstGeom>
           <a:ln w="28575">
@@ -4700,6 +4648,577 @@
           </a:fontRef>
         </p:style>
       </p:cxnSp>
+      <p:sp>
+        <p:nvSpPr>
+          <p:cNvPr id="2" name="矩形: 圆角 1">
+            <a:extLst>
+              <a:ext uri="{FF2B5EF4-FFF2-40B4-BE49-F238E27FC236}">
+                <a16:creationId xmlns:a16="http://schemas.microsoft.com/office/drawing/2014/main" id="{104890B8-A9AD-3B85-4D6D-4F87248A45DB}"/>
+              </a:ext>
+            </a:extLst>
+          </p:cNvPr>
+          <p:cNvSpPr/>
+          <p:nvPr/>
+        </p:nvSpPr>
+        <p:spPr>
+          <a:xfrm>
+            <a:off x="6705666" y="1371191"/>
+            <a:ext cx="505170" cy="544949"/>
+          </a:xfrm>
+          <a:prstGeom prst="roundRect">
+            <a:avLst>
+              <a:gd name="adj" fmla="val 9697"/>
+            </a:avLst>
+          </a:prstGeom>
+          <a:solidFill>
+            <a:schemeClr val="accent1">
+              <a:lumMod val="60000"/>
+              <a:lumOff val="40000"/>
+              <a:alpha val="30196"/>
+            </a:schemeClr>
+          </a:solidFill>
+          <a:ln>
+            <a:noFill/>
+          </a:ln>
+        </p:spPr>
+        <p:style>
+          <a:lnRef idx="2">
+            <a:schemeClr val="accent1">
+              <a:shade val="50000"/>
+            </a:schemeClr>
+          </a:lnRef>
+          <a:fillRef idx="1">
+            <a:schemeClr val="accent1"/>
+          </a:fillRef>
+          <a:effectRef idx="0">
+            <a:schemeClr val="accent1"/>
+          </a:effectRef>
+          <a:fontRef idx="minor">
+            <a:schemeClr val="lt1"/>
+          </a:fontRef>
+        </p:style>
+        <p:txBody>
+          <a:bodyPr lIns="36000" tIns="36000" rIns="36000" bIns="36000" rtlCol="0" anchor="b"/>
+          <a:lstStyle/>
+          <a:p>
+            <a:pPr algn="ctr"/>
+            <a:r>
+              <a:rPr lang="en-US" altLang="zh-CN" sz="800" b="1" dirty="0">
+                <a:solidFill>
+                  <a:srgbClr val="00B0F0"/>
+                </a:solidFill>
+              </a:rPr>
+              <a:t>Profile 1</a:t>
+            </a:r>
+            <a:endParaRPr lang="zh-CN" altLang="en-US" sz="800" b="1" dirty="0">
+              <a:solidFill>
+                <a:srgbClr val="00B0F0"/>
+              </a:solidFill>
+            </a:endParaRPr>
+          </a:p>
+        </p:txBody>
+      </p:sp>
+      <p:sp>
+        <p:nvSpPr>
+          <p:cNvPr id="21" name="矩形: 圆角 20">
+            <a:extLst>
+              <a:ext uri="{FF2B5EF4-FFF2-40B4-BE49-F238E27FC236}">
+                <a16:creationId xmlns:a16="http://schemas.microsoft.com/office/drawing/2014/main" id="{70B60145-A5DB-47E1-BA85-7E15B4D4A6DE}"/>
+              </a:ext>
+            </a:extLst>
+          </p:cNvPr>
+          <p:cNvSpPr/>
+          <p:nvPr/>
+        </p:nvSpPr>
+        <p:spPr>
+          <a:xfrm>
+            <a:off x="7522269" y="1371191"/>
+            <a:ext cx="505170" cy="544949"/>
+          </a:xfrm>
+          <a:prstGeom prst="roundRect">
+            <a:avLst>
+              <a:gd name="adj" fmla="val 9697"/>
+            </a:avLst>
+          </a:prstGeom>
+          <a:solidFill>
+            <a:schemeClr val="accent1">
+              <a:lumMod val="60000"/>
+              <a:lumOff val="40000"/>
+              <a:alpha val="30196"/>
+            </a:schemeClr>
+          </a:solidFill>
+          <a:ln>
+            <a:noFill/>
+          </a:ln>
+        </p:spPr>
+        <p:style>
+          <a:lnRef idx="2">
+            <a:schemeClr val="accent1">
+              <a:shade val="50000"/>
+            </a:schemeClr>
+          </a:lnRef>
+          <a:fillRef idx="1">
+            <a:schemeClr val="accent1"/>
+          </a:fillRef>
+          <a:effectRef idx="0">
+            <a:schemeClr val="accent1"/>
+          </a:effectRef>
+          <a:fontRef idx="minor">
+            <a:schemeClr val="lt1"/>
+          </a:fontRef>
+        </p:style>
+        <p:txBody>
+          <a:bodyPr lIns="36000" tIns="36000" rIns="36000" bIns="36000" rtlCol="0" anchor="b"/>
+          <a:lstStyle/>
+          <a:p>
+            <a:pPr algn="ctr"/>
+            <a:r>
+              <a:rPr lang="en-US" altLang="zh-CN" sz="800" b="1" dirty="0">
+                <a:solidFill>
+                  <a:srgbClr val="00B0F0"/>
+                </a:solidFill>
+              </a:rPr>
+              <a:t>Profile 2</a:t>
+            </a:r>
+            <a:endParaRPr lang="zh-CN" altLang="en-US" sz="800" b="1" dirty="0">
+              <a:solidFill>
+                <a:srgbClr val="00B0F0"/>
+              </a:solidFill>
+            </a:endParaRPr>
+          </a:p>
+        </p:txBody>
+      </p:sp>
+      <p:sp>
+        <p:nvSpPr>
+          <p:cNvPr id="22" name="矩形: 圆角 21">
+            <a:extLst>
+              <a:ext uri="{FF2B5EF4-FFF2-40B4-BE49-F238E27FC236}">
+                <a16:creationId xmlns:a16="http://schemas.microsoft.com/office/drawing/2014/main" id="{BE58B489-17DF-3D8B-D006-E09C1D82CC18}"/>
+              </a:ext>
+            </a:extLst>
+          </p:cNvPr>
+          <p:cNvSpPr/>
+          <p:nvPr/>
+        </p:nvSpPr>
+        <p:spPr>
+          <a:xfrm>
+            <a:off x="8338872" y="1371191"/>
+            <a:ext cx="505170" cy="544949"/>
+          </a:xfrm>
+          <a:prstGeom prst="roundRect">
+            <a:avLst>
+              <a:gd name="adj" fmla="val 9697"/>
+            </a:avLst>
+          </a:prstGeom>
+          <a:solidFill>
+            <a:schemeClr val="accent1">
+              <a:lumMod val="60000"/>
+              <a:lumOff val="40000"/>
+              <a:alpha val="30196"/>
+            </a:schemeClr>
+          </a:solidFill>
+          <a:ln>
+            <a:noFill/>
+          </a:ln>
+        </p:spPr>
+        <p:style>
+          <a:lnRef idx="2">
+            <a:schemeClr val="accent1">
+              <a:shade val="50000"/>
+            </a:schemeClr>
+          </a:lnRef>
+          <a:fillRef idx="1">
+            <a:schemeClr val="accent1"/>
+          </a:fillRef>
+          <a:effectRef idx="0">
+            <a:schemeClr val="accent1"/>
+          </a:effectRef>
+          <a:fontRef idx="minor">
+            <a:schemeClr val="lt1"/>
+          </a:fontRef>
+        </p:style>
+        <p:txBody>
+          <a:bodyPr lIns="36000" tIns="36000" rIns="36000" bIns="36000" rtlCol="0" anchor="b"/>
+          <a:lstStyle/>
+          <a:p>
+            <a:pPr algn="ctr"/>
+            <a:r>
+              <a:rPr lang="en-US" altLang="zh-CN" sz="800" b="1" dirty="0">
+                <a:solidFill>
+                  <a:srgbClr val="00B0F0"/>
+                </a:solidFill>
+              </a:rPr>
+              <a:t>Profile 3</a:t>
+            </a:r>
+            <a:endParaRPr lang="zh-CN" altLang="en-US" sz="800" b="1" dirty="0">
+              <a:solidFill>
+                <a:srgbClr val="00B0F0"/>
+              </a:solidFill>
+            </a:endParaRPr>
+          </a:p>
+        </p:txBody>
+      </p:sp>
+      <p:sp>
+        <p:nvSpPr>
+          <p:cNvPr id="23" name="矩形: 圆角 22">
+            <a:extLst>
+              <a:ext uri="{FF2B5EF4-FFF2-40B4-BE49-F238E27FC236}">
+                <a16:creationId xmlns:a16="http://schemas.microsoft.com/office/drawing/2014/main" id="{2FB77F0B-EFC8-CF9D-E6FF-AEFA0FD1C186}"/>
+              </a:ext>
+            </a:extLst>
+          </p:cNvPr>
+          <p:cNvSpPr/>
+          <p:nvPr/>
+        </p:nvSpPr>
+        <p:spPr>
+          <a:xfrm>
+            <a:off x="9155476" y="1371191"/>
+            <a:ext cx="505170" cy="544949"/>
+          </a:xfrm>
+          <a:prstGeom prst="roundRect">
+            <a:avLst>
+              <a:gd name="adj" fmla="val 9697"/>
+            </a:avLst>
+          </a:prstGeom>
+          <a:solidFill>
+            <a:schemeClr val="accent1">
+              <a:lumMod val="60000"/>
+              <a:lumOff val="40000"/>
+              <a:alpha val="30196"/>
+            </a:schemeClr>
+          </a:solidFill>
+          <a:ln>
+            <a:noFill/>
+          </a:ln>
+        </p:spPr>
+        <p:style>
+          <a:lnRef idx="2">
+            <a:schemeClr val="accent1">
+              <a:shade val="50000"/>
+            </a:schemeClr>
+          </a:lnRef>
+          <a:fillRef idx="1">
+            <a:schemeClr val="accent1"/>
+          </a:fillRef>
+          <a:effectRef idx="0">
+            <a:schemeClr val="accent1"/>
+          </a:effectRef>
+          <a:fontRef idx="minor">
+            <a:schemeClr val="lt1"/>
+          </a:fontRef>
+        </p:style>
+        <p:txBody>
+          <a:bodyPr lIns="36000" tIns="36000" rIns="36000" bIns="36000" rtlCol="0" anchor="b"/>
+          <a:lstStyle/>
+          <a:p>
+            <a:pPr algn="ctr"/>
+            <a:r>
+              <a:rPr lang="en-US" altLang="zh-CN" sz="800" b="1" dirty="0">
+                <a:solidFill>
+                  <a:srgbClr val="00B0F0"/>
+                </a:solidFill>
+              </a:rPr>
+              <a:t>Profile 4</a:t>
+            </a:r>
+            <a:endParaRPr lang="zh-CN" altLang="en-US" sz="800" b="1" dirty="0">
+              <a:solidFill>
+                <a:srgbClr val="00B0F0"/>
+              </a:solidFill>
+            </a:endParaRPr>
+          </a:p>
+        </p:txBody>
+      </p:sp>
+      <p:sp>
+        <p:nvSpPr>
+          <p:cNvPr id="27" name="文本框 26">
+            <a:extLst>
+              <a:ext uri="{FF2B5EF4-FFF2-40B4-BE49-F238E27FC236}">
+                <a16:creationId xmlns:a16="http://schemas.microsoft.com/office/drawing/2014/main" id="{64509E83-8020-4340-C62B-3DC5B0A4F453}"/>
+              </a:ext>
+            </a:extLst>
+          </p:cNvPr>
+          <p:cNvSpPr txBox="1"/>
+          <p:nvPr/>
+        </p:nvSpPr>
+        <p:spPr>
+          <a:xfrm>
+            <a:off x="10604497" y="729243"/>
+            <a:ext cx="1282703" cy="287718"/>
+          </a:xfrm>
+          <a:prstGeom prst="roundRect">
+            <a:avLst>
+              <a:gd name="adj" fmla="val 29099"/>
+            </a:avLst>
+          </a:prstGeom>
+          <a:solidFill>
+            <a:srgbClr val="FF0000"/>
+          </a:solidFill>
+        </p:spPr>
+        <p:txBody>
+          <a:bodyPr wrap="square" lIns="36000" tIns="0" rIns="36000" bIns="0" rtlCol="0">
+            <a:noAutofit/>
+          </a:bodyPr>
+          <a:lstStyle/>
+          <a:p>
+            <a:pPr algn="ctr">
+              <a:lnSpc>
+                <a:spcPts val="1800"/>
+              </a:lnSpc>
+            </a:pPr>
+            <a:r>
+              <a:rPr lang="en-US" altLang="zh-CN" sz="1200" b="1" dirty="0">
+                <a:solidFill>
+                  <a:schemeClr val="bg1"/>
+                </a:solidFill>
+              </a:rPr>
+              <a:t>Hold 5 Seconds</a:t>
+            </a:r>
+            <a:endParaRPr lang="zh-CN" altLang="en-US" sz="1200" b="1" dirty="0">
+              <a:solidFill>
+                <a:schemeClr val="bg1"/>
+              </a:solidFill>
+            </a:endParaRPr>
+          </a:p>
+        </p:txBody>
+      </p:sp>
+      <p:cxnSp>
+        <p:nvCxnSpPr>
+          <p:cNvPr id="37" name="连接符: 肘形 36">
+            <a:extLst>
+              <a:ext uri="{FF2B5EF4-FFF2-40B4-BE49-F238E27FC236}">
+                <a16:creationId xmlns:a16="http://schemas.microsoft.com/office/drawing/2014/main" id="{699736D9-ED74-8D03-B2F0-1A8DC6B0B2D8}"/>
+              </a:ext>
+            </a:extLst>
+          </p:cNvPr>
+          <p:cNvCxnSpPr>
+            <a:cxnSpLocks/>
+            <a:stCxn id="27" idx="1"/>
+            <a:endCxn id="18" idx="1"/>
+          </p:cNvCxnSpPr>
+          <p:nvPr/>
+        </p:nvCxnSpPr>
+        <p:spPr>
+          <a:xfrm rot="10800000" flipV="1">
+            <a:off x="10165365" y="873101"/>
+            <a:ext cx="439132" cy="309689"/>
+          </a:xfrm>
+          <a:prstGeom prst="bentConnector2">
+            <a:avLst/>
+          </a:prstGeom>
+          <a:ln w="28575">
+            <a:solidFill>
+              <a:srgbClr val="FF0000"/>
+            </a:solidFill>
+            <a:prstDash val="sysDot"/>
+          </a:ln>
+        </p:spPr>
+        <p:style>
+          <a:lnRef idx="1">
+            <a:schemeClr val="accent1"/>
+          </a:lnRef>
+          <a:fillRef idx="0">
+            <a:schemeClr val="accent1"/>
+          </a:fillRef>
+          <a:effectRef idx="0">
+            <a:schemeClr val="accent1"/>
+          </a:effectRef>
+          <a:fontRef idx="minor">
+            <a:schemeClr val="tx1"/>
+          </a:fontRef>
+        </p:style>
+      </p:cxnSp>
+      <p:cxnSp>
+        <p:nvCxnSpPr>
+          <p:cNvPr id="43" name="连接符: 肘形 42">
+            <a:extLst>
+              <a:ext uri="{FF2B5EF4-FFF2-40B4-BE49-F238E27FC236}">
+                <a16:creationId xmlns:a16="http://schemas.microsoft.com/office/drawing/2014/main" id="{CE1DB3A7-FD40-5310-740A-420288123EDF}"/>
+              </a:ext>
+            </a:extLst>
+          </p:cNvPr>
+          <p:cNvCxnSpPr>
+            <a:cxnSpLocks/>
+            <a:stCxn id="18" idx="1"/>
+            <a:endCxn id="46" idx="1"/>
+          </p:cNvCxnSpPr>
+          <p:nvPr/>
+        </p:nvCxnSpPr>
+        <p:spPr>
+          <a:xfrm rot="16200000" flipV="1">
+            <a:off x="9039203" y="56628"/>
+            <a:ext cx="290640" cy="1961685"/>
+          </a:xfrm>
+          <a:prstGeom prst="bentConnector3">
+            <a:avLst>
+              <a:gd name="adj1" fmla="val 172413"/>
+            </a:avLst>
+          </a:prstGeom>
+          <a:ln w="28575">
+            <a:solidFill>
+              <a:srgbClr val="FF0000"/>
+            </a:solidFill>
+            <a:prstDash val="sysDot"/>
+          </a:ln>
+        </p:spPr>
+        <p:style>
+          <a:lnRef idx="1">
+            <a:schemeClr val="accent1"/>
+          </a:lnRef>
+          <a:fillRef idx="0">
+            <a:schemeClr val="accent1"/>
+          </a:fillRef>
+          <a:effectRef idx="0">
+            <a:schemeClr val="accent1"/>
+          </a:effectRef>
+          <a:fontRef idx="minor">
+            <a:schemeClr val="tx1"/>
+          </a:fontRef>
+        </p:style>
+      </p:cxnSp>
+      <p:sp>
+        <p:nvSpPr>
+          <p:cNvPr id="46" name="左大括号 45">
+            <a:extLst>
+              <a:ext uri="{FF2B5EF4-FFF2-40B4-BE49-F238E27FC236}">
+                <a16:creationId xmlns:a16="http://schemas.microsoft.com/office/drawing/2014/main" id="{3C430160-9962-73D1-6065-B13551FE86AC}"/>
+              </a:ext>
+            </a:extLst>
+          </p:cNvPr>
+          <p:cNvSpPr/>
+          <p:nvPr/>
+        </p:nvSpPr>
+        <p:spPr>
+          <a:xfrm rot="16200000" flipH="1">
+            <a:off x="7981512" y="-131110"/>
+            <a:ext cx="417184" cy="2463705"/>
+          </a:xfrm>
+          <a:prstGeom prst="leftBrace">
+            <a:avLst>
+              <a:gd name="adj1" fmla="val 21655"/>
+              <a:gd name="adj2" fmla="val 50551"/>
+            </a:avLst>
+          </a:prstGeom>
+          <a:ln w="28575">
+            <a:solidFill>
+              <a:schemeClr val="accent1">
+                <a:alpha val="69804"/>
+              </a:schemeClr>
+            </a:solidFill>
+          </a:ln>
+        </p:spPr>
+        <p:style>
+          <a:lnRef idx="1">
+            <a:schemeClr val="accent1"/>
+          </a:lnRef>
+          <a:fillRef idx="0">
+            <a:schemeClr val="accent1"/>
+          </a:fillRef>
+          <a:effectRef idx="0">
+            <a:schemeClr val="accent1"/>
+          </a:effectRef>
+          <a:fontRef idx="minor">
+            <a:schemeClr val="tx1"/>
+          </a:fontRef>
+        </p:style>
+        <p:txBody>
+          <a:bodyPr rtlCol="0" anchor="ctr"/>
+          <a:lstStyle/>
+          <a:p>
+            <a:pPr algn="ctr"/>
+            <a:endParaRPr lang="zh-CN" altLang="en-US"/>
+          </a:p>
+        </p:txBody>
+      </p:sp>
+      <p:sp>
+        <p:nvSpPr>
+          <p:cNvPr id="53" name="文本框 52">
+            <a:extLst>
+              <a:ext uri="{FF2B5EF4-FFF2-40B4-BE49-F238E27FC236}">
+                <a16:creationId xmlns:a16="http://schemas.microsoft.com/office/drawing/2014/main" id="{1D480E97-14A7-EED0-0438-E0EBB56034C5}"/>
+              </a:ext>
+            </a:extLst>
+          </p:cNvPr>
+          <p:cNvSpPr txBox="1"/>
+          <p:nvPr/>
+        </p:nvSpPr>
+        <p:spPr>
+          <a:xfrm>
+            <a:off x="5496720" y="3662368"/>
+            <a:ext cx="994092" cy="523220"/>
+          </a:xfrm>
+          <a:prstGeom prst="rect">
+            <a:avLst/>
+          </a:prstGeom>
+          <a:noFill/>
+        </p:spPr>
+        <p:txBody>
+          <a:bodyPr wrap="square">
+            <a:spAutoFit/>
+          </a:bodyPr>
+          <a:lstStyle/>
+          <a:p>
+            <a:pPr algn="ctr"/>
+            <a:r>
+              <a:rPr lang="en-US" altLang="zh-CN" sz="1400" b="1" dirty="0">
+                <a:solidFill>
+                  <a:srgbClr val="BF9000"/>
+                </a:solidFill>
+              </a:rPr>
+              <a:t>Choose Function</a:t>
+            </a:r>
+            <a:endParaRPr lang="zh-CN" altLang="en-US" sz="1400" b="1" dirty="0">
+              <a:solidFill>
+                <a:srgbClr val="BF9000"/>
+              </a:solidFill>
+            </a:endParaRPr>
+          </a:p>
+        </p:txBody>
+      </p:sp>
+      <p:sp>
+        <p:nvSpPr>
+          <p:cNvPr id="54" name="文本框 53">
+            <a:extLst>
+              <a:ext uri="{FF2B5EF4-FFF2-40B4-BE49-F238E27FC236}">
+                <a16:creationId xmlns:a16="http://schemas.microsoft.com/office/drawing/2014/main" id="{86D94349-0836-37F0-BA3C-493BDECEAF06}"/>
+              </a:ext>
+            </a:extLst>
+          </p:cNvPr>
+          <p:cNvSpPr txBox="1"/>
+          <p:nvPr/>
+        </p:nvSpPr>
+        <p:spPr>
+          <a:xfrm>
+            <a:off x="7280391" y="601337"/>
+            <a:ext cx="994092" cy="523220"/>
+          </a:xfrm>
+          <a:prstGeom prst="rect">
+            <a:avLst/>
+          </a:prstGeom>
+          <a:noFill/>
+        </p:spPr>
+        <p:txBody>
+          <a:bodyPr wrap="square">
+            <a:spAutoFit/>
+          </a:bodyPr>
+          <a:lstStyle/>
+          <a:p>
+            <a:pPr algn="ctr"/>
+            <a:r>
+              <a:rPr lang="en-US" altLang="zh-CN" sz="1400" b="1" dirty="0">
+                <a:solidFill>
+                  <a:srgbClr val="7C9DCE"/>
+                </a:solidFill>
+              </a:rPr>
+              <a:t>Switch Profile</a:t>
+            </a:r>
+            <a:endParaRPr lang="zh-CN" altLang="en-US" sz="1400" b="1" dirty="0">
+              <a:solidFill>
+                <a:srgbClr val="7C9DCE"/>
+              </a:solidFill>
+            </a:endParaRPr>
+          </a:p>
+        </p:txBody>
+      </p:sp>
     </p:spTree>
     <p:extLst>
       <p:ext uri="{BB962C8B-B14F-4D97-AF65-F5344CB8AC3E}">
@@ -6159,8 +6678,8 @@
         </p:nvSpPr>
         <p:spPr>
           <a:xfrm>
-            <a:off x="8532846" y="342767"/>
-            <a:ext cx="3171758" cy="598553"/>
+            <a:off x="8616983" y="558922"/>
+            <a:ext cx="3171758" cy="406128"/>
           </a:xfrm>
           <a:prstGeom prst="rect">
             <a:avLst/>
@@ -6182,50 +6701,36 @@
           <a:bodyPr wrap="square" lIns="54000" tIns="36000" rIns="36000" bIns="36000" rtlCol="0">
             <a:spAutoFit/>
           </a:bodyPr>
-          <a:lstStyle/>
-          <a:p>
-            <a:pPr>
+          <a:lstStyle>
+            <a:defPPr>
+              <a:defRPr lang="zh-CN"/>
+            </a:defPPr>
+            <a:lvl1pPr>
               <a:lnSpc>
-                <a:spcPct val="150000"/>
+                <a:spcPts val="1300"/>
               </a:lnSpc>
-            </a:pPr>
-            <a:r>
-              <a:rPr lang="en-US" altLang="zh-CN" sz="1200" b="1" dirty="0">
+              <a:defRPr sz="1200" b="1">
                 <a:solidFill>
                   <a:schemeClr val="tx1">
-                    <a:lumMod val="85000"/>
-                    <a:lumOff val="15000"/>
+                    <a:lumMod val="75000"/>
+                    <a:lumOff val="25000"/>
                   </a:schemeClr>
                 </a:solidFill>
-              </a:rPr>
+              </a:defRPr>
+            </a:lvl1pPr>
+          </a:lstStyle>
+          <a:p>
+            <a:r>
+              <a:rPr lang="en-US" altLang="zh-CN" dirty="0"/>
               <a:t>Level means maximum brightness.</a:t>
             </a:r>
           </a:p>
           <a:p>
-            <a:pPr>
-              <a:lnSpc>
-                <a:spcPct val="150000"/>
-              </a:lnSpc>
-            </a:pPr>
             <a:r>
-              <a:rPr lang="en-US" altLang="zh-CN" sz="1200" b="1" dirty="0">
-                <a:solidFill>
-                  <a:schemeClr val="tx1">
-                    <a:lumMod val="85000"/>
-                    <a:lumOff val="15000"/>
-                  </a:schemeClr>
-                </a:solidFill>
-              </a:rPr>
+              <a:rPr lang="en-US" altLang="zh-CN" dirty="0"/>
               <a:t>Level for turntable and buttons are separate.</a:t>
             </a:r>
-            <a:endParaRPr lang="zh-CN" altLang="en-US" sz="1200" b="1" dirty="0">
-              <a:solidFill>
-                <a:schemeClr val="tx1">
-                  <a:lumMod val="85000"/>
-                  <a:lumOff val="15000"/>
-                </a:schemeClr>
-              </a:solidFill>
-            </a:endParaRPr>
+            <a:endParaRPr lang="zh-CN" altLang="en-US" dirty="0"/>
           </a:p>
         </p:txBody>
       </p:sp>
@@ -6938,8 +7443,8 @@
         </p:nvCxnSpPr>
         <p:spPr>
           <a:xfrm>
-            <a:off x="6960944" y="1095125"/>
-            <a:ext cx="0" cy="263542"/>
+            <a:off x="6960944" y="1156717"/>
+            <a:ext cx="0" cy="201950"/>
           </a:xfrm>
           <a:prstGeom prst="line">
             <a:avLst/>
@@ -6982,8 +7487,8 @@
         </p:nvSpPr>
         <p:spPr>
           <a:xfrm>
-            <a:off x="6516575" y="560757"/>
-            <a:ext cx="888737" cy="534368"/>
+            <a:off x="6516575" y="696215"/>
+            <a:ext cx="888737" cy="460502"/>
           </a:xfrm>
           <a:prstGeom prst="rect">
             <a:avLst/>
@@ -6998,18 +7503,18 @@
           <a:p>
             <a:pPr algn="ctr">
               <a:lnSpc>
-                <a:spcPts val="1800"/>
+                <a:spcPct val="90000"/>
               </a:lnSpc>
             </a:pPr>
             <a:r>
-              <a:rPr lang="en-US" altLang="zh-CN" sz="1600" b="1" dirty="0">
+              <a:rPr lang="en-US" altLang="zh-CN" sz="1400" b="1" dirty="0">
                 <a:solidFill>
                   <a:srgbClr val="FF0000"/>
                 </a:solidFill>
               </a:rPr>
               <a:t>Set First LED</a:t>
             </a:r>
-            <a:endParaRPr lang="zh-CN" altLang="en-US" sz="1600" b="1" dirty="0">
+            <a:endParaRPr lang="zh-CN" altLang="en-US" sz="1400" b="1" dirty="0">
               <a:solidFill>
                 <a:srgbClr val="FF0000"/>
               </a:solidFill>
@@ -7035,8 +7540,8 @@
         </p:nvCxnSpPr>
         <p:spPr>
           <a:xfrm>
-            <a:off x="7775581" y="1099100"/>
-            <a:ext cx="2132" cy="259567"/>
+            <a:off x="7775581" y="1156717"/>
+            <a:ext cx="2132" cy="201950"/>
           </a:xfrm>
           <a:prstGeom prst="line">
             <a:avLst/>
@@ -7079,8 +7584,8 @@
         </p:nvSpPr>
         <p:spPr>
           <a:xfrm>
-            <a:off x="7331212" y="560757"/>
-            <a:ext cx="888737" cy="538343"/>
+            <a:off x="7331212" y="696215"/>
+            <a:ext cx="888737" cy="460502"/>
           </a:xfrm>
           <a:prstGeom prst="rect">
             <a:avLst/>
@@ -7095,11 +7600,11 @@
           <a:p>
             <a:pPr algn="ctr">
               <a:lnSpc>
-                <a:spcPts val="1800"/>
+                <a:spcPct val="90000"/>
               </a:lnSpc>
             </a:pPr>
             <a:r>
-              <a:rPr lang="en-US" altLang="zh-CN" sz="1600" b="1" dirty="0">
+              <a:rPr lang="en-US" altLang="zh-CN" sz="1400" b="1" dirty="0">
                 <a:solidFill>
                   <a:srgbClr val="1971FF"/>
                 </a:solidFill>
@@ -7107,21 +7612,21 @@
               <a:t>Set Last</a:t>
             </a:r>
             <a:br>
-              <a:rPr lang="en-US" altLang="zh-CN" sz="1600" b="1" dirty="0">
+              <a:rPr lang="en-US" altLang="zh-CN" sz="1400" b="1" dirty="0">
                 <a:solidFill>
                   <a:srgbClr val="1971FF"/>
                 </a:solidFill>
               </a:rPr>
             </a:br>
             <a:r>
-              <a:rPr lang="en-US" altLang="zh-CN" sz="1600" b="1" dirty="0">
+              <a:rPr lang="en-US" altLang="zh-CN" sz="1400" b="1" dirty="0">
                 <a:solidFill>
                   <a:srgbClr val="1971FF"/>
                 </a:solidFill>
               </a:rPr>
               <a:t>LED</a:t>
             </a:r>
-            <a:endParaRPr lang="zh-CN" altLang="en-US" sz="1600" b="1" dirty="0">
+            <a:endParaRPr lang="zh-CN" altLang="en-US" sz="1400" b="1" dirty="0">
               <a:solidFill>
                 <a:srgbClr val="1971FF"/>
               </a:solidFill>
@@ -7143,8 +7648,8 @@
         </p:nvSpPr>
         <p:spPr>
           <a:xfrm>
-            <a:off x="8048876" y="560757"/>
-            <a:ext cx="1084320" cy="538343"/>
+            <a:off x="8048876" y="696215"/>
+            <a:ext cx="1084320" cy="460502"/>
           </a:xfrm>
           <a:prstGeom prst="rect">
             <a:avLst/>
@@ -7159,11 +7664,11 @@
           <a:p>
             <a:pPr algn="ctr">
               <a:lnSpc>
-                <a:spcPts val="1800"/>
+                <a:spcPct val="90000"/>
               </a:lnSpc>
             </a:pPr>
             <a:r>
-              <a:rPr lang="en-US" altLang="zh-CN" sz="1600" b="1" dirty="0">
+              <a:rPr lang="en-US" altLang="zh-CN" sz="1400" b="1" dirty="0">
                 <a:solidFill>
                   <a:schemeClr val="accent2">
                     <a:lumMod val="75000"/>
@@ -7176,20 +7681,20 @@
           <a:p>
             <a:pPr algn="ctr">
               <a:lnSpc>
-                <a:spcPts val="1800"/>
+                <a:spcPct val="90000"/>
               </a:lnSpc>
             </a:pPr>
             <a:r>
-              <a:rPr lang="en-US" altLang="zh-CN" sz="1600" b="1" dirty="0">
+              <a:rPr lang="en-US" altLang="zh-CN" sz="1400" b="1" dirty="0">
                 <a:solidFill>
                   <a:schemeClr val="accent2">
                     <a:lumMod val="75000"/>
                   </a:schemeClr>
                 </a:solidFill>
               </a:rPr>
-              <a:t>Mode</a:t>
+              <a:t>Direction</a:t>
             </a:r>
-            <a:endParaRPr lang="zh-CN" altLang="en-US" sz="1600" b="1" dirty="0">
+            <a:endParaRPr lang="zh-CN" altLang="en-US" sz="1400" b="1" dirty="0">
               <a:solidFill>
                 <a:schemeClr val="accent2">
                   <a:lumMod val="75000"/>
@@ -7217,8 +7722,8 @@
         </p:nvCxnSpPr>
         <p:spPr>
           <a:xfrm>
-            <a:off x="8591036" y="1099100"/>
-            <a:ext cx="3446" cy="259567"/>
+            <a:off x="8591036" y="1156717"/>
+            <a:ext cx="3446" cy="201950"/>
           </a:xfrm>
           <a:prstGeom prst="line">
             <a:avLst/>
@@ -7262,8 +7767,8 @@
         </p:nvSpPr>
         <p:spPr>
           <a:xfrm>
-            <a:off x="9006808" y="560757"/>
-            <a:ext cx="803713" cy="538343"/>
+            <a:off x="9006808" y="696215"/>
+            <a:ext cx="809907" cy="460502"/>
           </a:xfrm>
           <a:prstGeom prst="rect">
             <a:avLst/>
@@ -7278,11 +7783,11 @@
           <a:p>
             <a:pPr algn="ctr">
               <a:lnSpc>
-                <a:spcPts val="1800"/>
+                <a:spcPct val="90000"/>
               </a:lnSpc>
             </a:pPr>
             <a:r>
-              <a:rPr lang="en-US" altLang="zh-CN" sz="1600" b="1" dirty="0">
+              <a:rPr lang="en-US" altLang="zh-CN" sz="1400" b="1" dirty="0">
                 <a:solidFill>
                   <a:schemeClr val="accent5">
                     <a:lumMod val="75000"/>
@@ -7295,20 +7800,20 @@
           <a:p>
             <a:pPr algn="ctr">
               <a:lnSpc>
-                <a:spcPts val="1800"/>
+                <a:spcPct val="90000"/>
               </a:lnSpc>
             </a:pPr>
             <a:r>
-              <a:rPr lang="en-US" altLang="zh-CN" sz="1600" b="1" dirty="0">
+              <a:rPr lang="en-US" altLang="zh-CN" sz="1400" b="1" dirty="0">
                 <a:solidFill>
                   <a:schemeClr val="accent5">
                     <a:lumMod val="75000"/>
                   </a:schemeClr>
                 </a:solidFill>
               </a:rPr>
-              <a:t>Mode</a:t>
+              <a:t>Direction</a:t>
             </a:r>
-            <a:endParaRPr lang="zh-CN" altLang="en-US" sz="1600" b="1" dirty="0">
+            <a:endParaRPr lang="zh-CN" altLang="en-US" sz="1400" b="1" dirty="0">
               <a:solidFill>
                 <a:schemeClr val="accent5">
                   <a:lumMod val="75000"/>
@@ -7336,8 +7841,8 @@
         </p:nvCxnSpPr>
         <p:spPr>
           <a:xfrm flipH="1">
-            <a:off x="9406489" y="1099100"/>
-            <a:ext cx="2176" cy="259567"/>
+            <a:off x="9406489" y="1156717"/>
+            <a:ext cx="5273" cy="201950"/>
           </a:xfrm>
           <a:prstGeom prst="line">
             <a:avLst/>
@@ -7427,7 +7932,7 @@
         </p:nvSpPr>
         <p:spPr>
           <a:xfrm>
-            <a:off x="10222848" y="626864"/>
+            <a:off x="10222848" y="724230"/>
             <a:ext cx="803713" cy="406128"/>
           </a:xfrm>
           <a:prstGeom prst="rect">
@@ -7509,9 +8014,9 @@
           <p:nvPr/>
         </p:nvCxnSpPr>
         <p:spPr>
-          <a:xfrm flipV="1">
-            <a:off x="9810521" y="829928"/>
-            <a:ext cx="412327" cy="1"/>
+          <a:xfrm>
+            <a:off x="9816715" y="926466"/>
+            <a:ext cx="406133" cy="828"/>
           </a:xfrm>
           <a:prstGeom prst="bentConnector3">
             <a:avLst>
@@ -7557,7 +8062,7 @@
         </p:nvSpPr>
         <p:spPr>
           <a:xfrm>
-            <a:off x="7907518" y="171991"/>
+            <a:off x="7907518" y="290517"/>
             <a:ext cx="1369141" cy="252239"/>
           </a:xfrm>
           <a:prstGeom prst="rect">
@@ -7633,8 +8138,8 @@
         </p:nvCxnSpPr>
         <p:spPr>
           <a:xfrm rot="5400000">
-            <a:off x="8523300" y="491967"/>
-            <a:ext cx="136527" cy="1053"/>
+            <a:off x="8514834" y="618959"/>
+            <a:ext cx="153459" cy="1053"/>
           </a:xfrm>
           <a:prstGeom prst="bentConnector3">
             <a:avLst>
@@ -7764,7 +8269,7 @@
           <a:p>
             <a:r>
               <a:rPr lang="en-US" altLang="zh-CN" dirty="0"/>
-              <a:t>Resolution</a:t>
+              <a:t>Turntable Resolution</a:t>
             </a:r>
             <a:endParaRPr lang="zh-CN" altLang="en-US" dirty="0"/>
           </a:p>

</xml_diff>

<commit_message>
LR2 mode in sensor setup
</commit_message>
<xml_diff>
--- a/doc/Firmware_manual.pptx
+++ b/doc/Firmware_manual.pptx
@@ -217,7 +217,7 @@
           <a:p>
             <a:fld id="{99D69C7F-8110-406B-A63E-81EB2EBDFE06}" type="datetimeFigureOut">
               <a:rPr lang="zh-CN" altLang="en-US" smtClean="0"/>
-              <a:t>2025/5/3</a:t>
+              <a:t>2025/5/21</a:t>
             </a:fld>
             <a:endParaRPr lang="zh-CN" altLang="en-US"/>
           </a:p>
@@ -395,7 +395,7 @@
           <a:p>
             <a:fld id="{002F3B7A-C25F-4CE1-8FEE-39C6D6ACD16A}" type="datetimeFigureOut">
               <a:rPr lang="zh-CN" altLang="en-US" smtClean="0"/>
-              <a:t>2025/5/3</a:t>
+              <a:t>2025/5/21</a:t>
             </a:fld>
             <a:endParaRPr lang="zh-CN" altLang="en-US"/>
           </a:p>
@@ -7811,7 +7811,7 @@
                   </a:schemeClr>
                 </a:solidFill>
               </a:rPr>
-              <a:t>Direction</a:t>
+              <a:t>Mode</a:t>
             </a:r>
             <a:endParaRPr lang="zh-CN" altLang="en-US" sz="1400" b="1" dirty="0">
               <a:solidFill>
@@ -7932,8 +7932,8 @@
         </p:nvSpPr>
         <p:spPr>
           <a:xfrm>
-            <a:off x="10222848" y="724230"/>
-            <a:ext cx="803713" cy="406128"/>
+            <a:off x="10222848" y="639566"/>
+            <a:ext cx="809907" cy="572840"/>
           </a:xfrm>
           <a:prstGeom prst="rect">
             <a:avLst/>
@@ -7956,21 +7956,6 @@
             <a:spAutoFit/>
           </a:bodyPr>
           <a:lstStyle/>
-          <a:p>
-            <a:pPr>
-              <a:lnSpc>
-                <a:spcPts val="1300"/>
-              </a:lnSpc>
-            </a:pPr>
-            <a:r>
-              <a:rPr lang="en-US" altLang="zh-CN" sz="1200" b="1" dirty="0">
-                <a:solidFill>
-                  <a:srgbClr val="00B0F0"/>
-                </a:solidFill>
-              </a:rPr>
-              <a:t>Normal</a:t>
-            </a:r>
-          </a:p>
           <a:p>
             <a:pPr>
               <a:lnSpc>
@@ -7985,13 +7970,43 @@
                   </a:schemeClr>
                 </a:solidFill>
               </a:rPr>
+              <a:t>Normal</a:t>
+            </a:r>
+          </a:p>
+          <a:p>
+            <a:pPr>
+              <a:lnSpc>
+                <a:spcPts val="1300"/>
+              </a:lnSpc>
+            </a:pPr>
+            <a:r>
+              <a:rPr lang="en-US" altLang="zh-CN" sz="1200" b="1" dirty="0">
+                <a:solidFill>
+                  <a:srgbClr val="00B0F0"/>
+                </a:solidFill>
+              </a:rPr>
               <a:t>Reversed</a:t>
+            </a:r>
+            <a:br>
+              <a:rPr lang="en-US" altLang="zh-CN" sz="1200" b="1" dirty="0">
+                <a:solidFill>
+                  <a:schemeClr val="accent4">
+                    <a:lumMod val="75000"/>
+                  </a:schemeClr>
+                </a:solidFill>
+              </a:rPr>
+            </a:br>
+            <a:r>
+              <a:rPr lang="en-US" altLang="zh-CN" sz="1200" b="1" dirty="0">
+                <a:solidFill>
+                  <a:srgbClr val="FF0000"/>
+                </a:solidFill>
+              </a:rPr>
+              <a:t>LR2</a:t>
             </a:r>
             <a:endParaRPr lang="zh-CN" altLang="en-US" sz="1200" b="1" dirty="0">
               <a:solidFill>
-                <a:schemeClr val="accent4">
-                  <a:lumMod val="75000"/>
-                </a:schemeClr>
+                <a:srgbClr val="FF0000"/>
               </a:solidFill>
             </a:endParaRPr>
           </a:p>
@@ -8014,9 +8029,9 @@
           <p:nvPr/>
         </p:nvCxnSpPr>
         <p:spPr>
-          <a:xfrm>
-            <a:off x="9816715" y="926466"/>
-            <a:ext cx="406133" cy="828"/>
+          <a:xfrm flipV="1">
+            <a:off x="9816715" y="925986"/>
+            <a:ext cx="406133" cy="480"/>
           </a:xfrm>
           <a:prstGeom prst="bentConnector3">
             <a:avLst>
@@ -8095,7 +8110,9 @@
             <a:r>
               <a:rPr lang="en-US" altLang="zh-CN" sz="1200" b="1" dirty="0">
                 <a:solidFill>
-                  <a:srgbClr val="009E47"/>
+                  <a:schemeClr val="accent4">
+                    <a:lumMod val="75000"/>
+                  </a:schemeClr>
                 </a:solidFill>
               </a:rPr>
               <a:t>Normal</a:t>
@@ -8106,17 +8123,8 @@
                   <a:srgbClr val="00B0F0"/>
                 </a:solidFill>
               </a:rPr>
-              <a:t> </a:t>
+              <a:t> Reversed</a:t>
             </a:r>
-            <a:r>
-              <a:rPr lang="en-US" altLang="zh-CN" sz="1200" b="1" dirty="0">
-                <a:solidFill>
-                  <a:srgbClr val="FF0000"/>
-                </a:solidFill>
-              </a:rPr>
-              <a:t>Reversed</a:t>
-            </a:r>
-            <a:endParaRPr lang="en-US" altLang="zh-CN" sz="1200" b="1" dirty="0"/>
           </a:p>
         </p:txBody>
       </p:sp>

</xml_diff>